<commit_message>
Tag-3_2: Installation Linux/Windows GitLab-Runner, uvm.
</commit_message>
<xml_diff>
--- a/slides/Tag-3_2-GitLab-Runner-Container-Registry.pptx
+++ b/slides/Tag-3_2-GitLab-Runner-Container-Registry.pptx
@@ -1,15 +1,15 @@
 
 <file path=ppt/presentation.xml><?xml version="1.0" encoding="utf-8"?>
-<p:presentation xmlns:a="http://schemas.openxmlformats.org/drawingml/2006/main" xmlns:r="http://schemas.openxmlformats.org/officeDocument/2006/relationships" xmlns:p="http://schemas.openxmlformats.org/presentationml/2006/main" strictFirstAndLastChars="0" saveSubsetFonts="1">
+<p:presentation xmlns:a="http://schemas.openxmlformats.org/drawingml/2006/main" xmlns:r="http://schemas.openxmlformats.org/officeDocument/2006/relationships" xmlns:p="http://schemas.openxmlformats.org/presentationml/2006/main" strictFirstAndLastChars="0" saveSubsetFonts="1" bookmarkIdSeed="2">
   <p:sldMasterIdLst>
     <p:sldMasterId id="2147483648" r:id="rId1"/>
     <p:sldMasterId id="2147483649" r:id="rId2"/>
   </p:sldMasterIdLst>
   <p:notesMasterIdLst>
-    <p:notesMasterId r:id="rId22"/>
+    <p:notesMasterId r:id="rId32"/>
   </p:notesMasterIdLst>
   <p:handoutMasterIdLst>
-    <p:handoutMasterId r:id="rId23"/>
+    <p:handoutMasterId r:id="rId33"/>
   </p:handoutMasterIdLst>
   <p:sldIdLst>
     <p:sldId id="288" r:id="rId3"/>
@@ -24,13 +24,23 @@
     <p:sldId id="601" r:id="rId12"/>
     <p:sldId id="603" r:id="rId13"/>
     <p:sldId id="589" r:id="rId14"/>
-    <p:sldId id="590" r:id="rId15"/>
-    <p:sldId id="591" r:id="rId16"/>
-    <p:sldId id="592" r:id="rId17"/>
-    <p:sldId id="593" r:id="rId18"/>
-    <p:sldId id="594" r:id="rId19"/>
-    <p:sldId id="597" r:id="rId20"/>
-    <p:sldId id="595" r:id="rId21"/>
+    <p:sldId id="604" r:id="rId15"/>
+    <p:sldId id="590" r:id="rId16"/>
+    <p:sldId id="605" r:id="rId17"/>
+    <p:sldId id="606" r:id="rId18"/>
+    <p:sldId id="607" r:id="rId19"/>
+    <p:sldId id="612" r:id="rId20"/>
+    <p:sldId id="608" r:id="rId21"/>
+    <p:sldId id="609" r:id="rId22"/>
+    <p:sldId id="611" r:id="rId23"/>
+    <p:sldId id="610" r:id="rId24"/>
+    <p:sldId id="613" r:id="rId25"/>
+    <p:sldId id="591" r:id="rId26"/>
+    <p:sldId id="592" r:id="rId27"/>
+    <p:sldId id="593" r:id="rId28"/>
+    <p:sldId id="594" r:id="rId29"/>
+    <p:sldId id="597" r:id="rId30"/>
+    <p:sldId id="595" r:id="rId31"/>
   </p:sldIdLst>
   <p:sldSz cx="9144000" cy="6858000" type="screen4x3"/>
   <p:notesSz cx="6784975" cy="9921875"/>
@@ -1374,10 +1384,187 @@
           <a:bodyPr/>
           <a:lstStyle/>
           <a:p>
-            <a:r>
-              <a:rPr lang="de-DE" dirty="0"/>
-              <a:t>https://docs.gitlab.com/ee/ci/runners/configure_runners.html</a:t>
-            </a:r>
+            <a:endParaRPr lang="de-DE" dirty="0"/>
+          </a:p>
+          <a:p>
+            <a:r>
+              <a:rPr lang="de-DE" dirty="0"/>
+              <a:t>https://docs.gitlab.com/runner/install/</a:t>
+            </a:r>
+          </a:p>
+          <a:p>
+            <a:r>
+              <a:rPr lang="de-DE" dirty="0"/>
+              <a:t>https://help.itc.rwth-aachen.de/service/ubrf9cmzd17m/article/2abb4436ab0544a0aabe6f466e6159cd/</a:t>
+            </a:r>
+          </a:p>
+          <a:p>
+            <a:endParaRPr lang="de-DE" dirty="0"/>
+          </a:p>
+          <a:p>
+            <a:r>
+              <a:rPr lang="de-DE" b="0" i="0" dirty="0">
+                <a:solidFill>
+                  <a:srgbClr val="000000"/>
+                </a:solidFill>
+                <a:effectLst/>
+                <a:latin typeface="Avenir"/>
+              </a:rPr>
+              <a:t>Debian-Benutzer sollten APT-</a:t>
+            </a:r>
+            <a:r>
+              <a:rPr lang="de-DE" b="0" i="0" dirty="0" err="1">
+                <a:solidFill>
+                  <a:srgbClr val="000000"/>
+                </a:solidFill>
+                <a:effectLst/>
+                <a:latin typeface="Avenir"/>
+              </a:rPr>
+              <a:t>Pinning</a:t>
+            </a:r>
+            <a:r>
+              <a:rPr lang="de-DE" b="0" i="0" dirty="0">
+                <a:solidFill>
+                  <a:srgbClr val="000000"/>
+                </a:solidFill>
+                <a:effectLst/>
+                <a:latin typeface="Avenir"/>
+              </a:rPr>
+              <a:t> verwenden.</a:t>
+            </a:r>
+            <a:br>
+              <a:rPr lang="de-DE" dirty="0"/>
+            </a:br>
+            <a:br>
+              <a:rPr lang="de-DE" dirty="0"/>
+            </a:br>
+            <a:r>
+              <a:rPr lang="de-DE" b="0" i="0" dirty="0">
+                <a:solidFill>
+                  <a:srgbClr val="000000"/>
+                </a:solidFill>
+                <a:effectLst/>
+                <a:latin typeface="Avenir"/>
+              </a:rPr>
+              <a:t>Seit Debian Stretch haben die Debian-</a:t>
+            </a:r>
+            <a:r>
+              <a:rPr lang="de-DE" b="0" i="0" dirty="0" err="1">
+                <a:solidFill>
+                  <a:srgbClr val="000000"/>
+                </a:solidFill>
+                <a:effectLst/>
+                <a:latin typeface="Avenir"/>
+              </a:rPr>
+              <a:t>Maintainer</a:t>
+            </a:r>
+            <a:r>
+              <a:rPr lang="de-DE" b="0" i="0" dirty="0">
+                <a:solidFill>
+                  <a:srgbClr val="000000"/>
+                </a:solidFill>
+                <a:effectLst/>
+                <a:latin typeface="Avenir"/>
+              </a:rPr>
+              <a:t> ihr natives Paket mit dem gleichen Namen wie das offizielle </a:t>
+            </a:r>
+            <a:r>
+              <a:rPr lang="de-DE" b="0" i="0" dirty="0" err="1">
+                <a:solidFill>
+                  <a:srgbClr val="000000"/>
+                </a:solidFill>
+                <a:effectLst/>
+                <a:latin typeface="Avenir"/>
+              </a:rPr>
+              <a:t>GitLab</a:t>
+            </a:r>
+            <a:r>
+              <a:rPr lang="de-DE" b="0" i="0" dirty="0">
+                <a:solidFill>
+                  <a:srgbClr val="000000"/>
+                </a:solidFill>
+                <a:effectLst/>
+                <a:latin typeface="Avenir"/>
+              </a:rPr>
+              <a:t> Paket hinzugefügt, und standardmäßig haben die offiziellen </a:t>
+            </a:r>
+            <a:r>
+              <a:rPr lang="de-DE" b="0" i="0" dirty="0" err="1">
+                <a:solidFill>
+                  <a:srgbClr val="000000"/>
+                </a:solidFill>
+                <a:effectLst/>
+                <a:latin typeface="Avenir"/>
+              </a:rPr>
+              <a:t>Repositories</a:t>
+            </a:r>
+            <a:r>
+              <a:rPr lang="de-DE" b="0" i="0" dirty="0">
+                <a:solidFill>
+                  <a:srgbClr val="000000"/>
+                </a:solidFill>
+                <a:effectLst/>
+                <a:latin typeface="Avenir"/>
+              </a:rPr>
+              <a:t> eine höhere Priorität.</a:t>
+            </a:r>
+            <a:br>
+              <a:rPr lang="de-DE" dirty="0"/>
+            </a:br>
+            <a:br>
+              <a:rPr lang="de-DE" dirty="0"/>
+            </a:br>
+            <a:r>
+              <a:rPr lang="de-DE" b="0" i="0" dirty="0">
+                <a:solidFill>
+                  <a:srgbClr val="000000"/>
+                </a:solidFill>
+                <a:effectLst/>
+                <a:latin typeface="Avenir"/>
+              </a:rPr>
+              <a:t>Wenn Sie das offizielle </a:t>
+            </a:r>
+            <a:r>
+              <a:rPr lang="de-DE" b="0" i="0" dirty="0" err="1">
+                <a:solidFill>
+                  <a:srgbClr val="000000"/>
+                </a:solidFill>
+                <a:effectLst/>
+                <a:latin typeface="Avenir"/>
+              </a:rPr>
+              <a:t>GitLab</a:t>
+            </a:r>
+            <a:r>
+              <a:rPr lang="de-DE" b="0" i="0" dirty="0">
+                <a:solidFill>
+                  <a:srgbClr val="000000"/>
+                </a:solidFill>
+                <a:effectLst/>
+                <a:latin typeface="Avenir"/>
+              </a:rPr>
+              <a:t> Paket verwenden möchten, sollten Sie die Quelle des Pakets manuell festlegen. Am besten ist es, die </a:t>
+            </a:r>
+            <a:r>
+              <a:rPr lang="de-DE" b="0" i="0" dirty="0" err="1">
+                <a:solidFill>
+                  <a:srgbClr val="000000"/>
+                </a:solidFill>
+                <a:effectLst/>
+                <a:latin typeface="Avenir"/>
+              </a:rPr>
+              <a:t>Pinning</a:t>
+            </a:r>
+            <a:r>
+              <a:rPr lang="de-DE" b="0" i="0" dirty="0">
+                <a:solidFill>
+                  <a:srgbClr val="000000"/>
+                </a:solidFill>
+                <a:effectLst/>
+                <a:latin typeface="Avenir"/>
+              </a:rPr>
+              <a:t>-Konfigurationsdatei hinzuzufügen. Dadurch wird jedes nächste Update des Runner-Pakets - ob manuell oder automatisch - mit derselben Quelle durchgeführt:</a:t>
+            </a:r>
+            <a:endParaRPr lang="de-DE" dirty="0"/>
           </a:p>
         </p:txBody>
       </p:sp>
@@ -1399,7 +1586,941 @@
             <a:fld id="{18182567-388C-4D33-8B7B-A651F195F118}" type="slidenum">
               <a:rPr lang="de-DE" altLang="de-DE" smtClean="0"/>
               <a:pPr/>
-              <a:t>17</a:t>
+              <a:t>18</a:t>
+            </a:fld>
+            <a:endParaRPr lang="de-DE" altLang="de-DE"/>
+          </a:p>
+        </p:txBody>
+      </p:sp>
+    </p:spTree>
+    <p:extLst>
+      <p:ext uri="{BB962C8B-B14F-4D97-AF65-F5344CB8AC3E}">
+        <p14:creationId xmlns:p14="http://schemas.microsoft.com/office/powerpoint/2010/main" val="3900306899"/>
+      </p:ext>
+    </p:extLst>
+  </p:cSld>
+  <p:clrMapOvr>
+    <a:masterClrMapping/>
+  </p:clrMapOvr>
+</p:notes>
+</file>
+
+<file path=ppt/notesSlides/notesSlide11.xml><?xml version="1.0" encoding="utf-8"?>
+<p:notes xmlns:a="http://schemas.openxmlformats.org/drawingml/2006/main" xmlns:r="http://schemas.openxmlformats.org/officeDocument/2006/relationships" xmlns:p="http://schemas.openxmlformats.org/presentationml/2006/main">
+  <p:cSld>
+    <p:spTree>
+      <p:nvGrpSpPr>
+        <p:cNvPr id="1" name=""/>
+        <p:cNvGrpSpPr/>
+        <p:nvPr/>
+      </p:nvGrpSpPr>
+      <p:grpSpPr>
+        <a:xfrm>
+          <a:off x="0" y="0"/>
+          <a:ext cx="0" cy="0"/>
+          <a:chOff x="0" y="0"/>
+          <a:chExt cx="0" cy="0"/>
+        </a:xfrm>
+      </p:grpSpPr>
+      <p:sp>
+        <p:nvSpPr>
+          <p:cNvPr id="2" name="Folienbildplatzhalter 1"/>
+          <p:cNvSpPr>
+            <a:spLocks noGrp="1" noRot="1" noChangeAspect="1"/>
+          </p:cNvSpPr>
+          <p:nvPr>
+            <p:ph type="sldImg"/>
+          </p:nvPr>
+        </p:nvSpPr>
+        <p:spPr/>
+      </p:sp>
+      <p:sp>
+        <p:nvSpPr>
+          <p:cNvPr id="3" name="Notizenplatzhalter 2"/>
+          <p:cNvSpPr>
+            <a:spLocks noGrp="1"/>
+          </p:cNvSpPr>
+          <p:nvPr>
+            <p:ph type="body" idx="1"/>
+          </p:nvPr>
+        </p:nvSpPr>
+        <p:spPr/>
+        <p:txBody>
+          <a:bodyPr/>
+          <a:lstStyle/>
+          <a:p>
+            <a:endParaRPr lang="de-DE" dirty="0"/>
+          </a:p>
+          <a:p>
+            <a:r>
+              <a:rPr lang="de-DE" dirty="0"/>
+              <a:t>https://docs.gitlab.com/runner/install/</a:t>
+            </a:r>
+          </a:p>
+          <a:p>
+            <a:r>
+              <a:rPr lang="de-DE" dirty="0"/>
+              <a:t>https://help.itc.rwth-aachen.de/service/ubrf9cmzd17m/article/2abb4436ab0544a0aabe6f466e6159cd/</a:t>
+            </a:r>
+          </a:p>
+          <a:p>
+            <a:endParaRPr lang="de-DE" dirty="0"/>
+          </a:p>
+          <a:p>
+            <a:endParaRPr lang="de-DE" dirty="0"/>
+          </a:p>
+        </p:txBody>
+      </p:sp>
+      <p:sp>
+        <p:nvSpPr>
+          <p:cNvPr id="4" name="Foliennummernplatzhalter 3"/>
+          <p:cNvSpPr>
+            <a:spLocks noGrp="1"/>
+          </p:cNvSpPr>
+          <p:nvPr>
+            <p:ph type="sldNum" sz="quarter" idx="5"/>
+          </p:nvPr>
+        </p:nvSpPr>
+        <p:spPr/>
+        <p:txBody>
+          <a:bodyPr/>
+          <a:lstStyle/>
+          <a:p>
+            <a:fld id="{18182567-388C-4D33-8B7B-A651F195F118}" type="slidenum">
+              <a:rPr lang="de-DE" altLang="de-DE" smtClean="0"/>
+              <a:pPr/>
+              <a:t>19</a:t>
+            </a:fld>
+            <a:endParaRPr lang="de-DE" altLang="de-DE"/>
+          </a:p>
+        </p:txBody>
+      </p:sp>
+    </p:spTree>
+    <p:extLst>
+      <p:ext uri="{BB962C8B-B14F-4D97-AF65-F5344CB8AC3E}">
+        <p14:creationId xmlns:p14="http://schemas.microsoft.com/office/powerpoint/2010/main" val="489952897"/>
+      </p:ext>
+    </p:extLst>
+  </p:cSld>
+  <p:clrMapOvr>
+    <a:masterClrMapping/>
+  </p:clrMapOvr>
+</p:notes>
+</file>
+
+<file path=ppt/notesSlides/notesSlide12.xml><?xml version="1.0" encoding="utf-8"?>
+<p:notes xmlns:a="http://schemas.openxmlformats.org/drawingml/2006/main" xmlns:r="http://schemas.openxmlformats.org/officeDocument/2006/relationships" xmlns:p="http://schemas.openxmlformats.org/presentationml/2006/main">
+  <p:cSld>
+    <p:spTree>
+      <p:nvGrpSpPr>
+        <p:cNvPr id="1" name=""/>
+        <p:cNvGrpSpPr/>
+        <p:nvPr/>
+      </p:nvGrpSpPr>
+      <p:grpSpPr>
+        <a:xfrm>
+          <a:off x="0" y="0"/>
+          <a:ext cx="0" cy="0"/>
+          <a:chOff x="0" y="0"/>
+          <a:chExt cx="0" cy="0"/>
+        </a:xfrm>
+      </p:grpSpPr>
+      <p:sp>
+        <p:nvSpPr>
+          <p:cNvPr id="2" name="Folienbildplatzhalter 1"/>
+          <p:cNvSpPr>
+            <a:spLocks noGrp="1" noRot="1" noChangeAspect="1"/>
+          </p:cNvSpPr>
+          <p:nvPr>
+            <p:ph type="sldImg"/>
+          </p:nvPr>
+        </p:nvSpPr>
+        <p:spPr/>
+      </p:sp>
+      <p:sp>
+        <p:nvSpPr>
+          <p:cNvPr id="3" name="Notizenplatzhalter 2"/>
+          <p:cNvSpPr>
+            <a:spLocks noGrp="1"/>
+          </p:cNvSpPr>
+          <p:nvPr>
+            <p:ph type="body" idx="1"/>
+          </p:nvPr>
+        </p:nvSpPr>
+        <p:spPr/>
+        <p:txBody>
+          <a:bodyPr/>
+          <a:lstStyle/>
+          <a:p>
+            <a:endParaRPr lang="de-DE" dirty="0"/>
+          </a:p>
+          <a:p>
+            <a:r>
+              <a:rPr lang="de-DE" dirty="0"/>
+              <a:t>https://docs.gitlab.com/runner/install/</a:t>
+            </a:r>
+          </a:p>
+          <a:p>
+            <a:r>
+              <a:rPr lang="de-DE" dirty="0"/>
+              <a:t>https://help.itc.rwth-aachen.de/service/ubrf9cmzd17m/article/2abb4436ab0544a0aabe6f466e6159cd/</a:t>
+            </a:r>
+          </a:p>
+          <a:p>
+            <a:endParaRPr lang="de-DE" dirty="0"/>
+          </a:p>
+          <a:p>
+            <a:endParaRPr lang="de-DE" dirty="0"/>
+          </a:p>
+        </p:txBody>
+      </p:sp>
+      <p:sp>
+        <p:nvSpPr>
+          <p:cNvPr id="4" name="Foliennummernplatzhalter 3"/>
+          <p:cNvSpPr>
+            <a:spLocks noGrp="1"/>
+          </p:cNvSpPr>
+          <p:nvPr>
+            <p:ph type="sldNum" sz="quarter" idx="5"/>
+          </p:nvPr>
+        </p:nvSpPr>
+        <p:spPr/>
+        <p:txBody>
+          <a:bodyPr/>
+          <a:lstStyle/>
+          <a:p>
+            <a:fld id="{18182567-388C-4D33-8B7B-A651F195F118}" type="slidenum">
+              <a:rPr lang="de-DE" altLang="de-DE" smtClean="0"/>
+              <a:pPr/>
+              <a:t>20</a:t>
+            </a:fld>
+            <a:endParaRPr lang="de-DE" altLang="de-DE"/>
+          </a:p>
+        </p:txBody>
+      </p:sp>
+    </p:spTree>
+    <p:extLst>
+      <p:ext uri="{BB962C8B-B14F-4D97-AF65-F5344CB8AC3E}">
+        <p14:creationId xmlns:p14="http://schemas.microsoft.com/office/powerpoint/2010/main" val="741395206"/>
+      </p:ext>
+    </p:extLst>
+  </p:cSld>
+  <p:clrMapOvr>
+    <a:masterClrMapping/>
+  </p:clrMapOvr>
+</p:notes>
+</file>
+
+<file path=ppt/notesSlides/notesSlide13.xml><?xml version="1.0" encoding="utf-8"?>
+<p:notes xmlns:a="http://schemas.openxmlformats.org/drawingml/2006/main" xmlns:r="http://schemas.openxmlformats.org/officeDocument/2006/relationships" xmlns:p="http://schemas.openxmlformats.org/presentationml/2006/main">
+  <p:cSld>
+    <p:spTree>
+      <p:nvGrpSpPr>
+        <p:cNvPr id="1" name=""/>
+        <p:cNvGrpSpPr/>
+        <p:nvPr/>
+      </p:nvGrpSpPr>
+      <p:grpSpPr>
+        <a:xfrm>
+          <a:off x="0" y="0"/>
+          <a:ext cx="0" cy="0"/>
+          <a:chOff x="0" y="0"/>
+          <a:chExt cx="0" cy="0"/>
+        </a:xfrm>
+      </p:grpSpPr>
+      <p:sp>
+        <p:nvSpPr>
+          <p:cNvPr id="2" name="Folienbildplatzhalter 1"/>
+          <p:cNvSpPr>
+            <a:spLocks noGrp="1" noRot="1" noChangeAspect="1"/>
+          </p:cNvSpPr>
+          <p:nvPr>
+            <p:ph type="sldImg"/>
+          </p:nvPr>
+        </p:nvSpPr>
+        <p:spPr/>
+      </p:sp>
+      <p:sp>
+        <p:nvSpPr>
+          <p:cNvPr id="3" name="Notizenplatzhalter 2"/>
+          <p:cNvSpPr>
+            <a:spLocks noGrp="1"/>
+          </p:cNvSpPr>
+          <p:nvPr>
+            <p:ph type="body" idx="1"/>
+          </p:nvPr>
+        </p:nvSpPr>
+        <p:spPr/>
+        <p:txBody>
+          <a:bodyPr/>
+          <a:lstStyle/>
+          <a:p>
+            <a:endParaRPr lang="de-DE" dirty="0"/>
+          </a:p>
+          <a:p>
+            <a:r>
+              <a:rPr lang="de-DE" dirty="0"/>
+              <a:t>https://docs.gitlab.com/runner/install/</a:t>
+            </a:r>
+          </a:p>
+          <a:p>
+            <a:r>
+              <a:rPr lang="de-DE" dirty="0"/>
+              <a:t>https://help.itc.rwth-aachen.de/service/ubrf9cmzd17m/article/2abb4436ab0544a0aabe6f466e6159cd/</a:t>
+            </a:r>
+          </a:p>
+          <a:p>
+            <a:endParaRPr lang="de-DE" dirty="0"/>
+          </a:p>
+          <a:p>
+            <a:endParaRPr lang="de-DE" dirty="0"/>
+          </a:p>
+        </p:txBody>
+      </p:sp>
+      <p:sp>
+        <p:nvSpPr>
+          <p:cNvPr id="4" name="Foliennummernplatzhalter 3"/>
+          <p:cNvSpPr>
+            <a:spLocks noGrp="1"/>
+          </p:cNvSpPr>
+          <p:nvPr>
+            <p:ph type="sldNum" sz="quarter" idx="5"/>
+          </p:nvPr>
+        </p:nvSpPr>
+        <p:spPr/>
+        <p:txBody>
+          <a:bodyPr/>
+          <a:lstStyle/>
+          <a:p>
+            <a:fld id="{18182567-388C-4D33-8B7B-A651F195F118}" type="slidenum">
+              <a:rPr lang="de-DE" altLang="de-DE" smtClean="0"/>
+              <a:pPr/>
+              <a:t>21</a:t>
+            </a:fld>
+            <a:endParaRPr lang="de-DE" altLang="de-DE"/>
+          </a:p>
+        </p:txBody>
+      </p:sp>
+    </p:spTree>
+    <p:extLst>
+      <p:ext uri="{BB962C8B-B14F-4D97-AF65-F5344CB8AC3E}">
+        <p14:creationId xmlns:p14="http://schemas.microsoft.com/office/powerpoint/2010/main" val="268993880"/>
+      </p:ext>
+    </p:extLst>
+  </p:cSld>
+  <p:clrMapOvr>
+    <a:masterClrMapping/>
+  </p:clrMapOvr>
+</p:notes>
+</file>
+
+<file path=ppt/notesSlides/notesSlide14.xml><?xml version="1.0" encoding="utf-8"?>
+<p:notes xmlns:a="http://schemas.openxmlformats.org/drawingml/2006/main" xmlns:r="http://schemas.openxmlformats.org/officeDocument/2006/relationships" xmlns:p="http://schemas.openxmlformats.org/presentationml/2006/main">
+  <p:cSld>
+    <p:spTree>
+      <p:nvGrpSpPr>
+        <p:cNvPr id="1" name=""/>
+        <p:cNvGrpSpPr/>
+        <p:nvPr/>
+      </p:nvGrpSpPr>
+      <p:grpSpPr>
+        <a:xfrm>
+          <a:off x="0" y="0"/>
+          <a:ext cx="0" cy="0"/>
+          <a:chOff x="0" y="0"/>
+          <a:chExt cx="0" cy="0"/>
+        </a:xfrm>
+      </p:grpSpPr>
+      <p:sp>
+        <p:nvSpPr>
+          <p:cNvPr id="2" name="Folienbildplatzhalter 1"/>
+          <p:cNvSpPr>
+            <a:spLocks noGrp="1" noRot="1" noChangeAspect="1"/>
+          </p:cNvSpPr>
+          <p:nvPr>
+            <p:ph type="sldImg"/>
+          </p:nvPr>
+        </p:nvSpPr>
+        <p:spPr/>
+      </p:sp>
+      <p:sp>
+        <p:nvSpPr>
+          <p:cNvPr id="3" name="Notizenplatzhalter 2"/>
+          <p:cNvSpPr>
+            <a:spLocks noGrp="1"/>
+          </p:cNvSpPr>
+          <p:nvPr>
+            <p:ph type="body" idx="1"/>
+          </p:nvPr>
+        </p:nvSpPr>
+        <p:spPr/>
+        <p:txBody>
+          <a:bodyPr/>
+          <a:lstStyle/>
+          <a:p>
+            <a:endParaRPr lang="de-DE" dirty="0"/>
+          </a:p>
+          <a:p>
+            <a:r>
+              <a:rPr lang="de-DE" dirty="0"/>
+              <a:t>https://docs.gitlab.com/runner/install/</a:t>
+            </a:r>
+          </a:p>
+          <a:p>
+            <a:r>
+              <a:rPr lang="de-DE" dirty="0"/>
+              <a:t>https://help.itc.rwth-aachen.de/service/ubrf9cmzd17m/article/2abb4436ab0544a0aabe6f466e6159cd/</a:t>
+            </a:r>
+          </a:p>
+          <a:p>
+            <a:endParaRPr lang="de-DE" dirty="0"/>
+          </a:p>
+          <a:p>
+            <a:endParaRPr lang="de-DE" dirty="0"/>
+          </a:p>
+        </p:txBody>
+      </p:sp>
+      <p:sp>
+        <p:nvSpPr>
+          <p:cNvPr id="4" name="Foliennummernplatzhalter 3"/>
+          <p:cNvSpPr>
+            <a:spLocks noGrp="1"/>
+          </p:cNvSpPr>
+          <p:nvPr>
+            <p:ph type="sldNum" sz="quarter" idx="5"/>
+          </p:nvPr>
+        </p:nvSpPr>
+        <p:spPr/>
+        <p:txBody>
+          <a:bodyPr/>
+          <a:lstStyle/>
+          <a:p>
+            <a:fld id="{18182567-388C-4D33-8B7B-A651F195F118}" type="slidenum">
+              <a:rPr lang="de-DE" altLang="de-DE" smtClean="0"/>
+              <a:pPr/>
+              <a:t>22</a:t>
+            </a:fld>
+            <a:endParaRPr lang="de-DE" altLang="de-DE"/>
+          </a:p>
+        </p:txBody>
+      </p:sp>
+    </p:spTree>
+    <p:extLst>
+      <p:ext uri="{BB962C8B-B14F-4D97-AF65-F5344CB8AC3E}">
+        <p14:creationId xmlns:p14="http://schemas.microsoft.com/office/powerpoint/2010/main" val="2851199745"/>
+      </p:ext>
+    </p:extLst>
+  </p:cSld>
+  <p:clrMapOvr>
+    <a:masterClrMapping/>
+  </p:clrMapOvr>
+</p:notes>
+</file>
+
+<file path=ppt/notesSlides/notesSlide15.xml><?xml version="1.0" encoding="utf-8"?>
+<p:notes xmlns:a="http://schemas.openxmlformats.org/drawingml/2006/main" xmlns:r="http://schemas.openxmlformats.org/officeDocument/2006/relationships" xmlns:p="http://schemas.openxmlformats.org/presentationml/2006/main">
+  <p:cSld>
+    <p:spTree>
+      <p:nvGrpSpPr>
+        <p:cNvPr id="1" name=""/>
+        <p:cNvGrpSpPr/>
+        <p:nvPr/>
+      </p:nvGrpSpPr>
+      <p:grpSpPr>
+        <a:xfrm>
+          <a:off x="0" y="0"/>
+          <a:ext cx="0" cy="0"/>
+          <a:chOff x="0" y="0"/>
+          <a:chExt cx="0" cy="0"/>
+        </a:xfrm>
+      </p:grpSpPr>
+      <p:sp>
+        <p:nvSpPr>
+          <p:cNvPr id="2" name="Folienbildplatzhalter 1"/>
+          <p:cNvSpPr>
+            <a:spLocks noGrp="1" noRot="1" noChangeAspect="1"/>
+          </p:cNvSpPr>
+          <p:nvPr>
+            <p:ph type="sldImg"/>
+          </p:nvPr>
+        </p:nvSpPr>
+        <p:spPr/>
+      </p:sp>
+      <p:sp>
+        <p:nvSpPr>
+          <p:cNvPr id="3" name="Notizenplatzhalter 2"/>
+          <p:cNvSpPr>
+            <a:spLocks noGrp="1"/>
+          </p:cNvSpPr>
+          <p:nvPr>
+            <p:ph type="body" idx="1"/>
+          </p:nvPr>
+        </p:nvSpPr>
+        <p:spPr/>
+        <p:txBody>
+          <a:bodyPr/>
+          <a:lstStyle/>
+          <a:p>
+            <a:endParaRPr lang="de-DE" dirty="0"/>
+          </a:p>
+          <a:p>
+            <a:r>
+              <a:rPr lang="de-DE" dirty="0"/>
+              <a:t>https://docs.gitlab.com/runner/install/</a:t>
+            </a:r>
+          </a:p>
+          <a:p>
+            <a:r>
+              <a:rPr lang="de-DE" dirty="0"/>
+              <a:t>https://help.itc.rwth-aachen.de/service/ubrf9cmzd17m/article/2abb4436ab0544a0aabe6f466e6159cd/</a:t>
+            </a:r>
+          </a:p>
+          <a:p>
+            <a:endParaRPr lang="de-DE" dirty="0"/>
+          </a:p>
+          <a:p>
+            <a:endParaRPr lang="de-DE" dirty="0"/>
+          </a:p>
+        </p:txBody>
+      </p:sp>
+      <p:sp>
+        <p:nvSpPr>
+          <p:cNvPr id="4" name="Foliennummernplatzhalter 3"/>
+          <p:cNvSpPr>
+            <a:spLocks noGrp="1"/>
+          </p:cNvSpPr>
+          <p:nvPr>
+            <p:ph type="sldNum" sz="quarter" idx="5"/>
+          </p:nvPr>
+        </p:nvSpPr>
+        <p:spPr/>
+        <p:txBody>
+          <a:bodyPr/>
+          <a:lstStyle/>
+          <a:p>
+            <a:fld id="{18182567-388C-4D33-8B7B-A651F195F118}" type="slidenum">
+              <a:rPr lang="de-DE" altLang="de-DE" smtClean="0"/>
+              <a:pPr/>
+              <a:t>23</a:t>
+            </a:fld>
+            <a:endParaRPr lang="de-DE" altLang="de-DE"/>
+          </a:p>
+        </p:txBody>
+      </p:sp>
+    </p:spTree>
+    <p:extLst>
+      <p:ext uri="{BB962C8B-B14F-4D97-AF65-F5344CB8AC3E}">
+        <p14:creationId xmlns:p14="http://schemas.microsoft.com/office/powerpoint/2010/main" val="4006915865"/>
+      </p:ext>
+    </p:extLst>
+  </p:cSld>
+  <p:clrMapOvr>
+    <a:masterClrMapping/>
+  </p:clrMapOvr>
+</p:notes>
+</file>
+
+<file path=ppt/notesSlides/notesSlide16.xml><?xml version="1.0" encoding="utf-8"?>
+<p:notes xmlns:a="http://schemas.openxmlformats.org/drawingml/2006/main" xmlns:r="http://schemas.openxmlformats.org/officeDocument/2006/relationships" xmlns:p="http://schemas.openxmlformats.org/presentationml/2006/main">
+  <p:cSld>
+    <p:spTree>
+      <p:nvGrpSpPr>
+        <p:cNvPr id="1" name=""/>
+        <p:cNvGrpSpPr/>
+        <p:nvPr/>
+      </p:nvGrpSpPr>
+      <p:grpSpPr>
+        <a:xfrm>
+          <a:off x="0" y="0"/>
+          <a:ext cx="0" cy="0"/>
+          <a:chOff x="0" y="0"/>
+          <a:chExt cx="0" cy="0"/>
+        </a:xfrm>
+      </p:grpSpPr>
+      <p:sp>
+        <p:nvSpPr>
+          <p:cNvPr id="2" name="Folienbildplatzhalter 1"/>
+          <p:cNvSpPr>
+            <a:spLocks noGrp="1" noRot="1" noChangeAspect="1"/>
+          </p:cNvSpPr>
+          <p:nvPr>
+            <p:ph type="sldImg"/>
+          </p:nvPr>
+        </p:nvSpPr>
+        <p:spPr/>
+      </p:sp>
+      <p:sp>
+        <p:nvSpPr>
+          <p:cNvPr id="3" name="Notizenplatzhalter 2"/>
+          <p:cNvSpPr>
+            <a:spLocks noGrp="1"/>
+          </p:cNvSpPr>
+          <p:nvPr>
+            <p:ph type="body" idx="1"/>
+          </p:nvPr>
+        </p:nvSpPr>
+        <p:spPr/>
+        <p:txBody>
+          <a:bodyPr/>
+          <a:lstStyle/>
+          <a:p>
+            <a:r>
+              <a:rPr lang="de-DE" dirty="0"/>
+              <a:t>https://docs.gitlab.com/ee/ci/runners/runners_scope.html</a:t>
+            </a:r>
+          </a:p>
+        </p:txBody>
+      </p:sp>
+      <p:sp>
+        <p:nvSpPr>
+          <p:cNvPr id="4" name="Foliennummernplatzhalter 3"/>
+          <p:cNvSpPr>
+            <a:spLocks noGrp="1"/>
+          </p:cNvSpPr>
+          <p:nvPr>
+            <p:ph type="sldNum" sz="quarter" idx="5"/>
+          </p:nvPr>
+        </p:nvSpPr>
+        <p:spPr/>
+        <p:txBody>
+          <a:bodyPr/>
+          <a:lstStyle/>
+          <a:p>
+            <a:fld id="{18182567-388C-4D33-8B7B-A651F195F118}" type="slidenum">
+              <a:rPr lang="de-DE" altLang="de-DE" smtClean="0"/>
+              <a:pPr/>
+              <a:t>24</a:t>
+            </a:fld>
+            <a:endParaRPr lang="de-DE" altLang="de-DE"/>
+          </a:p>
+        </p:txBody>
+      </p:sp>
+    </p:spTree>
+    <p:extLst>
+      <p:ext uri="{BB962C8B-B14F-4D97-AF65-F5344CB8AC3E}">
+        <p14:creationId xmlns:p14="http://schemas.microsoft.com/office/powerpoint/2010/main" val="3273153064"/>
+      </p:ext>
+    </p:extLst>
+  </p:cSld>
+  <p:clrMapOvr>
+    <a:masterClrMapping/>
+  </p:clrMapOvr>
+</p:notes>
+</file>
+
+<file path=ppt/notesSlides/notesSlide17.xml><?xml version="1.0" encoding="utf-8"?>
+<p:notes xmlns:a="http://schemas.openxmlformats.org/drawingml/2006/main" xmlns:r="http://schemas.openxmlformats.org/officeDocument/2006/relationships" xmlns:p="http://schemas.openxmlformats.org/presentationml/2006/main">
+  <p:cSld>
+    <p:spTree>
+      <p:nvGrpSpPr>
+        <p:cNvPr id="1" name=""/>
+        <p:cNvGrpSpPr/>
+        <p:nvPr/>
+      </p:nvGrpSpPr>
+      <p:grpSpPr>
+        <a:xfrm>
+          <a:off x="0" y="0"/>
+          <a:ext cx="0" cy="0"/>
+          <a:chOff x="0" y="0"/>
+          <a:chExt cx="0" cy="0"/>
+        </a:xfrm>
+      </p:grpSpPr>
+      <p:sp>
+        <p:nvSpPr>
+          <p:cNvPr id="2" name="Folienbildplatzhalter 1"/>
+          <p:cNvSpPr>
+            <a:spLocks noGrp="1" noRot="1" noChangeAspect="1"/>
+          </p:cNvSpPr>
+          <p:nvPr>
+            <p:ph type="sldImg"/>
+          </p:nvPr>
+        </p:nvSpPr>
+        <p:spPr/>
+      </p:sp>
+      <p:sp>
+        <p:nvSpPr>
+          <p:cNvPr id="3" name="Notizenplatzhalter 2"/>
+          <p:cNvSpPr>
+            <a:spLocks noGrp="1"/>
+          </p:cNvSpPr>
+          <p:nvPr>
+            <p:ph type="body" idx="1"/>
+          </p:nvPr>
+        </p:nvSpPr>
+        <p:spPr/>
+        <p:txBody>
+          <a:bodyPr/>
+          <a:lstStyle/>
+          <a:p>
+            <a:r>
+              <a:rPr lang="de-DE" dirty="0"/>
+              <a:t>https://docs.gitlab.com/runner/register/</a:t>
+            </a:r>
+          </a:p>
+          <a:p>
+            <a:endParaRPr lang="de-DE" dirty="0"/>
+          </a:p>
+          <a:p>
+            <a:r>
+              <a:rPr lang="de-DE" dirty="0" err="1"/>
+              <a:t>Migrating</a:t>
+            </a:r>
+            <a:r>
+              <a:rPr lang="de-DE" dirty="0"/>
+              <a:t> </a:t>
+            </a:r>
+            <a:r>
+              <a:rPr lang="de-DE" dirty="0" err="1"/>
+              <a:t>to</a:t>
+            </a:r>
+            <a:r>
+              <a:rPr lang="de-DE" dirty="0"/>
+              <a:t> </a:t>
+            </a:r>
+            <a:r>
+              <a:rPr lang="de-DE" dirty="0" err="1"/>
+              <a:t>the</a:t>
+            </a:r>
+            <a:r>
+              <a:rPr lang="de-DE" dirty="0"/>
+              <a:t> </a:t>
+            </a:r>
+            <a:r>
+              <a:rPr lang="de-DE" dirty="0" err="1"/>
+              <a:t>new</a:t>
+            </a:r>
+            <a:r>
+              <a:rPr lang="de-DE" dirty="0"/>
+              <a:t> </a:t>
+            </a:r>
+            <a:r>
+              <a:rPr lang="de-DE" dirty="0" err="1"/>
+              <a:t>runner</a:t>
+            </a:r>
+            <a:r>
+              <a:rPr lang="de-DE" dirty="0"/>
+              <a:t> </a:t>
+            </a:r>
+            <a:r>
+              <a:rPr lang="de-DE" dirty="0" err="1"/>
+              <a:t>registration</a:t>
+            </a:r>
+            <a:r>
+              <a:rPr lang="de-DE" dirty="0"/>
+              <a:t> </a:t>
+            </a:r>
+            <a:r>
+              <a:rPr lang="de-DE" dirty="0" err="1"/>
+              <a:t>workflow</a:t>
+            </a:r>
+            <a:r>
+              <a:rPr lang="de-DE" dirty="0"/>
+              <a:t>:</a:t>
+            </a:r>
+          </a:p>
+          <a:p>
+            <a:r>
+              <a:rPr lang="de-DE" dirty="0"/>
+              <a:t>https://docs.gitlab.com/ee/ci/runners/new_creation_workflow.html</a:t>
+            </a:r>
+          </a:p>
+        </p:txBody>
+      </p:sp>
+      <p:sp>
+        <p:nvSpPr>
+          <p:cNvPr id="4" name="Foliennummernplatzhalter 3"/>
+          <p:cNvSpPr>
+            <a:spLocks noGrp="1"/>
+          </p:cNvSpPr>
+          <p:nvPr>
+            <p:ph type="sldNum" sz="quarter" idx="5"/>
+          </p:nvPr>
+        </p:nvSpPr>
+        <p:spPr/>
+        <p:txBody>
+          <a:bodyPr/>
+          <a:lstStyle/>
+          <a:p>
+            <a:fld id="{18182567-388C-4D33-8B7B-A651F195F118}" type="slidenum">
+              <a:rPr lang="de-DE" altLang="de-DE" smtClean="0"/>
+              <a:pPr/>
+              <a:t>25</a:t>
+            </a:fld>
+            <a:endParaRPr lang="de-DE" altLang="de-DE"/>
+          </a:p>
+        </p:txBody>
+      </p:sp>
+    </p:spTree>
+    <p:extLst>
+      <p:ext uri="{BB962C8B-B14F-4D97-AF65-F5344CB8AC3E}">
+        <p14:creationId xmlns:p14="http://schemas.microsoft.com/office/powerpoint/2010/main" val="3567902163"/>
+      </p:ext>
+    </p:extLst>
+  </p:cSld>
+  <p:clrMapOvr>
+    <a:masterClrMapping/>
+  </p:clrMapOvr>
+</p:notes>
+</file>
+
+<file path=ppt/notesSlides/notesSlide18.xml><?xml version="1.0" encoding="utf-8"?>
+<p:notes xmlns:a="http://schemas.openxmlformats.org/drawingml/2006/main" xmlns:r="http://schemas.openxmlformats.org/officeDocument/2006/relationships" xmlns:p="http://schemas.openxmlformats.org/presentationml/2006/main">
+  <p:cSld>
+    <p:spTree>
+      <p:nvGrpSpPr>
+        <p:cNvPr id="1" name=""/>
+        <p:cNvGrpSpPr/>
+        <p:nvPr/>
+      </p:nvGrpSpPr>
+      <p:grpSpPr>
+        <a:xfrm>
+          <a:off x="0" y="0"/>
+          <a:ext cx="0" cy="0"/>
+          <a:chOff x="0" y="0"/>
+          <a:chExt cx="0" cy="0"/>
+        </a:xfrm>
+      </p:grpSpPr>
+      <p:sp>
+        <p:nvSpPr>
+          <p:cNvPr id="2" name="Folienbildplatzhalter 1"/>
+          <p:cNvSpPr>
+            <a:spLocks noGrp="1" noRot="1" noChangeAspect="1"/>
+          </p:cNvSpPr>
+          <p:nvPr>
+            <p:ph type="sldImg"/>
+          </p:nvPr>
+        </p:nvSpPr>
+        <p:spPr/>
+      </p:sp>
+      <p:sp>
+        <p:nvSpPr>
+          <p:cNvPr id="3" name="Notizenplatzhalter 2"/>
+          <p:cNvSpPr>
+            <a:spLocks noGrp="1"/>
+          </p:cNvSpPr>
+          <p:nvPr>
+            <p:ph type="body" idx="1"/>
+          </p:nvPr>
+        </p:nvSpPr>
+        <p:spPr/>
+        <p:txBody>
+          <a:bodyPr/>
+          <a:lstStyle/>
+          <a:p>
+            <a:r>
+              <a:rPr lang="de-DE" dirty="0"/>
+              <a:t>https://docs.gitlab.com/runner/executors/</a:t>
+            </a:r>
+          </a:p>
+        </p:txBody>
+      </p:sp>
+      <p:sp>
+        <p:nvSpPr>
+          <p:cNvPr id="4" name="Foliennummernplatzhalter 3"/>
+          <p:cNvSpPr>
+            <a:spLocks noGrp="1"/>
+          </p:cNvSpPr>
+          <p:nvPr>
+            <p:ph type="sldNum" sz="quarter" idx="5"/>
+          </p:nvPr>
+        </p:nvSpPr>
+        <p:spPr/>
+        <p:txBody>
+          <a:bodyPr/>
+          <a:lstStyle/>
+          <a:p>
+            <a:fld id="{18182567-388C-4D33-8B7B-A651F195F118}" type="slidenum">
+              <a:rPr lang="de-DE" altLang="de-DE" smtClean="0"/>
+              <a:pPr/>
+              <a:t>26</a:t>
+            </a:fld>
+            <a:endParaRPr lang="de-DE" altLang="de-DE"/>
+          </a:p>
+        </p:txBody>
+      </p:sp>
+    </p:spTree>
+    <p:extLst>
+      <p:ext uri="{BB962C8B-B14F-4D97-AF65-F5344CB8AC3E}">
+        <p14:creationId xmlns:p14="http://schemas.microsoft.com/office/powerpoint/2010/main" val="66240159"/>
+      </p:ext>
+    </p:extLst>
+  </p:cSld>
+  <p:clrMapOvr>
+    <a:masterClrMapping/>
+  </p:clrMapOvr>
+</p:notes>
+</file>
+
+<file path=ppt/notesSlides/notesSlide19.xml><?xml version="1.0" encoding="utf-8"?>
+<p:notes xmlns:a="http://schemas.openxmlformats.org/drawingml/2006/main" xmlns:r="http://schemas.openxmlformats.org/officeDocument/2006/relationships" xmlns:p="http://schemas.openxmlformats.org/presentationml/2006/main">
+  <p:cSld>
+    <p:spTree>
+      <p:nvGrpSpPr>
+        <p:cNvPr id="1" name=""/>
+        <p:cNvGrpSpPr/>
+        <p:nvPr/>
+      </p:nvGrpSpPr>
+      <p:grpSpPr>
+        <a:xfrm>
+          <a:off x="0" y="0"/>
+          <a:ext cx="0" cy="0"/>
+          <a:chOff x="0" y="0"/>
+          <a:chExt cx="0" cy="0"/>
+        </a:xfrm>
+      </p:grpSpPr>
+      <p:sp>
+        <p:nvSpPr>
+          <p:cNvPr id="2" name="Folienbildplatzhalter 1"/>
+          <p:cNvSpPr>
+            <a:spLocks noGrp="1" noRot="1" noChangeAspect="1"/>
+          </p:cNvSpPr>
+          <p:nvPr>
+            <p:ph type="sldImg"/>
+          </p:nvPr>
+        </p:nvSpPr>
+        <p:spPr/>
+      </p:sp>
+      <p:sp>
+        <p:nvSpPr>
+          <p:cNvPr id="3" name="Notizenplatzhalter 2"/>
+          <p:cNvSpPr>
+            <a:spLocks noGrp="1"/>
+          </p:cNvSpPr>
+          <p:nvPr>
+            <p:ph type="body" idx="1"/>
+          </p:nvPr>
+        </p:nvSpPr>
+        <p:spPr/>
+        <p:txBody>
+          <a:bodyPr/>
+          <a:lstStyle/>
+          <a:p>
+            <a:r>
+              <a:rPr lang="de-DE" dirty="0"/>
+              <a:t>https://docs.gitlab.com/ee/ci/runners/configure_runners.html</a:t>
+            </a:r>
+          </a:p>
+        </p:txBody>
+      </p:sp>
+      <p:sp>
+        <p:nvSpPr>
+          <p:cNvPr id="4" name="Foliennummernplatzhalter 3"/>
+          <p:cNvSpPr>
+            <a:spLocks noGrp="1"/>
+          </p:cNvSpPr>
+          <p:nvPr>
+            <p:ph type="sldNum" sz="quarter" idx="5"/>
+          </p:nvPr>
+        </p:nvSpPr>
+        <p:spPr/>
+        <p:txBody>
+          <a:bodyPr/>
+          <a:lstStyle/>
+          <a:p>
+            <a:fld id="{18182567-388C-4D33-8B7B-A651F195F118}" type="slidenum">
+              <a:rPr lang="de-DE" altLang="de-DE" smtClean="0"/>
+              <a:pPr/>
+              <a:t>27</a:t>
             </a:fld>
             <a:endParaRPr lang="de-DE" altLang="de-DE"/>
           </a:p>
@@ -2442,7 +3563,7 @@
             <a:fld id="{18182567-388C-4D33-8B7B-A651F195F118}" type="slidenum">
               <a:rPr lang="de-DE" altLang="de-DE" smtClean="0"/>
               <a:pPr/>
-              <a:t>13</a:t>
+              <a:t>14</a:t>
             </a:fld>
             <a:endParaRPr lang="de-DE" altLang="de-DE"/>
           </a:p>
@@ -2507,7 +3628,53 @@
           <a:p>
             <a:r>
               <a:rPr lang="de-DE" dirty="0"/>
-              <a:t>https://docs.gitlab.com/ee/ci/runners/runners_scope.html</a:t>
+              <a:t>https://docs.gitlab.com/ee/tutorials/create_register_first_runner/</a:t>
+            </a:r>
+          </a:p>
+          <a:p>
+            <a:endParaRPr lang="de-DE" dirty="0"/>
+          </a:p>
+          <a:p>
+            <a:r>
+              <a:rPr lang="de-DE" dirty="0"/>
+              <a:t>https://docs.gitlab.com/runner/install/</a:t>
+            </a:r>
+          </a:p>
+          <a:p>
+            <a:endParaRPr lang="de-DE" dirty="0"/>
+          </a:p>
+          <a:p>
+            <a:endParaRPr lang="de-DE" dirty="0"/>
+          </a:p>
+          <a:p>
+            <a:r>
+              <a:rPr lang="de-DE" dirty="0" err="1"/>
+              <a:t>macOS</a:t>
+            </a:r>
+            <a:r>
+              <a:rPr lang="de-DE" dirty="0"/>
+              <a:t> </a:t>
+            </a:r>
+          </a:p>
+          <a:p>
+            <a:r>
+              <a:rPr lang="de-DE" dirty="0"/>
+              <a:t>https://docs.gitlab.com/runner/install/osx.html</a:t>
+            </a:r>
+          </a:p>
+          <a:p>
+            <a:endParaRPr lang="de-DE" dirty="0"/>
+          </a:p>
+          <a:p>
+            <a:r>
+              <a:rPr lang="de-DE" dirty="0"/>
+              <a:t>In einem Container:</a:t>
+            </a:r>
+          </a:p>
+          <a:p>
+            <a:r>
+              <a:rPr lang="de-DE" dirty="0"/>
+              <a:t>https://docs.gitlab.com/runner/install/docker.html</a:t>
             </a:r>
           </a:p>
         </p:txBody>
@@ -2530,7 +3697,7 @@
             <a:fld id="{18182567-388C-4D33-8B7B-A651F195F118}" type="slidenum">
               <a:rPr lang="de-DE" altLang="de-DE" smtClean="0"/>
               <a:pPr/>
-              <a:t>14</a:t>
+              <a:t>15</a:t>
             </a:fld>
             <a:endParaRPr lang="de-DE" altLang="de-DE"/>
           </a:p>
@@ -2539,7 +3706,7 @@
     </p:spTree>
     <p:extLst>
       <p:ext uri="{BB962C8B-B14F-4D97-AF65-F5344CB8AC3E}">
-        <p14:creationId xmlns:p14="http://schemas.microsoft.com/office/powerpoint/2010/main" val="3273153064"/>
+        <p14:creationId xmlns:p14="http://schemas.microsoft.com/office/powerpoint/2010/main" val="3458605969"/>
       </p:ext>
     </p:extLst>
   </p:cSld>
@@ -2593,77 +3760,25 @@
           <a:bodyPr/>
           <a:lstStyle/>
           <a:p>
-            <a:r>
-              <a:rPr lang="de-DE" dirty="0"/>
-              <a:t>https://docs.gitlab.com/runner/register/</a:t>
-            </a:r>
-          </a:p>
-          <a:p>
             <a:endParaRPr lang="de-DE" dirty="0"/>
           </a:p>
           <a:p>
             <a:r>
-              <a:rPr lang="de-DE" dirty="0" err="1"/>
-              <a:t>Migrating</a:t>
-            </a:r>
-            <a:r>
-              <a:rPr lang="de-DE" dirty="0"/>
-              <a:t> </a:t>
-            </a:r>
-            <a:r>
-              <a:rPr lang="de-DE" dirty="0" err="1"/>
-              <a:t>to</a:t>
-            </a:r>
-            <a:r>
-              <a:rPr lang="de-DE" dirty="0"/>
-              <a:t> </a:t>
-            </a:r>
-            <a:r>
-              <a:rPr lang="de-DE" dirty="0" err="1"/>
-              <a:t>the</a:t>
-            </a:r>
-            <a:r>
-              <a:rPr lang="de-DE" dirty="0"/>
-              <a:t> </a:t>
-            </a:r>
-            <a:r>
-              <a:rPr lang="de-DE" dirty="0" err="1"/>
-              <a:t>new</a:t>
-            </a:r>
-            <a:r>
-              <a:rPr lang="de-DE" dirty="0"/>
-              <a:t> </a:t>
-            </a:r>
-            <a:r>
-              <a:rPr lang="de-DE" dirty="0" err="1"/>
-              <a:t>runner</a:t>
-            </a:r>
-            <a:r>
-              <a:rPr lang="de-DE" dirty="0"/>
-              <a:t> </a:t>
-            </a:r>
-            <a:r>
-              <a:rPr lang="de-DE" dirty="0" err="1"/>
-              <a:t>registration</a:t>
-            </a:r>
-            <a:r>
-              <a:rPr lang="de-DE" dirty="0"/>
-              <a:t> </a:t>
-            </a:r>
-            <a:r>
-              <a:rPr lang="de-DE" dirty="0" err="1"/>
-              <a:t>workflow</a:t>
-            </a:r>
-            <a:r>
-              <a:rPr lang="de-DE" dirty="0"/>
-              <a:t>:</a:t>
-            </a:r>
-          </a:p>
-          <a:p>
-            <a:r>
-              <a:rPr lang="de-DE" dirty="0"/>
-              <a:t>https://docs.gitlab.com/ee/ci/runners/new_creation_workflow.html</a:t>
-            </a:r>
+              <a:rPr lang="de-DE" dirty="0"/>
+              <a:t>https://docs.gitlab.com/runner/install/</a:t>
+            </a:r>
+          </a:p>
+          <a:p>
+            <a:r>
+              <a:rPr lang="de-DE" dirty="0"/>
+              <a:t>https://help.itc.rwth-aachen.de/service/ubrf9cmzd17m/article/2abb4436ab0544a0aabe6f466e6159cd/</a:t>
+            </a:r>
+          </a:p>
+          <a:p>
+            <a:endParaRPr lang="de-DE" dirty="0"/>
+          </a:p>
+          <a:p>
+            <a:endParaRPr lang="de-DE" dirty="0"/>
           </a:p>
         </p:txBody>
       </p:sp>
@@ -2685,7 +3800,7 @@
             <a:fld id="{18182567-388C-4D33-8B7B-A651F195F118}" type="slidenum">
               <a:rPr lang="de-DE" altLang="de-DE" smtClean="0"/>
               <a:pPr/>
-              <a:t>15</a:t>
+              <a:t>16</a:t>
             </a:fld>
             <a:endParaRPr lang="de-DE" altLang="de-DE"/>
           </a:p>
@@ -2694,7 +3809,7 @@
     </p:spTree>
     <p:extLst>
       <p:ext uri="{BB962C8B-B14F-4D97-AF65-F5344CB8AC3E}">
-        <p14:creationId xmlns:p14="http://schemas.microsoft.com/office/powerpoint/2010/main" val="3567902163"/>
+        <p14:creationId xmlns:p14="http://schemas.microsoft.com/office/powerpoint/2010/main" val="1658688410"/>
       </p:ext>
     </p:extLst>
   </p:cSld>
@@ -2748,10 +3863,25 @@
           <a:bodyPr/>
           <a:lstStyle/>
           <a:p>
-            <a:r>
-              <a:rPr lang="de-DE" dirty="0"/>
-              <a:t>https://docs.gitlab.com/runner/executors/</a:t>
-            </a:r>
+            <a:endParaRPr lang="de-DE" dirty="0"/>
+          </a:p>
+          <a:p>
+            <a:r>
+              <a:rPr lang="de-DE" dirty="0"/>
+              <a:t>https://docs.gitlab.com/runner/install/</a:t>
+            </a:r>
+          </a:p>
+          <a:p>
+            <a:r>
+              <a:rPr lang="de-DE" dirty="0"/>
+              <a:t>https://help.itc.rwth-aachen.de/service/ubrf9cmzd17m/article/2abb4436ab0544a0aabe6f466e6159cd/</a:t>
+            </a:r>
+          </a:p>
+          <a:p>
+            <a:endParaRPr lang="de-DE" dirty="0"/>
+          </a:p>
+          <a:p>
+            <a:endParaRPr lang="de-DE" dirty="0"/>
           </a:p>
         </p:txBody>
       </p:sp>
@@ -2773,7 +3903,7 @@
             <a:fld id="{18182567-388C-4D33-8B7B-A651F195F118}" type="slidenum">
               <a:rPr lang="de-DE" altLang="de-DE" smtClean="0"/>
               <a:pPr/>
-              <a:t>16</a:t>
+              <a:t>17</a:t>
             </a:fld>
             <a:endParaRPr lang="de-DE" altLang="de-DE"/>
           </a:p>
@@ -2782,7 +3912,7 @@
     </p:spTree>
     <p:extLst>
       <p:ext uri="{BB962C8B-B14F-4D97-AF65-F5344CB8AC3E}">
-        <p14:creationId xmlns:p14="http://schemas.microsoft.com/office/powerpoint/2010/main" val="66240159"/>
+        <p14:creationId xmlns:p14="http://schemas.microsoft.com/office/powerpoint/2010/main" val="3253542229"/>
       </p:ext>
     </p:extLst>
   </p:cSld>
@@ -6736,7 +7866,7 @@
           <p:cNvPr id="2" name="Titel 1">
             <a:extLst>
               <a:ext uri="{FF2B5EF4-FFF2-40B4-BE49-F238E27FC236}">
-                <a16:creationId xmlns:a16="http://schemas.microsoft.com/office/drawing/2014/main" id="{2B9F73D1-0616-0915-95E4-06CBA79315C7}"/>
+                <a16:creationId xmlns:a16="http://schemas.microsoft.com/office/drawing/2014/main" id="{05989517-2629-F19D-F287-A21AC9337E86}"/>
               </a:ext>
             </a:extLst>
           </p:cNvPr>
@@ -6768,7 +7898,7 @@
           <p:cNvPr id="3" name="Inhaltsplatzhalter 2">
             <a:extLst>
               <a:ext uri="{FF2B5EF4-FFF2-40B4-BE49-F238E27FC236}">
-                <a16:creationId xmlns:a16="http://schemas.microsoft.com/office/drawing/2014/main" id="{3CE2D11A-801F-CE1E-A418-D35676D404C3}"/>
+                <a16:creationId xmlns:a16="http://schemas.microsoft.com/office/drawing/2014/main" id="{46E1868F-B940-4D2F-9D0C-5C6DA0802DA7}"/>
               </a:ext>
             </a:extLst>
           </p:cNvPr>
@@ -6788,8 +7918,172 @@
               <a:buNone/>
             </a:pPr>
             <a:r>
+              <a:rPr lang="de-DE" b="1" dirty="0" err="1"/>
+              <a:t>GitLab</a:t>
+            </a:r>
+            <a:r>
               <a:rPr lang="de-DE" b="1" dirty="0"/>
-              <a:t>Eigenen Project Runner benutzen</a:t>
+              <a:t> Runner Versionen…</a:t>
+            </a:r>
+          </a:p>
+          <a:p>
+            <a:pPr marL="0" indent="0">
+              <a:buNone/>
+            </a:pPr>
+            <a:r>
+              <a:rPr lang="de-DE" b="1" dirty="0">
+                <a:hlinkClick r:id="rId2"/>
+              </a:rPr>
+              <a:t>https://docs.gitlab.com/runner/</a:t>
+            </a:r>
+            <a:endParaRPr lang="de-DE" b="1" dirty="0"/>
+          </a:p>
+          <a:p>
+            <a:pPr algn="l">
+              <a:buFont typeface="Arial" panose="020B0604020202020204" pitchFamily="34" charset="0"/>
+              <a:buChar char="•"/>
+            </a:pPr>
+            <a:r>
+              <a:rPr lang="en-US" sz="1800" b="0" i="0" dirty="0">
+                <a:solidFill>
+                  <a:srgbClr val="404040"/>
+                </a:solidFill>
+                <a:effectLst/>
+                <a:latin typeface="gitlab sans"/>
+              </a:rPr>
+              <a:t>For compatibility reasons, the GitLab Runner </a:t>
+            </a:r>
+            <a:r>
+              <a:rPr lang="en-US" sz="1800" b="0" i="0" u="none" strike="noStrike" dirty="0" err="1">
+                <a:solidFill>
+                  <a:srgbClr val="5943B6"/>
+                </a:solidFill>
+                <a:effectLst/>
+                <a:latin typeface="gitlab sans"/>
+                <a:hlinkClick r:id="rId3"/>
+              </a:rPr>
+              <a:t>major.minor</a:t>
+            </a:r>
+            <a:r>
+              <a:rPr lang="en-US" sz="1800" b="0" i="0" dirty="0">
+                <a:solidFill>
+                  <a:srgbClr val="404040"/>
+                </a:solidFill>
+                <a:effectLst/>
+                <a:latin typeface="gitlab sans"/>
+              </a:rPr>
+              <a:t> version should stay in sync with the GitLab major and minor version. Older runners may still work with newer GitLab versions, and vice versa. However, features may not be available or work properly if a version difference exists.</a:t>
+            </a:r>
+          </a:p>
+          <a:p>
+            <a:pPr algn="l">
+              <a:buFont typeface="Arial" panose="020B0604020202020204" pitchFamily="34" charset="0"/>
+              <a:buChar char="•"/>
+            </a:pPr>
+            <a:r>
+              <a:rPr lang="en-US" sz="1800" b="0" i="0" dirty="0">
+                <a:solidFill>
+                  <a:srgbClr val="404040"/>
+                </a:solidFill>
+                <a:effectLst/>
+                <a:latin typeface="gitlab sans"/>
+              </a:rPr>
+              <a:t>Backward compatibility is guaranteed between minor version updates. However, sometimes minor version updates of GitLab can introduce new features that require GitLab Runner to be on the same minor version.</a:t>
+            </a:r>
+          </a:p>
+          <a:p>
+            <a:pPr algn="l">
+              <a:buFont typeface="Arial" panose="020B0604020202020204" pitchFamily="34" charset="0"/>
+              <a:buChar char="•"/>
+            </a:pPr>
+            <a:r>
+              <a:rPr lang="en-US" sz="1800" b="0" i="0" dirty="0">
+                <a:solidFill>
+                  <a:srgbClr val="000000"/>
+                </a:solidFill>
+                <a:effectLst/>
+                <a:latin typeface="gitlab sans"/>
+              </a:rPr>
+              <a:t>GitLab Runner 15.0 </a:t>
+            </a:r>
+            <a:r>
+              <a:rPr lang="en-US" sz="1800" b="0" i="0" u="none" strike="noStrike" dirty="0">
+                <a:solidFill>
+                  <a:srgbClr val="5943B6"/>
+                </a:solidFill>
+                <a:effectLst/>
+                <a:latin typeface="gitlab sans"/>
+                <a:hlinkClick r:id="rId4"/>
+              </a:rPr>
+              <a:t>introduced</a:t>
+            </a:r>
+            <a:r>
+              <a:rPr lang="en-US" sz="1800" b="0" i="0" dirty="0">
+                <a:solidFill>
+                  <a:srgbClr val="000000"/>
+                </a:solidFill>
+                <a:effectLst/>
+                <a:latin typeface="gitlab sans"/>
+              </a:rPr>
+              <a:t> a change to the registration API request format. It prevents the GitLab Runner from communicating with GitLab versions lower than 14.8. You must use a Runner version that is appropriate for the GitLab version, or upgrade the GitLab application.</a:t>
+            </a:r>
+          </a:p>
+          <a:p>
+            <a:pPr algn="l">
+              <a:buFont typeface="Arial" panose="020B0604020202020204" pitchFamily="34" charset="0"/>
+              <a:buChar char="•"/>
+            </a:pPr>
+            <a:r>
+              <a:rPr lang="en-US" sz="1800" b="0" i="0" dirty="0">
+                <a:solidFill>
+                  <a:srgbClr val="404040"/>
+                </a:solidFill>
+                <a:effectLst/>
+                <a:latin typeface="gitlab sans"/>
+              </a:rPr>
+              <a:t>If you host your own runners but host your repositories on GitLab.com, keep GitLab Runner </a:t>
+            </a:r>
+            <a:r>
+              <a:rPr lang="en-US" sz="1800" b="0" i="0" u="none" strike="noStrike" dirty="0">
+                <a:solidFill>
+                  <a:srgbClr val="5943B6"/>
+                </a:solidFill>
+                <a:effectLst/>
+                <a:latin typeface="gitlab sans"/>
+                <a:hlinkClick r:id="rId5"/>
+              </a:rPr>
+              <a:t>updated</a:t>
+            </a:r>
+            <a:r>
+              <a:rPr lang="en-US" sz="1800" b="0" i="0" dirty="0">
+                <a:solidFill>
+                  <a:srgbClr val="404040"/>
+                </a:solidFill>
+                <a:effectLst/>
+                <a:latin typeface="gitlab sans"/>
+              </a:rPr>
+              <a:t> to the latest version, as GitLab.com is </a:t>
+            </a:r>
+            <a:r>
+              <a:rPr lang="en-US" sz="1800" b="0" i="0" u="none" strike="noStrike" dirty="0">
+                <a:solidFill>
+                  <a:srgbClr val="5943B6"/>
+                </a:solidFill>
+                <a:effectLst/>
+                <a:latin typeface="gitlab sans"/>
+                <a:hlinkClick r:id="rId6"/>
+              </a:rPr>
+              <a:t>updated continuously</a:t>
+            </a:r>
+            <a:r>
+              <a:rPr lang="en-US" sz="1800" b="0" i="0" dirty="0">
+                <a:solidFill>
+                  <a:srgbClr val="404040"/>
+                </a:solidFill>
+                <a:effectLst/>
+                <a:latin typeface="gitlab sans"/>
+              </a:rPr>
+              <a:t>.</a:t>
             </a:r>
           </a:p>
           <a:p>
@@ -6803,7 +8097,7 @@
     </p:spTree>
     <p:extLst>
       <p:ext uri="{BB962C8B-B14F-4D97-AF65-F5344CB8AC3E}">
-        <p14:creationId xmlns:p14="http://schemas.microsoft.com/office/powerpoint/2010/main" val="2839312114"/>
+        <p14:creationId xmlns:p14="http://schemas.microsoft.com/office/powerpoint/2010/main" val="1650686857"/>
       </p:ext>
     </p:extLst>
   </p:cSld>
@@ -6888,7 +8182,61 @@
             </a:pPr>
             <a:r>
               <a:rPr lang="de-DE" b="1" dirty="0"/>
-              <a:t>Verschiedene Runner verwalten</a:t>
+              <a:t>Eigenen Project Runner benutzen</a:t>
+            </a:r>
+          </a:p>
+          <a:p>
+            <a:pPr>
+              <a:buFont typeface="Arial" panose="020B0604020202020204" pitchFamily="34" charset="0"/>
+              <a:buChar char="•"/>
+            </a:pPr>
+            <a:r>
+              <a:rPr lang="de-DE" dirty="0" err="1"/>
+              <a:t>GitLab</a:t>
+            </a:r>
+            <a:r>
+              <a:rPr lang="de-DE" dirty="0"/>
+              <a:t> Runner installieren</a:t>
+            </a:r>
+          </a:p>
+          <a:p>
+            <a:pPr>
+              <a:buFont typeface="Arial" panose="020B0604020202020204" pitchFamily="34" charset="0"/>
+              <a:buChar char="•"/>
+            </a:pPr>
+            <a:r>
+              <a:rPr lang="de-DE" dirty="0"/>
+              <a:t>Neues Projekt erstellen</a:t>
+            </a:r>
+          </a:p>
+          <a:p>
+            <a:pPr>
+              <a:buFont typeface="Arial" panose="020B0604020202020204" pitchFamily="34" charset="0"/>
+              <a:buChar char="•"/>
+            </a:pPr>
+            <a:r>
+              <a:rPr lang="de-DE" dirty="0"/>
+              <a:t>Projekt-Pipeline erstellen</a:t>
+            </a:r>
+          </a:p>
+          <a:p>
+            <a:pPr>
+              <a:buFont typeface="Arial" panose="020B0604020202020204" pitchFamily="34" charset="0"/>
+              <a:buChar char="•"/>
+            </a:pPr>
+            <a:r>
+              <a:rPr lang="de-DE" dirty="0"/>
+              <a:t>Projekt-Runner erstellen und registrieren</a:t>
+            </a:r>
+          </a:p>
+          <a:p>
+            <a:pPr>
+              <a:buFont typeface="Arial" panose="020B0604020202020204" pitchFamily="34" charset="0"/>
+              <a:buChar char="•"/>
+            </a:pPr>
+            <a:r>
+              <a:rPr lang="de-DE" dirty="0"/>
+              <a:t>Pipeline triggern, um den Runner zu starten</a:t>
             </a:r>
           </a:p>
           <a:p>
@@ -6902,7 +8250,7 @@
     </p:spTree>
     <p:extLst>
       <p:ext uri="{BB962C8B-B14F-4D97-AF65-F5344CB8AC3E}">
-        <p14:creationId xmlns:p14="http://schemas.microsoft.com/office/powerpoint/2010/main" val="2083771083"/>
+        <p14:creationId xmlns:p14="http://schemas.microsoft.com/office/powerpoint/2010/main" val="2839312114"/>
       </p:ext>
     </p:extLst>
   </p:cSld>
@@ -6986,8 +8334,117 @@
               <a:buNone/>
             </a:pPr>
             <a:r>
+              <a:rPr lang="de-DE" b="1" dirty="0" err="1"/>
+              <a:t>GitLab</a:t>
+            </a:r>
+            <a:r>
               <a:rPr lang="de-DE" b="1" dirty="0"/>
-              <a:t>Runner registrieren</a:t>
+              <a:t> Runner installieren</a:t>
+            </a:r>
+          </a:p>
+          <a:p>
+            <a:pPr>
+              <a:buFont typeface="Arial" panose="020B0604020202020204" pitchFamily="34" charset="0"/>
+              <a:buChar char="•"/>
+            </a:pPr>
+            <a:r>
+              <a:rPr lang="de-DE" dirty="0"/>
+              <a:t>Erinnerung: </a:t>
+            </a:r>
+            <a:r>
+              <a:rPr lang="de-DE" dirty="0" err="1"/>
+              <a:t>GitLab</a:t>
+            </a:r>
+            <a:r>
+              <a:rPr lang="de-DE" dirty="0"/>
+              <a:t> Runner führen unsere CI/CD </a:t>
+            </a:r>
+            <a:r>
+              <a:rPr lang="de-DE" dirty="0" err="1"/>
+              <a:t>jobs</a:t>
+            </a:r>
+            <a:r>
+              <a:rPr lang="de-DE" dirty="0"/>
+              <a:t> aus</a:t>
+            </a:r>
+          </a:p>
+          <a:p>
+            <a:pPr>
+              <a:buFont typeface="Arial" panose="020B0604020202020204" pitchFamily="34" charset="0"/>
+              <a:buChar char="•"/>
+            </a:pPr>
+            <a:r>
+              <a:rPr lang="de-DE" dirty="0"/>
+              <a:t>Folgende Installationen sind möglich</a:t>
+            </a:r>
+          </a:p>
+          <a:p>
+            <a:pPr lvl="1">
+              <a:buFont typeface="Arial" panose="020B0604020202020204" pitchFamily="34" charset="0"/>
+              <a:buChar char="•"/>
+            </a:pPr>
+            <a:r>
+              <a:rPr lang="de-DE" dirty="0"/>
+              <a:t>Eigene Infrastruktur</a:t>
+            </a:r>
+          </a:p>
+          <a:p>
+            <a:pPr lvl="1">
+              <a:buFont typeface="Arial" panose="020B0604020202020204" pitchFamily="34" charset="0"/>
+              <a:buChar char="•"/>
+            </a:pPr>
+            <a:r>
+              <a:rPr lang="de-DE" dirty="0"/>
+              <a:t>In einem Docker-Container</a:t>
+            </a:r>
+          </a:p>
+          <a:p>
+            <a:pPr lvl="1">
+              <a:buFont typeface="Arial" panose="020B0604020202020204" pitchFamily="34" charset="0"/>
+              <a:buChar char="•"/>
+            </a:pPr>
+            <a:r>
+              <a:rPr lang="de-DE" dirty="0" err="1"/>
+              <a:t>Kubernetes</a:t>
+            </a:r>
+            <a:r>
+              <a:rPr lang="de-DE" dirty="0"/>
+              <a:t>-Cluster</a:t>
+            </a:r>
+          </a:p>
+          <a:p>
+            <a:pPr>
+              <a:buFont typeface="Arial" panose="020B0604020202020204" pitchFamily="34" charset="0"/>
+              <a:buChar char="•"/>
+            </a:pPr>
+            <a:endParaRPr lang="de-DE" dirty="0"/>
+          </a:p>
+          <a:p>
+            <a:pPr>
+              <a:buFont typeface="Arial" panose="020B0604020202020204" pitchFamily="34" charset="0"/>
+              <a:buChar char="•"/>
+            </a:pPr>
+            <a:r>
+              <a:rPr lang="de-DE" dirty="0"/>
+              <a:t>Hier: Infrastruktur </a:t>
+            </a:r>
+            <a:r>
+              <a:rPr lang="de-DE" dirty="0">
+                <a:sym typeface="Wingdings" panose="05000000000000000000" pitchFamily="2" charset="2"/>
+              </a:rPr>
+              <a:t> lokale Maschine</a:t>
+            </a:r>
+          </a:p>
+          <a:p>
+            <a:pPr lvl="1">
+              <a:buFont typeface="Arial" panose="020B0604020202020204" pitchFamily="34" charset="0"/>
+              <a:buChar char="•"/>
+            </a:pPr>
+            <a:r>
+              <a:rPr lang="de-DE" dirty="0">
+                <a:sym typeface="Wingdings" panose="05000000000000000000" pitchFamily="2" charset="2"/>
+              </a:rPr>
+              <a:t>Linux oder Windows</a:t>
             </a:r>
           </a:p>
           <a:p>
@@ -7001,7 +8458,7 @@
     </p:spTree>
     <p:extLst>
       <p:ext uri="{BB962C8B-B14F-4D97-AF65-F5344CB8AC3E}">
-        <p14:creationId xmlns:p14="http://schemas.microsoft.com/office/powerpoint/2010/main" val="2238531874"/>
+        <p14:creationId xmlns:p14="http://schemas.microsoft.com/office/powerpoint/2010/main" val="259636530"/>
       </p:ext>
     </p:extLst>
   </p:cSld>
@@ -7085,9 +8542,137 @@
               <a:buNone/>
             </a:pPr>
             <a:r>
-              <a:rPr lang="de-DE" b="1" dirty="0" err="1"/>
-              <a:t>Executors</a:t>
-            </a:r>
+              <a:rPr lang="de-DE" b="1" dirty="0"/>
+              <a:t>Linux</a:t>
+            </a:r>
+          </a:p>
+          <a:p>
+            <a:pPr marL="457200" indent="-457200">
+              <a:buFont typeface="+mj-lt"/>
+              <a:buAutoNum type="arabicPeriod"/>
+            </a:pPr>
+            <a:r>
+              <a:rPr lang="de-DE" dirty="0">
+                <a:sym typeface="Wingdings" panose="05000000000000000000" pitchFamily="2" charset="2"/>
+              </a:rPr>
+              <a:t>Offizielle </a:t>
+            </a:r>
+            <a:r>
+              <a:rPr lang="de-DE" dirty="0" err="1">
+                <a:sym typeface="Wingdings" panose="05000000000000000000" pitchFamily="2" charset="2"/>
+              </a:rPr>
+              <a:t>GitLab</a:t>
+            </a:r>
+            <a:r>
+              <a:rPr lang="de-DE" dirty="0">
+                <a:sym typeface="Wingdings" panose="05000000000000000000" pitchFamily="2" charset="2"/>
+              </a:rPr>
+              <a:t> Repository hinzufügen</a:t>
+            </a:r>
+          </a:p>
+          <a:p>
+            <a:pPr marL="457200" indent="-457200">
+              <a:buFont typeface="+mj-lt"/>
+              <a:buAutoNum type="arabicPeriod"/>
+            </a:pPr>
+            <a:r>
+              <a:rPr lang="de-DE" dirty="0">
+                <a:sym typeface="Wingdings" panose="05000000000000000000" pitchFamily="2" charset="2"/>
+              </a:rPr>
+              <a:t>Aktuellstes </a:t>
+            </a:r>
+            <a:r>
+              <a:rPr lang="de-DE" dirty="0" err="1">
+                <a:sym typeface="Wingdings" panose="05000000000000000000" pitchFamily="2" charset="2"/>
+              </a:rPr>
+              <a:t>GitLab</a:t>
+            </a:r>
+            <a:r>
+              <a:rPr lang="de-DE" dirty="0">
+                <a:sym typeface="Wingdings" panose="05000000000000000000" pitchFamily="2" charset="2"/>
+              </a:rPr>
+              <a:t> Runner Paket installieren</a:t>
+            </a:r>
+          </a:p>
+          <a:p>
+            <a:pPr marL="457200" indent="-457200">
+              <a:buFont typeface="+mj-lt"/>
+              <a:buAutoNum type="arabicPeriod"/>
+            </a:pPr>
+            <a:r>
+              <a:rPr lang="de-DE" dirty="0">
+                <a:sym typeface="Wingdings" panose="05000000000000000000" pitchFamily="2" charset="2"/>
+              </a:rPr>
+              <a:t>Installation einer bestimmten </a:t>
+            </a:r>
+            <a:r>
+              <a:rPr lang="de-DE" dirty="0" err="1">
+                <a:sym typeface="Wingdings" panose="05000000000000000000" pitchFamily="2" charset="2"/>
+              </a:rPr>
+              <a:t>GitLab</a:t>
+            </a:r>
+            <a:r>
+              <a:rPr lang="de-DE" dirty="0">
+                <a:sym typeface="Wingdings" panose="05000000000000000000" pitchFamily="2" charset="2"/>
+              </a:rPr>
+              <a:t> Runner Version</a:t>
+            </a:r>
+          </a:p>
+          <a:p>
+            <a:pPr marL="457200" indent="-457200">
+              <a:buFont typeface="+mj-lt"/>
+              <a:buAutoNum type="arabicPeriod"/>
+            </a:pPr>
+            <a:r>
+              <a:rPr lang="de-DE" dirty="0">
+                <a:sym typeface="Wingdings" panose="05000000000000000000" pitchFamily="2" charset="2"/>
+              </a:rPr>
+              <a:t>Runner im </a:t>
+            </a:r>
+            <a:r>
+              <a:rPr lang="de-DE" dirty="0" err="1">
+                <a:sym typeface="Wingdings" panose="05000000000000000000" pitchFamily="2" charset="2"/>
+              </a:rPr>
+              <a:t>GitLab</a:t>
+            </a:r>
+            <a:r>
+              <a:rPr lang="de-DE" dirty="0">
+                <a:sym typeface="Wingdings" panose="05000000000000000000" pitchFamily="2" charset="2"/>
+              </a:rPr>
+              <a:t> registrieren (grob, später mehr)</a:t>
+            </a:r>
+          </a:p>
+          <a:p>
+            <a:pPr marL="457200" indent="-457200">
+              <a:buFont typeface="+mj-lt"/>
+              <a:buAutoNum type="arabicPeriod"/>
+            </a:pPr>
+            <a:r>
+              <a:rPr lang="de-DE" dirty="0" err="1">
+                <a:sym typeface="Wingdings" panose="05000000000000000000" pitchFamily="2" charset="2"/>
+              </a:rPr>
+              <a:t>GitLab</a:t>
+            </a:r>
+            <a:r>
+              <a:rPr lang="de-DE" dirty="0">
+                <a:sym typeface="Wingdings" panose="05000000000000000000" pitchFamily="2" charset="2"/>
+              </a:rPr>
+              <a:t> Runner aktualisieren</a:t>
+            </a:r>
+          </a:p>
+          <a:p>
+            <a:pPr marL="457200" indent="-457200">
+              <a:buFont typeface="+mj-lt"/>
+              <a:buAutoNum type="arabicPeriod"/>
+            </a:pPr>
+            <a:endParaRPr lang="de-DE" dirty="0">
+              <a:sym typeface="Wingdings" panose="05000000000000000000" pitchFamily="2" charset="2"/>
+            </a:endParaRPr>
+          </a:p>
+          <a:p>
+            <a:pPr marL="0" indent="0">
+              <a:buNone/>
+            </a:pPr>
             <a:endParaRPr lang="de-DE" b="1" dirty="0"/>
           </a:p>
         </p:txBody>
@@ -7095,7 +8680,7 @@
     </p:spTree>
     <p:extLst>
       <p:ext uri="{BB962C8B-B14F-4D97-AF65-F5344CB8AC3E}">
-        <p14:creationId xmlns:p14="http://schemas.microsoft.com/office/powerpoint/2010/main" val="949730093"/>
+        <p14:creationId xmlns:p14="http://schemas.microsoft.com/office/powerpoint/2010/main" val="1818553522"/>
       </p:ext>
     </p:extLst>
   </p:cSld>
@@ -7180,8 +8765,146 @@
             </a:pPr>
             <a:r>
               <a:rPr lang="de-DE" b="1" dirty="0"/>
-              <a:t>Runner konfigurieren</a:t>
-            </a:r>
+              <a:t>Offizielle </a:t>
+            </a:r>
+            <a:r>
+              <a:rPr lang="de-DE" b="1" dirty="0" err="1"/>
+              <a:t>GitLab</a:t>
+            </a:r>
+            <a:r>
+              <a:rPr lang="de-DE" b="1" dirty="0"/>
+              <a:t> Repository hinzufügen</a:t>
+            </a:r>
+          </a:p>
+          <a:p>
+            <a:pPr marL="0" indent="0">
+              <a:buNone/>
+            </a:pPr>
+            <a:endParaRPr lang="de-DE" b="1" dirty="0"/>
+          </a:p>
+          <a:p>
+            <a:pPr marL="0" indent="0">
+              <a:buNone/>
+            </a:pPr>
+            <a:r>
+              <a:rPr lang="de-DE" sz="2000" dirty="0">
+                <a:latin typeface="Consolas" panose="020B0609020204030204" pitchFamily="49" charset="0"/>
+                <a:sym typeface="Wingdings" panose="05000000000000000000" pitchFamily="2" charset="2"/>
+              </a:rPr>
+              <a:t># Für Debian/Ubuntu/Mint (Achtung bei Debian!)</a:t>
+            </a:r>
+          </a:p>
+          <a:p>
+            <a:pPr marL="0" indent="0">
+              <a:buNone/>
+            </a:pPr>
+            <a:r>
+              <a:rPr lang="de-DE" sz="2000" dirty="0" err="1">
+                <a:latin typeface="Consolas" panose="020B0609020204030204" pitchFamily="49" charset="0"/>
+                <a:sym typeface="Wingdings" panose="05000000000000000000" pitchFamily="2" charset="2"/>
+              </a:rPr>
+              <a:t>curl</a:t>
+            </a:r>
+            <a:r>
+              <a:rPr lang="de-DE" sz="2000" dirty="0">
+                <a:latin typeface="Consolas" panose="020B0609020204030204" pitchFamily="49" charset="0"/>
+                <a:sym typeface="Wingdings" panose="05000000000000000000" pitchFamily="2" charset="2"/>
+              </a:rPr>
+              <a:t> -L https://packages.gitlab.com/install/repositories/runner/gitlab-runner/script.deb.sh | </a:t>
+            </a:r>
+            <a:r>
+              <a:rPr lang="de-DE" sz="2000" dirty="0" err="1">
+                <a:latin typeface="Consolas" panose="020B0609020204030204" pitchFamily="49" charset="0"/>
+                <a:sym typeface="Wingdings" panose="05000000000000000000" pitchFamily="2" charset="2"/>
+              </a:rPr>
+              <a:t>sudo</a:t>
+            </a:r>
+            <a:r>
+              <a:rPr lang="de-DE" sz="2000" dirty="0">
+                <a:latin typeface="Consolas" panose="020B0609020204030204" pitchFamily="49" charset="0"/>
+                <a:sym typeface="Wingdings" panose="05000000000000000000" pitchFamily="2" charset="2"/>
+              </a:rPr>
+              <a:t> bash</a:t>
+            </a:r>
+          </a:p>
+          <a:p>
+            <a:pPr marL="0" indent="0">
+              <a:buNone/>
+            </a:pPr>
+            <a:r>
+              <a:rPr lang="de-DE" sz="2000" dirty="0">
+                <a:latin typeface="Consolas" panose="020B0609020204030204" pitchFamily="49" charset="0"/>
+                <a:sym typeface="Wingdings" panose="05000000000000000000" pitchFamily="2" charset="2"/>
+              </a:rPr>
+              <a:t> </a:t>
+            </a:r>
+          </a:p>
+          <a:p>
+            <a:pPr marL="0" indent="0">
+              <a:buNone/>
+            </a:pPr>
+            <a:r>
+              <a:rPr lang="de-DE" sz="2000" dirty="0">
+                <a:latin typeface="Consolas" panose="020B0609020204030204" pitchFamily="49" charset="0"/>
+                <a:sym typeface="Wingdings" panose="05000000000000000000" pitchFamily="2" charset="2"/>
+              </a:rPr>
+              <a:t># Für RHEL/</a:t>
+            </a:r>
+            <a:r>
+              <a:rPr lang="de-DE" sz="2000" dirty="0" err="1">
+                <a:latin typeface="Consolas" panose="020B0609020204030204" pitchFamily="49" charset="0"/>
+                <a:sym typeface="Wingdings" panose="05000000000000000000" pitchFamily="2" charset="2"/>
+              </a:rPr>
+              <a:t>CentOS</a:t>
+            </a:r>
+            <a:r>
+              <a:rPr lang="de-DE" sz="2000" dirty="0">
+                <a:latin typeface="Consolas" panose="020B0609020204030204" pitchFamily="49" charset="0"/>
+                <a:sym typeface="Wingdings" panose="05000000000000000000" pitchFamily="2" charset="2"/>
+              </a:rPr>
+              <a:t>/Fedora</a:t>
+            </a:r>
+          </a:p>
+          <a:p>
+            <a:pPr marL="0" indent="0">
+              <a:buNone/>
+            </a:pPr>
+            <a:r>
+              <a:rPr lang="de-DE" sz="2000" dirty="0" err="1">
+                <a:latin typeface="Consolas" panose="020B0609020204030204" pitchFamily="49" charset="0"/>
+                <a:sym typeface="Wingdings" panose="05000000000000000000" pitchFamily="2" charset="2"/>
+              </a:rPr>
+              <a:t>curl</a:t>
+            </a:r>
+            <a:r>
+              <a:rPr lang="de-DE" sz="2000" dirty="0">
+                <a:latin typeface="Consolas" panose="020B0609020204030204" pitchFamily="49" charset="0"/>
+                <a:sym typeface="Wingdings" panose="05000000000000000000" pitchFamily="2" charset="2"/>
+              </a:rPr>
+              <a:t> -L https://packages.gitlab.com/install/repositories/runner/gitlab-runner/script.rpm.sh | </a:t>
+            </a:r>
+            <a:r>
+              <a:rPr lang="de-DE" sz="2000" dirty="0" err="1">
+                <a:latin typeface="Consolas" panose="020B0609020204030204" pitchFamily="49" charset="0"/>
+                <a:sym typeface="Wingdings" panose="05000000000000000000" pitchFamily="2" charset="2"/>
+              </a:rPr>
+              <a:t>sudo</a:t>
+            </a:r>
+            <a:r>
+              <a:rPr lang="de-DE" sz="2000" dirty="0">
+                <a:latin typeface="Consolas" panose="020B0609020204030204" pitchFamily="49" charset="0"/>
+                <a:sym typeface="Wingdings" panose="05000000000000000000" pitchFamily="2" charset="2"/>
+              </a:rPr>
+              <a:t> bash</a:t>
+            </a:r>
+          </a:p>
+          <a:p>
+            <a:pPr marL="0" indent="0">
+              <a:buNone/>
+            </a:pPr>
+            <a:endParaRPr lang="de-DE" dirty="0">
+              <a:sym typeface="Wingdings" panose="05000000000000000000" pitchFamily="2" charset="2"/>
+            </a:endParaRPr>
           </a:p>
           <a:p>
             <a:pPr marL="0" indent="0">
@@ -7194,7 +8917,7 @@
     </p:spTree>
     <p:extLst>
       <p:ext uri="{BB962C8B-B14F-4D97-AF65-F5344CB8AC3E}">
-        <p14:creationId xmlns:p14="http://schemas.microsoft.com/office/powerpoint/2010/main" val="2185810072"/>
+        <p14:creationId xmlns:p14="http://schemas.microsoft.com/office/powerpoint/2010/main" val="2061967642"/>
       </p:ext>
     </p:extLst>
   </p:cSld>
@@ -7223,7 +8946,13 @@
       </p:grpSpPr>
       <p:sp>
         <p:nvSpPr>
-          <p:cNvPr id="2" name="Titel 1"/>
+          <p:cNvPr id="2" name="Titel 1">
+            <a:extLst>
+              <a:ext uri="{FF2B5EF4-FFF2-40B4-BE49-F238E27FC236}">
+                <a16:creationId xmlns:a16="http://schemas.microsoft.com/office/drawing/2014/main" id="{2B9F73D1-0616-0915-95E4-06CBA79315C7}"/>
+              </a:ext>
+            </a:extLst>
+          </p:cNvPr>
           <p:cNvSpPr>
             <a:spLocks noGrp="1"/>
           </p:cNvSpPr>
@@ -7237,20 +8966,30 @@
           <a:lstStyle/>
           <a:p>
             <a:r>
-              <a:rPr lang="de-DE" cap="none" dirty="0"/>
-              <a:t>Container/Docker Registry</a:t>
+              <a:rPr lang="de-DE" dirty="0" err="1"/>
+              <a:t>GitLab</a:t>
+            </a:r>
+            <a:r>
+              <a:rPr lang="de-DE" dirty="0"/>
+              <a:t> Runner</a:t>
             </a:r>
           </a:p>
         </p:txBody>
       </p:sp>
       <p:sp>
         <p:nvSpPr>
-          <p:cNvPr id="3" name="Untertitel 2"/>
+          <p:cNvPr id="3" name="Inhaltsplatzhalter 2">
+            <a:extLst>
+              <a:ext uri="{FF2B5EF4-FFF2-40B4-BE49-F238E27FC236}">
+                <a16:creationId xmlns:a16="http://schemas.microsoft.com/office/drawing/2014/main" id="{3CE2D11A-801F-CE1E-A418-D35676D404C3}"/>
+              </a:ext>
+            </a:extLst>
+          </p:cNvPr>
           <p:cNvSpPr>
             <a:spLocks noGrp="1"/>
           </p:cNvSpPr>
           <p:nvPr>
-            <p:ph type="body" idx="1"/>
+            <p:ph idx="1"/>
           </p:nvPr>
         </p:nvSpPr>
         <p:spPr/>
@@ -7258,17 +8997,322 @@
           <a:bodyPr/>
           <a:lstStyle/>
           <a:p>
-            <a:r>
-              <a:rPr lang="de-DE" dirty="0"/>
-              <a:t>Grundlagen von</a:t>
-            </a:r>
+            <a:pPr marL="0" indent="0">
+              <a:buNone/>
+            </a:pPr>
+            <a:r>
+              <a:rPr lang="de-DE" b="1" dirty="0"/>
+              <a:t>Offizielle </a:t>
+            </a:r>
+            <a:r>
+              <a:rPr lang="de-DE" b="1" dirty="0" err="1"/>
+              <a:t>GitLab</a:t>
+            </a:r>
+            <a:r>
+              <a:rPr lang="de-DE" b="1" dirty="0"/>
+              <a:t> Repository hinzufügen</a:t>
+            </a:r>
+          </a:p>
+          <a:p>
+            <a:pPr>
+              <a:buFont typeface="Arial" panose="020B0604020202020204" pitchFamily="34" charset="0"/>
+              <a:buChar char="•"/>
+            </a:pPr>
+            <a:r>
+              <a:rPr lang="de-DE" dirty="0"/>
+              <a:t>Debian-Benutzer sollten APT-</a:t>
+            </a:r>
+            <a:r>
+              <a:rPr lang="de-DE" dirty="0" err="1"/>
+              <a:t>Pinning</a:t>
+            </a:r>
+            <a:r>
+              <a:rPr lang="de-DE" dirty="0"/>
+              <a:t> verwenden</a:t>
+            </a:r>
+          </a:p>
+          <a:p>
+            <a:pPr>
+              <a:buFont typeface="Arial" panose="020B0604020202020204" pitchFamily="34" charset="0"/>
+              <a:buChar char="•"/>
+            </a:pPr>
+            <a:endParaRPr lang="de-DE" dirty="0"/>
+          </a:p>
+          <a:p>
+            <a:pPr marL="0" indent="0">
+              <a:buNone/>
+            </a:pPr>
+            <a:r>
+              <a:rPr lang="de-DE" sz="2000" dirty="0" err="1">
+                <a:latin typeface="Consolas" panose="020B0609020204030204" pitchFamily="49" charset="0"/>
+              </a:rPr>
+              <a:t>cat</a:t>
+            </a:r>
+            <a:r>
+              <a:rPr lang="de-DE" sz="2000" dirty="0">
+                <a:latin typeface="Consolas" panose="020B0609020204030204" pitchFamily="49" charset="0"/>
+              </a:rPr>
+              <a:t> &lt;&lt;EOF | </a:t>
+            </a:r>
+            <a:r>
+              <a:rPr lang="de-DE" sz="2000" dirty="0" err="1">
+                <a:latin typeface="Consolas" panose="020B0609020204030204" pitchFamily="49" charset="0"/>
+              </a:rPr>
+              <a:t>sudo</a:t>
+            </a:r>
+            <a:r>
+              <a:rPr lang="de-DE" sz="2000" dirty="0">
+                <a:latin typeface="Consolas" panose="020B0609020204030204" pitchFamily="49" charset="0"/>
+              </a:rPr>
+              <a:t> </a:t>
+            </a:r>
+            <a:r>
+              <a:rPr lang="de-DE" sz="2000" dirty="0" err="1">
+                <a:latin typeface="Consolas" panose="020B0609020204030204" pitchFamily="49" charset="0"/>
+              </a:rPr>
+              <a:t>tee</a:t>
+            </a:r>
+            <a:r>
+              <a:rPr lang="de-DE" sz="2000" dirty="0">
+                <a:latin typeface="Consolas" panose="020B0609020204030204" pitchFamily="49" charset="0"/>
+              </a:rPr>
+              <a:t> /</a:t>
+            </a:r>
+            <a:r>
+              <a:rPr lang="de-DE" sz="2000" dirty="0" err="1">
+                <a:latin typeface="Consolas" panose="020B0609020204030204" pitchFamily="49" charset="0"/>
+              </a:rPr>
+              <a:t>etc</a:t>
+            </a:r>
+            <a:r>
+              <a:rPr lang="de-DE" sz="2000" dirty="0">
+                <a:latin typeface="Consolas" panose="020B0609020204030204" pitchFamily="49" charset="0"/>
+              </a:rPr>
+              <a:t>/</a:t>
+            </a:r>
+            <a:r>
+              <a:rPr lang="de-DE" sz="2000" dirty="0" err="1">
+                <a:latin typeface="Consolas" panose="020B0609020204030204" pitchFamily="49" charset="0"/>
+              </a:rPr>
+              <a:t>apt</a:t>
+            </a:r>
+            <a:r>
+              <a:rPr lang="de-DE" sz="2000" dirty="0">
+                <a:latin typeface="Consolas" panose="020B0609020204030204" pitchFamily="49" charset="0"/>
+              </a:rPr>
+              <a:t>/</a:t>
+            </a:r>
+            <a:r>
+              <a:rPr lang="de-DE" sz="2000" dirty="0" err="1">
+                <a:latin typeface="Consolas" panose="020B0609020204030204" pitchFamily="49" charset="0"/>
+              </a:rPr>
+              <a:t>preferences.d</a:t>
+            </a:r>
+            <a:r>
+              <a:rPr lang="de-DE" sz="2000" dirty="0">
+                <a:latin typeface="Consolas" panose="020B0609020204030204" pitchFamily="49" charset="0"/>
+              </a:rPr>
+              <a:t>/</a:t>
+            </a:r>
+            <a:r>
+              <a:rPr lang="de-DE" sz="2000" dirty="0" err="1">
+                <a:latin typeface="Consolas" panose="020B0609020204030204" pitchFamily="49" charset="0"/>
+              </a:rPr>
+              <a:t>pin-gitlab-runner.pref</a:t>
+            </a:r>
+            <a:endParaRPr lang="de-DE" sz="2000" dirty="0">
+              <a:latin typeface="Consolas" panose="020B0609020204030204" pitchFamily="49" charset="0"/>
+            </a:endParaRPr>
+          </a:p>
+          <a:p>
+            <a:pPr marL="0" indent="0">
+              <a:buNone/>
+            </a:pPr>
+            <a:r>
+              <a:rPr lang="de-DE" sz="2000" dirty="0">
+                <a:latin typeface="Consolas" panose="020B0609020204030204" pitchFamily="49" charset="0"/>
+              </a:rPr>
+              <a:t>Explanation: </a:t>
+            </a:r>
+            <a:r>
+              <a:rPr lang="de-DE" sz="2000" dirty="0" err="1">
+                <a:latin typeface="Consolas" panose="020B0609020204030204" pitchFamily="49" charset="0"/>
+              </a:rPr>
+              <a:t>Prefer</a:t>
+            </a:r>
+            <a:r>
+              <a:rPr lang="de-DE" sz="2000" dirty="0">
+                <a:latin typeface="Consolas" panose="020B0609020204030204" pitchFamily="49" charset="0"/>
+              </a:rPr>
+              <a:t> </a:t>
+            </a:r>
+            <a:r>
+              <a:rPr lang="de-DE" sz="2000" dirty="0" err="1">
+                <a:latin typeface="Consolas" panose="020B0609020204030204" pitchFamily="49" charset="0"/>
+              </a:rPr>
+              <a:t>GitLab</a:t>
+            </a:r>
+            <a:r>
+              <a:rPr lang="de-DE" sz="2000" dirty="0">
+                <a:latin typeface="Consolas" panose="020B0609020204030204" pitchFamily="49" charset="0"/>
+              </a:rPr>
+              <a:t> </a:t>
+            </a:r>
+            <a:r>
+              <a:rPr lang="de-DE" sz="2000" dirty="0" err="1">
+                <a:latin typeface="Consolas" panose="020B0609020204030204" pitchFamily="49" charset="0"/>
+              </a:rPr>
+              <a:t>provided</a:t>
+            </a:r>
+            <a:r>
+              <a:rPr lang="de-DE" sz="2000" dirty="0">
+                <a:latin typeface="Consolas" panose="020B0609020204030204" pitchFamily="49" charset="0"/>
+              </a:rPr>
+              <a:t> </a:t>
+            </a:r>
+            <a:r>
+              <a:rPr lang="de-DE" sz="2000" dirty="0" err="1">
+                <a:latin typeface="Consolas" panose="020B0609020204030204" pitchFamily="49" charset="0"/>
+              </a:rPr>
+              <a:t>packages</a:t>
+            </a:r>
+            <a:r>
+              <a:rPr lang="de-DE" sz="2000" dirty="0">
+                <a:latin typeface="Consolas" panose="020B0609020204030204" pitchFamily="49" charset="0"/>
+              </a:rPr>
+              <a:t> </a:t>
+            </a:r>
+            <a:r>
+              <a:rPr lang="de-DE" sz="2000" dirty="0" err="1">
+                <a:latin typeface="Consolas" panose="020B0609020204030204" pitchFamily="49" charset="0"/>
+              </a:rPr>
+              <a:t>over</a:t>
+            </a:r>
+            <a:r>
+              <a:rPr lang="de-DE" sz="2000" dirty="0">
+                <a:latin typeface="Consolas" panose="020B0609020204030204" pitchFamily="49" charset="0"/>
+              </a:rPr>
+              <a:t> </a:t>
+            </a:r>
+            <a:r>
+              <a:rPr lang="de-DE" sz="2000" dirty="0" err="1">
+                <a:latin typeface="Consolas" panose="020B0609020204030204" pitchFamily="49" charset="0"/>
+              </a:rPr>
+              <a:t>the</a:t>
+            </a:r>
+            <a:r>
+              <a:rPr lang="de-DE" sz="2000" dirty="0">
+                <a:latin typeface="Consolas" panose="020B0609020204030204" pitchFamily="49" charset="0"/>
+              </a:rPr>
+              <a:t> Debian native </a:t>
+            </a:r>
+            <a:r>
+              <a:rPr lang="de-DE" sz="2000" dirty="0" err="1">
+                <a:latin typeface="Consolas" panose="020B0609020204030204" pitchFamily="49" charset="0"/>
+              </a:rPr>
+              <a:t>ones</a:t>
+            </a:r>
+            <a:endParaRPr lang="de-DE" sz="2000" dirty="0">
+              <a:latin typeface="Consolas" panose="020B0609020204030204" pitchFamily="49" charset="0"/>
+            </a:endParaRPr>
+          </a:p>
+          <a:p>
+            <a:pPr marL="0" indent="0">
+              <a:buNone/>
+            </a:pPr>
+            <a:r>
+              <a:rPr lang="de-DE" sz="2000" dirty="0">
+                <a:latin typeface="Consolas" panose="020B0609020204030204" pitchFamily="49" charset="0"/>
+              </a:rPr>
+              <a:t>Package: </a:t>
+            </a:r>
+            <a:r>
+              <a:rPr lang="de-DE" sz="2000" dirty="0" err="1">
+                <a:latin typeface="Consolas" panose="020B0609020204030204" pitchFamily="49" charset="0"/>
+              </a:rPr>
+              <a:t>gitlab-runner</a:t>
+            </a:r>
+            <a:endParaRPr lang="de-DE" sz="2000" dirty="0">
+              <a:latin typeface="Consolas" panose="020B0609020204030204" pitchFamily="49" charset="0"/>
+            </a:endParaRPr>
+          </a:p>
+          <a:p>
+            <a:pPr marL="0" indent="0">
+              <a:buNone/>
+            </a:pPr>
+            <a:r>
+              <a:rPr lang="de-DE" sz="2000" dirty="0">
+                <a:latin typeface="Consolas" panose="020B0609020204030204" pitchFamily="49" charset="0"/>
+              </a:rPr>
+              <a:t>Pin: </a:t>
+            </a:r>
+            <a:r>
+              <a:rPr lang="de-DE" sz="2000" dirty="0" err="1">
+                <a:latin typeface="Consolas" panose="020B0609020204030204" pitchFamily="49" charset="0"/>
+              </a:rPr>
+              <a:t>origin</a:t>
+            </a:r>
+            <a:r>
+              <a:rPr lang="de-DE" sz="2000" dirty="0">
+                <a:latin typeface="Consolas" panose="020B0609020204030204" pitchFamily="49" charset="0"/>
+              </a:rPr>
+              <a:t> packages.gitlab.com</a:t>
+            </a:r>
+          </a:p>
+          <a:p>
+            <a:pPr marL="0" indent="0">
+              <a:buNone/>
+            </a:pPr>
+            <a:r>
+              <a:rPr lang="de-DE" sz="2000" dirty="0">
+                <a:latin typeface="Consolas" panose="020B0609020204030204" pitchFamily="49" charset="0"/>
+              </a:rPr>
+              <a:t>Pin-</a:t>
+            </a:r>
+            <a:r>
+              <a:rPr lang="de-DE" sz="2000" dirty="0" err="1">
+                <a:latin typeface="Consolas" panose="020B0609020204030204" pitchFamily="49" charset="0"/>
+              </a:rPr>
+              <a:t>Priority</a:t>
+            </a:r>
+            <a:r>
+              <a:rPr lang="de-DE" sz="2000" dirty="0">
+                <a:latin typeface="Consolas" panose="020B0609020204030204" pitchFamily="49" charset="0"/>
+              </a:rPr>
+              <a:t>: 1001</a:t>
+            </a:r>
+          </a:p>
+          <a:p>
+            <a:pPr marL="0" indent="0">
+              <a:buNone/>
+            </a:pPr>
+            <a:r>
+              <a:rPr lang="de-DE" sz="2000" dirty="0">
+                <a:latin typeface="Consolas" panose="020B0609020204030204" pitchFamily="49" charset="0"/>
+              </a:rPr>
+              <a:t>EOF</a:t>
+            </a:r>
+          </a:p>
+          <a:p>
+            <a:pPr marL="0" indent="0">
+              <a:buNone/>
+            </a:pPr>
+            <a:endParaRPr lang="de-DE" dirty="0">
+              <a:sym typeface="Wingdings" panose="05000000000000000000" pitchFamily="2" charset="2"/>
+            </a:endParaRPr>
+          </a:p>
+          <a:p>
+            <a:pPr marL="0" indent="0">
+              <a:buNone/>
+            </a:pPr>
+            <a:endParaRPr lang="de-DE" b="1" dirty="0"/>
           </a:p>
         </p:txBody>
       </p:sp>
     </p:spTree>
     <p:extLst>
       <p:ext uri="{BB962C8B-B14F-4D97-AF65-F5344CB8AC3E}">
-        <p14:creationId xmlns:p14="http://schemas.microsoft.com/office/powerpoint/2010/main" val="2809021556"/>
+        <p14:creationId xmlns:p14="http://schemas.microsoft.com/office/powerpoint/2010/main" val="2628646576"/>
       </p:ext>
     </p:extLst>
   </p:cSld>
@@ -7300,7 +9344,7 @@
           <p:cNvPr id="2" name="Titel 1">
             <a:extLst>
               <a:ext uri="{FF2B5EF4-FFF2-40B4-BE49-F238E27FC236}">
-                <a16:creationId xmlns:a16="http://schemas.microsoft.com/office/drawing/2014/main" id="{25E7C6E1-B055-3AFC-5E69-1173C8DA414C}"/>
+                <a16:creationId xmlns:a16="http://schemas.microsoft.com/office/drawing/2014/main" id="{2B9F73D1-0616-0915-95E4-06CBA79315C7}"/>
               </a:ext>
             </a:extLst>
           </p:cNvPr>
@@ -7317,8 +9361,12 @@
           <a:lstStyle/>
           <a:p>
             <a:r>
-              <a:rPr lang="de-DE" dirty="0"/>
-              <a:t>Container Registry</a:t>
+              <a:rPr lang="de-DE" dirty="0" err="1"/>
+              <a:t>GitLab</a:t>
+            </a:r>
+            <a:r>
+              <a:rPr lang="de-DE" dirty="0"/>
+              <a:t> Runner</a:t>
             </a:r>
           </a:p>
         </p:txBody>
@@ -7328,7 +9376,7 @@
           <p:cNvPr id="3" name="Inhaltsplatzhalter 2">
             <a:extLst>
               <a:ext uri="{FF2B5EF4-FFF2-40B4-BE49-F238E27FC236}">
-                <a16:creationId xmlns:a16="http://schemas.microsoft.com/office/drawing/2014/main" id="{2F072594-2447-5EB7-7AAF-47596D7C1121}"/>
+                <a16:creationId xmlns:a16="http://schemas.microsoft.com/office/drawing/2014/main" id="{3CE2D11A-801F-CE1E-A418-D35676D404C3}"/>
               </a:ext>
             </a:extLst>
           </p:cNvPr>
@@ -7347,14 +9395,192 @@
             <a:pPr marL="0" indent="0">
               <a:buNone/>
             </a:pPr>
-            <a:endParaRPr lang="de-DE" dirty="0"/>
+            <a:r>
+              <a:rPr lang="nb-NO" b="1" dirty="0"/>
+              <a:t>Aktuellstes GitLab Runner Paket installieren</a:t>
+            </a:r>
+          </a:p>
+          <a:p>
+            <a:pPr marL="0" indent="0">
+              <a:buNone/>
+            </a:pPr>
+            <a:endParaRPr lang="de-DE" b="1" dirty="0"/>
+          </a:p>
+          <a:p>
+            <a:pPr marL="0" indent="0">
+              <a:buNone/>
+            </a:pPr>
+            <a:r>
+              <a:rPr lang="de-DE" sz="2000" dirty="0">
+                <a:latin typeface="Consolas" panose="020B0609020204030204" pitchFamily="49" charset="0"/>
+                <a:sym typeface="Wingdings" panose="05000000000000000000" pitchFamily="2" charset="2"/>
+              </a:rPr>
+              <a:t># Für Debian/Ubuntu/Mint</a:t>
+            </a:r>
+          </a:p>
+          <a:p>
+            <a:pPr marL="0" indent="0">
+              <a:buNone/>
+            </a:pPr>
+            <a:r>
+              <a:rPr lang="de-DE" sz="2000" dirty="0" err="1">
+                <a:latin typeface="Consolas" panose="020B0609020204030204" pitchFamily="49" charset="0"/>
+                <a:sym typeface="Wingdings" panose="05000000000000000000" pitchFamily="2" charset="2"/>
+              </a:rPr>
+              <a:t>sudo</a:t>
+            </a:r>
+            <a:r>
+              <a:rPr lang="de-DE" sz="2000" dirty="0">
+                <a:latin typeface="Consolas" panose="020B0609020204030204" pitchFamily="49" charset="0"/>
+                <a:sym typeface="Wingdings" panose="05000000000000000000" pitchFamily="2" charset="2"/>
+              </a:rPr>
+              <a:t> </a:t>
+            </a:r>
+            <a:r>
+              <a:rPr lang="de-DE" sz="2000" dirty="0" err="1">
+                <a:latin typeface="Consolas" panose="020B0609020204030204" pitchFamily="49" charset="0"/>
+                <a:sym typeface="Wingdings" panose="05000000000000000000" pitchFamily="2" charset="2"/>
+              </a:rPr>
+              <a:t>apt-get</a:t>
+            </a:r>
+            <a:r>
+              <a:rPr lang="de-DE" sz="2000" dirty="0">
+                <a:latin typeface="Consolas" panose="020B0609020204030204" pitchFamily="49" charset="0"/>
+                <a:sym typeface="Wingdings" panose="05000000000000000000" pitchFamily="2" charset="2"/>
+              </a:rPr>
+              <a:t> </a:t>
+            </a:r>
+            <a:r>
+              <a:rPr lang="de-DE" sz="2000" dirty="0" err="1">
+                <a:latin typeface="Consolas" panose="020B0609020204030204" pitchFamily="49" charset="0"/>
+                <a:sym typeface="Wingdings" panose="05000000000000000000" pitchFamily="2" charset="2"/>
+              </a:rPr>
+              <a:t>install</a:t>
+            </a:r>
+            <a:r>
+              <a:rPr lang="de-DE" sz="2000" dirty="0">
+                <a:latin typeface="Consolas" panose="020B0609020204030204" pitchFamily="49" charset="0"/>
+                <a:sym typeface="Wingdings" panose="05000000000000000000" pitchFamily="2" charset="2"/>
+              </a:rPr>
+              <a:t> </a:t>
+            </a:r>
+            <a:r>
+              <a:rPr lang="de-DE" sz="2000" dirty="0" err="1">
+                <a:latin typeface="Consolas" panose="020B0609020204030204" pitchFamily="49" charset="0"/>
+                <a:sym typeface="Wingdings" panose="05000000000000000000" pitchFamily="2" charset="2"/>
+              </a:rPr>
+              <a:t>gitlab-runner</a:t>
+            </a:r>
+            <a:endParaRPr lang="de-DE" sz="2000" dirty="0">
+              <a:latin typeface="Consolas" panose="020B0609020204030204" pitchFamily="49" charset="0"/>
+              <a:sym typeface="Wingdings" panose="05000000000000000000" pitchFamily="2" charset="2"/>
+            </a:endParaRPr>
+          </a:p>
+          <a:p>
+            <a:pPr marL="0" indent="0">
+              <a:buNone/>
+            </a:pPr>
+            <a:endParaRPr lang="de-DE" sz="2000" dirty="0">
+              <a:latin typeface="Consolas" panose="020B0609020204030204" pitchFamily="49" charset="0"/>
+              <a:sym typeface="Wingdings" panose="05000000000000000000" pitchFamily="2" charset="2"/>
+            </a:endParaRPr>
+          </a:p>
+          <a:p>
+            <a:pPr marL="0" indent="0">
+              <a:buNone/>
+            </a:pPr>
+            <a:r>
+              <a:rPr lang="de-DE" sz="2000" dirty="0">
+                <a:latin typeface="Consolas" panose="020B0609020204030204" pitchFamily="49" charset="0"/>
+                <a:sym typeface="Wingdings" panose="05000000000000000000" pitchFamily="2" charset="2"/>
+              </a:rPr>
+              <a:t># Für RHEL/</a:t>
+            </a:r>
+            <a:r>
+              <a:rPr lang="de-DE" sz="2000" dirty="0" err="1">
+                <a:latin typeface="Consolas" panose="020B0609020204030204" pitchFamily="49" charset="0"/>
+                <a:sym typeface="Wingdings" panose="05000000000000000000" pitchFamily="2" charset="2"/>
+              </a:rPr>
+              <a:t>CentOS</a:t>
+            </a:r>
+            <a:r>
+              <a:rPr lang="de-DE" sz="2000" dirty="0">
+                <a:latin typeface="Consolas" panose="020B0609020204030204" pitchFamily="49" charset="0"/>
+                <a:sym typeface="Wingdings" panose="05000000000000000000" pitchFamily="2" charset="2"/>
+              </a:rPr>
+              <a:t>/Fedora</a:t>
+            </a:r>
+          </a:p>
+          <a:p>
+            <a:pPr marL="0" indent="0">
+              <a:buNone/>
+            </a:pPr>
+            <a:r>
+              <a:rPr lang="de-DE" sz="2000" dirty="0" err="1">
+                <a:latin typeface="Consolas" panose="020B0609020204030204" pitchFamily="49" charset="0"/>
+                <a:sym typeface="Wingdings" panose="05000000000000000000" pitchFamily="2" charset="2"/>
+              </a:rPr>
+              <a:t>sudo</a:t>
+            </a:r>
+            <a:r>
+              <a:rPr lang="de-DE" sz="2000" dirty="0">
+                <a:latin typeface="Consolas" panose="020B0609020204030204" pitchFamily="49" charset="0"/>
+                <a:sym typeface="Wingdings" panose="05000000000000000000" pitchFamily="2" charset="2"/>
+              </a:rPr>
+              <a:t> </a:t>
+            </a:r>
+            <a:r>
+              <a:rPr lang="de-DE" sz="2000" dirty="0" err="1">
+                <a:latin typeface="Consolas" panose="020B0609020204030204" pitchFamily="49" charset="0"/>
+                <a:sym typeface="Wingdings" panose="05000000000000000000" pitchFamily="2" charset="2"/>
+              </a:rPr>
+              <a:t>yum</a:t>
+            </a:r>
+            <a:r>
+              <a:rPr lang="de-DE" sz="2000" dirty="0">
+                <a:latin typeface="Consolas" panose="020B0609020204030204" pitchFamily="49" charset="0"/>
+                <a:sym typeface="Wingdings" panose="05000000000000000000" pitchFamily="2" charset="2"/>
+              </a:rPr>
+              <a:t> </a:t>
+            </a:r>
+            <a:r>
+              <a:rPr lang="de-DE" sz="2000" dirty="0" err="1">
+                <a:latin typeface="Consolas" panose="020B0609020204030204" pitchFamily="49" charset="0"/>
+                <a:sym typeface="Wingdings" panose="05000000000000000000" pitchFamily="2" charset="2"/>
+              </a:rPr>
+              <a:t>install</a:t>
+            </a:r>
+            <a:r>
+              <a:rPr lang="de-DE" sz="2000" dirty="0">
+                <a:latin typeface="Consolas" panose="020B0609020204030204" pitchFamily="49" charset="0"/>
+                <a:sym typeface="Wingdings" panose="05000000000000000000" pitchFamily="2" charset="2"/>
+              </a:rPr>
+              <a:t> </a:t>
+            </a:r>
+            <a:r>
+              <a:rPr lang="de-DE" sz="2000" dirty="0" err="1">
+                <a:latin typeface="Consolas" panose="020B0609020204030204" pitchFamily="49" charset="0"/>
+                <a:sym typeface="Wingdings" panose="05000000000000000000" pitchFamily="2" charset="2"/>
+              </a:rPr>
+              <a:t>gitlab-runner</a:t>
+            </a:r>
+            <a:endParaRPr lang="de-DE" sz="2000" dirty="0">
+              <a:latin typeface="Consolas" panose="020B0609020204030204" pitchFamily="49" charset="0"/>
+              <a:sym typeface="Wingdings" panose="05000000000000000000" pitchFamily="2" charset="2"/>
+            </a:endParaRPr>
+          </a:p>
+          <a:p>
+            <a:pPr marL="0" indent="0">
+              <a:buNone/>
+            </a:pPr>
+            <a:endParaRPr lang="de-DE" b="1" dirty="0"/>
           </a:p>
         </p:txBody>
       </p:sp>
     </p:spTree>
     <p:extLst>
       <p:ext uri="{BB962C8B-B14F-4D97-AF65-F5344CB8AC3E}">
-        <p14:creationId xmlns:p14="http://schemas.microsoft.com/office/powerpoint/2010/main" val="81545675"/>
+        <p14:creationId xmlns:p14="http://schemas.microsoft.com/office/powerpoint/2010/main" val="1484121694"/>
       </p:ext>
     </p:extLst>
   </p:cSld>
@@ -7755,6 +9981,1731 @@
         </p:txBody>
       </p:sp>
     </p:spTree>
+  </p:cSld>
+  <p:clrMapOvr>
+    <a:masterClrMapping/>
+  </p:clrMapOvr>
+</p:sld>
+</file>
+
+<file path=ppt/slides/slide20.xml><?xml version="1.0" encoding="utf-8"?>
+<p:sld xmlns:a="http://schemas.openxmlformats.org/drawingml/2006/main" xmlns:r="http://schemas.openxmlformats.org/officeDocument/2006/relationships" xmlns:p="http://schemas.openxmlformats.org/presentationml/2006/main">
+  <p:cSld>
+    <p:spTree>
+      <p:nvGrpSpPr>
+        <p:cNvPr id="1" name=""/>
+        <p:cNvGrpSpPr/>
+        <p:nvPr/>
+      </p:nvGrpSpPr>
+      <p:grpSpPr>
+        <a:xfrm>
+          <a:off x="0" y="0"/>
+          <a:ext cx="0" cy="0"/>
+          <a:chOff x="0" y="0"/>
+          <a:chExt cx="0" cy="0"/>
+        </a:xfrm>
+      </p:grpSpPr>
+      <p:sp>
+        <p:nvSpPr>
+          <p:cNvPr id="2" name="Titel 1">
+            <a:extLst>
+              <a:ext uri="{FF2B5EF4-FFF2-40B4-BE49-F238E27FC236}">
+                <a16:creationId xmlns:a16="http://schemas.microsoft.com/office/drawing/2014/main" id="{2B9F73D1-0616-0915-95E4-06CBA79315C7}"/>
+              </a:ext>
+            </a:extLst>
+          </p:cNvPr>
+          <p:cNvSpPr>
+            <a:spLocks noGrp="1"/>
+          </p:cNvSpPr>
+          <p:nvPr>
+            <p:ph type="title"/>
+          </p:nvPr>
+        </p:nvSpPr>
+        <p:spPr/>
+        <p:txBody>
+          <a:bodyPr/>
+          <a:lstStyle/>
+          <a:p>
+            <a:r>
+              <a:rPr lang="de-DE" dirty="0" err="1"/>
+              <a:t>GitLab</a:t>
+            </a:r>
+            <a:r>
+              <a:rPr lang="de-DE" dirty="0"/>
+              <a:t> Runner</a:t>
+            </a:r>
+          </a:p>
+        </p:txBody>
+      </p:sp>
+      <p:sp>
+        <p:nvSpPr>
+          <p:cNvPr id="3" name="Inhaltsplatzhalter 2">
+            <a:extLst>
+              <a:ext uri="{FF2B5EF4-FFF2-40B4-BE49-F238E27FC236}">
+                <a16:creationId xmlns:a16="http://schemas.microsoft.com/office/drawing/2014/main" id="{3CE2D11A-801F-CE1E-A418-D35676D404C3}"/>
+              </a:ext>
+            </a:extLst>
+          </p:cNvPr>
+          <p:cNvSpPr>
+            <a:spLocks noGrp="1"/>
+          </p:cNvSpPr>
+          <p:nvPr>
+            <p:ph idx="1"/>
+          </p:nvPr>
+        </p:nvSpPr>
+        <p:spPr/>
+        <p:txBody>
+          <a:bodyPr/>
+          <a:lstStyle/>
+          <a:p>
+            <a:pPr marL="0" indent="0">
+              <a:buNone/>
+            </a:pPr>
+            <a:r>
+              <a:rPr lang="de-DE" b="1" dirty="0"/>
+              <a:t>Installation einer bestimmten </a:t>
+            </a:r>
+            <a:r>
+              <a:rPr lang="de-DE" b="1" dirty="0" err="1"/>
+              <a:t>GitLab</a:t>
+            </a:r>
+            <a:r>
+              <a:rPr lang="de-DE" b="1" dirty="0"/>
+              <a:t> Runner Version</a:t>
+            </a:r>
+          </a:p>
+          <a:p>
+            <a:pPr marL="0" indent="0">
+              <a:buNone/>
+            </a:pPr>
+            <a:endParaRPr lang="de-DE" dirty="0">
+              <a:sym typeface="Wingdings" panose="05000000000000000000" pitchFamily="2" charset="2"/>
+            </a:endParaRPr>
+          </a:p>
+          <a:p>
+            <a:pPr marL="0" indent="0">
+              <a:buNone/>
+            </a:pPr>
+            <a:r>
+              <a:rPr lang="de-DE" sz="2000" dirty="0">
+                <a:latin typeface="Consolas" panose="020B0609020204030204" pitchFamily="49" charset="0"/>
+              </a:rPr>
+              <a:t># Für DEB basierte Systeme (Debian, Ubuntu, Mint..)</a:t>
+            </a:r>
+          </a:p>
+          <a:p>
+            <a:pPr marL="0" indent="0">
+              <a:buNone/>
+            </a:pPr>
+            <a:r>
+              <a:rPr lang="de-DE" sz="2000" dirty="0" err="1">
+                <a:latin typeface="Consolas" panose="020B0609020204030204" pitchFamily="49" charset="0"/>
+              </a:rPr>
+              <a:t>apt</a:t>
+            </a:r>
+            <a:r>
+              <a:rPr lang="de-DE" sz="2000" dirty="0">
+                <a:latin typeface="Consolas" panose="020B0609020204030204" pitchFamily="49" charset="0"/>
+              </a:rPr>
+              <a:t>-cache </a:t>
+            </a:r>
+            <a:r>
+              <a:rPr lang="de-DE" sz="2000" dirty="0" err="1">
+                <a:latin typeface="Consolas" panose="020B0609020204030204" pitchFamily="49" charset="0"/>
+              </a:rPr>
+              <a:t>madison</a:t>
+            </a:r>
+            <a:r>
+              <a:rPr lang="de-DE" sz="2000" dirty="0">
+                <a:latin typeface="Consolas" panose="020B0609020204030204" pitchFamily="49" charset="0"/>
+              </a:rPr>
+              <a:t> </a:t>
+            </a:r>
+            <a:r>
+              <a:rPr lang="de-DE" sz="2000" dirty="0" err="1">
+                <a:latin typeface="Consolas" panose="020B0609020204030204" pitchFamily="49" charset="0"/>
+              </a:rPr>
+              <a:t>gitlab-runner</a:t>
+            </a:r>
+            <a:endParaRPr lang="de-DE" sz="2000" dirty="0">
+              <a:latin typeface="Consolas" panose="020B0609020204030204" pitchFamily="49" charset="0"/>
+            </a:endParaRPr>
+          </a:p>
+          <a:p>
+            <a:pPr marL="0" indent="0">
+              <a:buNone/>
+            </a:pPr>
+            <a:r>
+              <a:rPr lang="de-DE" sz="2000" dirty="0" err="1">
+                <a:latin typeface="Consolas" panose="020B0609020204030204" pitchFamily="49" charset="0"/>
+              </a:rPr>
+              <a:t>sudo</a:t>
+            </a:r>
+            <a:r>
+              <a:rPr lang="de-DE" sz="2000" dirty="0">
+                <a:latin typeface="Consolas" panose="020B0609020204030204" pitchFamily="49" charset="0"/>
+              </a:rPr>
+              <a:t> </a:t>
+            </a:r>
+            <a:r>
+              <a:rPr lang="de-DE" sz="2000" dirty="0" err="1">
+                <a:latin typeface="Consolas" panose="020B0609020204030204" pitchFamily="49" charset="0"/>
+              </a:rPr>
+              <a:t>apt-get</a:t>
+            </a:r>
+            <a:r>
+              <a:rPr lang="de-DE" sz="2000" dirty="0">
+                <a:latin typeface="Consolas" panose="020B0609020204030204" pitchFamily="49" charset="0"/>
+              </a:rPr>
+              <a:t> </a:t>
+            </a:r>
+            <a:r>
+              <a:rPr lang="de-DE" sz="2000" dirty="0" err="1">
+                <a:latin typeface="Consolas" panose="020B0609020204030204" pitchFamily="49" charset="0"/>
+              </a:rPr>
+              <a:t>install</a:t>
+            </a:r>
+            <a:r>
+              <a:rPr lang="de-DE" sz="2000" dirty="0">
+                <a:latin typeface="Consolas" panose="020B0609020204030204" pitchFamily="49" charset="0"/>
+              </a:rPr>
+              <a:t> </a:t>
+            </a:r>
+            <a:r>
+              <a:rPr lang="de-DE" sz="2000" dirty="0" err="1">
+                <a:latin typeface="Consolas" panose="020B0609020204030204" pitchFamily="49" charset="0"/>
+              </a:rPr>
+              <a:t>gitlab-runner</a:t>
+            </a:r>
+            <a:r>
+              <a:rPr lang="de-DE" sz="2000" dirty="0">
+                <a:latin typeface="Consolas" panose="020B0609020204030204" pitchFamily="49" charset="0"/>
+              </a:rPr>
+              <a:t>=10.0.0</a:t>
+            </a:r>
+          </a:p>
+          <a:p>
+            <a:pPr marL="0" indent="0">
+              <a:buNone/>
+            </a:pPr>
+            <a:endParaRPr lang="de-DE" sz="2000" dirty="0">
+              <a:latin typeface="Consolas" panose="020B0609020204030204" pitchFamily="49" charset="0"/>
+            </a:endParaRPr>
+          </a:p>
+          <a:p>
+            <a:pPr marL="0" indent="0">
+              <a:buNone/>
+            </a:pPr>
+            <a:r>
+              <a:rPr lang="de-DE" sz="2000" dirty="0">
+                <a:latin typeface="Consolas" panose="020B0609020204030204" pitchFamily="49" charset="0"/>
+              </a:rPr>
+              <a:t># Für RPM basierte Systeme (RHEL, </a:t>
+            </a:r>
+            <a:r>
+              <a:rPr lang="de-DE" sz="2000" dirty="0" err="1">
+                <a:latin typeface="Consolas" panose="020B0609020204030204" pitchFamily="49" charset="0"/>
+              </a:rPr>
+              <a:t>centOS</a:t>
+            </a:r>
+            <a:r>
+              <a:rPr lang="de-DE" sz="2000" dirty="0">
+                <a:latin typeface="Consolas" panose="020B0609020204030204" pitchFamily="49" charset="0"/>
+              </a:rPr>
+              <a:t>, Fedora...)</a:t>
+            </a:r>
+          </a:p>
+          <a:p>
+            <a:pPr marL="0" indent="0">
+              <a:buNone/>
+            </a:pPr>
+            <a:r>
+              <a:rPr lang="de-DE" sz="2000" dirty="0" err="1">
+                <a:latin typeface="Consolas" panose="020B0609020204030204" pitchFamily="49" charset="0"/>
+              </a:rPr>
+              <a:t>yum</a:t>
+            </a:r>
+            <a:r>
+              <a:rPr lang="de-DE" sz="2000" dirty="0">
+                <a:latin typeface="Consolas" panose="020B0609020204030204" pitchFamily="49" charset="0"/>
+              </a:rPr>
+              <a:t> </a:t>
+            </a:r>
+            <a:r>
+              <a:rPr lang="de-DE" sz="2000" dirty="0" err="1">
+                <a:latin typeface="Consolas" panose="020B0609020204030204" pitchFamily="49" charset="0"/>
+              </a:rPr>
+              <a:t>list</a:t>
+            </a:r>
+            <a:r>
+              <a:rPr lang="de-DE" sz="2000" dirty="0">
+                <a:latin typeface="Consolas" panose="020B0609020204030204" pitchFamily="49" charset="0"/>
+              </a:rPr>
+              <a:t> </a:t>
+            </a:r>
+            <a:r>
+              <a:rPr lang="de-DE" sz="2000" dirty="0" err="1">
+                <a:latin typeface="Consolas" panose="020B0609020204030204" pitchFamily="49" charset="0"/>
+              </a:rPr>
+              <a:t>gitlab-runner</a:t>
+            </a:r>
+            <a:r>
+              <a:rPr lang="de-DE" sz="2000" dirty="0">
+                <a:latin typeface="Consolas" panose="020B0609020204030204" pitchFamily="49" charset="0"/>
+              </a:rPr>
+              <a:t> --</a:t>
+            </a:r>
+            <a:r>
+              <a:rPr lang="de-DE" sz="2000" dirty="0" err="1">
+                <a:latin typeface="Consolas" panose="020B0609020204030204" pitchFamily="49" charset="0"/>
+              </a:rPr>
+              <a:t>showduplicates</a:t>
+            </a:r>
+            <a:r>
+              <a:rPr lang="de-DE" sz="2000" dirty="0">
+                <a:latin typeface="Consolas" panose="020B0609020204030204" pitchFamily="49" charset="0"/>
+              </a:rPr>
+              <a:t> | </a:t>
+            </a:r>
+            <a:r>
+              <a:rPr lang="de-DE" sz="2000" dirty="0" err="1">
+                <a:latin typeface="Consolas" panose="020B0609020204030204" pitchFamily="49" charset="0"/>
+              </a:rPr>
+              <a:t>sort</a:t>
+            </a:r>
+            <a:r>
+              <a:rPr lang="de-DE" sz="2000" dirty="0">
+                <a:latin typeface="Consolas" panose="020B0609020204030204" pitchFamily="49" charset="0"/>
+              </a:rPr>
+              <a:t> -r</a:t>
+            </a:r>
+          </a:p>
+          <a:p>
+            <a:pPr marL="0" indent="0">
+              <a:buNone/>
+            </a:pPr>
+            <a:r>
+              <a:rPr lang="de-DE" sz="2000" dirty="0" err="1">
+                <a:latin typeface="Consolas" panose="020B0609020204030204" pitchFamily="49" charset="0"/>
+              </a:rPr>
+              <a:t>sudo</a:t>
+            </a:r>
+            <a:r>
+              <a:rPr lang="de-DE" sz="2000" dirty="0">
+                <a:latin typeface="Consolas" panose="020B0609020204030204" pitchFamily="49" charset="0"/>
+              </a:rPr>
+              <a:t> </a:t>
+            </a:r>
+            <a:r>
+              <a:rPr lang="de-DE" sz="2000" dirty="0" err="1">
+                <a:latin typeface="Consolas" panose="020B0609020204030204" pitchFamily="49" charset="0"/>
+              </a:rPr>
+              <a:t>yum</a:t>
+            </a:r>
+            <a:r>
+              <a:rPr lang="de-DE" sz="2000" dirty="0">
+                <a:latin typeface="Consolas" panose="020B0609020204030204" pitchFamily="49" charset="0"/>
+              </a:rPr>
+              <a:t> </a:t>
+            </a:r>
+            <a:r>
+              <a:rPr lang="de-DE" sz="2000" dirty="0" err="1">
+                <a:latin typeface="Consolas" panose="020B0609020204030204" pitchFamily="49" charset="0"/>
+              </a:rPr>
+              <a:t>install</a:t>
+            </a:r>
+            <a:r>
+              <a:rPr lang="de-DE" sz="2000" dirty="0">
+                <a:latin typeface="Consolas" panose="020B0609020204030204" pitchFamily="49" charset="0"/>
+              </a:rPr>
+              <a:t> gitlab-runner-10.0.0-1</a:t>
+            </a:r>
+          </a:p>
+        </p:txBody>
+      </p:sp>
+    </p:spTree>
+    <p:extLst>
+      <p:ext uri="{BB962C8B-B14F-4D97-AF65-F5344CB8AC3E}">
+        <p14:creationId xmlns:p14="http://schemas.microsoft.com/office/powerpoint/2010/main" val="177697416"/>
+      </p:ext>
+    </p:extLst>
+  </p:cSld>
+  <p:clrMapOvr>
+    <a:masterClrMapping/>
+  </p:clrMapOvr>
+</p:sld>
+</file>
+
+<file path=ppt/slides/slide21.xml><?xml version="1.0" encoding="utf-8"?>
+<p:sld xmlns:a="http://schemas.openxmlformats.org/drawingml/2006/main" xmlns:r="http://schemas.openxmlformats.org/officeDocument/2006/relationships" xmlns:p="http://schemas.openxmlformats.org/presentationml/2006/main">
+  <p:cSld>
+    <p:spTree>
+      <p:nvGrpSpPr>
+        <p:cNvPr id="1" name=""/>
+        <p:cNvGrpSpPr/>
+        <p:nvPr/>
+      </p:nvGrpSpPr>
+      <p:grpSpPr>
+        <a:xfrm>
+          <a:off x="0" y="0"/>
+          <a:ext cx="0" cy="0"/>
+          <a:chOff x="0" y="0"/>
+          <a:chExt cx="0" cy="0"/>
+        </a:xfrm>
+      </p:grpSpPr>
+      <p:sp>
+        <p:nvSpPr>
+          <p:cNvPr id="2" name="Titel 1">
+            <a:extLst>
+              <a:ext uri="{FF2B5EF4-FFF2-40B4-BE49-F238E27FC236}">
+                <a16:creationId xmlns:a16="http://schemas.microsoft.com/office/drawing/2014/main" id="{2B9F73D1-0616-0915-95E4-06CBA79315C7}"/>
+              </a:ext>
+            </a:extLst>
+          </p:cNvPr>
+          <p:cNvSpPr>
+            <a:spLocks noGrp="1"/>
+          </p:cNvSpPr>
+          <p:nvPr>
+            <p:ph type="title"/>
+          </p:nvPr>
+        </p:nvSpPr>
+        <p:spPr/>
+        <p:txBody>
+          <a:bodyPr/>
+          <a:lstStyle/>
+          <a:p>
+            <a:r>
+              <a:rPr lang="de-DE" dirty="0" err="1"/>
+              <a:t>GitLab</a:t>
+            </a:r>
+            <a:r>
+              <a:rPr lang="de-DE" dirty="0"/>
+              <a:t> Runner</a:t>
+            </a:r>
+          </a:p>
+        </p:txBody>
+      </p:sp>
+      <p:sp>
+        <p:nvSpPr>
+          <p:cNvPr id="3" name="Inhaltsplatzhalter 2">
+            <a:extLst>
+              <a:ext uri="{FF2B5EF4-FFF2-40B4-BE49-F238E27FC236}">
+                <a16:creationId xmlns:a16="http://schemas.microsoft.com/office/drawing/2014/main" id="{3CE2D11A-801F-CE1E-A418-D35676D404C3}"/>
+              </a:ext>
+            </a:extLst>
+          </p:cNvPr>
+          <p:cNvSpPr>
+            <a:spLocks noGrp="1"/>
+          </p:cNvSpPr>
+          <p:nvPr>
+            <p:ph idx="1"/>
+          </p:nvPr>
+        </p:nvSpPr>
+        <p:spPr/>
+        <p:txBody>
+          <a:bodyPr/>
+          <a:lstStyle/>
+          <a:p>
+            <a:pPr marL="0" indent="0">
+              <a:buNone/>
+            </a:pPr>
+            <a:r>
+              <a:rPr lang="de-DE" b="1" dirty="0"/>
+              <a:t>Runner im </a:t>
+            </a:r>
+            <a:r>
+              <a:rPr lang="de-DE" b="1" dirty="0" err="1"/>
+              <a:t>GitLab</a:t>
+            </a:r>
+            <a:r>
+              <a:rPr lang="de-DE" b="1" dirty="0"/>
+              <a:t> registrieren (grob, später mehr)</a:t>
+            </a:r>
+          </a:p>
+          <a:p>
+            <a:pPr marL="457200" indent="-457200">
+              <a:buFont typeface="+mj-lt"/>
+              <a:buAutoNum type="arabicPeriod"/>
+            </a:pPr>
+            <a:r>
+              <a:rPr lang="de-DE" sz="2000" dirty="0"/>
+              <a:t>Linux: </a:t>
+            </a:r>
+            <a:r>
+              <a:rPr lang="de-DE" sz="2000" dirty="0" err="1"/>
+              <a:t>sudo</a:t>
+            </a:r>
+            <a:r>
+              <a:rPr lang="de-DE" sz="2000" dirty="0"/>
+              <a:t> </a:t>
+            </a:r>
+            <a:r>
+              <a:rPr lang="de-DE" sz="2000" dirty="0" err="1"/>
+              <a:t>gitlab-runner</a:t>
+            </a:r>
+            <a:r>
+              <a:rPr lang="de-DE" sz="2000" dirty="0"/>
+              <a:t> </a:t>
+            </a:r>
+            <a:r>
+              <a:rPr lang="de-DE" sz="2000" dirty="0" err="1"/>
+              <a:t>register</a:t>
+            </a:r>
+            <a:br>
+              <a:rPr lang="de-DE" sz="2000" dirty="0"/>
+            </a:br>
+            <a:r>
+              <a:rPr lang="de-DE" sz="2000" dirty="0"/>
+              <a:t>Windows: ./gitlab-runner.exe </a:t>
+            </a:r>
+            <a:r>
+              <a:rPr lang="de-DE" sz="2000" dirty="0" err="1"/>
+              <a:t>register</a:t>
+            </a:r>
+            <a:endParaRPr lang="de-DE" sz="2000" dirty="0"/>
+          </a:p>
+          <a:p>
+            <a:pPr marL="457200" indent="-457200">
+              <a:buFont typeface="+mj-lt"/>
+              <a:buAutoNum type="arabicPeriod"/>
+            </a:pPr>
+            <a:r>
+              <a:rPr lang="de-DE" sz="2000" dirty="0"/>
+              <a:t>URL zur </a:t>
+            </a:r>
+            <a:r>
+              <a:rPr lang="de-DE" sz="2000" dirty="0" err="1"/>
+              <a:t>GitLab</a:t>
+            </a:r>
+            <a:r>
+              <a:rPr lang="de-DE" sz="2000" dirty="0"/>
+              <a:t> Instanz eingeben</a:t>
+            </a:r>
+          </a:p>
+          <a:p>
+            <a:pPr marL="457200" indent="-457200">
+              <a:buFont typeface="+mj-lt"/>
+              <a:buAutoNum type="arabicPeriod"/>
+            </a:pPr>
+            <a:r>
+              <a:rPr lang="de-DE" sz="2000" dirty="0"/>
+              <a:t>Authenticator-Token für den Runner eingeben</a:t>
+            </a:r>
+          </a:p>
+          <a:p>
+            <a:pPr marL="857250" lvl="1" indent="-457200">
+              <a:buFont typeface="+mj-lt"/>
+              <a:buAutoNum type="arabicPeriod"/>
+            </a:pPr>
+            <a:r>
+              <a:rPr lang="de-DE" sz="1800" dirty="0"/>
+              <a:t>Projekt </a:t>
+            </a:r>
+            <a:r>
+              <a:rPr lang="de-DE" sz="1800" dirty="0">
+                <a:sym typeface="Wingdings" panose="05000000000000000000" pitchFamily="2" charset="2"/>
+              </a:rPr>
+              <a:t> Einstellungen  CI/CD  Runners</a:t>
+            </a:r>
+          </a:p>
+          <a:p>
+            <a:pPr marL="457200" indent="-457200">
+              <a:buFont typeface="+mj-lt"/>
+              <a:buAutoNum type="arabicPeriod"/>
+            </a:pPr>
+            <a:r>
+              <a:rPr lang="de-DE" sz="2000" dirty="0">
+                <a:sym typeface="Wingdings" panose="05000000000000000000" pitchFamily="2" charset="2"/>
+              </a:rPr>
+              <a:t>Beschreibung für den Runner eingeben (später über die GUI änderbar)</a:t>
+            </a:r>
+          </a:p>
+          <a:p>
+            <a:pPr marL="457200" indent="-457200">
+              <a:buFont typeface="+mj-lt"/>
+              <a:buAutoNum type="arabicPeriod"/>
+            </a:pPr>
+            <a:r>
+              <a:rPr lang="de-DE" sz="2000" dirty="0"/>
+              <a:t>Die entsprechenden Tags für den </a:t>
+            </a:r>
+            <a:r>
+              <a:rPr lang="de-DE" sz="2000" dirty="0" err="1"/>
+              <a:t>GitLab</a:t>
+            </a:r>
+            <a:r>
+              <a:rPr lang="de-DE" sz="2000" dirty="0"/>
+              <a:t> Runner</a:t>
+            </a:r>
+          </a:p>
+          <a:p>
+            <a:pPr marL="457200" indent="-457200">
+              <a:buFont typeface="+mj-lt"/>
+              <a:buAutoNum type="arabicPeriod"/>
+            </a:pPr>
+            <a:r>
+              <a:rPr lang="de-DE" sz="2000" dirty="0" err="1"/>
+              <a:t>Executor</a:t>
+            </a:r>
+            <a:r>
+              <a:rPr lang="de-DE" sz="2000" dirty="0"/>
+              <a:t> (Docker!) für den Runner angeben</a:t>
+            </a:r>
+          </a:p>
+          <a:p>
+            <a:pPr marL="457200" indent="-457200">
+              <a:buFont typeface="+mj-lt"/>
+              <a:buAutoNum type="arabicPeriod"/>
+            </a:pPr>
+            <a:r>
+              <a:rPr lang="de-DE" sz="2000" dirty="0"/>
+              <a:t>Standard Image angeben, welches genutzt werden soll, falls in .</a:t>
+            </a:r>
+            <a:r>
+              <a:rPr lang="de-DE" sz="2000" dirty="0" err="1"/>
+              <a:t>gitlab-ci.yml</a:t>
+            </a:r>
+            <a:r>
+              <a:rPr lang="de-DE" sz="2000" dirty="0"/>
+              <a:t> nichts definiert wurde</a:t>
+            </a:r>
+          </a:p>
+          <a:p>
+            <a:pPr marL="457200" indent="-457200">
+              <a:buFont typeface="+mj-lt"/>
+              <a:buAutoNum type="arabicPeriod"/>
+            </a:pPr>
+            <a:endParaRPr lang="de-DE" sz="1600" dirty="0"/>
+          </a:p>
+          <a:p>
+            <a:pPr marL="457200" indent="-457200">
+              <a:buFont typeface="+mj-lt"/>
+              <a:buAutoNum type="arabicPeriod"/>
+            </a:pPr>
+            <a:endParaRPr lang="de-DE" dirty="0">
+              <a:latin typeface="Consolas" panose="020B0609020204030204" pitchFamily="49" charset="0"/>
+              <a:sym typeface="Wingdings" panose="05000000000000000000" pitchFamily="2" charset="2"/>
+            </a:endParaRPr>
+          </a:p>
+          <a:p>
+            <a:pPr marL="0" indent="0">
+              <a:buNone/>
+            </a:pPr>
+            <a:endParaRPr lang="de-DE" dirty="0">
+              <a:latin typeface="Consolas" panose="020B0609020204030204" pitchFamily="49" charset="0"/>
+              <a:sym typeface="Wingdings" panose="05000000000000000000" pitchFamily="2" charset="2"/>
+            </a:endParaRPr>
+          </a:p>
+          <a:p>
+            <a:pPr marL="0" indent="0">
+              <a:buNone/>
+            </a:pPr>
+            <a:endParaRPr lang="de-DE" b="1" dirty="0"/>
+          </a:p>
+        </p:txBody>
+      </p:sp>
+    </p:spTree>
+    <p:extLst>
+      <p:ext uri="{BB962C8B-B14F-4D97-AF65-F5344CB8AC3E}">
+        <p14:creationId xmlns:p14="http://schemas.microsoft.com/office/powerpoint/2010/main" val="34263816"/>
+      </p:ext>
+    </p:extLst>
+  </p:cSld>
+  <p:clrMapOvr>
+    <a:masterClrMapping/>
+  </p:clrMapOvr>
+</p:sld>
+</file>
+
+<file path=ppt/slides/slide22.xml><?xml version="1.0" encoding="utf-8"?>
+<p:sld xmlns:a="http://schemas.openxmlformats.org/drawingml/2006/main" xmlns:r="http://schemas.openxmlformats.org/officeDocument/2006/relationships" xmlns:p="http://schemas.openxmlformats.org/presentationml/2006/main">
+  <p:cSld>
+    <p:spTree>
+      <p:nvGrpSpPr>
+        <p:cNvPr id="1" name=""/>
+        <p:cNvGrpSpPr/>
+        <p:nvPr/>
+      </p:nvGrpSpPr>
+      <p:grpSpPr>
+        <a:xfrm>
+          <a:off x="0" y="0"/>
+          <a:ext cx="0" cy="0"/>
+          <a:chOff x="0" y="0"/>
+          <a:chExt cx="0" cy="0"/>
+        </a:xfrm>
+      </p:grpSpPr>
+      <p:sp>
+        <p:nvSpPr>
+          <p:cNvPr id="2" name="Titel 1">
+            <a:extLst>
+              <a:ext uri="{FF2B5EF4-FFF2-40B4-BE49-F238E27FC236}">
+                <a16:creationId xmlns:a16="http://schemas.microsoft.com/office/drawing/2014/main" id="{2B9F73D1-0616-0915-95E4-06CBA79315C7}"/>
+              </a:ext>
+            </a:extLst>
+          </p:cNvPr>
+          <p:cNvSpPr>
+            <a:spLocks noGrp="1"/>
+          </p:cNvSpPr>
+          <p:nvPr>
+            <p:ph type="title"/>
+          </p:nvPr>
+        </p:nvSpPr>
+        <p:spPr/>
+        <p:txBody>
+          <a:bodyPr/>
+          <a:lstStyle/>
+          <a:p>
+            <a:r>
+              <a:rPr lang="de-DE" dirty="0" err="1"/>
+              <a:t>GitLab</a:t>
+            </a:r>
+            <a:r>
+              <a:rPr lang="de-DE" dirty="0"/>
+              <a:t> Runner</a:t>
+            </a:r>
+          </a:p>
+        </p:txBody>
+      </p:sp>
+      <p:sp>
+        <p:nvSpPr>
+          <p:cNvPr id="3" name="Inhaltsplatzhalter 2">
+            <a:extLst>
+              <a:ext uri="{FF2B5EF4-FFF2-40B4-BE49-F238E27FC236}">
+                <a16:creationId xmlns:a16="http://schemas.microsoft.com/office/drawing/2014/main" id="{3CE2D11A-801F-CE1E-A418-D35676D404C3}"/>
+              </a:ext>
+            </a:extLst>
+          </p:cNvPr>
+          <p:cNvSpPr>
+            <a:spLocks noGrp="1"/>
+          </p:cNvSpPr>
+          <p:nvPr>
+            <p:ph idx="1"/>
+          </p:nvPr>
+        </p:nvSpPr>
+        <p:spPr/>
+        <p:txBody>
+          <a:bodyPr/>
+          <a:lstStyle/>
+          <a:p>
+            <a:pPr marL="0" indent="0">
+              <a:buNone/>
+            </a:pPr>
+            <a:r>
+              <a:rPr lang="de-DE" b="1" dirty="0" err="1"/>
+              <a:t>GitLab</a:t>
+            </a:r>
+            <a:r>
+              <a:rPr lang="de-DE" b="1" dirty="0"/>
+              <a:t> Runner aktualisieren</a:t>
+            </a:r>
+          </a:p>
+          <a:p>
+            <a:pPr marL="0" indent="0">
+              <a:buNone/>
+            </a:pPr>
+            <a:endParaRPr lang="de-DE" b="1" dirty="0">
+              <a:sym typeface="Wingdings" panose="05000000000000000000" pitchFamily="2" charset="2"/>
+            </a:endParaRPr>
+          </a:p>
+          <a:p>
+            <a:pPr marL="0" indent="0">
+              <a:buNone/>
+            </a:pPr>
+            <a:r>
+              <a:rPr lang="en-US" sz="2000" dirty="0">
+                <a:latin typeface="Consolas" panose="020B0609020204030204" pitchFamily="49" charset="0"/>
+                <a:sym typeface="Wingdings" panose="05000000000000000000" pitchFamily="2" charset="2"/>
+              </a:rPr>
+              <a:t># Für Debian/Ubuntu/Mint</a:t>
+            </a:r>
+          </a:p>
+          <a:p>
+            <a:pPr marL="0" indent="0">
+              <a:buNone/>
+            </a:pPr>
+            <a:r>
+              <a:rPr lang="en-US" sz="2000" dirty="0" err="1">
+                <a:latin typeface="Consolas" panose="020B0609020204030204" pitchFamily="49" charset="0"/>
+                <a:sym typeface="Wingdings" panose="05000000000000000000" pitchFamily="2" charset="2"/>
+              </a:rPr>
+              <a:t>sudo</a:t>
+            </a:r>
+            <a:r>
+              <a:rPr lang="en-US" sz="2000" dirty="0">
+                <a:latin typeface="Consolas" panose="020B0609020204030204" pitchFamily="49" charset="0"/>
+                <a:sym typeface="Wingdings" panose="05000000000000000000" pitchFamily="2" charset="2"/>
+              </a:rPr>
+              <a:t> apt-get update</a:t>
+            </a:r>
+          </a:p>
+          <a:p>
+            <a:pPr marL="0" indent="0">
+              <a:buNone/>
+            </a:pPr>
+            <a:r>
+              <a:rPr lang="en-US" sz="2000" dirty="0" err="1">
+                <a:latin typeface="Consolas" panose="020B0609020204030204" pitchFamily="49" charset="0"/>
+                <a:sym typeface="Wingdings" panose="05000000000000000000" pitchFamily="2" charset="2"/>
+              </a:rPr>
+              <a:t>sudo</a:t>
+            </a:r>
+            <a:r>
+              <a:rPr lang="en-US" sz="2000" dirty="0">
+                <a:latin typeface="Consolas" panose="020B0609020204030204" pitchFamily="49" charset="0"/>
+                <a:sym typeface="Wingdings" panose="05000000000000000000" pitchFamily="2" charset="2"/>
+              </a:rPr>
+              <a:t> apt-get install </a:t>
+            </a:r>
+            <a:r>
+              <a:rPr lang="en-US" sz="2000" dirty="0" err="1">
+                <a:latin typeface="Consolas" panose="020B0609020204030204" pitchFamily="49" charset="0"/>
+                <a:sym typeface="Wingdings" panose="05000000000000000000" pitchFamily="2" charset="2"/>
+              </a:rPr>
+              <a:t>gitlab</a:t>
+            </a:r>
+            <a:r>
+              <a:rPr lang="en-US" sz="2000" dirty="0">
+                <a:latin typeface="Consolas" panose="020B0609020204030204" pitchFamily="49" charset="0"/>
+                <a:sym typeface="Wingdings" panose="05000000000000000000" pitchFamily="2" charset="2"/>
+              </a:rPr>
+              <a:t>-runner</a:t>
+            </a:r>
+          </a:p>
+          <a:p>
+            <a:pPr marL="0" indent="0">
+              <a:buNone/>
+            </a:pPr>
+            <a:endParaRPr lang="en-US" sz="2000" dirty="0">
+              <a:latin typeface="Consolas" panose="020B0609020204030204" pitchFamily="49" charset="0"/>
+              <a:sym typeface="Wingdings" panose="05000000000000000000" pitchFamily="2" charset="2"/>
+            </a:endParaRPr>
+          </a:p>
+          <a:p>
+            <a:pPr marL="0" indent="0">
+              <a:buNone/>
+            </a:pPr>
+            <a:r>
+              <a:rPr lang="en-US" sz="2000" dirty="0">
+                <a:latin typeface="Consolas" panose="020B0609020204030204" pitchFamily="49" charset="0"/>
+                <a:sym typeface="Wingdings" panose="05000000000000000000" pitchFamily="2" charset="2"/>
+              </a:rPr>
+              <a:t># Für RHEL/CentOS/Fedora</a:t>
+            </a:r>
+          </a:p>
+          <a:p>
+            <a:pPr marL="0" indent="0">
+              <a:buNone/>
+            </a:pPr>
+            <a:r>
+              <a:rPr lang="en-US" sz="2000" dirty="0" err="1">
+                <a:latin typeface="Consolas" panose="020B0609020204030204" pitchFamily="49" charset="0"/>
+                <a:sym typeface="Wingdings" panose="05000000000000000000" pitchFamily="2" charset="2"/>
+              </a:rPr>
+              <a:t>sudo</a:t>
+            </a:r>
+            <a:r>
+              <a:rPr lang="en-US" sz="2000" dirty="0">
+                <a:latin typeface="Consolas" panose="020B0609020204030204" pitchFamily="49" charset="0"/>
+                <a:sym typeface="Wingdings" panose="05000000000000000000" pitchFamily="2" charset="2"/>
+              </a:rPr>
+              <a:t> yum update</a:t>
+            </a:r>
+          </a:p>
+          <a:p>
+            <a:pPr marL="0" indent="0">
+              <a:buNone/>
+            </a:pPr>
+            <a:r>
+              <a:rPr lang="en-US" sz="2000" dirty="0" err="1">
+                <a:latin typeface="Consolas" panose="020B0609020204030204" pitchFamily="49" charset="0"/>
+                <a:sym typeface="Wingdings" panose="05000000000000000000" pitchFamily="2" charset="2"/>
+              </a:rPr>
+              <a:t>sudo</a:t>
+            </a:r>
+            <a:r>
+              <a:rPr lang="en-US" sz="2000" dirty="0">
+                <a:latin typeface="Consolas" panose="020B0609020204030204" pitchFamily="49" charset="0"/>
+                <a:sym typeface="Wingdings" panose="05000000000000000000" pitchFamily="2" charset="2"/>
+              </a:rPr>
+              <a:t> yum install </a:t>
+            </a:r>
+            <a:r>
+              <a:rPr lang="en-US" sz="2000" dirty="0" err="1">
+                <a:latin typeface="Consolas" panose="020B0609020204030204" pitchFamily="49" charset="0"/>
+                <a:sym typeface="Wingdings" panose="05000000000000000000" pitchFamily="2" charset="2"/>
+              </a:rPr>
+              <a:t>gitlab</a:t>
+            </a:r>
+            <a:r>
+              <a:rPr lang="en-US" sz="2000" dirty="0">
+                <a:latin typeface="Consolas" panose="020B0609020204030204" pitchFamily="49" charset="0"/>
+                <a:sym typeface="Wingdings" panose="05000000000000000000" pitchFamily="2" charset="2"/>
+              </a:rPr>
+              <a:t>-runner</a:t>
+            </a:r>
+          </a:p>
+          <a:p>
+            <a:pPr marL="0" indent="0">
+              <a:buNone/>
+            </a:pPr>
+            <a:endParaRPr lang="de-DE" sz="2000" b="1" dirty="0">
+              <a:latin typeface="Consolas" panose="020B0609020204030204" pitchFamily="49" charset="0"/>
+              <a:sym typeface="Wingdings" panose="05000000000000000000" pitchFamily="2" charset="2"/>
+            </a:endParaRPr>
+          </a:p>
+          <a:p>
+            <a:pPr marL="0" indent="0">
+              <a:buNone/>
+            </a:pPr>
+            <a:endParaRPr lang="de-DE" b="1" dirty="0"/>
+          </a:p>
+        </p:txBody>
+      </p:sp>
+    </p:spTree>
+    <p:extLst>
+      <p:ext uri="{BB962C8B-B14F-4D97-AF65-F5344CB8AC3E}">
+        <p14:creationId xmlns:p14="http://schemas.microsoft.com/office/powerpoint/2010/main" val="1029927681"/>
+      </p:ext>
+    </p:extLst>
+  </p:cSld>
+  <p:clrMapOvr>
+    <a:masterClrMapping/>
+  </p:clrMapOvr>
+</p:sld>
+</file>
+
+<file path=ppt/slides/slide23.xml><?xml version="1.0" encoding="utf-8"?>
+<p:sld xmlns:a="http://schemas.openxmlformats.org/drawingml/2006/main" xmlns:r="http://schemas.openxmlformats.org/officeDocument/2006/relationships" xmlns:p="http://schemas.openxmlformats.org/presentationml/2006/main">
+  <p:cSld>
+    <p:spTree>
+      <p:nvGrpSpPr>
+        <p:cNvPr id="1" name=""/>
+        <p:cNvGrpSpPr/>
+        <p:nvPr/>
+      </p:nvGrpSpPr>
+      <p:grpSpPr>
+        <a:xfrm>
+          <a:off x="0" y="0"/>
+          <a:ext cx="0" cy="0"/>
+          <a:chOff x="0" y="0"/>
+          <a:chExt cx="0" cy="0"/>
+        </a:xfrm>
+      </p:grpSpPr>
+      <p:sp>
+        <p:nvSpPr>
+          <p:cNvPr id="2" name="Titel 1">
+            <a:extLst>
+              <a:ext uri="{FF2B5EF4-FFF2-40B4-BE49-F238E27FC236}">
+                <a16:creationId xmlns:a16="http://schemas.microsoft.com/office/drawing/2014/main" id="{2B9F73D1-0616-0915-95E4-06CBA79315C7}"/>
+              </a:ext>
+            </a:extLst>
+          </p:cNvPr>
+          <p:cNvSpPr>
+            <a:spLocks noGrp="1"/>
+          </p:cNvSpPr>
+          <p:nvPr>
+            <p:ph type="title"/>
+          </p:nvPr>
+        </p:nvSpPr>
+        <p:spPr/>
+        <p:txBody>
+          <a:bodyPr/>
+          <a:lstStyle/>
+          <a:p>
+            <a:r>
+              <a:rPr lang="de-DE" dirty="0" err="1"/>
+              <a:t>GitLab</a:t>
+            </a:r>
+            <a:r>
+              <a:rPr lang="de-DE" dirty="0"/>
+              <a:t> Runner</a:t>
+            </a:r>
+          </a:p>
+        </p:txBody>
+      </p:sp>
+      <p:sp>
+        <p:nvSpPr>
+          <p:cNvPr id="3" name="Inhaltsplatzhalter 2">
+            <a:extLst>
+              <a:ext uri="{FF2B5EF4-FFF2-40B4-BE49-F238E27FC236}">
+                <a16:creationId xmlns:a16="http://schemas.microsoft.com/office/drawing/2014/main" id="{3CE2D11A-801F-CE1E-A418-D35676D404C3}"/>
+              </a:ext>
+            </a:extLst>
+          </p:cNvPr>
+          <p:cNvSpPr>
+            <a:spLocks noGrp="1"/>
+          </p:cNvSpPr>
+          <p:nvPr>
+            <p:ph idx="1"/>
+          </p:nvPr>
+        </p:nvSpPr>
+        <p:spPr/>
+        <p:txBody>
+          <a:bodyPr/>
+          <a:lstStyle/>
+          <a:p>
+            <a:pPr marL="0" indent="0">
+              <a:buNone/>
+            </a:pPr>
+            <a:r>
+              <a:rPr lang="de-DE" b="1" dirty="0"/>
+              <a:t>Windows</a:t>
+            </a:r>
+          </a:p>
+          <a:p>
+            <a:pPr marL="457200" indent="-457200">
+              <a:buFont typeface="+mj-lt"/>
+              <a:buAutoNum type="arabicPeriod"/>
+            </a:pPr>
+            <a:r>
+              <a:rPr lang="de-DE" dirty="0">
+                <a:sym typeface="Wingdings" panose="05000000000000000000" pitchFamily="2" charset="2"/>
+              </a:rPr>
+              <a:t>Systemordner erstellen, z.B.: C:\GitLab-Runner</a:t>
+            </a:r>
+          </a:p>
+          <a:p>
+            <a:pPr marL="457200" indent="-457200">
+              <a:buFont typeface="+mj-lt"/>
+              <a:buAutoNum type="arabicPeriod"/>
+            </a:pPr>
+            <a:r>
+              <a:rPr lang="de-DE" dirty="0">
+                <a:sym typeface="Wingdings" panose="05000000000000000000" pitchFamily="2" charset="2"/>
+              </a:rPr>
+              <a:t>Installationsdatei herunterladen und in den erstellten Ordner kopieren.</a:t>
+            </a:r>
+          </a:p>
+          <a:p>
+            <a:pPr marL="857250" lvl="1" indent="-457200">
+              <a:buFont typeface="+mj-lt"/>
+              <a:buAutoNum type="arabicPeriod"/>
+            </a:pPr>
+            <a:r>
+              <a:rPr lang="de-DE" dirty="0">
+                <a:sym typeface="Wingdings" panose="05000000000000000000" pitchFamily="2" charset="2"/>
+              </a:rPr>
+              <a:t>Exe in gitlab-runner.exe umbenennen</a:t>
+            </a:r>
+          </a:p>
+          <a:p>
+            <a:pPr marL="457200" indent="-457200">
+              <a:buFont typeface="+mj-lt"/>
+              <a:buAutoNum type="arabicPeriod"/>
+            </a:pPr>
+            <a:r>
+              <a:rPr lang="de-DE" dirty="0" err="1">
+                <a:sym typeface="Wingdings" panose="05000000000000000000" pitchFamily="2" charset="2"/>
+              </a:rPr>
+              <a:t>Powershell</a:t>
+            </a:r>
+            <a:r>
+              <a:rPr lang="de-DE" dirty="0">
+                <a:sym typeface="Wingdings" panose="05000000000000000000" pitchFamily="2" charset="2"/>
+              </a:rPr>
+              <a:t> als Admin starten</a:t>
+            </a:r>
+          </a:p>
+          <a:p>
+            <a:pPr marL="457200" indent="-457200">
+              <a:buFont typeface="+mj-lt"/>
+              <a:buAutoNum type="arabicPeriod"/>
+            </a:pPr>
+            <a:r>
+              <a:rPr lang="de-DE" dirty="0">
+                <a:sym typeface="Wingdings" panose="05000000000000000000" pitchFamily="2" charset="2"/>
+              </a:rPr>
+              <a:t>Runner registrieren</a:t>
+            </a:r>
+          </a:p>
+          <a:p>
+            <a:pPr marL="457200" indent="-457200">
+              <a:buFont typeface="+mj-lt"/>
+              <a:buAutoNum type="arabicPeriod"/>
+            </a:pPr>
+            <a:r>
+              <a:rPr lang="de-DE" dirty="0">
+                <a:sym typeface="Wingdings" panose="05000000000000000000" pitchFamily="2" charset="2"/>
+              </a:rPr>
+              <a:t>Den Runner als Service installieren über die </a:t>
+            </a:r>
+            <a:r>
+              <a:rPr lang="de-DE" dirty="0" err="1">
+                <a:sym typeface="Wingdings" panose="05000000000000000000" pitchFamily="2" charset="2"/>
+              </a:rPr>
+              <a:t>Powershell</a:t>
+            </a:r>
+            <a:r>
+              <a:rPr lang="de-DE" dirty="0">
+                <a:sym typeface="Wingdings" panose="05000000000000000000" pitchFamily="2" charset="2"/>
+              </a:rPr>
+              <a:t>:</a:t>
+            </a:r>
+          </a:p>
+          <a:p>
+            <a:pPr marL="857250" lvl="1" indent="-457200">
+              <a:buFont typeface="+mj-lt"/>
+              <a:buAutoNum type="arabicPeriod"/>
+            </a:pPr>
+            <a:r>
+              <a:rPr lang="de-DE" dirty="0">
+                <a:sym typeface="Wingdings" panose="05000000000000000000" pitchFamily="2" charset="2"/>
+              </a:rPr>
+              <a:t>cd C:\Gitlab-Runner</a:t>
+            </a:r>
+          </a:p>
+          <a:p>
+            <a:pPr marL="857250" lvl="1" indent="-457200">
+              <a:buFont typeface="+mj-lt"/>
+              <a:buAutoNum type="arabicPeriod"/>
+            </a:pPr>
+            <a:r>
+              <a:rPr lang="de-DE" dirty="0">
+                <a:sym typeface="Wingdings" panose="05000000000000000000" pitchFamily="2" charset="2"/>
+              </a:rPr>
+              <a:t>./gitlab-runner.exe </a:t>
+            </a:r>
+            <a:r>
+              <a:rPr lang="de-DE" dirty="0" err="1">
+                <a:sym typeface="Wingdings" panose="05000000000000000000" pitchFamily="2" charset="2"/>
+              </a:rPr>
+              <a:t>install</a:t>
+            </a:r>
+            <a:endParaRPr lang="de-DE" dirty="0">
+              <a:sym typeface="Wingdings" panose="05000000000000000000" pitchFamily="2" charset="2"/>
+            </a:endParaRPr>
+          </a:p>
+          <a:p>
+            <a:pPr marL="857250" lvl="1" indent="-457200">
+              <a:buFont typeface="+mj-lt"/>
+              <a:buAutoNum type="arabicPeriod"/>
+            </a:pPr>
+            <a:r>
+              <a:rPr lang="de-DE" dirty="0">
+                <a:sym typeface="Wingdings" panose="05000000000000000000" pitchFamily="2" charset="2"/>
+              </a:rPr>
+              <a:t>./gitlab-runner.exe </a:t>
+            </a:r>
+            <a:r>
+              <a:rPr lang="de-DE" dirty="0" err="1">
+                <a:sym typeface="Wingdings" panose="05000000000000000000" pitchFamily="2" charset="2"/>
+              </a:rPr>
+              <a:t>start</a:t>
+            </a:r>
+            <a:endParaRPr lang="de-DE" dirty="0">
+              <a:sym typeface="Wingdings" panose="05000000000000000000" pitchFamily="2" charset="2"/>
+            </a:endParaRPr>
+          </a:p>
+          <a:p>
+            <a:pPr marL="457200" indent="-457200">
+              <a:buFont typeface="+mj-lt"/>
+              <a:buAutoNum type="arabicPeriod"/>
+            </a:pPr>
+            <a:r>
+              <a:rPr lang="de-DE" dirty="0">
+                <a:sym typeface="Wingdings" panose="05000000000000000000" pitchFamily="2" charset="2"/>
+              </a:rPr>
+              <a:t>Service läuft nun. Weitere Runner unter ./</a:t>
+            </a:r>
+            <a:r>
+              <a:rPr lang="de-DE" dirty="0" err="1">
+                <a:sym typeface="Wingdings" panose="05000000000000000000" pitchFamily="2" charset="2"/>
+              </a:rPr>
+              <a:t>config</a:t>
+            </a:r>
+            <a:r>
+              <a:rPr lang="de-DE" dirty="0">
+                <a:sym typeface="Wingdings" panose="05000000000000000000" pitchFamily="2" charset="2"/>
+              </a:rPr>
+              <a:t>. </a:t>
+            </a:r>
+            <a:r>
+              <a:rPr lang="de-DE" dirty="0" err="1">
+                <a:sym typeface="Wingdings" panose="05000000000000000000" pitchFamily="2" charset="2"/>
+              </a:rPr>
+              <a:t>Toml</a:t>
+            </a:r>
+            <a:r>
+              <a:rPr lang="de-DE" dirty="0">
+                <a:sym typeface="Wingdings" panose="05000000000000000000" pitchFamily="2" charset="2"/>
+              </a:rPr>
+              <a:t> konfigurierbar</a:t>
+            </a:r>
+          </a:p>
+          <a:p>
+            <a:pPr marL="0" indent="0">
+              <a:buNone/>
+            </a:pPr>
+            <a:endParaRPr lang="de-DE" dirty="0">
+              <a:latin typeface="+mj-lt"/>
+              <a:sym typeface="Wingdings" panose="05000000000000000000" pitchFamily="2" charset="2"/>
+            </a:endParaRPr>
+          </a:p>
+          <a:p>
+            <a:pPr marL="0" indent="0">
+              <a:buNone/>
+            </a:pPr>
+            <a:endParaRPr lang="de-DE" b="1" dirty="0"/>
+          </a:p>
+        </p:txBody>
+      </p:sp>
+    </p:spTree>
+    <p:extLst>
+      <p:ext uri="{BB962C8B-B14F-4D97-AF65-F5344CB8AC3E}">
+        <p14:creationId xmlns:p14="http://schemas.microsoft.com/office/powerpoint/2010/main" val="3188064999"/>
+      </p:ext>
+    </p:extLst>
+  </p:cSld>
+  <p:clrMapOvr>
+    <a:masterClrMapping/>
+  </p:clrMapOvr>
+</p:sld>
+</file>
+
+<file path=ppt/slides/slide24.xml><?xml version="1.0" encoding="utf-8"?>
+<p:sld xmlns:a="http://schemas.openxmlformats.org/drawingml/2006/main" xmlns:r="http://schemas.openxmlformats.org/officeDocument/2006/relationships" xmlns:p="http://schemas.openxmlformats.org/presentationml/2006/main">
+  <p:cSld>
+    <p:spTree>
+      <p:nvGrpSpPr>
+        <p:cNvPr id="1" name=""/>
+        <p:cNvGrpSpPr/>
+        <p:nvPr/>
+      </p:nvGrpSpPr>
+      <p:grpSpPr>
+        <a:xfrm>
+          <a:off x="0" y="0"/>
+          <a:ext cx="0" cy="0"/>
+          <a:chOff x="0" y="0"/>
+          <a:chExt cx="0" cy="0"/>
+        </a:xfrm>
+      </p:grpSpPr>
+      <p:sp>
+        <p:nvSpPr>
+          <p:cNvPr id="2" name="Titel 1">
+            <a:extLst>
+              <a:ext uri="{FF2B5EF4-FFF2-40B4-BE49-F238E27FC236}">
+                <a16:creationId xmlns:a16="http://schemas.microsoft.com/office/drawing/2014/main" id="{2B9F73D1-0616-0915-95E4-06CBA79315C7}"/>
+              </a:ext>
+            </a:extLst>
+          </p:cNvPr>
+          <p:cNvSpPr>
+            <a:spLocks noGrp="1"/>
+          </p:cNvSpPr>
+          <p:nvPr>
+            <p:ph type="title"/>
+          </p:nvPr>
+        </p:nvSpPr>
+        <p:spPr/>
+        <p:txBody>
+          <a:bodyPr/>
+          <a:lstStyle/>
+          <a:p>
+            <a:r>
+              <a:rPr lang="de-DE" dirty="0" err="1"/>
+              <a:t>GitLab</a:t>
+            </a:r>
+            <a:r>
+              <a:rPr lang="de-DE" dirty="0"/>
+              <a:t> Runner</a:t>
+            </a:r>
+          </a:p>
+        </p:txBody>
+      </p:sp>
+      <p:sp>
+        <p:nvSpPr>
+          <p:cNvPr id="3" name="Inhaltsplatzhalter 2">
+            <a:extLst>
+              <a:ext uri="{FF2B5EF4-FFF2-40B4-BE49-F238E27FC236}">
+                <a16:creationId xmlns:a16="http://schemas.microsoft.com/office/drawing/2014/main" id="{3CE2D11A-801F-CE1E-A418-D35676D404C3}"/>
+              </a:ext>
+            </a:extLst>
+          </p:cNvPr>
+          <p:cNvSpPr>
+            <a:spLocks noGrp="1"/>
+          </p:cNvSpPr>
+          <p:nvPr>
+            <p:ph idx="1"/>
+          </p:nvPr>
+        </p:nvSpPr>
+        <p:spPr/>
+        <p:txBody>
+          <a:bodyPr/>
+          <a:lstStyle/>
+          <a:p>
+            <a:pPr marL="0" indent="0">
+              <a:buNone/>
+            </a:pPr>
+            <a:r>
+              <a:rPr lang="de-DE" b="1" dirty="0"/>
+              <a:t>Verschiedene Runner verwalten</a:t>
+            </a:r>
+          </a:p>
+          <a:p>
+            <a:pPr marL="0" indent="0">
+              <a:buNone/>
+            </a:pPr>
+            <a:endParaRPr lang="de-DE" b="1" dirty="0"/>
+          </a:p>
+        </p:txBody>
+      </p:sp>
+    </p:spTree>
+    <p:extLst>
+      <p:ext uri="{BB962C8B-B14F-4D97-AF65-F5344CB8AC3E}">
+        <p14:creationId xmlns:p14="http://schemas.microsoft.com/office/powerpoint/2010/main" val="2083771083"/>
+      </p:ext>
+    </p:extLst>
+  </p:cSld>
+  <p:clrMapOvr>
+    <a:masterClrMapping/>
+  </p:clrMapOvr>
+</p:sld>
+</file>
+
+<file path=ppt/slides/slide25.xml><?xml version="1.0" encoding="utf-8"?>
+<p:sld xmlns:a="http://schemas.openxmlformats.org/drawingml/2006/main" xmlns:r="http://schemas.openxmlformats.org/officeDocument/2006/relationships" xmlns:p="http://schemas.openxmlformats.org/presentationml/2006/main">
+  <p:cSld>
+    <p:spTree>
+      <p:nvGrpSpPr>
+        <p:cNvPr id="1" name=""/>
+        <p:cNvGrpSpPr/>
+        <p:nvPr/>
+      </p:nvGrpSpPr>
+      <p:grpSpPr>
+        <a:xfrm>
+          <a:off x="0" y="0"/>
+          <a:ext cx="0" cy="0"/>
+          <a:chOff x="0" y="0"/>
+          <a:chExt cx="0" cy="0"/>
+        </a:xfrm>
+      </p:grpSpPr>
+      <p:sp>
+        <p:nvSpPr>
+          <p:cNvPr id="2" name="Titel 1">
+            <a:extLst>
+              <a:ext uri="{FF2B5EF4-FFF2-40B4-BE49-F238E27FC236}">
+                <a16:creationId xmlns:a16="http://schemas.microsoft.com/office/drawing/2014/main" id="{2B9F73D1-0616-0915-95E4-06CBA79315C7}"/>
+              </a:ext>
+            </a:extLst>
+          </p:cNvPr>
+          <p:cNvSpPr>
+            <a:spLocks noGrp="1"/>
+          </p:cNvSpPr>
+          <p:nvPr>
+            <p:ph type="title"/>
+          </p:nvPr>
+        </p:nvSpPr>
+        <p:spPr/>
+        <p:txBody>
+          <a:bodyPr/>
+          <a:lstStyle/>
+          <a:p>
+            <a:r>
+              <a:rPr lang="de-DE" dirty="0" err="1"/>
+              <a:t>GitLab</a:t>
+            </a:r>
+            <a:r>
+              <a:rPr lang="de-DE" dirty="0"/>
+              <a:t> Runner</a:t>
+            </a:r>
+          </a:p>
+        </p:txBody>
+      </p:sp>
+      <p:sp>
+        <p:nvSpPr>
+          <p:cNvPr id="3" name="Inhaltsplatzhalter 2">
+            <a:extLst>
+              <a:ext uri="{FF2B5EF4-FFF2-40B4-BE49-F238E27FC236}">
+                <a16:creationId xmlns:a16="http://schemas.microsoft.com/office/drawing/2014/main" id="{3CE2D11A-801F-CE1E-A418-D35676D404C3}"/>
+              </a:ext>
+            </a:extLst>
+          </p:cNvPr>
+          <p:cNvSpPr>
+            <a:spLocks noGrp="1"/>
+          </p:cNvSpPr>
+          <p:nvPr>
+            <p:ph idx="1"/>
+          </p:nvPr>
+        </p:nvSpPr>
+        <p:spPr/>
+        <p:txBody>
+          <a:bodyPr/>
+          <a:lstStyle/>
+          <a:p>
+            <a:pPr marL="0" indent="0">
+              <a:buNone/>
+            </a:pPr>
+            <a:r>
+              <a:rPr lang="de-DE" b="1" dirty="0"/>
+              <a:t>Runner registrieren</a:t>
+            </a:r>
+          </a:p>
+          <a:p>
+            <a:pPr marL="0" indent="0">
+              <a:buNone/>
+            </a:pPr>
+            <a:endParaRPr lang="de-DE" b="1" dirty="0"/>
+          </a:p>
+        </p:txBody>
+      </p:sp>
+    </p:spTree>
+    <p:extLst>
+      <p:ext uri="{BB962C8B-B14F-4D97-AF65-F5344CB8AC3E}">
+        <p14:creationId xmlns:p14="http://schemas.microsoft.com/office/powerpoint/2010/main" val="2238531874"/>
+      </p:ext>
+    </p:extLst>
+  </p:cSld>
+  <p:clrMapOvr>
+    <a:masterClrMapping/>
+  </p:clrMapOvr>
+</p:sld>
+</file>
+
+<file path=ppt/slides/slide26.xml><?xml version="1.0" encoding="utf-8"?>
+<p:sld xmlns:a="http://schemas.openxmlformats.org/drawingml/2006/main" xmlns:r="http://schemas.openxmlformats.org/officeDocument/2006/relationships" xmlns:p="http://schemas.openxmlformats.org/presentationml/2006/main">
+  <p:cSld>
+    <p:spTree>
+      <p:nvGrpSpPr>
+        <p:cNvPr id="1" name=""/>
+        <p:cNvGrpSpPr/>
+        <p:nvPr/>
+      </p:nvGrpSpPr>
+      <p:grpSpPr>
+        <a:xfrm>
+          <a:off x="0" y="0"/>
+          <a:ext cx="0" cy="0"/>
+          <a:chOff x="0" y="0"/>
+          <a:chExt cx="0" cy="0"/>
+        </a:xfrm>
+      </p:grpSpPr>
+      <p:sp>
+        <p:nvSpPr>
+          <p:cNvPr id="2" name="Titel 1">
+            <a:extLst>
+              <a:ext uri="{FF2B5EF4-FFF2-40B4-BE49-F238E27FC236}">
+                <a16:creationId xmlns:a16="http://schemas.microsoft.com/office/drawing/2014/main" id="{2B9F73D1-0616-0915-95E4-06CBA79315C7}"/>
+              </a:ext>
+            </a:extLst>
+          </p:cNvPr>
+          <p:cNvSpPr>
+            <a:spLocks noGrp="1"/>
+          </p:cNvSpPr>
+          <p:nvPr>
+            <p:ph type="title"/>
+          </p:nvPr>
+        </p:nvSpPr>
+        <p:spPr/>
+        <p:txBody>
+          <a:bodyPr/>
+          <a:lstStyle/>
+          <a:p>
+            <a:r>
+              <a:rPr lang="de-DE" dirty="0" err="1"/>
+              <a:t>GitLab</a:t>
+            </a:r>
+            <a:r>
+              <a:rPr lang="de-DE" dirty="0"/>
+              <a:t> Runner</a:t>
+            </a:r>
+          </a:p>
+        </p:txBody>
+      </p:sp>
+      <p:sp>
+        <p:nvSpPr>
+          <p:cNvPr id="3" name="Inhaltsplatzhalter 2">
+            <a:extLst>
+              <a:ext uri="{FF2B5EF4-FFF2-40B4-BE49-F238E27FC236}">
+                <a16:creationId xmlns:a16="http://schemas.microsoft.com/office/drawing/2014/main" id="{3CE2D11A-801F-CE1E-A418-D35676D404C3}"/>
+              </a:ext>
+            </a:extLst>
+          </p:cNvPr>
+          <p:cNvSpPr>
+            <a:spLocks noGrp="1"/>
+          </p:cNvSpPr>
+          <p:nvPr>
+            <p:ph idx="1"/>
+          </p:nvPr>
+        </p:nvSpPr>
+        <p:spPr/>
+        <p:txBody>
+          <a:bodyPr/>
+          <a:lstStyle/>
+          <a:p>
+            <a:pPr marL="0" indent="0">
+              <a:buNone/>
+            </a:pPr>
+            <a:r>
+              <a:rPr lang="de-DE" b="1" dirty="0" err="1"/>
+              <a:t>Executors</a:t>
+            </a:r>
+            <a:endParaRPr lang="de-DE" b="1" dirty="0"/>
+          </a:p>
+        </p:txBody>
+      </p:sp>
+    </p:spTree>
+    <p:extLst>
+      <p:ext uri="{BB962C8B-B14F-4D97-AF65-F5344CB8AC3E}">
+        <p14:creationId xmlns:p14="http://schemas.microsoft.com/office/powerpoint/2010/main" val="949730093"/>
+      </p:ext>
+    </p:extLst>
+  </p:cSld>
+  <p:clrMapOvr>
+    <a:masterClrMapping/>
+  </p:clrMapOvr>
+</p:sld>
+</file>
+
+<file path=ppt/slides/slide27.xml><?xml version="1.0" encoding="utf-8"?>
+<p:sld xmlns:a="http://schemas.openxmlformats.org/drawingml/2006/main" xmlns:r="http://schemas.openxmlformats.org/officeDocument/2006/relationships" xmlns:p="http://schemas.openxmlformats.org/presentationml/2006/main">
+  <p:cSld>
+    <p:spTree>
+      <p:nvGrpSpPr>
+        <p:cNvPr id="1" name=""/>
+        <p:cNvGrpSpPr/>
+        <p:nvPr/>
+      </p:nvGrpSpPr>
+      <p:grpSpPr>
+        <a:xfrm>
+          <a:off x="0" y="0"/>
+          <a:ext cx="0" cy="0"/>
+          <a:chOff x="0" y="0"/>
+          <a:chExt cx="0" cy="0"/>
+        </a:xfrm>
+      </p:grpSpPr>
+      <p:sp>
+        <p:nvSpPr>
+          <p:cNvPr id="2" name="Titel 1">
+            <a:extLst>
+              <a:ext uri="{FF2B5EF4-FFF2-40B4-BE49-F238E27FC236}">
+                <a16:creationId xmlns:a16="http://schemas.microsoft.com/office/drawing/2014/main" id="{2B9F73D1-0616-0915-95E4-06CBA79315C7}"/>
+              </a:ext>
+            </a:extLst>
+          </p:cNvPr>
+          <p:cNvSpPr>
+            <a:spLocks noGrp="1"/>
+          </p:cNvSpPr>
+          <p:nvPr>
+            <p:ph type="title"/>
+          </p:nvPr>
+        </p:nvSpPr>
+        <p:spPr/>
+        <p:txBody>
+          <a:bodyPr/>
+          <a:lstStyle/>
+          <a:p>
+            <a:r>
+              <a:rPr lang="de-DE" dirty="0" err="1"/>
+              <a:t>GitLab</a:t>
+            </a:r>
+            <a:r>
+              <a:rPr lang="de-DE" dirty="0"/>
+              <a:t> Runner</a:t>
+            </a:r>
+          </a:p>
+        </p:txBody>
+      </p:sp>
+      <p:sp>
+        <p:nvSpPr>
+          <p:cNvPr id="3" name="Inhaltsplatzhalter 2">
+            <a:extLst>
+              <a:ext uri="{FF2B5EF4-FFF2-40B4-BE49-F238E27FC236}">
+                <a16:creationId xmlns:a16="http://schemas.microsoft.com/office/drawing/2014/main" id="{3CE2D11A-801F-CE1E-A418-D35676D404C3}"/>
+              </a:ext>
+            </a:extLst>
+          </p:cNvPr>
+          <p:cNvSpPr>
+            <a:spLocks noGrp="1"/>
+          </p:cNvSpPr>
+          <p:nvPr>
+            <p:ph idx="1"/>
+          </p:nvPr>
+        </p:nvSpPr>
+        <p:spPr/>
+        <p:txBody>
+          <a:bodyPr/>
+          <a:lstStyle/>
+          <a:p>
+            <a:pPr marL="0" indent="0">
+              <a:buNone/>
+            </a:pPr>
+            <a:r>
+              <a:rPr lang="de-DE" b="1" dirty="0"/>
+              <a:t>Runner konfigurieren</a:t>
+            </a:r>
+          </a:p>
+          <a:p>
+            <a:pPr marL="0" indent="0">
+              <a:buNone/>
+            </a:pPr>
+            <a:endParaRPr lang="de-DE" b="1" dirty="0"/>
+          </a:p>
+        </p:txBody>
+      </p:sp>
+    </p:spTree>
+    <p:extLst>
+      <p:ext uri="{BB962C8B-B14F-4D97-AF65-F5344CB8AC3E}">
+        <p14:creationId xmlns:p14="http://schemas.microsoft.com/office/powerpoint/2010/main" val="2185810072"/>
+      </p:ext>
+    </p:extLst>
+  </p:cSld>
+  <p:clrMapOvr>
+    <a:masterClrMapping/>
+  </p:clrMapOvr>
+</p:sld>
+</file>
+
+<file path=ppt/slides/slide28.xml><?xml version="1.0" encoding="utf-8"?>
+<p:sld xmlns:a="http://schemas.openxmlformats.org/drawingml/2006/main" xmlns:r="http://schemas.openxmlformats.org/officeDocument/2006/relationships" xmlns:p="http://schemas.openxmlformats.org/presentationml/2006/main">
+  <p:cSld>
+    <p:spTree>
+      <p:nvGrpSpPr>
+        <p:cNvPr id="1" name=""/>
+        <p:cNvGrpSpPr/>
+        <p:nvPr/>
+      </p:nvGrpSpPr>
+      <p:grpSpPr>
+        <a:xfrm>
+          <a:off x="0" y="0"/>
+          <a:ext cx="0" cy="0"/>
+          <a:chOff x="0" y="0"/>
+          <a:chExt cx="0" cy="0"/>
+        </a:xfrm>
+      </p:grpSpPr>
+      <p:sp>
+        <p:nvSpPr>
+          <p:cNvPr id="2" name="Titel 1"/>
+          <p:cNvSpPr>
+            <a:spLocks noGrp="1"/>
+          </p:cNvSpPr>
+          <p:nvPr>
+            <p:ph type="title"/>
+          </p:nvPr>
+        </p:nvSpPr>
+        <p:spPr/>
+        <p:txBody>
+          <a:bodyPr/>
+          <a:lstStyle/>
+          <a:p>
+            <a:r>
+              <a:rPr lang="de-DE" cap="none" dirty="0"/>
+              <a:t>Container/Docker Registry</a:t>
+            </a:r>
+          </a:p>
+        </p:txBody>
+      </p:sp>
+      <p:sp>
+        <p:nvSpPr>
+          <p:cNvPr id="3" name="Untertitel 2"/>
+          <p:cNvSpPr>
+            <a:spLocks noGrp="1"/>
+          </p:cNvSpPr>
+          <p:nvPr>
+            <p:ph type="body" idx="1"/>
+          </p:nvPr>
+        </p:nvSpPr>
+        <p:spPr/>
+        <p:txBody>
+          <a:bodyPr/>
+          <a:lstStyle/>
+          <a:p>
+            <a:r>
+              <a:rPr lang="de-DE" dirty="0"/>
+              <a:t>Grundlagen von</a:t>
+            </a:r>
+          </a:p>
+        </p:txBody>
+      </p:sp>
+    </p:spTree>
+    <p:extLst>
+      <p:ext uri="{BB962C8B-B14F-4D97-AF65-F5344CB8AC3E}">
+        <p14:creationId xmlns:p14="http://schemas.microsoft.com/office/powerpoint/2010/main" val="2809021556"/>
+      </p:ext>
+    </p:extLst>
+  </p:cSld>
+  <p:clrMapOvr>
+    <a:masterClrMapping/>
+  </p:clrMapOvr>
+</p:sld>
+</file>
+
+<file path=ppt/slides/slide29.xml><?xml version="1.0" encoding="utf-8"?>
+<p:sld xmlns:a="http://schemas.openxmlformats.org/drawingml/2006/main" xmlns:r="http://schemas.openxmlformats.org/officeDocument/2006/relationships" xmlns:p="http://schemas.openxmlformats.org/presentationml/2006/main">
+  <p:cSld>
+    <p:spTree>
+      <p:nvGrpSpPr>
+        <p:cNvPr id="1" name=""/>
+        <p:cNvGrpSpPr/>
+        <p:nvPr/>
+      </p:nvGrpSpPr>
+      <p:grpSpPr>
+        <a:xfrm>
+          <a:off x="0" y="0"/>
+          <a:ext cx="0" cy="0"/>
+          <a:chOff x="0" y="0"/>
+          <a:chExt cx="0" cy="0"/>
+        </a:xfrm>
+      </p:grpSpPr>
+      <p:sp>
+        <p:nvSpPr>
+          <p:cNvPr id="2" name="Titel 1">
+            <a:extLst>
+              <a:ext uri="{FF2B5EF4-FFF2-40B4-BE49-F238E27FC236}">
+                <a16:creationId xmlns:a16="http://schemas.microsoft.com/office/drawing/2014/main" id="{25E7C6E1-B055-3AFC-5E69-1173C8DA414C}"/>
+              </a:ext>
+            </a:extLst>
+          </p:cNvPr>
+          <p:cNvSpPr>
+            <a:spLocks noGrp="1"/>
+          </p:cNvSpPr>
+          <p:nvPr>
+            <p:ph type="title"/>
+          </p:nvPr>
+        </p:nvSpPr>
+        <p:spPr/>
+        <p:txBody>
+          <a:bodyPr/>
+          <a:lstStyle/>
+          <a:p>
+            <a:r>
+              <a:rPr lang="de-DE" dirty="0"/>
+              <a:t>Container Registry</a:t>
+            </a:r>
+          </a:p>
+        </p:txBody>
+      </p:sp>
+      <p:sp>
+        <p:nvSpPr>
+          <p:cNvPr id="3" name="Inhaltsplatzhalter 2">
+            <a:extLst>
+              <a:ext uri="{FF2B5EF4-FFF2-40B4-BE49-F238E27FC236}">
+                <a16:creationId xmlns:a16="http://schemas.microsoft.com/office/drawing/2014/main" id="{2F072594-2447-5EB7-7AAF-47596D7C1121}"/>
+              </a:ext>
+            </a:extLst>
+          </p:cNvPr>
+          <p:cNvSpPr>
+            <a:spLocks noGrp="1"/>
+          </p:cNvSpPr>
+          <p:nvPr>
+            <p:ph idx="1"/>
+          </p:nvPr>
+        </p:nvSpPr>
+        <p:spPr/>
+        <p:txBody>
+          <a:bodyPr/>
+          <a:lstStyle/>
+          <a:p>
+            <a:pPr marL="0" indent="0">
+              <a:buNone/>
+            </a:pPr>
+            <a:endParaRPr lang="de-DE" dirty="0"/>
+          </a:p>
+        </p:txBody>
+      </p:sp>
+    </p:spTree>
+    <p:extLst>
+      <p:ext uri="{BB962C8B-B14F-4D97-AF65-F5344CB8AC3E}">
+        <p14:creationId xmlns:p14="http://schemas.microsoft.com/office/powerpoint/2010/main" val="81545675"/>
+      </p:ext>
+    </p:extLst>
   </p:cSld>
   <p:clrMapOvr>
     <a:masterClrMapping/>

</xml_diff>

<commit_message>
Tag-3_2: Keine Ahnung. Irgendwas zu Runners vermutlich. Project Runners. Und jede Menge an Fragen.
</commit_message>
<xml_diff>
--- a/slides/Tag-3_2-GitLab-Runner-Container-Registry.pptx
+++ b/slides/Tag-3_2-GitLab-Runner-Container-Registry.pptx
@@ -6,10 +6,10 @@
     <p:sldMasterId id="2147483649" r:id="rId2"/>
   </p:sldMasterIdLst>
   <p:notesMasterIdLst>
-    <p:notesMasterId r:id="rId81"/>
+    <p:notesMasterId r:id="rId84"/>
   </p:notesMasterIdLst>
   <p:handoutMasterIdLst>
-    <p:handoutMasterId r:id="rId82"/>
+    <p:handoutMasterId r:id="rId85"/>
   </p:handoutMasterIdLst>
   <p:sldIdLst>
     <p:sldId id="288" r:id="rId3"/>
@@ -85,11 +85,14 @@
     <p:sldId id="668" r:id="rId73"/>
     <p:sldId id="662" r:id="rId74"/>
     <p:sldId id="669" r:id="rId75"/>
-    <p:sldId id="592" r:id="rId76"/>
-    <p:sldId id="593" r:id="rId77"/>
-    <p:sldId id="594" r:id="rId78"/>
-    <p:sldId id="597" r:id="rId79"/>
-    <p:sldId id="595" r:id="rId80"/>
+    <p:sldId id="670" r:id="rId76"/>
+    <p:sldId id="671" r:id="rId77"/>
+    <p:sldId id="672" r:id="rId78"/>
+    <p:sldId id="592" r:id="rId79"/>
+    <p:sldId id="593" r:id="rId80"/>
+    <p:sldId id="594" r:id="rId81"/>
+    <p:sldId id="597" r:id="rId82"/>
+    <p:sldId id="595" r:id="rId83"/>
   </p:sldIdLst>
   <p:sldSz cx="9144000" cy="6858000" type="screen4x3"/>
   <p:notesSz cx="6784975" cy="9921875"/>
@@ -7841,77 +7844,7 @@
           <a:bodyPr/>
           <a:lstStyle/>
           <a:p>
-            <a:r>
-              <a:rPr lang="de-DE" dirty="0"/>
-              <a:t>https://docs.gitlab.com/runner/register/</a:t>
-            </a:r>
-          </a:p>
-          <a:p>
-            <a:endParaRPr lang="de-DE" dirty="0"/>
-          </a:p>
-          <a:p>
-            <a:r>
-              <a:rPr lang="de-DE" dirty="0" err="1"/>
-              <a:t>Migrating</a:t>
-            </a:r>
-            <a:r>
-              <a:rPr lang="de-DE" dirty="0"/>
-              <a:t> </a:t>
-            </a:r>
-            <a:r>
-              <a:rPr lang="de-DE" dirty="0" err="1"/>
-              <a:t>to</a:t>
-            </a:r>
-            <a:r>
-              <a:rPr lang="de-DE" dirty="0"/>
-              <a:t> </a:t>
-            </a:r>
-            <a:r>
-              <a:rPr lang="de-DE" dirty="0" err="1"/>
-              <a:t>the</a:t>
-            </a:r>
-            <a:r>
-              <a:rPr lang="de-DE" dirty="0"/>
-              <a:t> </a:t>
-            </a:r>
-            <a:r>
-              <a:rPr lang="de-DE" dirty="0" err="1"/>
-              <a:t>new</a:t>
-            </a:r>
-            <a:r>
-              <a:rPr lang="de-DE" dirty="0"/>
-              <a:t> </a:t>
-            </a:r>
-            <a:r>
-              <a:rPr lang="de-DE" dirty="0" err="1"/>
-              <a:t>runner</a:t>
-            </a:r>
-            <a:r>
-              <a:rPr lang="de-DE" dirty="0"/>
-              <a:t> </a:t>
-            </a:r>
-            <a:r>
-              <a:rPr lang="de-DE" dirty="0" err="1"/>
-              <a:t>registration</a:t>
-            </a:r>
-            <a:r>
-              <a:rPr lang="de-DE" dirty="0"/>
-              <a:t> </a:t>
-            </a:r>
-            <a:r>
-              <a:rPr lang="de-DE" dirty="0" err="1"/>
-              <a:t>workflow</a:t>
-            </a:r>
-            <a:r>
-              <a:rPr lang="de-DE" dirty="0"/>
-              <a:t>:</a:t>
-            </a:r>
-          </a:p>
-          <a:p>
-            <a:r>
-              <a:rPr lang="de-DE" dirty="0"/>
-              <a:t>https://docs.gitlab.com/ee/ci/runners/new_creation_workflow.html</a:t>
-            </a:r>
+            <a:endParaRPr lang="de-DE"/>
           </a:p>
         </p:txBody>
       </p:sp>
@@ -7933,7 +7866,7 @@
             <a:fld id="{18182567-388C-4D33-8B7B-A651F195F118}" type="slidenum">
               <a:rPr lang="de-DE" altLang="de-DE" smtClean="0"/>
               <a:pPr/>
-              <a:t>74</a:t>
+              <a:t>76</a:t>
             </a:fld>
             <a:endParaRPr lang="de-DE" altLang="de-DE"/>
           </a:p>
@@ -7942,7 +7875,7 @@
     </p:spTree>
     <p:extLst>
       <p:ext uri="{BB962C8B-B14F-4D97-AF65-F5344CB8AC3E}">
-        <p14:creationId xmlns:p14="http://schemas.microsoft.com/office/powerpoint/2010/main" val="3567902163"/>
+        <p14:creationId xmlns:p14="http://schemas.microsoft.com/office/powerpoint/2010/main" val="3820729181"/>
       </p:ext>
     </p:extLst>
   </p:cSld>
@@ -7998,7 +7931,74 @@
           <a:p>
             <a:r>
               <a:rPr lang="de-DE" dirty="0"/>
-              <a:t>https://docs.gitlab.com/runner/executors/</a:t>
+              <a:t>https://docs.gitlab.com/runner/register/</a:t>
+            </a:r>
+          </a:p>
+          <a:p>
+            <a:endParaRPr lang="de-DE" dirty="0"/>
+          </a:p>
+          <a:p>
+            <a:r>
+              <a:rPr lang="de-DE" dirty="0" err="1"/>
+              <a:t>Migrating</a:t>
+            </a:r>
+            <a:r>
+              <a:rPr lang="de-DE" dirty="0"/>
+              <a:t> </a:t>
+            </a:r>
+            <a:r>
+              <a:rPr lang="de-DE" dirty="0" err="1"/>
+              <a:t>to</a:t>
+            </a:r>
+            <a:r>
+              <a:rPr lang="de-DE" dirty="0"/>
+              <a:t> </a:t>
+            </a:r>
+            <a:r>
+              <a:rPr lang="de-DE" dirty="0" err="1"/>
+              <a:t>the</a:t>
+            </a:r>
+            <a:r>
+              <a:rPr lang="de-DE" dirty="0"/>
+              <a:t> </a:t>
+            </a:r>
+            <a:r>
+              <a:rPr lang="de-DE" dirty="0" err="1"/>
+              <a:t>new</a:t>
+            </a:r>
+            <a:r>
+              <a:rPr lang="de-DE" dirty="0"/>
+              <a:t> </a:t>
+            </a:r>
+            <a:r>
+              <a:rPr lang="de-DE" dirty="0" err="1"/>
+              <a:t>runner</a:t>
+            </a:r>
+            <a:r>
+              <a:rPr lang="de-DE" dirty="0"/>
+              <a:t> </a:t>
+            </a:r>
+            <a:r>
+              <a:rPr lang="de-DE" dirty="0" err="1"/>
+              <a:t>registration</a:t>
+            </a:r>
+            <a:r>
+              <a:rPr lang="de-DE" dirty="0"/>
+              <a:t> </a:t>
+            </a:r>
+            <a:r>
+              <a:rPr lang="de-DE" dirty="0" err="1"/>
+              <a:t>workflow</a:t>
+            </a:r>
+            <a:r>
+              <a:rPr lang="de-DE" dirty="0"/>
+              <a:t>:</a:t>
+            </a:r>
+          </a:p>
+          <a:p>
+            <a:r>
+              <a:rPr lang="de-DE" dirty="0"/>
+              <a:t>https://docs.gitlab.com/ee/ci/runners/new_creation_workflow.html</a:t>
             </a:r>
           </a:p>
         </p:txBody>
@@ -8021,7 +8021,7 @@
             <a:fld id="{18182567-388C-4D33-8B7B-A651F195F118}" type="slidenum">
               <a:rPr lang="de-DE" altLang="de-DE" smtClean="0"/>
               <a:pPr/>
-              <a:t>75</a:t>
+              <a:t>77</a:t>
             </a:fld>
             <a:endParaRPr lang="de-DE" altLang="de-DE"/>
           </a:p>
@@ -8030,7 +8030,7 @@
     </p:spTree>
     <p:extLst>
       <p:ext uri="{BB962C8B-B14F-4D97-AF65-F5344CB8AC3E}">
-        <p14:creationId xmlns:p14="http://schemas.microsoft.com/office/powerpoint/2010/main" val="66240159"/>
+        <p14:creationId xmlns:p14="http://schemas.microsoft.com/office/powerpoint/2010/main" val="3567902163"/>
       </p:ext>
     </p:extLst>
   </p:cSld>
@@ -8086,7 +8086,7 @@
           <a:p>
             <a:r>
               <a:rPr lang="de-DE" dirty="0"/>
-              <a:t>https://docs.gitlab.com/ee/ci/runners/configure_runners.html</a:t>
+              <a:t>https://docs.gitlab.com/runner/executors/</a:t>
             </a:r>
           </a:p>
         </p:txBody>
@@ -8109,7 +8109,95 @@
             <a:fld id="{18182567-388C-4D33-8B7B-A651F195F118}" type="slidenum">
               <a:rPr lang="de-DE" altLang="de-DE" smtClean="0"/>
               <a:pPr/>
-              <a:t>76</a:t>
+              <a:t>78</a:t>
+            </a:fld>
+            <a:endParaRPr lang="de-DE" altLang="de-DE"/>
+          </a:p>
+        </p:txBody>
+      </p:sp>
+    </p:spTree>
+    <p:extLst>
+      <p:ext uri="{BB962C8B-B14F-4D97-AF65-F5344CB8AC3E}">
+        <p14:creationId xmlns:p14="http://schemas.microsoft.com/office/powerpoint/2010/main" val="66240159"/>
+      </p:ext>
+    </p:extLst>
+  </p:cSld>
+  <p:clrMapOvr>
+    <a:masterClrMapping/>
+  </p:clrMapOvr>
+</p:notes>
+</file>
+
+<file path=ppt/notesSlides/notesSlide67.xml><?xml version="1.0" encoding="utf-8"?>
+<p:notes xmlns:a="http://schemas.openxmlformats.org/drawingml/2006/main" xmlns:r="http://schemas.openxmlformats.org/officeDocument/2006/relationships" xmlns:p="http://schemas.openxmlformats.org/presentationml/2006/main">
+  <p:cSld>
+    <p:spTree>
+      <p:nvGrpSpPr>
+        <p:cNvPr id="1" name=""/>
+        <p:cNvGrpSpPr/>
+        <p:nvPr/>
+      </p:nvGrpSpPr>
+      <p:grpSpPr>
+        <a:xfrm>
+          <a:off x="0" y="0"/>
+          <a:ext cx="0" cy="0"/>
+          <a:chOff x="0" y="0"/>
+          <a:chExt cx="0" cy="0"/>
+        </a:xfrm>
+      </p:grpSpPr>
+      <p:sp>
+        <p:nvSpPr>
+          <p:cNvPr id="2" name="Folienbildplatzhalter 1"/>
+          <p:cNvSpPr>
+            <a:spLocks noGrp="1" noRot="1" noChangeAspect="1"/>
+          </p:cNvSpPr>
+          <p:nvPr>
+            <p:ph type="sldImg"/>
+          </p:nvPr>
+        </p:nvSpPr>
+        <p:spPr/>
+      </p:sp>
+      <p:sp>
+        <p:nvSpPr>
+          <p:cNvPr id="3" name="Notizenplatzhalter 2"/>
+          <p:cNvSpPr>
+            <a:spLocks noGrp="1"/>
+          </p:cNvSpPr>
+          <p:nvPr>
+            <p:ph type="body" idx="1"/>
+          </p:nvPr>
+        </p:nvSpPr>
+        <p:spPr/>
+        <p:txBody>
+          <a:bodyPr/>
+          <a:lstStyle/>
+          <a:p>
+            <a:r>
+              <a:rPr lang="de-DE" dirty="0"/>
+              <a:t>https://docs.gitlab.com/ee/ci/runners/configure_runners.html</a:t>
+            </a:r>
+          </a:p>
+        </p:txBody>
+      </p:sp>
+      <p:sp>
+        <p:nvSpPr>
+          <p:cNvPr id="4" name="Foliennummernplatzhalter 3"/>
+          <p:cNvSpPr>
+            <a:spLocks noGrp="1"/>
+          </p:cNvSpPr>
+          <p:nvPr>
+            <p:ph type="sldNum" sz="quarter" idx="5"/>
+          </p:nvPr>
+        </p:nvSpPr>
+        <p:spPr/>
+        <p:txBody>
+          <a:bodyPr/>
+          <a:lstStyle/>
+          <a:p>
+            <a:fld id="{18182567-388C-4D33-8B7B-A651F195F118}" type="slidenum">
+              <a:rPr lang="de-DE" altLang="de-DE" smtClean="0"/>
+              <a:pPr/>
+              <a:t>79</a:t>
             </a:fld>
             <a:endParaRPr lang="de-DE" altLang="de-DE"/>
           </a:p>
@@ -9313,7 +9401,7 @@
         <p:spPr bwMode="auto">
           <a:xfrm>
             <a:off x="4252913" y="6424613"/>
-            <a:ext cx="1311578" cy="246221"/>
+            <a:ext cx="2860078" cy="246221"/>
           </a:xfrm>
           <a:prstGeom prst="rect">
             <a:avLst/>
@@ -9343,7 +9431,7 @@
                 </a:solidFill>
                 <a:latin typeface="Arial" charset="0"/>
               </a:rPr>
-              <a:t>Tag-2_5-GitOps.ppt</a:t>
+              <a:t>Tag-3_2-GitLab-Runner-Container-Registry.ppt</a:t>
             </a:r>
             <a:endParaRPr lang="de-DE" dirty="0">
               <a:solidFill>
@@ -27933,7 +28021,15 @@
             </a:pPr>
             <a:r>
               <a:rPr lang="de-DE" dirty="0"/>
-              <a:t>Inaktive (&gt; 3 Monate) Group Runner können automatisch „bereinigt“ werden</a:t>
+              <a:t>Inaktive (&gt; 3 Monate) Group Runner (= „</a:t>
+            </a:r>
+            <a:r>
+              <a:rPr lang="de-DE" dirty="0" err="1"/>
+              <a:t>stale</a:t>
+            </a:r>
+            <a:r>
+              <a:rPr lang="de-DE" dirty="0"/>
+              <a:t>“) können automatisch bereinigt werden</a:t>
             </a:r>
           </a:p>
           <a:p>
@@ -31371,6 +31467,435 @@
           </a:p>
         </p:txBody>
       </p:sp>
+      <p:graphicFrame>
+        <p:nvGraphicFramePr>
+          <p:cNvPr id="4" name="Tabelle 4">
+            <a:extLst>
+              <a:ext uri="{FF2B5EF4-FFF2-40B4-BE49-F238E27FC236}">
+                <a16:creationId xmlns:a16="http://schemas.microsoft.com/office/drawing/2014/main" id="{0F1A54FA-1882-4C50-6E9D-11CD3557A19F}"/>
+              </a:ext>
+            </a:extLst>
+          </p:cNvPr>
+          <p:cNvGraphicFramePr>
+            <a:graphicFrameLocks noGrp="1"/>
+          </p:cNvGraphicFramePr>
+          <p:nvPr>
+            <p:extLst>
+              <p:ext uri="{D42A27DB-BD31-4B8C-83A1-F6EECF244321}">
+                <p14:modId xmlns:p14="http://schemas.microsoft.com/office/powerpoint/2010/main" val="1567570019"/>
+              </p:ext>
+            </p:extLst>
+          </p:nvPr>
+        </p:nvGraphicFramePr>
+        <p:xfrm>
+          <a:off x="285720" y="874712"/>
+          <a:ext cx="8516938" cy="5613400"/>
+        </p:xfrm>
+        <a:graphic>
+          <a:graphicData uri="http://schemas.openxmlformats.org/drawingml/2006/table">
+            <a:tbl>
+              <a:tblPr firstRow="1" bandRow="1">
+                <a:tableStyleId>{21E4AEA4-8DFA-4A89-87EB-49C32662AFE0}</a:tableStyleId>
+              </a:tblPr>
+              <a:tblGrid>
+                <a:gridCol w="4258469">
+                  <a:extLst>
+                    <a:ext uri="{9D8B030D-6E8A-4147-A177-3AD203B41FA5}">
+                      <a16:colId xmlns:a16="http://schemas.microsoft.com/office/drawing/2014/main" val="1535218891"/>
+                    </a:ext>
+                  </a:extLst>
+                </a:gridCol>
+                <a:gridCol w="4258469">
+                  <a:extLst>
+                    <a:ext uri="{9D8B030D-6E8A-4147-A177-3AD203B41FA5}">
+                      <a16:colId xmlns:a16="http://schemas.microsoft.com/office/drawing/2014/main" val="1793090123"/>
+                    </a:ext>
+                  </a:extLst>
+                </a:gridCol>
+              </a:tblGrid>
+              <a:tr h="370840">
+                <a:tc>
+                  <a:txBody>
+                    <a:bodyPr/>
+                    <a:lstStyle/>
+                    <a:p>
+                      <a:r>
+                        <a:rPr lang="de-DE" dirty="0"/>
+                        <a:t>Status</a:t>
+                      </a:r>
+                    </a:p>
+                  </a:txBody>
+                  <a:tcPr>
+                    <a:solidFill>
+                      <a:srgbClr val="008C5A"/>
+                    </a:solidFill>
+                  </a:tcPr>
+                </a:tc>
+                <a:tc>
+                  <a:txBody>
+                    <a:bodyPr/>
+                    <a:lstStyle/>
+                    <a:p>
+                      <a:r>
+                        <a:rPr lang="de-DE" dirty="0"/>
+                        <a:t>Beschreibung</a:t>
+                      </a:r>
+                    </a:p>
+                  </a:txBody>
+                  <a:tcPr>
+                    <a:solidFill>
+                      <a:srgbClr val="008C5A"/>
+                    </a:solidFill>
+                  </a:tcPr>
+                </a:tc>
+                <a:extLst>
+                  <a:ext uri="{0D108BD9-81ED-4DB2-BD59-A6C34878D82A}">
+                    <a16:rowId xmlns:a16="http://schemas.microsoft.com/office/drawing/2014/main" val="431683746"/>
+                  </a:ext>
+                </a:extLst>
+              </a:tr>
+              <a:tr h="370840">
+                <a:tc>
+                  <a:txBody>
+                    <a:bodyPr/>
+                    <a:lstStyle/>
+                    <a:p>
+                      <a:r>
+                        <a:rPr lang="de-DE" dirty="0"/>
+                        <a:t>online</a:t>
+                      </a:r>
+                    </a:p>
+                  </a:txBody>
+                  <a:tcPr/>
+                </a:tc>
+                <a:tc>
+                  <a:txBody>
+                    <a:bodyPr/>
+                    <a:lstStyle/>
+                    <a:p>
+                      <a:pPr rtl="0"/>
+                      <a:r>
+                        <a:rPr lang="de-DE" sz="1600" b="0" i="0" kern="1200" dirty="0">
+                          <a:solidFill>
+                            <a:schemeClr val="dk1"/>
+                          </a:solidFill>
+                          <a:effectLst/>
+                          <a:latin typeface="+mn-lt"/>
+                          <a:ea typeface="+mn-ea"/>
+                          <a:cs typeface="+mn-cs"/>
+                        </a:rPr>
+                        <a:t>Der Runner hat sich innerhalb der letzten 2 Stunden mit </a:t>
+                      </a:r>
+                      <a:r>
+                        <a:rPr lang="de-DE" sz="1600" b="0" i="0" kern="1200" dirty="0" err="1">
+                          <a:solidFill>
+                            <a:schemeClr val="dk1"/>
+                          </a:solidFill>
+                          <a:effectLst/>
+                          <a:latin typeface="+mn-lt"/>
+                          <a:ea typeface="+mn-ea"/>
+                          <a:cs typeface="+mn-cs"/>
+                        </a:rPr>
+                        <a:t>GitLab</a:t>
+                      </a:r>
+                      <a:r>
+                        <a:rPr lang="de-DE" sz="1600" b="0" i="0" kern="1200" dirty="0">
+                          <a:solidFill>
+                            <a:schemeClr val="dk1"/>
+                          </a:solidFill>
+                          <a:effectLst/>
+                          <a:latin typeface="+mn-lt"/>
+                          <a:ea typeface="+mn-ea"/>
+                          <a:cs typeface="+mn-cs"/>
+                        </a:rPr>
+                        <a:t> in Verbindung gesetzt und ist für die Ausführung von Jobs verfügbar.</a:t>
+                      </a:r>
+                    </a:p>
+                  </a:txBody>
+                  <a:tcPr/>
+                </a:tc>
+                <a:extLst>
+                  <a:ext uri="{0D108BD9-81ED-4DB2-BD59-A6C34878D82A}">
+                    <a16:rowId xmlns:a16="http://schemas.microsoft.com/office/drawing/2014/main" val="4084393259"/>
+                  </a:ext>
+                </a:extLst>
+              </a:tr>
+              <a:tr h="370840">
+                <a:tc>
+                  <a:txBody>
+                    <a:bodyPr/>
+                    <a:lstStyle/>
+                    <a:p>
+                      <a:r>
+                        <a:rPr lang="de-DE" dirty="0"/>
+                        <a:t>offline</a:t>
+                      </a:r>
+                    </a:p>
+                  </a:txBody>
+                  <a:tcPr/>
+                </a:tc>
+                <a:tc>
+                  <a:txBody>
+                    <a:bodyPr/>
+                    <a:lstStyle/>
+                    <a:p>
+                      <a:pPr rtl="0"/>
+                      <a:r>
+                        <a:rPr lang="de-DE" sz="1600" b="0" i="0" kern="1200" dirty="0">
+                          <a:solidFill>
+                            <a:schemeClr val="dk1"/>
+                          </a:solidFill>
+                          <a:effectLst/>
+                          <a:latin typeface="+mn-lt"/>
+                          <a:ea typeface="+mn-ea"/>
+                          <a:cs typeface="+mn-cs"/>
+                        </a:rPr>
+                        <a:t>Der Runner hat sich seit mehr als 2 Stunden nicht mehr mit </a:t>
+                      </a:r>
+                      <a:r>
+                        <a:rPr lang="de-DE" sz="1600" b="0" i="0" kern="1200" dirty="0" err="1">
+                          <a:solidFill>
+                            <a:schemeClr val="dk1"/>
+                          </a:solidFill>
+                          <a:effectLst/>
+                          <a:latin typeface="+mn-lt"/>
+                          <a:ea typeface="+mn-ea"/>
+                          <a:cs typeface="+mn-cs"/>
+                        </a:rPr>
+                        <a:t>GitLab</a:t>
+                      </a:r>
+                      <a:r>
+                        <a:rPr lang="de-DE" sz="1600" b="0" i="0" kern="1200" dirty="0">
+                          <a:solidFill>
+                            <a:schemeClr val="dk1"/>
+                          </a:solidFill>
+                          <a:effectLst/>
+                          <a:latin typeface="+mn-lt"/>
+                          <a:ea typeface="+mn-ea"/>
+                          <a:cs typeface="+mn-cs"/>
+                        </a:rPr>
+                        <a:t> in Verbindung gesetzt und ist nicht verfügbar, um Jobs auszuführen. Überprüfen Sie den Runner, um zu sehen, ob Sie ihn online bringen können.</a:t>
+                      </a:r>
+                    </a:p>
+                  </a:txBody>
+                  <a:tcPr/>
+                </a:tc>
+                <a:extLst>
+                  <a:ext uri="{0D108BD9-81ED-4DB2-BD59-A6C34878D82A}">
+                    <a16:rowId xmlns:a16="http://schemas.microsoft.com/office/drawing/2014/main" val="2607581212"/>
+                  </a:ext>
+                </a:extLst>
+              </a:tr>
+              <a:tr h="370840">
+                <a:tc>
+                  <a:txBody>
+                    <a:bodyPr/>
+                    <a:lstStyle/>
+                    <a:p>
+                      <a:r>
+                        <a:rPr lang="de-DE" dirty="0" err="1"/>
+                        <a:t>stale</a:t>
+                      </a:r>
+                      <a:endParaRPr lang="de-DE" dirty="0"/>
+                    </a:p>
+                  </a:txBody>
+                  <a:tcPr/>
+                </a:tc>
+                <a:tc>
+                  <a:txBody>
+                    <a:bodyPr/>
+                    <a:lstStyle/>
+                    <a:p>
+                      <a:pPr rtl="0"/>
+                      <a:r>
+                        <a:rPr lang="de-DE" sz="1600" b="0" i="0" kern="1200" dirty="0">
+                          <a:solidFill>
+                            <a:schemeClr val="dk1"/>
+                          </a:solidFill>
+                          <a:effectLst/>
+                          <a:latin typeface="+mn-lt"/>
+                          <a:ea typeface="+mn-ea"/>
+                          <a:cs typeface="+mn-cs"/>
+                        </a:rPr>
+                        <a:t>Der Runner hat seit mehr als 3 Monaten keinen Kontakt zu </a:t>
+                      </a:r>
+                      <a:r>
+                        <a:rPr lang="de-DE" sz="1600" b="0" i="0" kern="1200" dirty="0" err="1">
+                          <a:solidFill>
+                            <a:schemeClr val="dk1"/>
+                          </a:solidFill>
+                          <a:effectLst/>
+                          <a:latin typeface="+mn-lt"/>
+                          <a:ea typeface="+mn-ea"/>
+                          <a:cs typeface="+mn-cs"/>
+                        </a:rPr>
+                        <a:t>GitLab</a:t>
+                      </a:r>
+                      <a:r>
+                        <a:rPr lang="de-DE" sz="1600" b="0" i="0" kern="1200" dirty="0">
+                          <a:solidFill>
+                            <a:schemeClr val="dk1"/>
+                          </a:solidFill>
+                          <a:effectLst/>
+                          <a:latin typeface="+mn-lt"/>
+                          <a:ea typeface="+mn-ea"/>
+                          <a:cs typeface="+mn-cs"/>
+                        </a:rPr>
+                        <a:t> aufgenommen. Wenn der Läufer vor mehr als 3 Monaten erstellt wurde, aber nie mit der Instanz in Kontakt getreten ist, wird er ebenfalls als veraltet betrachtet.</a:t>
+                      </a:r>
+                    </a:p>
+                  </a:txBody>
+                  <a:tcPr/>
+                </a:tc>
+                <a:extLst>
+                  <a:ext uri="{0D108BD9-81ED-4DB2-BD59-A6C34878D82A}">
+                    <a16:rowId xmlns:a16="http://schemas.microsoft.com/office/drawing/2014/main" val="85763331"/>
+                  </a:ext>
+                </a:extLst>
+              </a:tr>
+              <a:tr h="370840">
+                <a:tc>
+                  <a:txBody>
+                    <a:bodyPr/>
+                    <a:lstStyle/>
+                    <a:p>
+                      <a:r>
+                        <a:rPr lang="de-DE" dirty="0" err="1"/>
+                        <a:t>never_contacted</a:t>
+                      </a:r>
+                      <a:endParaRPr lang="de-DE" dirty="0"/>
+                    </a:p>
+                  </a:txBody>
+                  <a:tcPr/>
+                </a:tc>
+                <a:tc>
+                  <a:txBody>
+                    <a:bodyPr/>
+                    <a:lstStyle/>
+                    <a:p>
+                      <a:pPr rtl="0"/>
+                      <a:r>
+                        <a:rPr lang="de-DE" sz="1600" b="0" i="0" kern="1200" dirty="0">
+                          <a:solidFill>
+                            <a:schemeClr val="dk1"/>
+                          </a:solidFill>
+                          <a:effectLst/>
+                          <a:latin typeface="+mn-lt"/>
+                          <a:ea typeface="+mn-ea"/>
+                          <a:cs typeface="+mn-cs"/>
+                        </a:rPr>
+                        <a:t>Der Runner hat sich noch nie mit </a:t>
+                      </a:r>
+                      <a:r>
+                        <a:rPr lang="de-DE" sz="1600" b="0" i="0" kern="1200" dirty="0" err="1">
+                          <a:solidFill>
+                            <a:schemeClr val="dk1"/>
+                          </a:solidFill>
+                          <a:effectLst/>
+                          <a:latin typeface="+mn-lt"/>
+                          <a:ea typeface="+mn-ea"/>
+                          <a:cs typeface="+mn-cs"/>
+                        </a:rPr>
+                        <a:t>GitLab</a:t>
+                      </a:r>
+                      <a:r>
+                        <a:rPr lang="de-DE" sz="1600" b="0" i="0" kern="1200" dirty="0">
+                          <a:solidFill>
+                            <a:schemeClr val="dk1"/>
+                          </a:solidFill>
+                          <a:effectLst/>
+                          <a:latin typeface="+mn-lt"/>
+                          <a:ea typeface="+mn-ea"/>
+                          <a:cs typeface="+mn-cs"/>
+                        </a:rPr>
+                        <a:t> in Verbindung gesetzt. Um den Runner mit </a:t>
+                      </a:r>
+                      <a:r>
+                        <a:rPr lang="de-DE" sz="1600" b="0" i="0" kern="1200" dirty="0" err="1">
+                          <a:solidFill>
+                            <a:schemeClr val="dk1"/>
+                          </a:solidFill>
+                          <a:effectLst/>
+                          <a:latin typeface="+mn-lt"/>
+                          <a:ea typeface="+mn-ea"/>
+                          <a:cs typeface="+mn-cs"/>
+                        </a:rPr>
+                        <a:t>GitLab</a:t>
+                      </a:r>
+                      <a:r>
+                        <a:rPr lang="de-DE" sz="1600" b="0" i="0" kern="1200" dirty="0">
+                          <a:solidFill>
+                            <a:schemeClr val="dk1"/>
+                          </a:solidFill>
+                          <a:effectLst/>
+                          <a:latin typeface="+mn-lt"/>
+                          <a:ea typeface="+mn-ea"/>
+                          <a:cs typeface="+mn-cs"/>
+                        </a:rPr>
+                        <a:t> in Kontakt zu bringen, führen Sie </a:t>
+                      </a:r>
+                      <a:r>
+                        <a:rPr lang="de-DE" sz="1600" b="0" i="0" kern="1200" dirty="0" err="1">
+                          <a:solidFill>
+                            <a:schemeClr val="dk1"/>
+                          </a:solidFill>
+                          <a:effectLst/>
+                          <a:latin typeface="+mn-lt"/>
+                          <a:ea typeface="+mn-ea"/>
+                          <a:cs typeface="+mn-cs"/>
+                        </a:rPr>
+                        <a:t>gitlab-runner</a:t>
+                      </a:r>
+                      <a:r>
+                        <a:rPr lang="de-DE" sz="1600" b="0" i="0" kern="1200" dirty="0">
+                          <a:solidFill>
+                            <a:schemeClr val="dk1"/>
+                          </a:solidFill>
+                          <a:effectLst/>
+                          <a:latin typeface="+mn-lt"/>
+                          <a:ea typeface="+mn-ea"/>
+                          <a:cs typeface="+mn-cs"/>
+                        </a:rPr>
+                        <a:t> </a:t>
+                      </a:r>
+                      <a:r>
+                        <a:rPr lang="de-DE" sz="1600" b="0" i="0" kern="1200" dirty="0" err="1">
+                          <a:solidFill>
+                            <a:schemeClr val="dk1"/>
+                          </a:solidFill>
+                          <a:effectLst/>
+                          <a:latin typeface="+mn-lt"/>
+                          <a:ea typeface="+mn-ea"/>
+                          <a:cs typeface="+mn-cs"/>
+                        </a:rPr>
+                        <a:t>run</a:t>
+                      </a:r>
+                      <a:r>
+                        <a:rPr lang="de-DE" sz="1600" b="0" i="0" kern="1200" dirty="0">
+                          <a:solidFill>
+                            <a:schemeClr val="dk1"/>
+                          </a:solidFill>
+                          <a:effectLst/>
+                          <a:latin typeface="+mn-lt"/>
+                          <a:ea typeface="+mn-ea"/>
+                          <a:cs typeface="+mn-cs"/>
+                        </a:rPr>
+                        <a:t> aus.</a:t>
+                      </a:r>
+                    </a:p>
+                  </a:txBody>
+                  <a:tcPr/>
+                </a:tc>
+                <a:extLst>
+                  <a:ext uri="{0D108BD9-81ED-4DB2-BD59-A6C34878D82A}">
+                    <a16:rowId xmlns:a16="http://schemas.microsoft.com/office/drawing/2014/main" val="2759603019"/>
+                  </a:ext>
+                </a:extLst>
+              </a:tr>
+            </a:tbl>
+          </a:graphicData>
+        </a:graphic>
+      </p:graphicFrame>
     </p:spTree>
     <p:extLst>
       <p:ext uri="{BB962C8B-B14F-4D97-AF65-F5344CB8AC3E}">
@@ -31406,7 +31931,7 @@
           <p:cNvPr id="2" name="Titel 1">
             <a:extLst>
               <a:ext uri="{FF2B5EF4-FFF2-40B4-BE49-F238E27FC236}">
-                <a16:creationId xmlns:a16="http://schemas.microsoft.com/office/drawing/2014/main" id="{2B9F73D1-0616-0915-95E4-06CBA79315C7}"/>
+                <a16:creationId xmlns:a16="http://schemas.microsoft.com/office/drawing/2014/main" id="{0FD8A572-C586-1EFF-D76E-60131F18297A}"/>
               </a:ext>
             </a:extLst>
           </p:cNvPr>
@@ -31423,12 +31948,8 @@
           <a:lstStyle/>
           <a:p>
             <a:r>
-              <a:rPr lang="de-DE" dirty="0" err="1"/>
-              <a:t>GitLab</a:t>
-            </a:r>
-            <a:r>
-              <a:rPr lang="de-DE" dirty="0"/>
-              <a:t> Runner</a:t>
+              <a:rPr lang="de-DE" dirty="0"/>
+              <a:t>Wollen wir das?</a:t>
             </a:r>
           </a:p>
         </p:txBody>
@@ -31438,7 +31959,7 @@
           <p:cNvPr id="3" name="Inhaltsplatzhalter 2">
             <a:extLst>
               <a:ext uri="{FF2B5EF4-FFF2-40B4-BE49-F238E27FC236}">
-                <a16:creationId xmlns:a16="http://schemas.microsoft.com/office/drawing/2014/main" id="{3CE2D11A-801F-CE1E-A418-D35676D404C3}"/>
+                <a16:creationId xmlns:a16="http://schemas.microsoft.com/office/drawing/2014/main" id="{68A5B177-F931-DD3F-C78D-5D167B7671E2}"/>
               </a:ext>
             </a:extLst>
           </p:cNvPr>
@@ -31458,22 +31979,128 @@
               <a:buNone/>
             </a:pPr>
             <a:r>
-              <a:rPr lang="de-DE" b="1" dirty="0"/>
-              <a:t>Runner registrieren</a:t>
+              <a:rPr lang="en-US" sz="1600" b="1" i="0" dirty="0">
+                <a:solidFill>
+                  <a:srgbClr val="222261"/>
+                </a:solidFill>
+                <a:effectLst/>
+                <a:latin typeface="gitlab sans"/>
+              </a:rPr>
+              <a:t>View statistics for runner performance</a:t>
             </a:r>
           </a:p>
           <a:p>
             <a:pPr marL="0" indent="0">
               <a:buNone/>
             </a:pPr>
-            <a:endParaRPr lang="de-DE" b="1" dirty="0"/>
+            <a:r>
+              <a:rPr lang="en-US" sz="1600" dirty="0">
+                <a:hlinkClick r:id="rId2"/>
+              </a:rPr>
+              <a:t>https://docs.gitlab.com/ee/ci/runners/runners_scope.html#view-statistics-for-runner-performance</a:t>
+            </a:r>
+            <a:r>
+              <a:rPr lang="en-US" sz="1600" dirty="0"/>
+              <a:t> </a:t>
+            </a:r>
+          </a:p>
+          <a:p>
+            <a:pPr marL="0" indent="0">
+              <a:buNone/>
+            </a:pPr>
+            <a:r>
+              <a:rPr lang="en-US" sz="1600" dirty="0"/>
+              <a:t>As an administrator, you can view runner statistics to learn about the performance of your runner fleet.</a:t>
+            </a:r>
+          </a:p>
+          <a:p>
+            <a:pPr marL="0" indent="0">
+              <a:buNone/>
+            </a:pPr>
+            <a:endParaRPr lang="en-US" sz="1600" dirty="0"/>
+          </a:p>
+          <a:p>
+            <a:pPr marL="0" indent="0">
+              <a:buNone/>
+            </a:pPr>
+            <a:r>
+              <a:rPr lang="en-US" sz="1600" dirty="0"/>
+              <a:t>The Median job queued time value is calculated by sampling the queue duration of the most recent 100 jobs that were run by Instance runners. Jobs from only the latest 5000 runners are considered.</a:t>
+            </a:r>
+          </a:p>
+          <a:p>
+            <a:pPr marL="0" indent="0">
+              <a:buNone/>
+            </a:pPr>
+            <a:endParaRPr lang="en-US" sz="1600" dirty="0"/>
+          </a:p>
+          <a:p>
+            <a:pPr marL="0" indent="0">
+              <a:buNone/>
+            </a:pPr>
+            <a:r>
+              <a:rPr lang="en-US" sz="1600" dirty="0"/>
+              <a:t>The median is a value that falls into the 50th percentile: half of the jobs queued for longer than the median value, and half of the jobs queued for less than the median value.</a:t>
+            </a:r>
+          </a:p>
+          <a:p>
+            <a:pPr marL="0" indent="0">
+              <a:buNone/>
+            </a:pPr>
+            <a:endParaRPr lang="en-US" sz="1600" dirty="0"/>
+          </a:p>
+          <a:p>
+            <a:pPr marL="0" indent="0">
+              <a:buNone/>
+            </a:pPr>
+            <a:r>
+              <a:rPr lang="en-US" sz="1600" dirty="0"/>
+              <a:t>To view runner statistics:</a:t>
+            </a:r>
+          </a:p>
+          <a:p>
+            <a:pPr marL="0" indent="0">
+              <a:buNone/>
+            </a:pPr>
+            <a:endParaRPr lang="en-US" sz="1600" dirty="0"/>
+          </a:p>
+          <a:p>
+            <a:pPr>
+              <a:buFont typeface="+mj-lt"/>
+              <a:buAutoNum type="arabicPeriod"/>
+            </a:pPr>
+            <a:r>
+              <a:rPr lang="en-US" sz="1600" dirty="0"/>
+              <a:t>On the left sidebar, at the bottom, select Admin Area.</a:t>
+            </a:r>
+          </a:p>
+          <a:p>
+            <a:pPr>
+              <a:buFont typeface="+mj-lt"/>
+              <a:buAutoNum type="arabicPeriod"/>
+            </a:pPr>
+            <a:r>
+              <a:rPr lang="en-US" sz="1600" dirty="0"/>
+              <a:t>Select CI/CD &gt; Runners.</a:t>
+            </a:r>
+          </a:p>
+          <a:p>
+            <a:pPr>
+              <a:buFont typeface="+mj-lt"/>
+              <a:buAutoNum type="arabicPeriod"/>
+            </a:pPr>
+            <a:r>
+              <a:rPr lang="en-US" sz="1600" dirty="0"/>
+              <a:t>Select View metrics.</a:t>
+            </a:r>
+            <a:endParaRPr lang="de-DE" sz="1600" dirty="0"/>
           </a:p>
         </p:txBody>
       </p:sp>
     </p:spTree>
     <p:extLst>
       <p:ext uri="{BB962C8B-B14F-4D97-AF65-F5344CB8AC3E}">
-        <p14:creationId xmlns:p14="http://schemas.microsoft.com/office/powerpoint/2010/main" val="2238531874"/>
+        <p14:creationId xmlns:p14="http://schemas.microsoft.com/office/powerpoint/2010/main" val="1601494826"/>
       </p:ext>
     </p:extLst>
   </p:cSld>
@@ -31505,7 +32132,7 @@
           <p:cNvPr id="2" name="Titel 1">
             <a:extLst>
               <a:ext uri="{FF2B5EF4-FFF2-40B4-BE49-F238E27FC236}">
-                <a16:creationId xmlns:a16="http://schemas.microsoft.com/office/drawing/2014/main" id="{2B9F73D1-0616-0915-95E4-06CBA79315C7}"/>
+                <a16:creationId xmlns:a16="http://schemas.microsoft.com/office/drawing/2014/main" id="{5C0F13BC-8108-19BA-4223-072A23AF3437}"/>
               </a:ext>
             </a:extLst>
           </p:cNvPr>
@@ -31522,12 +32149,8 @@
           <a:lstStyle/>
           <a:p>
             <a:r>
-              <a:rPr lang="de-DE" dirty="0" err="1"/>
-              <a:t>GitLab</a:t>
-            </a:r>
-            <a:r>
-              <a:rPr lang="de-DE" dirty="0"/>
-              <a:t> Runner</a:t>
+              <a:rPr lang="de-DE" dirty="0"/>
+              <a:t>Wollen wir das?</a:t>
             </a:r>
           </a:p>
         </p:txBody>
@@ -31537,7 +32160,7 @@
           <p:cNvPr id="3" name="Inhaltsplatzhalter 2">
             <a:extLst>
               <a:ext uri="{FF2B5EF4-FFF2-40B4-BE49-F238E27FC236}">
-                <a16:creationId xmlns:a16="http://schemas.microsoft.com/office/drawing/2014/main" id="{3CE2D11A-801F-CE1E-A418-D35676D404C3}"/>
+                <a16:creationId xmlns:a16="http://schemas.microsoft.com/office/drawing/2014/main" id="{3B8A68ED-466D-F7C4-4563-B9735AAA13DF}"/>
               </a:ext>
             </a:extLst>
           </p:cNvPr>
@@ -31557,17 +32180,178 @@
               <a:buNone/>
             </a:pPr>
             <a:r>
-              <a:rPr lang="de-DE" b="1" dirty="0" err="1"/>
-              <a:t>Executors</a:t>
-            </a:r>
-            <a:endParaRPr lang="de-DE" b="1" dirty="0"/>
+              <a:rPr lang="en-US" sz="1400" b="1" i="0" dirty="0">
+                <a:solidFill>
+                  <a:srgbClr val="222261"/>
+                </a:solidFill>
+                <a:effectLst/>
+                <a:latin typeface="gitlab sans"/>
+              </a:rPr>
+              <a:t>Determine which runners need to be upgraded</a:t>
+            </a:r>
+          </a:p>
+          <a:p>
+            <a:pPr marL="0" indent="0">
+              <a:buNone/>
+            </a:pPr>
+            <a:r>
+              <a:rPr lang="de-DE" sz="1400" dirty="0">
+                <a:hlinkClick r:id="rId2"/>
+              </a:rPr>
+              <a:t>https://docs.gitlab.com/ee/ci/runners/runners_scope.html#determine-which-runners-need-to-be-upgraded</a:t>
+            </a:r>
+            <a:r>
+              <a:rPr lang="de-DE" sz="1400" dirty="0"/>
+              <a:t> </a:t>
+            </a:r>
+          </a:p>
+          <a:p>
+            <a:pPr marL="0" indent="0">
+              <a:buNone/>
+            </a:pPr>
+            <a:r>
+              <a:rPr lang="en-US" sz="1400" dirty="0"/>
+              <a:t>The version of GitLab Runner used by your runners should be kept up-to-date.</a:t>
+            </a:r>
+          </a:p>
+          <a:p>
+            <a:pPr marL="0" indent="0">
+              <a:buNone/>
+            </a:pPr>
+            <a:endParaRPr lang="en-US" sz="1400" dirty="0"/>
+          </a:p>
+          <a:p>
+            <a:pPr marL="0" indent="0">
+              <a:buNone/>
+            </a:pPr>
+            <a:r>
+              <a:rPr lang="en-US" sz="1400" dirty="0"/>
+              <a:t>To determine which runners need to be upgraded:</a:t>
+            </a:r>
+          </a:p>
+          <a:p>
+            <a:pPr marL="0" indent="0">
+              <a:buNone/>
+            </a:pPr>
+            <a:endParaRPr lang="en-US" sz="1400" dirty="0"/>
+          </a:p>
+          <a:p>
+            <a:pPr>
+              <a:buFont typeface="+mj-lt"/>
+              <a:buAutoNum type="arabicPeriod"/>
+            </a:pPr>
+            <a:r>
+              <a:rPr lang="en-US" sz="1400" dirty="0"/>
+              <a:t>View the list of runners:</a:t>
+            </a:r>
+          </a:p>
+          <a:p>
+            <a:pPr lvl="1">
+              <a:buFont typeface="Arial" panose="020B0604020202020204" pitchFamily="34" charset="0"/>
+              <a:buChar char="•"/>
+            </a:pPr>
+            <a:r>
+              <a:rPr lang="en-US" sz="1400" dirty="0"/>
+              <a:t>For a group:</a:t>
+            </a:r>
+          </a:p>
+          <a:p>
+            <a:pPr marL="1257300" lvl="2" indent="-342900">
+              <a:buFont typeface="+mj-lt"/>
+              <a:buAutoNum type="arabicPeriod"/>
+            </a:pPr>
+            <a:r>
+              <a:rPr lang="en-US" sz="1400" dirty="0"/>
+              <a:t>On the left sidebar, select Search or go to and find your group.</a:t>
+            </a:r>
+          </a:p>
+          <a:p>
+            <a:pPr marL="1257300" lvl="2" indent="-342900">
+              <a:buFont typeface="+mj-lt"/>
+              <a:buAutoNum type="arabicPeriod"/>
+            </a:pPr>
+            <a:r>
+              <a:rPr lang="en-US" sz="1400" dirty="0"/>
+              <a:t>Select Build &gt; Runners.</a:t>
+            </a:r>
+          </a:p>
+          <a:p>
+            <a:pPr lvl="1">
+              <a:buFont typeface="Arial" panose="020B0604020202020204" pitchFamily="34" charset="0"/>
+              <a:buChar char="•"/>
+            </a:pPr>
+            <a:r>
+              <a:rPr lang="en-US" sz="1400" dirty="0"/>
+              <a:t>For the instance:</a:t>
+            </a:r>
+          </a:p>
+          <a:p>
+            <a:pPr marL="1257300" lvl="2" indent="-342900">
+              <a:buFont typeface="+mj-lt"/>
+              <a:buAutoNum type="arabicPeriod"/>
+            </a:pPr>
+            <a:r>
+              <a:rPr lang="en-US" sz="1400" dirty="0"/>
+              <a:t>On the left sidebar, at the bottom, select Admin Area.</a:t>
+            </a:r>
+          </a:p>
+          <a:p>
+            <a:pPr marL="1257300" lvl="2" indent="-342900">
+              <a:buFont typeface="+mj-lt"/>
+              <a:buAutoNum type="arabicPeriod"/>
+            </a:pPr>
+            <a:r>
+              <a:rPr lang="en-US" sz="1400" dirty="0"/>
+              <a:t>Select CI/CD &gt; Runners.</a:t>
+            </a:r>
+          </a:p>
+          <a:p>
+            <a:pPr>
+              <a:buFont typeface="+mj-lt"/>
+              <a:buAutoNum type="arabicPeriod"/>
+            </a:pPr>
+            <a:r>
+              <a:rPr lang="en-US" sz="1400" dirty="0"/>
+              <a:t>Above the list of runners, view the status:</a:t>
+            </a:r>
+          </a:p>
+          <a:p>
+            <a:pPr lvl="1">
+              <a:buFont typeface="Arial" panose="020B0604020202020204" pitchFamily="34" charset="0"/>
+              <a:buChar char="•"/>
+            </a:pPr>
+            <a:r>
+              <a:rPr lang="en-US" sz="1400" dirty="0"/>
+              <a:t>Outdated - recommended: The runner does not have the latest PATCH version, which may make it vulnerable to security or high severity bugs. Or, the runner is one or more MAJOR versions behind your GitLab instance, so some features may not be available or work properly.</a:t>
+            </a:r>
+          </a:p>
+          <a:p>
+            <a:pPr lvl="1">
+              <a:buFont typeface="Arial" panose="020B0604020202020204" pitchFamily="34" charset="0"/>
+              <a:buChar char="•"/>
+            </a:pPr>
+            <a:r>
+              <a:rPr lang="en-US" sz="1400" dirty="0"/>
+              <a:t>Outdated - available: Newer versions are available but upgrading is not critical.</a:t>
+            </a:r>
+          </a:p>
+          <a:p>
+            <a:pPr>
+              <a:buFont typeface="+mj-lt"/>
+              <a:buAutoNum type="arabicPeriod"/>
+            </a:pPr>
+            <a:r>
+              <a:rPr lang="en-US" sz="1400" dirty="0"/>
+              <a:t>Filter the list by status to view which individual runners need to be upgraded.</a:t>
+            </a:r>
+            <a:endParaRPr lang="de-DE" sz="1400" dirty="0"/>
           </a:p>
         </p:txBody>
       </p:sp>
     </p:spTree>
     <p:extLst>
       <p:ext uri="{BB962C8B-B14F-4D97-AF65-F5344CB8AC3E}">
-        <p14:creationId xmlns:p14="http://schemas.microsoft.com/office/powerpoint/2010/main" val="949730093"/>
+        <p14:creationId xmlns:p14="http://schemas.microsoft.com/office/powerpoint/2010/main" val="2758937212"/>
       </p:ext>
     </p:extLst>
   </p:cSld>
@@ -31599,7 +32383,7 @@
           <p:cNvPr id="2" name="Titel 1">
             <a:extLst>
               <a:ext uri="{FF2B5EF4-FFF2-40B4-BE49-F238E27FC236}">
-                <a16:creationId xmlns:a16="http://schemas.microsoft.com/office/drawing/2014/main" id="{2B9F73D1-0616-0915-95E4-06CBA79315C7}"/>
+                <a16:creationId xmlns:a16="http://schemas.microsoft.com/office/drawing/2014/main" id="{B45E3AFA-0458-C497-D9D7-15F0BDB24297}"/>
               </a:ext>
             </a:extLst>
           </p:cNvPr>
@@ -31616,12 +32400,8 @@
           <a:lstStyle/>
           <a:p>
             <a:r>
-              <a:rPr lang="de-DE" dirty="0" err="1"/>
-              <a:t>GitLab</a:t>
-            </a:r>
-            <a:r>
-              <a:rPr lang="de-DE" dirty="0"/>
-              <a:t> Runner</a:t>
+              <a:rPr lang="de-DE" dirty="0"/>
+              <a:t>Wollen wir das?</a:t>
             </a:r>
           </a:p>
         </p:txBody>
@@ -31631,7 +32411,7 @@
           <p:cNvPr id="3" name="Inhaltsplatzhalter 2">
             <a:extLst>
               <a:ext uri="{FF2B5EF4-FFF2-40B4-BE49-F238E27FC236}">
-                <a16:creationId xmlns:a16="http://schemas.microsoft.com/office/drawing/2014/main" id="{3CE2D11A-801F-CE1E-A418-D35676D404C3}"/>
+                <a16:creationId xmlns:a16="http://schemas.microsoft.com/office/drawing/2014/main" id="{A0925B80-D309-F6B7-9EA9-4A5A21D5DB61}"/>
               </a:ext>
             </a:extLst>
           </p:cNvPr>
@@ -31651,22 +32431,50 @@
               <a:buNone/>
             </a:pPr>
             <a:r>
-              <a:rPr lang="de-DE" b="1" dirty="0"/>
-              <a:t>Runner konfigurieren</a:t>
+              <a:rPr lang="en-US" b="1" i="0" dirty="0">
+                <a:solidFill>
+                  <a:srgbClr val="222261"/>
+                </a:solidFill>
+                <a:effectLst/>
+                <a:latin typeface="gitlab sans"/>
+              </a:rPr>
+              <a:t>Determine the IP address of a runner</a:t>
             </a:r>
           </a:p>
           <a:p>
             <a:pPr marL="0" indent="0">
               <a:buNone/>
             </a:pPr>
-            <a:endParaRPr lang="de-DE" b="1" dirty="0"/>
+            <a:r>
+              <a:rPr lang="de-DE" dirty="0"/>
+              <a:t>Viel.</a:t>
+            </a:r>
+          </a:p>
+          <a:p>
+            <a:pPr marL="0" indent="0">
+              <a:buNone/>
+            </a:pPr>
+            <a:r>
+              <a:rPr lang="de-DE" dirty="0"/>
+              <a:t>Hier: </a:t>
+            </a:r>
+            <a:r>
+              <a:rPr lang="de-DE" dirty="0">
+                <a:hlinkClick r:id="rId3"/>
+              </a:rPr>
+              <a:t>https://docs.gitlab.com/ee/ci/runners/runners_scope.html#determine-the-ip-address-of-a-runner</a:t>
+            </a:r>
+            <a:r>
+              <a:rPr lang="de-DE" dirty="0"/>
+              <a:t> </a:t>
+            </a:r>
           </a:p>
         </p:txBody>
       </p:sp>
     </p:spTree>
     <p:extLst>
       <p:ext uri="{BB962C8B-B14F-4D97-AF65-F5344CB8AC3E}">
-        <p14:creationId xmlns:p14="http://schemas.microsoft.com/office/powerpoint/2010/main" val="2185810072"/>
+        <p14:creationId xmlns:p14="http://schemas.microsoft.com/office/powerpoint/2010/main" val="3308430722"/>
       </p:ext>
     </p:extLst>
   </p:cSld>
@@ -31695,7 +32503,13 @@
       </p:grpSpPr>
       <p:sp>
         <p:nvSpPr>
-          <p:cNvPr id="2" name="Titel 1"/>
+          <p:cNvPr id="2" name="Titel 1">
+            <a:extLst>
+              <a:ext uri="{FF2B5EF4-FFF2-40B4-BE49-F238E27FC236}">
+                <a16:creationId xmlns:a16="http://schemas.microsoft.com/office/drawing/2014/main" id="{2B9F73D1-0616-0915-95E4-06CBA79315C7}"/>
+              </a:ext>
+            </a:extLst>
+          </p:cNvPr>
           <p:cNvSpPr>
             <a:spLocks noGrp="1"/>
           </p:cNvSpPr>
@@ -31709,20 +32523,30 @@
           <a:lstStyle/>
           <a:p>
             <a:r>
-              <a:rPr lang="de-DE" cap="none" dirty="0"/>
-              <a:t>Container/Docker Registry</a:t>
+              <a:rPr lang="de-DE" dirty="0" err="1"/>
+              <a:t>GitLab</a:t>
+            </a:r>
+            <a:r>
+              <a:rPr lang="de-DE" dirty="0"/>
+              <a:t> Runner</a:t>
             </a:r>
           </a:p>
         </p:txBody>
       </p:sp>
       <p:sp>
         <p:nvSpPr>
-          <p:cNvPr id="3" name="Untertitel 2"/>
+          <p:cNvPr id="3" name="Inhaltsplatzhalter 2">
+            <a:extLst>
+              <a:ext uri="{FF2B5EF4-FFF2-40B4-BE49-F238E27FC236}">
+                <a16:creationId xmlns:a16="http://schemas.microsoft.com/office/drawing/2014/main" id="{3CE2D11A-801F-CE1E-A418-D35676D404C3}"/>
+              </a:ext>
+            </a:extLst>
+          </p:cNvPr>
           <p:cNvSpPr>
             <a:spLocks noGrp="1"/>
           </p:cNvSpPr>
           <p:nvPr>
-            <p:ph type="body" idx="1"/>
+            <p:ph idx="1"/>
           </p:nvPr>
         </p:nvSpPr>
         <p:spPr/>
@@ -31730,17 +32554,26 @@
           <a:bodyPr/>
           <a:lstStyle/>
           <a:p>
-            <a:r>
-              <a:rPr lang="de-DE" dirty="0"/>
-              <a:t>Grundlagen von</a:t>
-            </a:r>
+            <a:pPr marL="0" indent="0">
+              <a:buNone/>
+            </a:pPr>
+            <a:r>
+              <a:rPr lang="de-DE" b="1" dirty="0"/>
+              <a:t>Runner registrieren</a:t>
+            </a:r>
+          </a:p>
+          <a:p>
+            <a:pPr marL="0" indent="0">
+              <a:buNone/>
+            </a:pPr>
+            <a:endParaRPr lang="de-DE" b="1" dirty="0"/>
           </a:p>
         </p:txBody>
       </p:sp>
     </p:spTree>
     <p:extLst>
       <p:ext uri="{BB962C8B-B14F-4D97-AF65-F5344CB8AC3E}">
-        <p14:creationId xmlns:p14="http://schemas.microsoft.com/office/powerpoint/2010/main" val="2809021556"/>
+        <p14:creationId xmlns:p14="http://schemas.microsoft.com/office/powerpoint/2010/main" val="2238531874"/>
       </p:ext>
     </p:extLst>
   </p:cSld>
@@ -31772,7 +32605,7 @@
           <p:cNvPr id="2" name="Titel 1">
             <a:extLst>
               <a:ext uri="{FF2B5EF4-FFF2-40B4-BE49-F238E27FC236}">
-                <a16:creationId xmlns:a16="http://schemas.microsoft.com/office/drawing/2014/main" id="{25E7C6E1-B055-3AFC-5E69-1173C8DA414C}"/>
+                <a16:creationId xmlns:a16="http://schemas.microsoft.com/office/drawing/2014/main" id="{2B9F73D1-0616-0915-95E4-06CBA79315C7}"/>
               </a:ext>
             </a:extLst>
           </p:cNvPr>
@@ -31789,8 +32622,12 @@
           <a:lstStyle/>
           <a:p>
             <a:r>
-              <a:rPr lang="de-DE" dirty="0"/>
-              <a:t>Container Registry</a:t>
+              <a:rPr lang="de-DE" dirty="0" err="1"/>
+              <a:t>GitLab</a:t>
+            </a:r>
+            <a:r>
+              <a:rPr lang="de-DE" dirty="0"/>
+              <a:t> Runner</a:t>
             </a:r>
           </a:p>
         </p:txBody>
@@ -31800,7 +32637,7 @@
           <p:cNvPr id="3" name="Inhaltsplatzhalter 2">
             <a:extLst>
               <a:ext uri="{FF2B5EF4-FFF2-40B4-BE49-F238E27FC236}">
-                <a16:creationId xmlns:a16="http://schemas.microsoft.com/office/drawing/2014/main" id="{2F072594-2447-5EB7-7AAF-47596D7C1121}"/>
+                <a16:creationId xmlns:a16="http://schemas.microsoft.com/office/drawing/2014/main" id="{3CE2D11A-801F-CE1E-A418-D35676D404C3}"/>
               </a:ext>
             </a:extLst>
           </p:cNvPr>
@@ -31819,14 +32656,117 @@
             <a:pPr marL="0" indent="0">
               <a:buNone/>
             </a:pPr>
-            <a:endParaRPr lang="de-DE" dirty="0"/>
+            <a:r>
+              <a:rPr lang="de-DE" b="1" dirty="0" err="1"/>
+              <a:t>Executors</a:t>
+            </a:r>
+            <a:endParaRPr lang="de-DE" b="1" dirty="0"/>
           </a:p>
         </p:txBody>
       </p:sp>
     </p:spTree>
     <p:extLst>
       <p:ext uri="{BB962C8B-B14F-4D97-AF65-F5344CB8AC3E}">
-        <p14:creationId xmlns:p14="http://schemas.microsoft.com/office/powerpoint/2010/main" val="81545675"/>
+        <p14:creationId xmlns:p14="http://schemas.microsoft.com/office/powerpoint/2010/main" val="949730093"/>
+      </p:ext>
+    </p:extLst>
+  </p:cSld>
+  <p:clrMapOvr>
+    <a:masterClrMapping/>
+  </p:clrMapOvr>
+</p:sld>
+</file>
+
+<file path=ppt/slides/slide79.xml><?xml version="1.0" encoding="utf-8"?>
+<p:sld xmlns:a="http://schemas.openxmlformats.org/drawingml/2006/main" xmlns:r="http://schemas.openxmlformats.org/officeDocument/2006/relationships" xmlns:p="http://schemas.openxmlformats.org/presentationml/2006/main">
+  <p:cSld>
+    <p:spTree>
+      <p:nvGrpSpPr>
+        <p:cNvPr id="1" name=""/>
+        <p:cNvGrpSpPr/>
+        <p:nvPr/>
+      </p:nvGrpSpPr>
+      <p:grpSpPr>
+        <a:xfrm>
+          <a:off x="0" y="0"/>
+          <a:ext cx="0" cy="0"/>
+          <a:chOff x="0" y="0"/>
+          <a:chExt cx="0" cy="0"/>
+        </a:xfrm>
+      </p:grpSpPr>
+      <p:sp>
+        <p:nvSpPr>
+          <p:cNvPr id="2" name="Titel 1">
+            <a:extLst>
+              <a:ext uri="{FF2B5EF4-FFF2-40B4-BE49-F238E27FC236}">
+                <a16:creationId xmlns:a16="http://schemas.microsoft.com/office/drawing/2014/main" id="{2B9F73D1-0616-0915-95E4-06CBA79315C7}"/>
+              </a:ext>
+            </a:extLst>
+          </p:cNvPr>
+          <p:cNvSpPr>
+            <a:spLocks noGrp="1"/>
+          </p:cNvSpPr>
+          <p:nvPr>
+            <p:ph type="title"/>
+          </p:nvPr>
+        </p:nvSpPr>
+        <p:spPr/>
+        <p:txBody>
+          <a:bodyPr/>
+          <a:lstStyle/>
+          <a:p>
+            <a:r>
+              <a:rPr lang="de-DE" dirty="0" err="1"/>
+              <a:t>GitLab</a:t>
+            </a:r>
+            <a:r>
+              <a:rPr lang="de-DE" dirty="0"/>
+              <a:t> Runner</a:t>
+            </a:r>
+          </a:p>
+        </p:txBody>
+      </p:sp>
+      <p:sp>
+        <p:nvSpPr>
+          <p:cNvPr id="3" name="Inhaltsplatzhalter 2">
+            <a:extLst>
+              <a:ext uri="{FF2B5EF4-FFF2-40B4-BE49-F238E27FC236}">
+                <a16:creationId xmlns:a16="http://schemas.microsoft.com/office/drawing/2014/main" id="{3CE2D11A-801F-CE1E-A418-D35676D404C3}"/>
+              </a:ext>
+            </a:extLst>
+          </p:cNvPr>
+          <p:cNvSpPr>
+            <a:spLocks noGrp="1"/>
+          </p:cNvSpPr>
+          <p:nvPr>
+            <p:ph idx="1"/>
+          </p:nvPr>
+        </p:nvSpPr>
+        <p:spPr/>
+        <p:txBody>
+          <a:bodyPr/>
+          <a:lstStyle/>
+          <a:p>
+            <a:pPr marL="0" indent="0">
+              <a:buNone/>
+            </a:pPr>
+            <a:r>
+              <a:rPr lang="de-DE" b="1" dirty="0"/>
+              <a:t>Runner konfigurieren</a:t>
+            </a:r>
+          </a:p>
+          <a:p>
+            <a:pPr marL="0" indent="0">
+              <a:buNone/>
+            </a:pPr>
+            <a:endParaRPr lang="de-DE" b="1" dirty="0"/>
+          </a:p>
+        </p:txBody>
+      </p:sp>
+    </p:spTree>
+    <p:extLst>
+      <p:ext uri="{BB962C8B-B14F-4D97-AF65-F5344CB8AC3E}">
+        <p14:creationId xmlns:p14="http://schemas.microsoft.com/office/powerpoint/2010/main" val="2185810072"/>
       </p:ext>
     </p:extLst>
   </p:cSld>
@@ -32191,6 +33131,166 @@
     <p:extLst>
       <p:ext uri="{BB962C8B-B14F-4D97-AF65-F5344CB8AC3E}">
         <p14:creationId xmlns:p14="http://schemas.microsoft.com/office/powerpoint/2010/main" val="1262124069"/>
+      </p:ext>
+    </p:extLst>
+  </p:cSld>
+  <p:clrMapOvr>
+    <a:masterClrMapping/>
+  </p:clrMapOvr>
+</p:sld>
+</file>
+
+<file path=ppt/slides/slide80.xml><?xml version="1.0" encoding="utf-8"?>
+<p:sld xmlns:a="http://schemas.openxmlformats.org/drawingml/2006/main" xmlns:r="http://schemas.openxmlformats.org/officeDocument/2006/relationships" xmlns:p="http://schemas.openxmlformats.org/presentationml/2006/main">
+  <p:cSld>
+    <p:spTree>
+      <p:nvGrpSpPr>
+        <p:cNvPr id="1" name=""/>
+        <p:cNvGrpSpPr/>
+        <p:nvPr/>
+      </p:nvGrpSpPr>
+      <p:grpSpPr>
+        <a:xfrm>
+          <a:off x="0" y="0"/>
+          <a:ext cx="0" cy="0"/>
+          <a:chOff x="0" y="0"/>
+          <a:chExt cx="0" cy="0"/>
+        </a:xfrm>
+      </p:grpSpPr>
+      <p:sp>
+        <p:nvSpPr>
+          <p:cNvPr id="2" name="Titel 1"/>
+          <p:cNvSpPr>
+            <a:spLocks noGrp="1"/>
+          </p:cNvSpPr>
+          <p:nvPr>
+            <p:ph type="title"/>
+          </p:nvPr>
+        </p:nvSpPr>
+        <p:spPr/>
+        <p:txBody>
+          <a:bodyPr/>
+          <a:lstStyle/>
+          <a:p>
+            <a:r>
+              <a:rPr lang="de-DE" cap="none" dirty="0"/>
+              <a:t>Container/Docker Registry</a:t>
+            </a:r>
+          </a:p>
+        </p:txBody>
+      </p:sp>
+      <p:sp>
+        <p:nvSpPr>
+          <p:cNvPr id="3" name="Untertitel 2"/>
+          <p:cNvSpPr>
+            <a:spLocks noGrp="1"/>
+          </p:cNvSpPr>
+          <p:nvPr>
+            <p:ph type="body" idx="1"/>
+          </p:nvPr>
+        </p:nvSpPr>
+        <p:spPr/>
+        <p:txBody>
+          <a:bodyPr/>
+          <a:lstStyle/>
+          <a:p>
+            <a:r>
+              <a:rPr lang="de-DE" dirty="0"/>
+              <a:t>Grundlagen von</a:t>
+            </a:r>
+          </a:p>
+        </p:txBody>
+      </p:sp>
+    </p:spTree>
+    <p:extLst>
+      <p:ext uri="{BB962C8B-B14F-4D97-AF65-F5344CB8AC3E}">
+        <p14:creationId xmlns:p14="http://schemas.microsoft.com/office/powerpoint/2010/main" val="2809021556"/>
+      </p:ext>
+    </p:extLst>
+  </p:cSld>
+  <p:clrMapOvr>
+    <a:masterClrMapping/>
+  </p:clrMapOvr>
+</p:sld>
+</file>
+
+<file path=ppt/slides/slide81.xml><?xml version="1.0" encoding="utf-8"?>
+<p:sld xmlns:a="http://schemas.openxmlformats.org/drawingml/2006/main" xmlns:r="http://schemas.openxmlformats.org/officeDocument/2006/relationships" xmlns:p="http://schemas.openxmlformats.org/presentationml/2006/main">
+  <p:cSld>
+    <p:spTree>
+      <p:nvGrpSpPr>
+        <p:cNvPr id="1" name=""/>
+        <p:cNvGrpSpPr/>
+        <p:nvPr/>
+      </p:nvGrpSpPr>
+      <p:grpSpPr>
+        <a:xfrm>
+          <a:off x="0" y="0"/>
+          <a:ext cx="0" cy="0"/>
+          <a:chOff x="0" y="0"/>
+          <a:chExt cx="0" cy="0"/>
+        </a:xfrm>
+      </p:grpSpPr>
+      <p:sp>
+        <p:nvSpPr>
+          <p:cNvPr id="2" name="Titel 1">
+            <a:extLst>
+              <a:ext uri="{FF2B5EF4-FFF2-40B4-BE49-F238E27FC236}">
+                <a16:creationId xmlns:a16="http://schemas.microsoft.com/office/drawing/2014/main" id="{25E7C6E1-B055-3AFC-5E69-1173C8DA414C}"/>
+              </a:ext>
+            </a:extLst>
+          </p:cNvPr>
+          <p:cNvSpPr>
+            <a:spLocks noGrp="1"/>
+          </p:cNvSpPr>
+          <p:nvPr>
+            <p:ph type="title"/>
+          </p:nvPr>
+        </p:nvSpPr>
+        <p:spPr/>
+        <p:txBody>
+          <a:bodyPr/>
+          <a:lstStyle/>
+          <a:p>
+            <a:r>
+              <a:rPr lang="de-DE" dirty="0"/>
+              <a:t>Container Registry</a:t>
+            </a:r>
+          </a:p>
+        </p:txBody>
+      </p:sp>
+      <p:sp>
+        <p:nvSpPr>
+          <p:cNvPr id="3" name="Inhaltsplatzhalter 2">
+            <a:extLst>
+              <a:ext uri="{FF2B5EF4-FFF2-40B4-BE49-F238E27FC236}">
+                <a16:creationId xmlns:a16="http://schemas.microsoft.com/office/drawing/2014/main" id="{2F072594-2447-5EB7-7AAF-47596D7C1121}"/>
+              </a:ext>
+            </a:extLst>
+          </p:cNvPr>
+          <p:cNvSpPr>
+            <a:spLocks noGrp="1"/>
+          </p:cNvSpPr>
+          <p:nvPr>
+            <p:ph idx="1"/>
+          </p:nvPr>
+        </p:nvSpPr>
+        <p:spPr/>
+        <p:txBody>
+          <a:bodyPr/>
+          <a:lstStyle/>
+          <a:p>
+            <a:pPr marL="0" indent="0">
+              <a:buNone/>
+            </a:pPr>
+            <a:endParaRPr lang="de-DE" dirty="0"/>
+          </a:p>
+        </p:txBody>
+      </p:sp>
+    </p:spTree>
+    <p:extLst>
+      <p:ext uri="{BB962C8B-B14F-4D97-AF65-F5344CB8AC3E}">
+        <p14:creationId xmlns:p14="http://schemas.microsoft.com/office/powerpoint/2010/main" val="81545675"/>
       </p:ext>
     </p:extLst>
   </p:cSld>

</xml_diff>

<commit_message>
Tag-3_2: Register and configure runners
</commit_message>
<xml_diff>
--- a/slides/Tag-3_2-GitLab-Runner-Container-Registry.pptx
+++ b/slides/Tag-3_2-GitLab-Runner-Container-Registry.pptx
@@ -13583,7 +13583,7 @@
               <a:rPr lang="de-DE" dirty="0">
                 <a:sym typeface="Wingdings" panose="05000000000000000000" pitchFamily="2" charset="2"/>
               </a:rPr>
-              <a:t> Runner (nicht Projekt Runner!) registrieren</a:t>
+              <a:t> Runner registrieren</a:t>
             </a:r>
           </a:p>
           <a:p>
@@ -15373,7 +15373,7 @@
             </a:r>
             <a:r>
               <a:rPr lang="de-DE" b="1" dirty="0"/>
-              <a:t> Runner (nicht Projekt Runner!) registrieren</a:t>
+              <a:t> Runner registrieren</a:t>
             </a:r>
           </a:p>
           <a:p>
@@ -15503,7 +15503,7 @@
             </a:r>
             <a:r>
               <a:rPr lang="de-DE" sz="2000" dirty="0"/>
-              <a:t> (Docker!) für den Runner angeben</a:t>
+              <a:t> (Shell, Docker, …) für den Runner angeben</a:t>
             </a:r>
           </a:p>
           <a:p>
@@ -15513,14 +15513,24 @@
             </a:pPr>
             <a:r>
               <a:rPr lang="de-DE" sz="2000" dirty="0"/>
+              <a:t>Falls Docker: </a:t>
+            </a:r>
+          </a:p>
+          <a:p>
+            <a:pPr marL="857250" lvl="1" indent="-457200">
+              <a:buFont typeface="Arial" panose="020B0604020202020204" pitchFamily="34" charset="0"/>
+              <a:buChar char="•"/>
+            </a:pPr>
+            <a:r>
+              <a:rPr lang="de-DE" sz="1600" dirty="0"/>
               <a:t>Standard Image angeben, welches genutzt werden soll, falls in .</a:t>
             </a:r>
             <a:r>
-              <a:rPr lang="de-DE" sz="2000" dirty="0" err="1"/>
+              <a:rPr lang="de-DE" sz="1600" dirty="0" err="1"/>
               <a:t>gitlab-ci.yml</a:t>
             </a:r>
             <a:r>
-              <a:rPr lang="de-DE" sz="2000" dirty="0"/>
+              <a:rPr lang="de-DE" sz="1600" dirty="0"/>
               <a:t> nichts definiert wurde</a:t>
             </a:r>
           </a:p>
@@ -28594,15 +28604,7 @@
             </a:pPr>
             <a:r>
               <a:rPr lang="de-DE" dirty="0"/>
-              <a:t>Erstellen Sie ihren ersten </a:t>
-            </a:r>
-            <a:r>
-              <a:rPr lang="de-DE"/>
-              <a:t>eigenen Group </a:t>
-            </a:r>
-            <a:r>
-              <a:rPr lang="de-DE" dirty="0"/>
-              <a:t>Runner.</a:t>
+              <a:t>Erstellen Sie ihren ersten eigenen Group Runner.</a:t>
             </a:r>
           </a:p>
           <a:p>
@@ -33004,6 +33006,36 @@
             <a:pPr marL="0" indent="0">
               <a:buNone/>
             </a:pPr>
+            <a:r>
+              <a:rPr lang="de-DE" dirty="0"/>
+              <a:t>Ist schon am Anfang beschrieben.</a:t>
+            </a:r>
+          </a:p>
+          <a:p>
+            <a:pPr marL="0" indent="0">
+              <a:buNone/>
+            </a:pPr>
+            <a:r>
+              <a:rPr lang="de-DE" dirty="0">
+                <a:hlinkClick r:id="rId3"/>
+              </a:rPr>
+              <a:t>https://docs.gitlab.com/runner/register/?tab=Linux</a:t>
+            </a:r>
+            <a:r>
+              <a:rPr lang="de-DE" dirty="0"/>
+              <a:t> </a:t>
+            </a:r>
+          </a:p>
+          <a:p>
+            <a:pPr marL="0" indent="0">
+              <a:buNone/>
+            </a:pPr>
+            <a:endParaRPr lang="de-DE" b="1" dirty="0"/>
+          </a:p>
+          <a:p>
+            <a:pPr marL="0" indent="0">
+              <a:buNone/>
+            </a:pPr>
             <a:endParaRPr lang="de-DE" b="1" dirty="0"/>
           </a:p>
         </p:txBody>
@@ -33556,6 +33588,54 @@
               <a:rPr lang="de-DE" b="1" dirty="0"/>
               <a:t>Runner konfigurieren</a:t>
             </a:r>
+          </a:p>
+          <a:p>
+            <a:pPr marL="0" indent="0">
+              <a:buNone/>
+            </a:pPr>
+            <a:r>
+              <a:rPr lang="de-DE" dirty="0"/>
+              <a:t>Wird durch das vorherige abgefrühstückt.</a:t>
+            </a:r>
+          </a:p>
+          <a:p>
+            <a:pPr marL="0" indent="0">
+              <a:buNone/>
+            </a:pPr>
+            <a:endParaRPr lang="de-DE" dirty="0"/>
+          </a:p>
+          <a:p>
+            <a:pPr marL="0" indent="0">
+              <a:buNone/>
+            </a:pPr>
+            <a:r>
+              <a:rPr lang="de-DE" dirty="0"/>
+              <a:t>Die Doku von </a:t>
+            </a:r>
+            <a:r>
+              <a:rPr lang="de-DE" dirty="0" err="1"/>
+              <a:t>GitLab</a:t>
+            </a:r>
+            <a:r>
+              <a:rPr lang="de-DE" dirty="0"/>
+              <a:t> selbst ist super lang:</a:t>
+            </a:r>
+          </a:p>
+          <a:p>
+            <a:pPr marL="0" indent="0">
+              <a:buNone/>
+            </a:pPr>
+            <a:r>
+              <a:rPr lang="de-DE">
+                <a:hlinkClick r:id="rId3"/>
+              </a:rPr>
+              <a:t>https://docs.gitlab.com/ee/ci/runners/configure_runners.html</a:t>
+            </a:r>
+            <a:r>
+              <a:rPr lang="de-DE"/>
+              <a:t> </a:t>
+            </a:r>
+            <a:endParaRPr lang="de-DE" dirty="0"/>
           </a:p>
           <a:p>
             <a:pPr marL="0" indent="0">

</xml_diff>

<commit_message>
Tag-3_2: Init Docker Registry
</commit_message>
<xml_diff>
--- a/slides/Tag-3_2-GitLab-Runner-Container-Registry.pptx
+++ b/slides/Tag-3_2-GitLab-Runner-Container-Registry.pptx
@@ -33626,16 +33626,15 @@
               <a:buNone/>
             </a:pPr>
             <a:r>
-              <a:rPr lang="de-DE">
+              <a:rPr lang="de-DE" dirty="0">
                 <a:hlinkClick r:id="rId3"/>
               </a:rPr>
               <a:t>https://docs.gitlab.com/ee/ci/runners/configure_runners.html</a:t>
             </a:r>
             <a:r>
-              <a:rPr lang="de-DE"/>
+              <a:rPr lang="de-DE" dirty="0"/>
               <a:t> </a:t>
             </a:r>
-            <a:endParaRPr lang="de-DE" dirty="0"/>
           </a:p>
           <a:p>
             <a:pPr marL="0" indent="0">
@@ -33777,34 +33776,113 @@
           </a:p>
         </p:txBody>
       </p:sp>
-      <p:sp>
-        <p:nvSpPr>
-          <p:cNvPr id="3" name="Inhaltsplatzhalter 2">
+      <p:pic>
+        <p:nvPicPr>
+          <p:cNvPr id="5" name="Inhaltsplatzhalter 4">
             <a:extLst>
               <a:ext uri="{FF2B5EF4-FFF2-40B4-BE49-F238E27FC236}">
-                <a16:creationId xmlns:a16="http://schemas.microsoft.com/office/drawing/2014/main" id="{2F072594-2447-5EB7-7AAF-47596D7C1121}"/>
+                <a16:creationId xmlns:a16="http://schemas.microsoft.com/office/drawing/2014/main" id="{E7C5BE06-2B92-CC8B-9154-47007ABBF34A}"/>
               </a:ext>
             </a:extLst>
           </p:cNvPr>
-          <p:cNvSpPr>
-            <a:spLocks noGrp="1"/>
-          </p:cNvSpPr>
+          <p:cNvPicPr>
+            <a:picLocks noGrp="1" noChangeAspect="1"/>
+          </p:cNvPicPr>
           <p:nvPr>
             <p:ph idx="1"/>
           </p:nvPr>
-        </p:nvSpPr>
-        <p:spPr/>
-        <p:txBody>
-          <a:bodyPr/>
-          <a:lstStyle/>
-          <a:p>
-            <a:pPr marL="0" indent="0">
-              <a:buNone/>
-            </a:pPr>
-            <a:endParaRPr lang="de-DE" dirty="0"/>
-          </a:p>
-        </p:txBody>
-      </p:sp>
+        </p:nvPicPr>
+        <p:blipFill>
+          <a:blip r:embed="rId2">
+            <a:extLst>
+              <a:ext uri="{28A0092B-C50C-407E-A947-70E740481C1C}">
+                <a14:useLocalDpi xmlns:a14="http://schemas.microsoft.com/office/drawing/2010/main" val="0"/>
+              </a:ext>
+            </a:extLst>
+          </a:blip>
+          <a:stretch>
+            <a:fillRect/>
+          </a:stretch>
+        </p:blipFill>
+        <p:spPr>
+          <a:xfrm>
+            <a:off x="-304800" y="2852936"/>
+            <a:ext cx="4876800" cy="4876800"/>
+          </a:xfrm>
+        </p:spPr>
+      </p:pic>
+      <p:pic>
+        <p:nvPicPr>
+          <p:cNvPr id="7" name="Grafik 6">
+            <a:extLst>
+              <a:ext uri="{FF2B5EF4-FFF2-40B4-BE49-F238E27FC236}">
+                <a16:creationId xmlns:a16="http://schemas.microsoft.com/office/drawing/2014/main" id="{BE9CCB7C-8C17-285C-7F88-68B9D147713B}"/>
+              </a:ext>
+            </a:extLst>
+          </p:cNvPr>
+          <p:cNvPicPr>
+            <a:picLocks noChangeAspect="1"/>
+          </p:cNvPicPr>
+          <p:nvPr/>
+        </p:nvPicPr>
+        <p:blipFill>
+          <a:blip r:embed="rId3">
+            <a:extLst>
+              <a:ext uri="{28A0092B-C50C-407E-A947-70E740481C1C}">
+                <a14:useLocalDpi xmlns:a14="http://schemas.microsoft.com/office/drawing/2010/main" val="0"/>
+              </a:ext>
+            </a:extLst>
+          </a:blip>
+          <a:stretch>
+            <a:fillRect/>
+          </a:stretch>
+        </p:blipFill>
+        <p:spPr>
+          <a:xfrm>
+            <a:off x="6948264" y="4221088"/>
+            <a:ext cx="1534942" cy="1412776"/>
+          </a:xfrm>
+          <a:prstGeom prst="rect">
+            <a:avLst/>
+          </a:prstGeom>
+        </p:spPr>
+      </p:pic>
+      <p:pic>
+        <p:nvPicPr>
+          <p:cNvPr id="9" name="Grafik 8">
+            <a:extLst>
+              <a:ext uri="{FF2B5EF4-FFF2-40B4-BE49-F238E27FC236}">
+                <a16:creationId xmlns:a16="http://schemas.microsoft.com/office/drawing/2014/main" id="{D8643DA2-0E30-D480-2AA8-859C9431F89F}"/>
+              </a:ext>
+            </a:extLst>
+          </p:cNvPr>
+          <p:cNvPicPr>
+            <a:picLocks noChangeAspect="1"/>
+          </p:cNvPicPr>
+          <p:nvPr/>
+        </p:nvPicPr>
+        <p:blipFill>
+          <a:blip r:embed="rId4">
+            <a:extLst>
+              <a:ext uri="{28A0092B-C50C-407E-A947-70E740481C1C}">
+                <a14:useLocalDpi xmlns:a14="http://schemas.microsoft.com/office/drawing/2010/main" val="0"/>
+              </a:ext>
+            </a:extLst>
+          </a:blip>
+          <a:stretch>
+            <a:fillRect/>
+          </a:stretch>
+        </p:blipFill>
+        <p:spPr>
+          <a:xfrm>
+            <a:off x="1379031" y="904567"/>
+            <a:ext cx="6336704" cy="3136668"/>
+          </a:xfrm>
+          <a:prstGeom prst="rect">
+            <a:avLst/>
+          </a:prstGeom>
+        </p:spPr>
+      </p:pic>
     </p:spTree>
     <p:extLst>
       <p:ext uri="{BB962C8B-B14F-4D97-AF65-F5344CB8AC3E}">

</xml_diff>

<commit_message>
Tag-3_2: GitLab Executors finished.
</commit_message>
<xml_diff>
--- a/slides/Tag-3_2-GitLab-Runner-Container-Registry.pptx
+++ b/slides/Tag-3_2-GitLab-Runner-Container-Registry.pptx
@@ -6,10 +6,10 @@
     <p:sldMasterId id="2147483649" r:id="rId2"/>
   </p:sldMasterIdLst>
   <p:notesMasterIdLst>
-    <p:notesMasterId r:id="rId86"/>
+    <p:notesMasterId r:id="rId99"/>
   </p:notesMasterIdLst>
   <p:handoutMasterIdLst>
-    <p:handoutMasterId r:id="rId87"/>
+    <p:handoutMasterId r:id="rId100"/>
   </p:handoutMasterIdLst>
   <p:sldIdLst>
     <p:sldId id="288" r:id="rId3"/>
@@ -91,10 +91,23 @@
     <p:sldId id="671" r:id="rId79"/>
     <p:sldId id="672" r:id="rId80"/>
     <p:sldId id="592" r:id="rId81"/>
-    <p:sldId id="593" r:id="rId82"/>
-    <p:sldId id="594" r:id="rId83"/>
-    <p:sldId id="597" r:id="rId84"/>
-    <p:sldId id="595" r:id="rId85"/>
+    <p:sldId id="594" r:id="rId82"/>
+    <p:sldId id="675" r:id="rId83"/>
+    <p:sldId id="676" r:id="rId84"/>
+    <p:sldId id="593" r:id="rId85"/>
+    <p:sldId id="678" r:id="rId86"/>
+    <p:sldId id="679" r:id="rId87"/>
+    <p:sldId id="680" r:id="rId88"/>
+    <p:sldId id="681" r:id="rId89"/>
+    <p:sldId id="682" r:id="rId90"/>
+    <p:sldId id="683" r:id="rId91"/>
+    <p:sldId id="684" r:id="rId92"/>
+    <p:sldId id="685" r:id="rId93"/>
+    <p:sldId id="686" r:id="rId94"/>
+    <p:sldId id="687" r:id="rId95"/>
+    <p:sldId id="677" r:id="rId96"/>
+    <p:sldId id="597" r:id="rId97"/>
+    <p:sldId id="595" r:id="rId98"/>
   </p:sldIdLst>
   <p:sldSz cx="9144000" cy="6858000" type="screen4x3"/>
   <p:notesSz cx="6784975" cy="9921875"/>
@@ -8264,7 +8277,7 @@
           <a:p>
             <a:r>
               <a:rPr lang="de-DE" dirty="0"/>
-              <a:t>https://docs.gitlab.com/runner/executors/</a:t>
+              <a:t>https://docs.gitlab.com/ee/ci/runners/configure_runners.html</a:t>
             </a:r>
           </a:p>
         </p:txBody>
@@ -8296,7 +8309,7 @@
     </p:spTree>
     <p:extLst>
       <p:ext uri="{BB962C8B-B14F-4D97-AF65-F5344CB8AC3E}">
-        <p14:creationId xmlns:p14="http://schemas.microsoft.com/office/powerpoint/2010/main" val="66240159"/>
+        <p14:creationId xmlns:p14="http://schemas.microsoft.com/office/powerpoint/2010/main" val="3430974287"/>
       </p:ext>
     </p:extLst>
   </p:cSld>
@@ -8350,10 +8363,7 @@
           <a:bodyPr/>
           <a:lstStyle/>
           <a:p>
-            <a:r>
-              <a:rPr lang="de-DE" dirty="0"/>
-              <a:t>https://docs.gitlab.com/ee/ci/runners/configure_runners.html</a:t>
-            </a:r>
+            <a:endParaRPr lang="de-DE" dirty="0"/>
           </a:p>
         </p:txBody>
       </p:sp>
@@ -8384,7 +8394,7 @@
     </p:spTree>
     <p:extLst>
       <p:ext uri="{BB962C8B-B14F-4D97-AF65-F5344CB8AC3E}">
-        <p14:creationId xmlns:p14="http://schemas.microsoft.com/office/powerpoint/2010/main" val="3430974287"/>
+        <p14:creationId xmlns:p14="http://schemas.microsoft.com/office/powerpoint/2010/main" val="374953982"/>
       </p:ext>
     </p:extLst>
   </p:cSld>
@@ -8473,6 +8483,267 @@
     <p:extLst>
       <p:ext uri="{BB962C8B-B14F-4D97-AF65-F5344CB8AC3E}">
         <p14:creationId xmlns:p14="http://schemas.microsoft.com/office/powerpoint/2010/main" val="2578003126"/>
+      </p:ext>
+    </p:extLst>
+  </p:cSld>
+  <p:clrMapOvr>
+    <a:masterClrMapping/>
+  </p:clrMapOvr>
+</p:notes>
+</file>
+
+<file path=ppt/notesSlides/notesSlide70.xml><?xml version="1.0" encoding="utf-8"?>
+<p:notes xmlns:a="http://schemas.openxmlformats.org/drawingml/2006/main" xmlns:r="http://schemas.openxmlformats.org/officeDocument/2006/relationships" xmlns:p="http://schemas.openxmlformats.org/presentationml/2006/main">
+  <p:cSld>
+    <p:spTree>
+      <p:nvGrpSpPr>
+        <p:cNvPr id="1" name=""/>
+        <p:cNvGrpSpPr/>
+        <p:nvPr/>
+      </p:nvGrpSpPr>
+      <p:grpSpPr>
+        <a:xfrm>
+          <a:off x="0" y="0"/>
+          <a:ext cx="0" cy="0"/>
+          <a:chOff x="0" y="0"/>
+          <a:chExt cx="0" cy="0"/>
+        </a:xfrm>
+      </p:grpSpPr>
+      <p:sp>
+        <p:nvSpPr>
+          <p:cNvPr id="2" name="Folienbildplatzhalter 1"/>
+          <p:cNvSpPr>
+            <a:spLocks noGrp="1" noRot="1" noChangeAspect="1"/>
+          </p:cNvSpPr>
+          <p:nvPr>
+            <p:ph type="sldImg"/>
+          </p:nvPr>
+        </p:nvSpPr>
+        <p:spPr/>
+      </p:sp>
+      <p:sp>
+        <p:nvSpPr>
+          <p:cNvPr id="3" name="Notizenplatzhalter 2"/>
+          <p:cNvSpPr>
+            <a:spLocks noGrp="1"/>
+          </p:cNvSpPr>
+          <p:nvPr>
+            <p:ph type="body" idx="1"/>
+          </p:nvPr>
+        </p:nvSpPr>
+        <p:spPr/>
+        <p:txBody>
+          <a:bodyPr/>
+          <a:lstStyle/>
+          <a:p>
+            <a:r>
+              <a:rPr lang="de-DE" dirty="0"/>
+              <a:t>https://medium.com/devops-with-valentine/a-brief-guide-to-gitlab-ci-runners-and-executors-a81b9b8bf24e</a:t>
+            </a:r>
+          </a:p>
+        </p:txBody>
+      </p:sp>
+      <p:sp>
+        <p:nvSpPr>
+          <p:cNvPr id="4" name="Foliennummernplatzhalter 3"/>
+          <p:cNvSpPr>
+            <a:spLocks noGrp="1"/>
+          </p:cNvSpPr>
+          <p:nvPr>
+            <p:ph type="sldNum" sz="quarter" idx="5"/>
+          </p:nvPr>
+        </p:nvSpPr>
+        <p:spPr/>
+        <p:txBody>
+          <a:bodyPr/>
+          <a:lstStyle/>
+          <a:p>
+            <a:fld id="{18182567-388C-4D33-8B7B-A651F195F118}" type="slidenum">
+              <a:rPr lang="de-DE" altLang="de-DE" smtClean="0"/>
+              <a:pPr/>
+              <a:t>82</a:t>
+            </a:fld>
+            <a:endParaRPr lang="de-DE" altLang="de-DE"/>
+          </a:p>
+        </p:txBody>
+      </p:sp>
+    </p:spTree>
+    <p:extLst>
+      <p:ext uri="{BB962C8B-B14F-4D97-AF65-F5344CB8AC3E}">
+        <p14:creationId xmlns:p14="http://schemas.microsoft.com/office/powerpoint/2010/main" val="4049035542"/>
+      </p:ext>
+    </p:extLst>
+  </p:cSld>
+  <p:clrMapOvr>
+    <a:masterClrMapping/>
+  </p:clrMapOvr>
+</p:notes>
+</file>
+
+<file path=ppt/notesSlides/notesSlide71.xml><?xml version="1.0" encoding="utf-8"?>
+<p:notes xmlns:a="http://schemas.openxmlformats.org/drawingml/2006/main" xmlns:r="http://schemas.openxmlformats.org/officeDocument/2006/relationships" xmlns:p="http://schemas.openxmlformats.org/presentationml/2006/main">
+  <p:cSld>
+    <p:spTree>
+      <p:nvGrpSpPr>
+        <p:cNvPr id="1" name=""/>
+        <p:cNvGrpSpPr/>
+        <p:nvPr/>
+      </p:nvGrpSpPr>
+      <p:grpSpPr>
+        <a:xfrm>
+          <a:off x="0" y="0"/>
+          <a:ext cx="0" cy="0"/>
+          <a:chOff x="0" y="0"/>
+          <a:chExt cx="0" cy="0"/>
+        </a:xfrm>
+      </p:grpSpPr>
+      <p:sp>
+        <p:nvSpPr>
+          <p:cNvPr id="2" name="Folienbildplatzhalter 1"/>
+          <p:cNvSpPr>
+            <a:spLocks noGrp="1" noRot="1" noChangeAspect="1"/>
+          </p:cNvSpPr>
+          <p:nvPr>
+            <p:ph type="sldImg"/>
+          </p:nvPr>
+        </p:nvSpPr>
+        <p:spPr/>
+      </p:sp>
+      <p:sp>
+        <p:nvSpPr>
+          <p:cNvPr id="3" name="Notizenplatzhalter 2"/>
+          <p:cNvSpPr>
+            <a:spLocks noGrp="1"/>
+          </p:cNvSpPr>
+          <p:nvPr>
+            <p:ph type="body" idx="1"/>
+          </p:nvPr>
+        </p:nvSpPr>
+        <p:spPr/>
+        <p:txBody>
+          <a:bodyPr/>
+          <a:lstStyle/>
+          <a:p>
+            <a:r>
+              <a:rPr lang="de-DE" dirty="0"/>
+              <a:t>https://docs.gitlab.com/runner/executors/</a:t>
+            </a:r>
+          </a:p>
+        </p:txBody>
+      </p:sp>
+      <p:sp>
+        <p:nvSpPr>
+          <p:cNvPr id="4" name="Foliennummernplatzhalter 3"/>
+          <p:cNvSpPr>
+            <a:spLocks noGrp="1"/>
+          </p:cNvSpPr>
+          <p:nvPr>
+            <p:ph type="sldNum" sz="quarter" idx="5"/>
+          </p:nvPr>
+        </p:nvSpPr>
+        <p:spPr/>
+        <p:txBody>
+          <a:bodyPr/>
+          <a:lstStyle/>
+          <a:p>
+            <a:fld id="{18182567-388C-4D33-8B7B-A651F195F118}" type="slidenum">
+              <a:rPr lang="de-DE" altLang="de-DE" smtClean="0"/>
+              <a:pPr/>
+              <a:t>83</a:t>
+            </a:fld>
+            <a:endParaRPr lang="de-DE" altLang="de-DE"/>
+          </a:p>
+        </p:txBody>
+      </p:sp>
+    </p:spTree>
+    <p:extLst>
+      <p:ext uri="{BB962C8B-B14F-4D97-AF65-F5344CB8AC3E}">
+        <p14:creationId xmlns:p14="http://schemas.microsoft.com/office/powerpoint/2010/main" val="66240159"/>
+      </p:ext>
+    </p:extLst>
+  </p:cSld>
+  <p:clrMapOvr>
+    <a:masterClrMapping/>
+  </p:clrMapOvr>
+</p:notes>
+</file>
+
+<file path=ppt/notesSlides/notesSlide72.xml><?xml version="1.0" encoding="utf-8"?>
+<p:notes xmlns:a="http://schemas.openxmlformats.org/drawingml/2006/main" xmlns:r="http://schemas.openxmlformats.org/officeDocument/2006/relationships" xmlns:p="http://schemas.openxmlformats.org/presentationml/2006/main">
+  <p:cSld>
+    <p:spTree>
+      <p:nvGrpSpPr>
+        <p:cNvPr id="1" name=""/>
+        <p:cNvGrpSpPr/>
+        <p:nvPr/>
+      </p:nvGrpSpPr>
+      <p:grpSpPr>
+        <a:xfrm>
+          <a:off x="0" y="0"/>
+          <a:ext cx="0" cy="0"/>
+          <a:chOff x="0" y="0"/>
+          <a:chExt cx="0" cy="0"/>
+        </a:xfrm>
+      </p:grpSpPr>
+      <p:sp>
+        <p:nvSpPr>
+          <p:cNvPr id="2" name="Folienbildplatzhalter 1"/>
+          <p:cNvSpPr>
+            <a:spLocks noGrp="1" noRot="1" noChangeAspect="1"/>
+          </p:cNvSpPr>
+          <p:nvPr>
+            <p:ph type="sldImg"/>
+          </p:nvPr>
+        </p:nvSpPr>
+        <p:spPr/>
+      </p:sp>
+      <p:sp>
+        <p:nvSpPr>
+          <p:cNvPr id="3" name="Notizenplatzhalter 2"/>
+          <p:cNvSpPr>
+            <a:spLocks noGrp="1"/>
+          </p:cNvSpPr>
+          <p:nvPr>
+            <p:ph type="body" idx="1"/>
+          </p:nvPr>
+        </p:nvSpPr>
+        <p:spPr/>
+        <p:txBody>
+          <a:bodyPr/>
+          <a:lstStyle/>
+          <a:p>
+            <a:endParaRPr lang="de-DE" dirty="0"/>
+          </a:p>
+        </p:txBody>
+      </p:sp>
+      <p:sp>
+        <p:nvSpPr>
+          <p:cNvPr id="4" name="Foliennummernplatzhalter 3"/>
+          <p:cNvSpPr>
+            <a:spLocks noGrp="1"/>
+          </p:cNvSpPr>
+          <p:nvPr>
+            <p:ph type="sldNum" sz="quarter" idx="5"/>
+          </p:nvPr>
+        </p:nvSpPr>
+        <p:spPr/>
+        <p:txBody>
+          <a:bodyPr/>
+          <a:lstStyle/>
+          <a:p>
+            <a:fld id="{18182567-388C-4D33-8B7B-A651F195F118}" type="slidenum">
+              <a:rPr lang="de-DE" altLang="de-DE" smtClean="0"/>
+              <a:pPr/>
+              <a:t>92</a:t>
+            </a:fld>
+            <a:endParaRPr lang="de-DE" altLang="de-DE"/>
+          </a:p>
+        </p:txBody>
+      </p:sp>
+    </p:spTree>
+    <p:extLst>
+      <p:ext uri="{BB962C8B-B14F-4D97-AF65-F5344CB8AC3E}">
+        <p14:creationId xmlns:p14="http://schemas.microsoft.com/office/powerpoint/2010/main" val="3474372093"/>
       </p:ext>
     </p:extLst>
   </p:cSld>
@@ -9194,7 +9465,7 @@
               <a:pPr algn="ctr">
                 <a:defRPr/>
               </a:pPr>
-              <a:t>28.05.2024</a:t>
+              <a:t>29.05.2024</a:t>
             </a:fld>
             <a:endParaRPr lang="de-DE" sz="1000">
               <a:solidFill>
@@ -31872,7 +32143,10 @@
               <a:rPr lang="de-DE" dirty="0" err="1"/>
               <a:t>GitLab</a:t>
             </a:r>
-            <a:endParaRPr lang="de-DE" dirty="0"/>
+            <a:r>
+              <a:rPr lang="de-DE" dirty="0"/>
+              <a:t> Runner</a:t>
+            </a:r>
           </a:p>
         </p:txBody>
       </p:sp>
@@ -32350,7 +32624,7 @@
 </file>
 
 <file path=ppt/slides/slide76.xml><?xml version="1.0" encoding="utf-8"?>
-<p:sld xmlns:a="http://schemas.openxmlformats.org/drawingml/2006/main" xmlns:r="http://schemas.openxmlformats.org/officeDocument/2006/relationships" xmlns:p="http://schemas.openxmlformats.org/presentationml/2006/main">
+<p:sld xmlns:a="http://schemas.openxmlformats.org/drawingml/2006/main" xmlns:r="http://schemas.openxmlformats.org/officeDocument/2006/relationships" xmlns:p="http://schemas.openxmlformats.org/presentationml/2006/main" show="0">
   <p:cSld>
     <p:spTree>
       <p:nvGrpSpPr>
@@ -32551,7 +32825,7 @@
 </file>
 
 <file path=ppt/slides/slide77.xml><?xml version="1.0" encoding="utf-8"?>
-<p:sld xmlns:a="http://schemas.openxmlformats.org/drawingml/2006/main" xmlns:r="http://schemas.openxmlformats.org/officeDocument/2006/relationships" xmlns:p="http://schemas.openxmlformats.org/presentationml/2006/main">
+<p:sld xmlns:a="http://schemas.openxmlformats.org/drawingml/2006/main" xmlns:r="http://schemas.openxmlformats.org/officeDocument/2006/relationships" xmlns:p="http://schemas.openxmlformats.org/presentationml/2006/main" show="0">
   <p:cSld>
     <p:spTree>
       <p:nvGrpSpPr>
@@ -32802,7 +33076,7 @@
 </file>
 
 <file path=ppt/slides/slide78.xml><?xml version="1.0" encoding="utf-8"?>
-<p:sld xmlns:a="http://schemas.openxmlformats.org/drawingml/2006/main" xmlns:r="http://schemas.openxmlformats.org/officeDocument/2006/relationships" xmlns:p="http://schemas.openxmlformats.org/presentationml/2006/main">
+<p:sld xmlns:a="http://schemas.openxmlformats.org/drawingml/2006/main" xmlns:r="http://schemas.openxmlformats.org/officeDocument/2006/relationships" xmlns:p="http://schemas.openxmlformats.org/presentationml/2006/main" show="0">
   <p:cSld>
     <p:spTree>
       <p:nvGrpSpPr>
@@ -32925,7 +33199,7 @@
 </file>
 
 <file path=ppt/slides/slide79.xml><?xml version="1.0" encoding="utf-8"?>
-<p:sld xmlns:a="http://schemas.openxmlformats.org/drawingml/2006/main" xmlns:r="http://schemas.openxmlformats.org/officeDocument/2006/relationships" xmlns:p="http://schemas.openxmlformats.org/presentationml/2006/main">
+<p:sld xmlns:a="http://schemas.openxmlformats.org/drawingml/2006/main" xmlns:r="http://schemas.openxmlformats.org/officeDocument/2006/relationships" xmlns:p="http://schemas.openxmlformats.org/presentationml/2006/main" show="0">
   <p:cSld>
     <p:spTree>
       <p:nvGrpSpPr>
@@ -33418,7 +33692,7 @@
 </file>
 
 <file path=ppt/slides/slide80.xml><?xml version="1.0" encoding="utf-8"?>
-<p:sld xmlns:a="http://schemas.openxmlformats.org/drawingml/2006/main" xmlns:r="http://schemas.openxmlformats.org/officeDocument/2006/relationships" xmlns:p="http://schemas.openxmlformats.org/presentationml/2006/main">
+<p:sld xmlns:a="http://schemas.openxmlformats.org/drawingml/2006/main" xmlns:r="http://schemas.openxmlformats.org/officeDocument/2006/relationships" xmlns:p="http://schemas.openxmlformats.org/presentationml/2006/main" show="0">
   <p:cSld>
     <p:spTree>
       <p:nvGrpSpPr>
@@ -33491,9 +33765,61 @@
               <a:buNone/>
             </a:pPr>
             <a:r>
-              <a:rPr lang="de-DE" b="1" dirty="0" err="1"/>
-              <a:t>Executors</a:t>
-            </a:r>
+              <a:rPr lang="de-DE" b="1" dirty="0"/>
+              <a:t>Runner konfigurieren</a:t>
+            </a:r>
+          </a:p>
+          <a:p>
+            <a:pPr marL="0" indent="0">
+              <a:buNone/>
+            </a:pPr>
+            <a:r>
+              <a:rPr lang="de-DE" dirty="0"/>
+              <a:t>Wird durch das vorherige abgefrühstückt.</a:t>
+            </a:r>
+          </a:p>
+          <a:p>
+            <a:pPr marL="0" indent="0">
+              <a:buNone/>
+            </a:pPr>
+            <a:endParaRPr lang="de-DE" dirty="0"/>
+          </a:p>
+          <a:p>
+            <a:pPr marL="0" indent="0">
+              <a:buNone/>
+            </a:pPr>
+            <a:r>
+              <a:rPr lang="de-DE" dirty="0"/>
+              <a:t>Die Doku von </a:t>
+            </a:r>
+            <a:r>
+              <a:rPr lang="de-DE" dirty="0" err="1"/>
+              <a:t>GitLab</a:t>
+            </a:r>
+            <a:r>
+              <a:rPr lang="de-DE" dirty="0"/>
+              <a:t> selbst ist super lang:</a:t>
+            </a:r>
+          </a:p>
+          <a:p>
+            <a:pPr marL="0" indent="0">
+              <a:buNone/>
+            </a:pPr>
+            <a:r>
+              <a:rPr lang="de-DE" dirty="0">
+                <a:hlinkClick r:id="rId3"/>
+              </a:rPr>
+              <a:t>https://docs.gitlab.com/ee/ci/runners/configure_runners.html</a:t>
+            </a:r>
+            <a:r>
+              <a:rPr lang="de-DE" dirty="0"/>
+              <a:t> </a:t>
+            </a:r>
+          </a:p>
+          <a:p>
+            <a:pPr marL="0" indent="0">
+              <a:buNone/>
+            </a:pPr>
             <a:endParaRPr lang="de-DE" b="1" dirty="0"/>
           </a:p>
         </p:txBody>
@@ -33501,7 +33827,7 @@
     </p:spTree>
     <p:extLst>
       <p:ext uri="{BB962C8B-B14F-4D97-AF65-F5344CB8AC3E}">
-        <p14:creationId xmlns:p14="http://schemas.microsoft.com/office/powerpoint/2010/main" val="949730093"/>
+        <p14:creationId xmlns:p14="http://schemas.microsoft.com/office/powerpoint/2010/main" val="2185810072"/>
       </p:ext>
     </p:extLst>
   </p:cSld>
@@ -33533,7 +33859,7 @@
           <p:cNvPr id="2" name="Titel 1">
             <a:extLst>
               <a:ext uri="{FF2B5EF4-FFF2-40B4-BE49-F238E27FC236}">
-                <a16:creationId xmlns:a16="http://schemas.microsoft.com/office/drawing/2014/main" id="{2B9F73D1-0616-0915-95E4-06CBA79315C7}"/>
+                <a16:creationId xmlns:a16="http://schemas.microsoft.com/office/drawing/2014/main" id="{F623803F-97C3-215D-E258-C690188E9BEA}"/>
               </a:ext>
             </a:extLst>
           </p:cNvPr>
@@ -33560,94 +33886,45 @@
           </a:p>
         </p:txBody>
       </p:sp>
-      <p:sp>
-        <p:nvSpPr>
-          <p:cNvPr id="3" name="Inhaltsplatzhalter 2">
+      <p:pic>
+        <p:nvPicPr>
+          <p:cNvPr id="5" name="Inhaltsplatzhalter 4">
             <a:extLst>
               <a:ext uri="{FF2B5EF4-FFF2-40B4-BE49-F238E27FC236}">
-                <a16:creationId xmlns:a16="http://schemas.microsoft.com/office/drawing/2014/main" id="{3CE2D11A-801F-CE1E-A418-D35676D404C3}"/>
+                <a16:creationId xmlns:a16="http://schemas.microsoft.com/office/drawing/2014/main" id="{B86BA6BA-3FD2-ABE6-6FE6-D787A1D68992}"/>
               </a:ext>
             </a:extLst>
           </p:cNvPr>
-          <p:cNvSpPr>
-            <a:spLocks noGrp="1"/>
-          </p:cNvSpPr>
+          <p:cNvPicPr>
+            <a:picLocks noGrp="1" noChangeAspect="1"/>
+          </p:cNvPicPr>
           <p:nvPr>
             <p:ph idx="1"/>
           </p:nvPr>
-        </p:nvSpPr>
-        <p:spPr/>
-        <p:txBody>
-          <a:bodyPr/>
-          <a:lstStyle/>
-          <a:p>
-            <a:pPr marL="0" indent="0">
-              <a:buNone/>
-            </a:pPr>
-            <a:r>
-              <a:rPr lang="de-DE" b="1" dirty="0"/>
-              <a:t>Runner konfigurieren</a:t>
-            </a:r>
-          </a:p>
-          <a:p>
-            <a:pPr marL="0" indent="0">
-              <a:buNone/>
-            </a:pPr>
-            <a:r>
-              <a:rPr lang="de-DE" dirty="0"/>
-              <a:t>Wird durch das vorherige abgefrühstückt.</a:t>
-            </a:r>
-          </a:p>
-          <a:p>
-            <a:pPr marL="0" indent="0">
-              <a:buNone/>
-            </a:pPr>
-            <a:endParaRPr lang="de-DE" dirty="0"/>
-          </a:p>
-          <a:p>
-            <a:pPr marL="0" indent="0">
-              <a:buNone/>
-            </a:pPr>
-            <a:r>
-              <a:rPr lang="de-DE" dirty="0"/>
-              <a:t>Die Doku von </a:t>
-            </a:r>
-            <a:r>
-              <a:rPr lang="de-DE" dirty="0" err="1"/>
-              <a:t>GitLab</a:t>
-            </a:r>
-            <a:r>
-              <a:rPr lang="de-DE" dirty="0"/>
-              <a:t> selbst ist super lang:</a:t>
-            </a:r>
-          </a:p>
-          <a:p>
-            <a:pPr marL="0" indent="0">
-              <a:buNone/>
-            </a:pPr>
-            <a:r>
-              <a:rPr lang="de-DE" dirty="0">
-                <a:hlinkClick r:id="rId3"/>
-              </a:rPr>
-              <a:t>https://docs.gitlab.com/ee/ci/runners/configure_runners.html</a:t>
-            </a:r>
-            <a:r>
-              <a:rPr lang="de-DE" dirty="0"/>
-              <a:t> </a:t>
-            </a:r>
-          </a:p>
-          <a:p>
-            <a:pPr marL="0" indent="0">
-              <a:buNone/>
-            </a:pPr>
-            <a:endParaRPr lang="de-DE" b="1" dirty="0"/>
-          </a:p>
-        </p:txBody>
-      </p:sp>
+        </p:nvPicPr>
+        <p:blipFill>
+          <a:blip r:embed="rId3">
+            <a:extLst>
+              <a:ext uri="{28A0092B-C50C-407E-A947-70E740481C1C}">
+                <a14:useLocalDpi xmlns:a14="http://schemas.microsoft.com/office/drawing/2010/main" val="0"/>
+              </a:ext>
+            </a:extLst>
+          </a:blip>
+          <a:stretch>
+            <a:fillRect/>
+          </a:stretch>
+        </p:blipFill>
+        <p:spPr>
+          <a:xfrm>
+            <a:off x="1265882" y="1268760"/>
+            <a:ext cx="6612235" cy="4915095"/>
+          </a:xfrm>
+        </p:spPr>
+      </p:pic>
     </p:spTree>
     <p:extLst>
       <p:ext uri="{BB962C8B-B14F-4D97-AF65-F5344CB8AC3E}">
-        <p14:creationId xmlns:p14="http://schemas.microsoft.com/office/powerpoint/2010/main" val="2185810072"/>
+        <p14:creationId xmlns:p14="http://schemas.microsoft.com/office/powerpoint/2010/main" val="1805919786"/>
       </p:ext>
     </p:extLst>
   </p:cSld>
@@ -33676,7 +33953,13 @@
       </p:grpSpPr>
       <p:sp>
         <p:nvSpPr>
-          <p:cNvPr id="2" name="Titel 1"/>
+          <p:cNvPr id="2" name="Titel 1">
+            <a:extLst>
+              <a:ext uri="{FF2B5EF4-FFF2-40B4-BE49-F238E27FC236}">
+                <a16:creationId xmlns:a16="http://schemas.microsoft.com/office/drawing/2014/main" id="{F7186B53-37C6-EDAC-E1C8-DF765FA8A6F7}"/>
+              </a:ext>
+            </a:extLst>
+          </p:cNvPr>
           <p:cNvSpPr>
             <a:spLocks noGrp="1"/>
           </p:cNvSpPr>
@@ -33690,20 +33973,30 @@
           <a:lstStyle/>
           <a:p>
             <a:r>
-              <a:rPr lang="de-DE" cap="none" dirty="0"/>
-              <a:t>Container/Docker Registry</a:t>
+              <a:rPr lang="de-DE" dirty="0" err="1"/>
+              <a:t>GitLab</a:t>
+            </a:r>
+            <a:r>
+              <a:rPr lang="de-DE" dirty="0"/>
+              <a:t> Runner</a:t>
             </a:r>
           </a:p>
         </p:txBody>
       </p:sp>
       <p:sp>
         <p:nvSpPr>
-          <p:cNvPr id="3" name="Untertitel 2"/>
+          <p:cNvPr id="3" name="Inhaltsplatzhalter 2">
+            <a:extLst>
+              <a:ext uri="{FF2B5EF4-FFF2-40B4-BE49-F238E27FC236}">
+                <a16:creationId xmlns:a16="http://schemas.microsoft.com/office/drawing/2014/main" id="{95B7C673-EB6A-3A77-468D-D3FD88DBCE11}"/>
+              </a:ext>
+            </a:extLst>
+          </p:cNvPr>
           <p:cNvSpPr>
             <a:spLocks noGrp="1"/>
           </p:cNvSpPr>
           <p:nvPr>
-            <p:ph type="body" idx="1"/>
+            <p:ph idx="1"/>
           </p:nvPr>
         </p:nvSpPr>
         <p:spPr/>
@@ -33711,9 +34004,168 @@
           <a:bodyPr/>
           <a:lstStyle/>
           <a:p>
-            <a:r>
-              <a:rPr lang="de-DE" dirty="0"/>
-              <a:t>Grundlagen von</a:t>
+            <a:pPr marL="0" indent="0">
+              <a:buNone/>
+            </a:pPr>
+            <a:r>
+              <a:rPr lang="de-DE" b="1" dirty="0"/>
+              <a:t>TL;DR</a:t>
+            </a:r>
+          </a:p>
+          <a:p>
+            <a:pPr>
+              <a:buFont typeface="Arial" panose="020B0604020202020204" pitchFamily="34" charset="0"/>
+              <a:buChar char="•"/>
+            </a:pPr>
+            <a:r>
+              <a:rPr lang="de-DE" u="sng" dirty="0" err="1"/>
+              <a:t>GitLab</a:t>
+            </a:r>
+            <a:r>
+              <a:rPr lang="de-DE" u="sng" dirty="0"/>
+              <a:t> Job</a:t>
+            </a:r>
+          </a:p>
+          <a:p>
+            <a:pPr lvl="1">
+              <a:buFont typeface="Arial" panose="020B0604020202020204" pitchFamily="34" charset="0"/>
+              <a:buChar char="•"/>
+            </a:pPr>
+            <a:r>
+              <a:rPr lang="de-DE" dirty="0"/>
+              <a:t>Kleinste Komponente einer Pipeline</a:t>
+            </a:r>
+          </a:p>
+          <a:p>
+            <a:pPr lvl="1">
+              <a:buFont typeface="Arial" panose="020B0604020202020204" pitchFamily="34" charset="0"/>
+              <a:buChar char="•"/>
+            </a:pPr>
+            <a:r>
+              <a:rPr lang="de-DE" dirty="0"/>
+              <a:t>Besteht aus 1-n Befehlen, welche ausgeführt werden sollen</a:t>
+            </a:r>
+          </a:p>
+          <a:p>
+            <a:pPr>
+              <a:buFont typeface="Arial" panose="020B0604020202020204" pitchFamily="34" charset="0"/>
+              <a:buChar char="•"/>
+            </a:pPr>
+            <a:r>
+              <a:rPr lang="de-DE" u="sng" dirty="0" err="1"/>
+              <a:t>GitLab</a:t>
+            </a:r>
+            <a:r>
+              <a:rPr lang="de-DE" u="sng" dirty="0"/>
+              <a:t> Runner</a:t>
+            </a:r>
+          </a:p>
+          <a:p>
+            <a:pPr lvl="1">
+              <a:buFont typeface="Arial" panose="020B0604020202020204" pitchFamily="34" charset="0"/>
+              <a:buChar char="•"/>
+            </a:pPr>
+            <a:r>
+              <a:rPr lang="de-DE" dirty="0"/>
+              <a:t>Ein „</a:t>
+            </a:r>
+            <a:r>
+              <a:rPr lang="de-DE" dirty="0" err="1"/>
+              <a:t>agent</a:t>
+            </a:r>
+            <a:r>
+              <a:rPr lang="de-DE" dirty="0"/>
+              <a:t>“ installiert, (meist) auf einem anderen Server, als der </a:t>
+            </a:r>
+            <a:r>
+              <a:rPr lang="de-DE" dirty="0" err="1"/>
+              <a:t>GitLab</a:t>
+            </a:r>
+            <a:r>
+              <a:rPr lang="de-DE" dirty="0"/>
+              <a:t> Server</a:t>
+            </a:r>
+          </a:p>
+          <a:p>
+            <a:pPr lvl="1">
+              <a:buFont typeface="Arial" panose="020B0604020202020204" pitchFamily="34" charset="0"/>
+              <a:buChar char="•"/>
+            </a:pPr>
+            <a:r>
+              <a:rPr lang="de-DE" dirty="0"/>
+              <a:t>Erhält Anweisungen vom </a:t>
+            </a:r>
+            <a:r>
+              <a:rPr lang="de-DE" dirty="0" err="1"/>
+              <a:t>GitLab</a:t>
+            </a:r>
+            <a:r>
+              <a:rPr lang="de-DE" dirty="0"/>
+              <a:t> Server, welcher </a:t>
+            </a:r>
+            <a:r>
+              <a:rPr lang="de-DE" dirty="0" err="1"/>
+              <a:t>GitLab</a:t>
+            </a:r>
+            <a:r>
+              <a:rPr lang="de-DE" dirty="0"/>
+              <a:t> Job ausgeführt werden soll</a:t>
+            </a:r>
+          </a:p>
+          <a:p>
+            <a:pPr>
+              <a:buFont typeface="Arial" panose="020B0604020202020204" pitchFamily="34" charset="0"/>
+              <a:buChar char="•"/>
+            </a:pPr>
+            <a:r>
+              <a:rPr lang="de-DE" u="sng" dirty="0"/>
+              <a:t>Runner </a:t>
+            </a:r>
+            <a:r>
+              <a:rPr lang="de-DE" u="sng" dirty="0" err="1"/>
+              <a:t>Executor</a:t>
+            </a:r>
+            <a:endParaRPr lang="de-DE" u="sng" dirty="0"/>
+          </a:p>
+          <a:p>
+            <a:pPr lvl="1">
+              <a:buFont typeface="Arial" panose="020B0604020202020204" pitchFamily="34" charset="0"/>
+              <a:buChar char="•"/>
+            </a:pPr>
+            <a:r>
+              <a:rPr lang="de-DE" dirty="0"/>
+              <a:t>Jeder Runner hat mindestens einen </a:t>
+            </a:r>
+            <a:r>
+              <a:rPr lang="de-DE" dirty="0" err="1"/>
+              <a:t>Executor</a:t>
+            </a:r>
+            <a:endParaRPr lang="de-DE" dirty="0"/>
+          </a:p>
+          <a:p>
+            <a:pPr lvl="1">
+              <a:buFont typeface="Arial" panose="020B0604020202020204" pitchFamily="34" charset="0"/>
+              <a:buChar char="•"/>
+            </a:pPr>
+            <a:r>
+              <a:rPr lang="de-DE" dirty="0"/>
+              <a:t>Ein </a:t>
+            </a:r>
+            <a:r>
+              <a:rPr lang="de-DE" dirty="0" err="1"/>
+              <a:t>Executor</a:t>
+            </a:r>
+            <a:r>
+              <a:rPr lang="de-DE" dirty="0"/>
+              <a:t> ist die Umgebung, in der der </a:t>
+            </a:r>
+            <a:r>
+              <a:rPr lang="de-DE" dirty="0" err="1"/>
+              <a:t>GitLab</a:t>
+            </a:r>
+            <a:r>
+              <a:rPr lang="de-DE" dirty="0"/>
+              <a:t> Job ausgeführt wird.</a:t>
             </a:r>
           </a:p>
         </p:txBody>
@@ -33721,7 +34173,7 @@
     </p:spTree>
     <p:extLst>
       <p:ext uri="{BB962C8B-B14F-4D97-AF65-F5344CB8AC3E}">
-        <p14:creationId xmlns:p14="http://schemas.microsoft.com/office/powerpoint/2010/main" val="2809021556"/>
+        <p14:creationId xmlns:p14="http://schemas.microsoft.com/office/powerpoint/2010/main" val="1520276084"/>
       </p:ext>
     </p:extLst>
   </p:cSld>
@@ -33753,7 +34205,7 @@
           <p:cNvPr id="2" name="Titel 1">
             <a:extLst>
               <a:ext uri="{FF2B5EF4-FFF2-40B4-BE49-F238E27FC236}">
-                <a16:creationId xmlns:a16="http://schemas.microsoft.com/office/drawing/2014/main" id="{25E7C6E1-B055-3AFC-5E69-1173C8DA414C}"/>
+                <a16:creationId xmlns:a16="http://schemas.microsoft.com/office/drawing/2014/main" id="{2B9F73D1-0616-0915-95E4-06CBA79315C7}"/>
               </a:ext>
             </a:extLst>
           </p:cNvPr>
@@ -33770,123 +34222,1622 @@
           <a:lstStyle/>
           <a:p>
             <a:r>
-              <a:rPr lang="de-DE" dirty="0"/>
-              <a:t>Container Registry</a:t>
+              <a:rPr lang="de-DE" dirty="0" err="1"/>
+              <a:t>GitLab</a:t>
+            </a:r>
+            <a:r>
+              <a:rPr lang="de-DE" dirty="0"/>
+              <a:t> Runner</a:t>
             </a:r>
           </a:p>
         </p:txBody>
       </p:sp>
-      <p:pic>
-        <p:nvPicPr>
-          <p:cNvPr id="5" name="Inhaltsplatzhalter 4">
+      <p:sp>
+        <p:nvSpPr>
+          <p:cNvPr id="3" name="Inhaltsplatzhalter 2">
             <a:extLst>
               <a:ext uri="{FF2B5EF4-FFF2-40B4-BE49-F238E27FC236}">
-                <a16:creationId xmlns:a16="http://schemas.microsoft.com/office/drawing/2014/main" id="{E7C5BE06-2B92-CC8B-9154-47007ABBF34A}"/>
+                <a16:creationId xmlns:a16="http://schemas.microsoft.com/office/drawing/2014/main" id="{3CE2D11A-801F-CE1E-A418-D35676D404C3}"/>
               </a:ext>
             </a:extLst>
           </p:cNvPr>
-          <p:cNvPicPr>
-            <a:picLocks noGrp="1" noChangeAspect="1"/>
-          </p:cNvPicPr>
+          <p:cNvSpPr>
+            <a:spLocks noGrp="1"/>
+          </p:cNvSpPr>
           <p:nvPr>
             <p:ph idx="1"/>
           </p:nvPr>
-        </p:nvPicPr>
-        <p:blipFill>
-          <a:blip r:embed="rId2">
-            <a:extLst>
-              <a:ext uri="{28A0092B-C50C-407E-A947-70E740481C1C}">
-                <a14:useLocalDpi xmlns:a14="http://schemas.microsoft.com/office/drawing/2010/main" val="0"/>
-              </a:ext>
-            </a:extLst>
-          </a:blip>
-          <a:stretch>
-            <a:fillRect/>
-          </a:stretch>
-        </p:blipFill>
-        <p:spPr>
-          <a:xfrm>
-            <a:off x="-304800" y="2852936"/>
-            <a:ext cx="4876800" cy="4876800"/>
-          </a:xfrm>
-        </p:spPr>
-      </p:pic>
-      <p:pic>
-        <p:nvPicPr>
-          <p:cNvPr id="7" name="Grafik 6">
+        </p:nvSpPr>
+        <p:spPr/>
+        <p:txBody>
+          <a:bodyPr/>
+          <a:lstStyle/>
+          <a:p>
+            <a:pPr marL="0" indent="0">
+              <a:buNone/>
+            </a:pPr>
+            <a:r>
+              <a:rPr lang="de-DE" b="1" dirty="0" err="1"/>
+              <a:t>Executors</a:t>
+            </a:r>
+            <a:endParaRPr lang="de-DE" b="1" dirty="0"/>
+          </a:p>
+          <a:p>
+            <a:pPr>
+              <a:buFont typeface="Arial" panose="020B0604020202020204" pitchFamily="34" charset="0"/>
+              <a:buChar char="•"/>
+            </a:pPr>
+            <a:r>
+              <a:rPr lang="de-DE" dirty="0"/>
+              <a:t>Verschiedene </a:t>
+            </a:r>
+            <a:r>
+              <a:rPr lang="de-DE" dirty="0" err="1"/>
+              <a:t>Executors</a:t>
+            </a:r>
+            <a:r>
+              <a:rPr lang="de-DE" dirty="0"/>
+              <a:t> sind in </a:t>
+            </a:r>
+            <a:r>
+              <a:rPr lang="de-DE" dirty="0" err="1"/>
+              <a:t>GitLab</a:t>
+            </a:r>
+            <a:r>
+              <a:rPr lang="de-DE" dirty="0"/>
+              <a:t> verfügbar</a:t>
+            </a:r>
+          </a:p>
+          <a:p>
+            <a:pPr lvl="1">
+              <a:buFont typeface="Arial" panose="020B0604020202020204" pitchFamily="34" charset="0"/>
+              <a:buChar char="•"/>
+            </a:pPr>
+            <a:r>
+              <a:rPr lang="de-DE" dirty="0"/>
+              <a:t>Shell</a:t>
+            </a:r>
+          </a:p>
+          <a:p>
+            <a:pPr lvl="1">
+              <a:buFont typeface="Arial" panose="020B0604020202020204" pitchFamily="34" charset="0"/>
+              <a:buChar char="•"/>
+            </a:pPr>
+            <a:r>
+              <a:rPr lang="de-DE" dirty="0"/>
+              <a:t>SSH</a:t>
+            </a:r>
+          </a:p>
+          <a:p>
+            <a:pPr lvl="1">
+              <a:buFont typeface="Arial" panose="020B0604020202020204" pitchFamily="34" charset="0"/>
+              <a:buChar char="•"/>
+            </a:pPr>
+            <a:r>
+              <a:rPr lang="de-DE" dirty="0"/>
+              <a:t>VirtualBox</a:t>
+            </a:r>
+          </a:p>
+          <a:p>
+            <a:pPr lvl="1">
+              <a:buFont typeface="Arial" panose="020B0604020202020204" pitchFamily="34" charset="0"/>
+              <a:buChar char="•"/>
+            </a:pPr>
+            <a:r>
+              <a:rPr lang="de-DE" dirty="0"/>
+              <a:t>Parallels</a:t>
+            </a:r>
+          </a:p>
+          <a:p>
+            <a:pPr lvl="1">
+              <a:buFont typeface="Arial" panose="020B0604020202020204" pitchFamily="34" charset="0"/>
+              <a:buChar char="•"/>
+            </a:pPr>
+            <a:r>
+              <a:rPr lang="de-DE" dirty="0"/>
+              <a:t>Docker</a:t>
+            </a:r>
+          </a:p>
+          <a:p>
+            <a:pPr lvl="2">
+              <a:buFont typeface="Arial" panose="020B0604020202020204" pitchFamily="34" charset="0"/>
+              <a:buChar char="•"/>
+            </a:pPr>
+            <a:r>
+              <a:rPr lang="de-DE" sz="1800" dirty="0"/>
+              <a:t>Docker </a:t>
+            </a:r>
+            <a:r>
+              <a:rPr lang="de-DE" sz="1800" dirty="0" err="1"/>
+              <a:t>Machine</a:t>
+            </a:r>
+            <a:endParaRPr lang="de-DE" sz="1800" dirty="0"/>
+          </a:p>
+          <a:p>
+            <a:pPr lvl="1">
+              <a:buFont typeface="Arial" panose="020B0604020202020204" pitchFamily="34" charset="0"/>
+              <a:buChar char="•"/>
+            </a:pPr>
+            <a:r>
+              <a:rPr lang="de-DE" dirty="0" err="1"/>
+              <a:t>Kubernetes</a:t>
+            </a:r>
+            <a:endParaRPr lang="de-DE" dirty="0"/>
+          </a:p>
+          <a:p>
+            <a:pPr>
+              <a:buFont typeface="Arial" panose="020B0604020202020204" pitchFamily="34" charset="0"/>
+              <a:buChar char="•"/>
+            </a:pPr>
+            <a:r>
+              <a:rPr lang="de-DE" dirty="0" err="1"/>
+              <a:t>Executor</a:t>
+            </a:r>
+            <a:r>
+              <a:rPr lang="de-DE" dirty="0"/>
+              <a:t> ist abhängig vom Use Case!</a:t>
+            </a:r>
+          </a:p>
+          <a:p>
+            <a:pPr lvl="1">
+              <a:buFont typeface="Arial" panose="020B0604020202020204" pitchFamily="34" charset="0"/>
+              <a:buChar char="•"/>
+            </a:pPr>
+            <a:r>
+              <a:rPr lang="de-DE" dirty="0"/>
+              <a:t>Es gibt nicht den „besten“ </a:t>
+            </a:r>
+            <a:r>
+              <a:rPr lang="de-DE" dirty="0" err="1"/>
+              <a:t>Executor</a:t>
+            </a:r>
+            <a:endParaRPr lang="de-DE" dirty="0"/>
+          </a:p>
+          <a:p>
+            <a:pPr lvl="1">
+              <a:buFont typeface="Arial" panose="020B0604020202020204" pitchFamily="34" charset="0"/>
+              <a:buChar char="•"/>
+            </a:pPr>
+            <a:endParaRPr lang="de-DE" dirty="0"/>
+          </a:p>
+        </p:txBody>
+      </p:sp>
+    </p:spTree>
+    <p:extLst>
+      <p:ext uri="{BB962C8B-B14F-4D97-AF65-F5344CB8AC3E}">
+        <p14:creationId xmlns:p14="http://schemas.microsoft.com/office/powerpoint/2010/main" val="949730093"/>
+      </p:ext>
+    </p:extLst>
+  </p:cSld>
+  <p:clrMapOvr>
+    <a:masterClrMapping/>
+  </p:clrMapOvr>
+</p:sld>
+</file>
+
+<file path=ppt/slides/slide84.xml><?xml version="1.0" encoding="utf-8"?>
+<p:sld xmlns:a="http://schemas.openxmlformats.org/drawingml/2006/main" xmlns:r="http://schemas.openxmlformats.org/officeDocument/2006/relationships" xmlns:p="http://schemas.openxmlformats.org/presentationml/2006/main">
+  <p:cSld>
+    <p:spTree>
+      <p:nvGrpSpPr>
+        <p:cNvPr id="1" name=""/>
+        <p:cNvGrpSpPr/>
+        <p:nvPr/>
+      </p:nvGrpSpPr>
+      <p:grpSpPr>
+        <a:xfrm>
+          <a:off x="0" y="0"/>
+          <a:ext cx="0" cy="0"/>
+          <a:chOff x="0" y="0"/>
+          <a:chExt cx="0" cy="0"/>
+        </a:xfrm>
+      </p:grpSpPr>
+      <p:sp>
+        <p:nvSpPr>
+          <p:cNvPr id="2" name="Titel 1">
             <a:extLst>
               <a:ext uri="{FF2B5EF4-FFF2-40B4-BE49-F238E27FC236}">
-                <a16:creationId xmlns:a16="http://schemas.microsoft.com/office/drawing/2014/main" id="{BE9CCB7C-8C17-285C-7F88-68B9D147713B}"/>
+                <a16:creationId xmlns:a16="http://schemas.microsoft.com/office/drawing/2014/main" id="{47C93AD8-3A8D-6989-FEBD-DA63D84B1B1F}"/>
               </a:ext>
             </a:extLst>
           </p:cNvPr>
-          <p:cNvPicPr>
-            <a:picLocks noChangeAspect="1"/>
-          </p:cNvPicPr>
-          <p:nvPr/>
-        </p:nvPicPr>
-        <p:blipFill>
-          <a:blip r:embed="rId3">
-            <a:extLst>
-              <a:ext uri="{28A0092B-C50C-407E-A947-70E740481C1C}">
-                <a14:useLocalDpi xmlns:a14="http://schemas.microsoft.com/office/drawing/2010/main" val="0"/>
-              </a:ext>
-            </a:extLst>
-          </a:blip>
-          <a:stretch>
-            <a:fillRect/>
-          </a:stretch>
-        </p:blipFill>
-        <p:spPr>
-          <a:xfrm>
-            <a:off x="6948264" y="4221088"/>
-            <a:ext cx="1534942" cy="1412776"/>
-          </a:xfrm>
-          <a:prstGeom prst="rect">
-            <a:avLst/>
-          </a:prstGeom>
-        </p:spPr>
-      </p:pic>
-      <p:pic>
-        <p:nvPicPr>
-          <p:cNvPr id="9" name="Grafik 8">
+          <p:cNvSpPr>
+            <a:spLocks noGrp="1"/>
+          </p:cNvSpPr>
+          <p:nvPr>
+            <p:ph type="title"/>
+          </p:nvPr>
+        </p:nvSpPr>
+        <p:spPr/>
+        <p:txBody>
+          <a:bodyPr/>
+          <a:lstStyle/>
+          <a:p>
+            <a:r>
+              <a:rPr lang="de-DE" dirty="0" err="1"/>
+              <a:t>GitLab</a:t>
+            </a:r>
+            <a:r>
+              <a:rPr lang="de-DE" dirty="0"/>
+              <a:t> Runner</a:t>
+            </a:r>
+          </a:p>
+        </p:txBody>
+      </p:sp>
+      <p:sp>
+        <p:nvSpPr>
+          <p:cNvPr id="3" name="Inhaltsplatzhalter 2">
             <a:extLst>
               <a:ext uri="{FF2B5EF4-FFF2-40B4-BE49-F238E27FC236}">
-                <a16:creationId xmlns:a16="http://schemas.microsoft.com/office/drawing/2014/main" id="{D8643DA2-0E30-D480-2AA8-859C9431F89F}"/>
+                <a16:creationId xmlns:a16="http://schemas.microsoft.com/office/drawing/2014/main" id="{D24D0738-1D86-965F-46E5-56ACABA7F5BE}"/>
               </a:ext>
             </a:extLst>
           </p:cNvPr>
-          <p:cNvPicPr>
-            <a:picLocks noChangeAspect="1"/>
-          </p:cNvPicPr>
-          <p:nvPr/>
-        </p:nvPicPr>
-        <p:blipFill>
-          <a:blip r:embed="rId4">
-            <a:extLst>
-              <a:ext uri="{28A0092B-C50C-407E-A947-70E740481C1C}">
-                <a14:useLocalDpi xmlns:a14="http://schemas.microsoft.com/office/drawing/2010/main" val="0"/>
-              </a:ext>
-            </a:extLst>
-          </a:blip>
-          <a:stretch>
-            <a:fillRect/>
-          </a:stretch>
-        </p:blipFill>
-        <p:spPr>
-          <a:xfrm>
-            <a:off x="1379031" y="904567"/>
-            <a:ext cx="6336704" cy="3136668"/>
-          </a:xfrm>
-          <a:prstGeom prst="rect">
-            <a:avLst/>
-          </a:prstGeom>
-        </p:spPr>
-      </p:pic>
+          <p:cNvSpPr>
+            <a:spLocks noGrp="1"/>
+          </p:cNvSpPr>
+          <p:nvPr>
+            <p:ph idx="1"/>
+          </p:nvPr>
+        </p:nvSpPr>
+        <p:spPr/>
+        <p:txBody>
+          <a:bodyPr/>
+          <a:lstStyle/>
+          <a:p>
+            <a:pPr marL="0" indent="0">
+              <a:buNone/>
+            </a:pPr>
+            <a:r>
+              <a:rPr lang="de-DE" b="1" dirty="0"/>
+              <a:t>Shell </a:t>
+            </a:r>
+            <a:r>
+              <a:rPr lang="de-DE" b="1" dirty="0" err="1"/>
+              <a:t>Executor</a:t>
+            </a:r>
+            <a:endParaRPr lang="de-DE" b="1" dirty="0"/>
+          </a:p>
+          <a:p>
+            <a:pPr>
+              <a:buFont typeface="Arial" panose="020B0604020202020204" pitchFamily="34" charset="0"/>
+              <a:buChar char="•"/>
+            </a:pPr>
+            <a:r>
+              <a:rPr lang="de-DE" dirty="0"/>
+              <a:t>Führt die Jobs dort aus, wo der Runner installiert wurde</a:t>
+            </a:r>
+          </a:p>
+          <a:p>
+            <a:pPr lvl="1">
+              <a:buFont typeface="Arial" panose="020B0604020202020204" pitchFamily="34" charset="0"/>
+              <a:buChar char="•"/>
+            </a:pPr>
+            <a:r>
+              <a:rPr lang="de-DE" dirty="0"/>
+              <a:t>Analog zu Jenkins oder anderen CI Servern</a:t>
+            </a:r>
+          </a:p>
+          <a:p>
+            <a:pPr>
+              <a:buFont typeface="Arial" panose="020B0604020202020204" pitchFamily="34" charset="0"/>
+              <a:buChar char="•"/>
+            </a:pPr>
+            <a:r>
+              <a:rPr lang="de-DE" dirty="0"/>
+              <a:t>Alle benötigten </a:t>
+            </a:r>
+            <a:r>
+              <a:rPr lang="de-DE" dirty="0" err="1"/>
+              <a:t>Dependencies</a:t>
+            </a:r>
+            <a:r>
+              <a:rPr lang="de-DE" dirty="0"/>
+              <a:t> müssen auf dem Server installiert sein</a:t>
+            </a:r>
+          </a:p>
+          <a:p>
+            <a:pPr>
+              <a:buFont typeface="Arial" panose="020B0604020202020204" pitchFamily="34" charset="0"/>
+              <a:buChar char="•"/>
+            </a:pPr>
+            <a:r>
+              <a:rPr lang="de-DE" dirty="0"/>
+              <a:t>Aber: Docker Images in der Job-</a:t>
+            </a:r>
+            <a:r>
+              <a:rPr lang="de-DE" dirty="0" err="1"/>
+              <a:t>Config</a:t>
+            </a:r>
+            <a:r>
+              <a:rPr lang="de-DE" dirty="0"/>
+              <a:t> werden ignoriert!</a:t>
+            </a:r>
+          </a:p>
+          <a:p>
+            <a:pPr lvl="1">
+              <a:buFont typeface="Arial" panose="020B0604020202020204" pitchFamily="34" charset="0"/>
+              <a:buChar char="•"/>
+            </a:pPr>
+            <a:r>
+              <a:rPr lang="de-DE" dirty="0"/>
+              <a:t>Selbst wenn Docker installiert ist</a:t>
+            </a:r>
+          </a:p>
+          <a:p>
+            <a:pPr>
+              <a:buFont typeface="Arial" panose="020B0604020202020204" pitchFamily="34" charset="0"/>
+              <a:buChar char="•"/>
+            </a:pPr>
+            <a:r>
+              <a:rPr lang="de-DE" dirty="0"/>
+              <a:t>Alles zur Laufzeit vorhanden</a:t>
+            </a:r>
+          </a:p>
+          <a:p>
+            <a:pPr lvl="1">
+              <a:buFont typeface="Arial" panose="020B0604020202020204" pitchFamily="34" charset="0"/>
+              <a:buChar char="•"/>
+            </a:pPr>
+            <a:r>
+              <a:rPr lang="de-DE" dirty="0">
+                <a:sym typeface="Wingdings" panose="05000000000000000000" pitchFamily="2" charset="2"/>
+              </a:rPr>
+              <a:t> Jobs werden sehr schnell ausgeführt</a:t>
+            </a:r>
+          </a:p>
+          <a:p>
+            <a:pPr>
+              <a:buFont typeface="Arial" panose="020B0604020202020204" pitchFamily="34" charset="0"/>
+              <a:buChar char="•"/>
+            </a:pPr>
+            <a:endParaRPr lang="de-DE" dirty="0"/>
+          </a:p>
+          <a:p>
+            <a:pPr>
+              <a:buFont typeface="Arial" panose="020B0604020202020204" pitchFamily="34" charset="0"/>
+              <a:buChar char="•"/>
+            </a:pPr>
+            <a:endParaRPr lang="de-DE" dirty="0"/>
+          </a:p>
+        </p:txBody>
+      </p:sp>
     </p:spTree>
     <p:extLst>
       <p:ext uri="{BB962C8B-B14F-4D97-AF65-F5344CB8AC3E}">
-        <p14:creationId xmlns:p14="http://schemas.microsoft.com/office/powerpoint/2010/main" val="81545675"/>
+        <p14:creationId xmlns:p14="http://schemas.microsoft.com/office/powerpoint/2010/main" val="1379235772"/>
+      </p:ext>
+    </p:extLst>
+  </p:cSld>
+  <p:clrMapOvr>
+    <a:masterClrMapping/>
+  </p:clrMapOvr>
+</p:sld>
+</file>
+
+<file path=ppt/slides/slide85.xml><?xml version="1.0" encoding="utf-8"?>
+<p:sld xmlns:a="http://schemas.openxmlformats.org/drawingml/2006/main" xmlns:r="http://schemas.openxmlformats.org/officeDocument/2006/relationships" xmlns:p="http://schemas.openxmlformats.org/presentationml/2006/main">
+  <p:cSld>
+    <p:spTree>
+      <p:nvGrpSpPr>
+        <p:cNvPr id="1" name=""/>
+        <p:cNvGrpSpPr/>
+        <p:nvPr/>
+      </p:nvGrpSpPr>
+      <p:grpSpPr>
+        <a:xfrm>
+          <a:off x="0" y="0"/>
+          <a:ext cx="0" cy="0"/>
+          <a:chOff x="0" y="0"/>
+          <a:chExt cx="0" cy="0"/>
+        </a:xfrm>
+      </p:grpSpPr>
+      <p:sp>
+        <p:nvSpPr>
+          <p:cNvPr id="2" name="Titel 1">
+            <a:extLst>
+              <a:ext uri="{FF2B5EF4-FFF2-40B4-BE49-F238E27FC236}">
+                <a16:creationId xmlns:a16="http://schemas.microsoft.com/office/drawing/2014/main" id="{47C93AD8-3A8D-6989-FEBD-DA63D84B1B1F}"/>
+              </a:ext>
+            </a:extLst>
+          </p:cNvPr>
+          <p:cNvSpPr>
+            <a:spLocks noGrp="1"/>
+          </p:cNvSpPr>
+          <p:nvPr>
+            <p:ph type="title"/>
+          </p:nvPr>
+        </p:nvSpPr>
+        <p:spPr/>
+        <p:txBody>
+          <a:bodyPr/>
+          <a:lstStyle/>
+          <a:p>
+            <a:r>
+              <a:rPr lang="de-DE" dirty="0" err="1"/>
+              <a:t>GitLab</a:t>
+            </a:r>
+            <a:r>
+              <a:rPr lang="de-DE" dirty="0"/>
+              <a:t> Runner</a:t>
+            </a:r>
+          </a:p>
+        </p:txBody>
+      </p:sp>
+      <p:sp>
+        <p:nvSpPr>
+          <p:cNvPr id="3" name="Inhaltsplatzhalter 2">
+            <a:extLst>
+              <a:ext uri="{FF2B5EF4-FFF2-40B4-BE49-F238E27FC236}">
+                <a16:creationId xmlns:a16="http://schemas.microsoft.com/office/drawing/2014/main" id="{D24D0738-1D86-965F-46E5-56ACABA7F5BE}"/>
+              </a:ext>
+            </a:extLst>
+          </p:cNvPr>
+          <p:cNvSpPr>
+            <a:spLocks noGrp="1"/>
+          </p:cNvSpPr>
+          <p:nvPr>
+            <p:ph idx="1"/>
+          </p:nvPr>
+        </p:nvSpPr>
+        <p:spPr/>
+        <p:txBody>
+          <a:bodyPr/>
+          <a:lstStyle/>
+          <a:p>
+            <a:pPr marL="0" indent="0">
+              <a:buNone/>
+            </a:pPr>
+            <a:r>
+              <a:rPr lang="de-DE" b="1" dirty="0"/>
+              <a:t>Shell </a:t>
+            </a:r>
+            <a:r>
+              <a:rPr lang="de-DE" b="1" dirty="0" err="1"/>
+              <a:t>Executor</a:t>
+            </a:r>
+            <a:endParaRPr lang="de-DE" b="1" dirty="0"/>
+          </a:p>
+          <a:p>
+            <a:pPr>
+              <a:buFont typeface="Arial" panose="020B0604020202020204" pitchFamily="34" charset="0"/>
+              <a:buChar char="•"/>
+            </a:pPr>
+            <a:r>
+              <a:rPr lang="de-DE" u="sng" dirty="0"/>
+              <a:t>Use Case</a:t>
+            </a:r>
+          </a:p>
+          <a:p>
+            <a:pPr lvl="1">
+              <a:buFont typeface="Arial" panose="020B0604020202020204" pitchFamily="34" charset="0"/>
+              <a:buChar char="•"/>
+            </a:pPr>
+            <a:r>
+              <a:rPr lang="de-DE" dirty="0"/>
+              <a:t>Native Umgebung (spezifisches Betriebssystem oder Hardware)</a:t>
+            </a:r>
+          </a:p>
+          <a:p>
+            <a:pPr>
+              <a:buFont typeface="Arial" panose="020B0604020202020204" pitchFamily="34" charset="0"/>
+              <a:buChar char="•"/>
+            </a:pPr>
+            <a:endParaRPr lang="de-DE" dirty="0"/>
+          </a:p>
+          <a:p>
+            <a:pPr>
+              <a:buFont typeface="Arial" panose="020B0604020202020204" pitchFamily="34" charset="0"/>
+              <a:buChar char="•"/>
+            </a:pPr>
+            <a:r>
+              <a:rPr lang="de-DE" u="sng" dirty="0"/>
+              <a:t>Zu beachten</a:t>
+            </a:r>
+          </a:p>
+          <a:p>
+            <a:pPr lvl="1">
+              <a:buFont typeface="Arial" panose="020B0604020202020204" pitchFamily="34" charset="0"/>
+              <a:buChar char="•"/>
+            </a:pPr>
+            <a:r>
+              <a:rPr lang="de-DE" dirty="0"/>
+              <a:t>Umgebung kann unzureichend dokumentiert sein</a:t>
+            </a:r>
+          </a:p>
+          <a:p>
+            <a:pPr lvl="2">
+              <a:buFont typeface="Arial" panose="020B0604020202020204" pitchFamily="34" charset="0"/>
+              <a:buChar char="•"/>
+            </a:pPr>
+            <a:r>
+              <a:rPr lang="de-DE" sz="1800" dirty="0"/>
+              <a:t>Welche Versionen werden verwendet?</a:t>
+            </a:r>
+          </a:p>
+          <a:p>
+            <a:pPr lvl="2">
+              <a:buFont typeface="Arial" panose="020B0604020202020204" pitchFamily="34" charset="0"/>
+              <a:buChar char="•"/>
+            </a:pPr>
+            <a:r>
+              <a:rPr lang="de-DE" sz="1800" dirty="0"/>
+              <a:t>Job auf andere Infrastruktur </a:t>
+            </a:r>
+            <a:r>
+              <a:rPr lang="de-DE" sz="1800" dirty="0">
+                <a:sym typeface="Wingdings" panose="05000000000000000000" pitchFamily="2" charset="2"/>
+              </a:rPr>
+              <a:t> Welche </a:t>
+            </a:r>
+            <a:r>
+              <a:rPr lang="de-DE" sz="1800" dirty="0" err="1">
+                <a:sym typeface="Wingdings" panose="05000000000000000000" pitchFamily="2" charset="2"/>
+              </a:rPr>
+              <a:t>Dependencies</a:t>
+            </a:r>
+            <a:r>
+              <a:rPr lang="de-DE" sz="1800" dirty="0">
+                <a:sym typeface="Wingdings" panose="05000000000000000000" pitchFamily="2" charset="2"/>
+              </a:rPr>
+              <a:t> in welcher Version werden benötigt?</a:t>
+            </a:r>
+          </a:p>
+          <a:p>
+            <a:pPr lvl="1">
+              <a:buFont typeface="Arial" panose="020B0604020202020204" pitchFamily="34" charset="0"/>
+              <a:buChar char="•"/>
+            </a:pPr>
+            <a:r>
+              <a:rPr lang="de-DE" dirty="0">
+                <a:sym typeface="Wingdings" panose="05000000000000000000" pitchFamily="2" charset="2"/>
+              </a:rPr>
+              <a:t>„</a:t>
+            </a:r>
+            <a:r>
+              <a:rPr lang="de-DE" dirty="0" err="1">
+                <a:sym typeface="Wingdings" panose="05000000000000000000" pitchFamily="2" charset="2"/>
+              </a:rPr>
+              <a:t>Left-overs</a:t>
+            </a:r>
+            <a:r>
+              <a:rPr lang="de-DE" dirty="0">
+                <a:sym typeface="Wingdings" panose="05000000000000000000" pitchFamily="2" charset="2"/>
+              </a:rPr>
+              <a:t>“ aus vorherigen Jobs  keine saubere </a:t>
+            </a:r>
+            <a:r>
+              <a:rPr lang="de-DE" dirty="0" err="1">
+                <a:sym typeface="Wingdings" panose="05000000000000000000" pitchFamily="2" charset="2"/>
+              </a:rPr>
+              <a:t>build</a:t>
+            </a:r>
+            <a:r>
+              <a:rPr lang="de-DE" dirty="0">
+                <a:sym typeface="Wingdings" panose="05000000000000000000" pitchFamily="2" charset="2"/>
+              </a:rPr>
+              <a:t> Umgebung</a:t>
+            </a:r>
+          </a:p>
+          <a:p>
+            <a:pPr lvl="1">
+              <a:buFont typeface="Arial" panose="020B0604020202020204" pitchFamily="34" charset="0"/>
+              <a:buChar char="•"/>
+            </a:pPr>
+            <a:r>
+              <a:rPr lang="de-DE" dirty="0" err="1">
+                <a:sym typeface="Wingdings" panose="05000000000000000000" pitchFamily="2" charset="2"/>
+              </a:rPr>
+              <a:t>Dependency</a:t>
+            </a:r>
+            <a:r>
+              <a:rPr lang="de-DE" dirty="0">
+                <a:sym typeface="Wingdings" panose="05000000000000000000" pitchFamily="2" charset="2"/>
+              </a:rPr>
+              <a:t>-Management</a:t>
+            </a:r>
+          </a:p>
+          <a:p>
+            <a:pPr lvl="2">
+              <a:buFont typeface="Arial" panose="020B0604020202020204" pitchFamily="34" charset="0"/>
+              <a:buChar char="•"/>
+            </a:pPr>
+            <a:r>
+              <a:rPr lang="de-DE" sz="1800" dirty="0"/>
+              <a:t>Ein Projekt benötigt Node.js v20 ein Anderes v18</a:t>
+            </a:r>
+          </a:p>
+          <a:p>
+            <a:pPr lvl="1">
+              <a:buFont typeface="Arial" panose="020B0604020202020204" pitchFamily="34" charset="0"/>
+              <a:buChar char="•"/>
+            </a:pPr>
+            <a:r>
+              <a:rPr lang="de-DE" dirty="0"/>
+              <a:t>Muss den anderen Jobs vertrauen</a:t>
+            </a:r>
+          </a:p>
+          <a:p>
+            <a:pPr lvl="2">
+              <a:buFont typeface="Arial" panose="020B0604020202020204" pitchFamily="34" charset="0"/>
+              <a:buChar char="•"/>
+            </a:pPr>
+            <a:r>
+              <a:rPr lang="de-DE" sz="1800" dirty="0"/>
+              <a:t>Haben vollen Zugriff auf das Projekt + Secrets</a:t>
+            </a:r>
+          </a:p>
+          <a:p>
+            <a:pPr>
+              <a:buFont typeface="Arial" panose="020B0604020202020204" pitchFamily="34" charset="0"/>
+              <a:buChar char="•"/>
+            </a:pPr>
+            <a:endParaRPr lang="de-DE" dirty="0"/>
+          </a:p>
+        </p:txBody>
+      </p:sp>
+    </p:spTree>
+    <p:extLst>
+      <p:ext uri="{BB962C8B-B14F-4D97-AF65-F5344CB8AC3E}">
+        <p14:creationId xmlns:p14="http://schemas.microsoft.com/office/powerpoint/2010/main" val="2884578998"/>
+      </p:ext>
+    </p:extLst>
+  </p:cSld>
+  <p:clrMapOvr>
+    <a:masterClrMapping/>
+  </p:clrMapOvr>
+</p:sld>
+</file>
+
+<file path=ppt/slides/slide86.xml><?xml version="1.0" encoding="utf-8"?>
+<p:sld xmlns:a="http://schemas.openxmlformats.org/drawingml/2006/main" xmlns:r="http://schemas.openxmlformats.org/officeDocument/2006/relationships" xmlns:p="http://schemas.openxmlformats.org/presentationml/2006/main">
+  <p:cSld>
+    <p:spTree>
+      <p:nvGrpSpPr>
+        <p:cNvPr id="1" name=""/>
+        <p:cNvGrpSpPr/>
+        <p:nvPr/>
+      </p:nvGrpSpPr>
+      <p:grpSpPr>
+        <a:xfrm>
+          <a:off x="0" y="0"/>
+          <a:ext cx="0" cy="0"/>
+          <a:chOff x="0" y="0"/>
+          <a:chExt cx="0" cy="0"/>
+        </a:xfrm>
+      </p:grpSpPr>
+      <p:sp>
+        <p:nvSpPr>
+          <p:cNvPr id="2" name="Titel 1">
+            <a:extLst>
+              <a:ext uri="{FF2B5EF4-FFF2-40B4-BE49-F238E27FC236}">
+                <a16:creationId xmlns:a16="http://schemas.microsoft.com/office/drawing/2014/main" id="{5DFE6F25-98F2-5A1D-8A4F-BDDDE6C1E6F7}"/>
+              </a:ext>
+            </a:extLst>
+          </p:cNvPr>
+          <p:cNvSpPr>
+            <a:spLocks noGrp="1"/>
+          </p:cNvSpPr>
+          <p:nvPr>
+            <p:ph type="title"/>
+          </p:nvPr>
+        </p:nvSpPr>
+        <p:spPr/>
+        <p:txBody>
+          <a:bodyPr/>
+          <a:lstStyle/>
+          <a:p>
+            <a:r>
+              <a:rPr lang="de-DE" dirty="0" err="1"/>
+              <a:t>GitLab</a:t>
+            </a:r>
+            <a:r>
+              <a:rPr lang="de-DE" dirty="0"/>
+              <a:t> Runner</a:t>
+            </a:r>
+          </a:p>
+        </p:txBody>
+      </p:sp>
+      <p:sp>
+        <p:nvSpPr>
+          <p:cNvPr id="3" name="Inhaltsplatzhalter 2">
+            <a:extLst>
+              <a:ext uri="{FF2B5EF4-FFF2-40B4-BE49-F238E27FC236}">
+                <a16:creationId xmlns:a16="http://schemas.microsoft.com/office/drawing/2014/main" id="{8F45E6D7-CC11-68DE-957B-0DB4E6BBCF67}"/>
+              </a:ext>
+            </a:extLst>
+          </p:cNvPr>
+          <p:cNvSpPr>
+            <a:spLocks noGrp="1"/>
+          </p:cNvSpPr>
+          <p:nvPr>
+            <p:ph idx="1"/>
+          </p:nvPr>
+        </p:nvSpPr>
+        <p:spPr/>
+        <p:txBody>
+          <a:bodyPr/>
+          <a:lstStyle/>
+          <a:p>
+            <a:pPr marL="0" indent="0">
+              <a:buNone/>
+            </a:pPr>
+            <a:r>
+              <a:rPr lang="de-DE" b="1" dirty="0"/>
+              <a:t>SSH </a:t>
+            </a:r>
+            <a:r>
+              <a:rPr lang="de-DE" b="1" dirty="0" err="1"/>
+              <a:t>Executor</a:t>
+            </a:r>
+            <a:endParaRPr lang="de-DE" b="1" dirty="0"/>
+          </a:p>
+          <a:p>
+            <a:pPr>
+              <a:buFont typeface="Arial" panose="020B0604020202020204" pitchFamily="34" charset="0"/>
+              <a:buChar char="•"/>
+            </a:pPr>
+            <a:r>
+              <a:rPr lang="de-DE" dirty="0"/>
+              <a:t>Befehle über SSH an eine Maschine</a:t>
+            </a:r>
+          </a:p>
+          <a:p>
+            <a:pPr>
+              <a:buFont typeface="Arial" panose="020B0604020202020204" pitchFamily="34" charset="0"/>
+              <a:buChar char="•"/>
+            </a:pPr>
+            <a:r>
+              <a:rPr lang="de-DE" dirty="0"/>
+              <a:t>Funktionsweise ähnlich zum Shell </a:t>
+            </a:r>
+            <a:r>
+              <a:rPr lang="de-DE" dirty="0" err="1"/>
+              <a:t>Executor</a:t>
+            </a:r>
+            <a:endParaRPr lang="de-DE" dirty="0"/>
+          </a:p>
+          <a:p>
+            <a:pPr>
+              <a:buFont typeface="Arial" panose="020B0604020202020204" pitchFamily="34" charset="0"/>
+              <a:buChar char="•"/>
+            </a:pPr>
+            <a:r>
+              <a:rPr lang="de-DE" dirty="0"/>
+              <a:t>Funktioniert nur für Bash-Scripts!</a:t>
+            </a:r>
+          </a:p>
+          <a:p>
+            <a:pPr>
+              <a:buFont typeface="Arial" panose="020B0604020202020204" pitchFamily="34" charset="0"/>
+              <a:buChar char="•"/>
+            </a:pPr>
+            <a:r>
+              <a:rPr lang="de-DE" dirty="0"/>
+              <a:t>Höhere Sicherheit, da SSH</a:t>
+            </a:r>
+          </a:p>
+          <a:p>
+            <a:pPr lvl="1">
+              <a:buFont typeface="Arial" panose="020B0604020202020204" pitchFamily="34" charset="0"/>
+              <a:buChar char="•"/>
+            </a:pPr>
+            <a:r>
+              <a:rPr lang="de-DE" dirty="0">
+                <a:sym typeface="Wingdings" panose="05000000000000000000" pitchFamily="2" charset="2"/>
+              </a:rPr>
+              <a:t> Befehle haben nicht Zugriff auf das gesamte Dateisystem</a:t>
+            </a:r>
+          </a:p>
+          <a:p>
+            <a:pPr>
+              <a:buFont typeface="Arial" panose="020B0604020202020204" pitchFamily="34" charset="0"/>
+              <a:buChar char="•"/>
+            </a:pPr>
+            <a:r>
+              <a:rPr lang="de-DE" dirty="0">
+                <a:sym typeface="Wingdings" panose="05000000000000000000" pitchFamily="2" charset="2"/>
+              </a:rPr>
+              <a:t>Nur zur Vollständigkeit bei </a:t>
+            </a:r>
+            <a:r>
+              <a:rPr lang="de-DE" dirty="0" err="1">
+                <a:sym typeface="Wingdings" panose="05000000000000000000" pitchFamily="2" charset="2"/>
+              </a:rPr>
+              <a:t>GitLab</a:t>
+            </a:r>
+            <a:r>
+              <a:rPr lang="de-DE" dirty="0">
+                <a:sym typeface="Wingdings" panose="05000000000000000000" pitchFamily="2" charset="2"/>
+              </a:rPr>
+              <a:t> selbst aufgeführt!</a:t>
+            </a:r>
+          </a:p>
+          <a:p>
+            <a:pPr lvl="1">
+              <a:buFont typeface="Arial" panose="020B0604020202020204" pitchFamily="34" charset="0"/>
+              <a:buChar char="•"/>
+            </a:pPr>
+            <a:r>
+              <a:rPr lang="de-DE" dirty="0">
+                <a:sym typeface="Wingdings" panose="05000000000000000000" pitchFamily="2" charset="2"/>
+              </a:rPr>
+              <a:t>Hat den geringsten Support</a:t>
+            </a:r>
+          </a:p>
+          <a:p>
+            <a:pPr>
+              <a:buFont typeface="Arial" panose="020B0604020202020204" pitchFamily="34" charset="0"/>
+              <a:buChar char="•"/>
+            </a:pPr>
+            <a:r>
+              <a:rPr lang="de-DE" dirty="0">
+                <a:sym typeface="Wingdings" panose="05000000000000000000" pitchFamily="2" charset="2"/>
+              </a:rPr>
+              <a:t>Wird von </a:t>
+            </a:r>
+            <a:r>
+              <a:rPr lang="de-DE" dirty="0" err="1">
+                <a:sym typeface="Wingdings" panose="05000000000000000000" pitchFamily="2" charset="2"/>
+              </a:rPr>
+              <a:t>GitLab</a:t>
+            </a:r>
+            <a:r>
+              <a:rPr lang="de-DE" dirty="0">
+                <a:sym typeface="Wingdings" panose="05000000000000000000" pitchFamily="2" charset="2"/>
+              </a:rPr>
+              <a:t> selbst nicht empfohlen.</a:t>
+            </a:r>
+          </a:p>
+          <a:p>
+            <a:pPr lvl="1">
+              <a:buFont typeface="Arial" panose="020B0604020202020204" pitchFamily="34" charset="0"/>
+              <a:buChar char="•"/>
+            </a:pPr>
+            <a:endParaRPr lang="de-DE" dirty="0"/>
+          </a:p>
+        </p:txBody>
+      </p:sp>
+    </p:spTree>
+    <p:extLst>
+      <p:ext uri="{BB962C8B-B14F-4D97-AF65-F5344CB8AC3E}">
+        <p14:creationId xmlns:p14="http://schemas.microsoft.com/office/powerpoint/2010/main" val="2611533870"/>
+      </p:ext>
+    </p:extLst>
+  </p:cSld>
+  <p:clrMapOvr>
+    <a:masterClrMapping/>
+  </p:clrMapOvr>
+</p:sld>
+</file>
+
+<file path=ppt/slides/slide87.xml><?xml version="1.0" encoding="utf-8"?>
+<p:sld xmlns:a="http://schemas.openxmlformats.org/drawingml/2006/main" xmlns:r="http://schemas.openxmlformats.org/officeDocument/2006/relationships" xmlns:p="http://schemas.openxmlformats.org/presentationml/2006/main">
+  <p:cSld>
+    <p:spTree>
+      <p:nvGrpSpPr>
+        <p:cNvPr id="1" name=""/>
+        <p:cNvGrpSpPr/>
+        <p:nvPr/>
+      </p:nvGrpSpPr>
+      <p:grpSpPr>
+        <a:xfrm>
+          <a:off x="0" y="0"/>
+          <a:ext cx="0" cy="0"/>
+          <a:chOff x="0" y="0"/>
+          <a:chExt cx="0" cy="0"/>
+        </a:xfrm>
+      </p:grpSpPr>
+      <p:sp>
+        <p:nvSpPr>
+          <p:cNvPr id="2" name="Titel 1">
+            <a:extLst>
+              <a:ext uri="{FF2B5EF4-FFF2-40B4-BE49-F238E27FC236}">
+                <a16:creationId xmlns:a16="http://schemas.microsoft.com/office/drawing/2014/main" id="{5DFE6F25-98F2-5A1D-8A4F-BDDDE6C1E6F7}"/>
+              </a:ext>
+            </a:extLst>
+          </p:cNvPr>
+          <p:cNvSpPr>
+            <a:spLocks noGrp="1"/>
+          </p:cNvSpPr>
+          <p:nvPr>
+            <p:ph type="title"/>
+          </p:nvPr>
+        </p:nvSpPr>
+        <p:spPr/>
+        <p:txBody>
+          <a:bodyPr/>
+          <a:lstStyle/>
+          <a:p>
+            <a:r>
+              <a:rPr lang="de-DE" dirty="0" err="1"/>
+              <a:t>GitLab</a:t>
+            </a:r>
+            <a:r>
+              <a:rPr lang="de-DE" dirty="0"/>
+              <a:t> Runner</a:t>
+            </a:r>
+          </a:p>
+        </p:txBody>
+      </p:sp>
+      <p:sp>
+        <p:nvSpPr>
+          <p:cNvPr id="3" name="Inhaltsplatzhalter 2">
+            <a:extLst>
+              <a:ext uri="{FF2B5EF4-FFF2-40B4-BE49-F238E27FC236}">
+                <a16:creationId xmlns:a16="http://schemas.microsoft.com/office/drawing/2014/main" id="{8F45E6D7-CC11-68DE-957B-0DB4E6BBCF67}"/>
+              </a:ext>
+            </a:extLst>
+          </p:cNvPr>
+          <p:cNvSpPr>
+            <a:spLocks noGrp="1"/>
+          </p:cNvSpPr>
+          <p:nvPr>
+            <p:ph idx="1"/>
+          </p:nvPr>
+        </p:nvSpPr>
+        <p:spPr/>
+        <p:txBody>
+          <a:bodyPr/>
+          <a:lstStyle/>
+          <a:p>
+            <a:pPr marL="0" indent="0">
+              <a:buNone/>
+            </a:pPr>
+            <a:r>
+              <a:rPr lang="de-DE" b="1" dirty="0"/>
+              <a:t>SSH </a:t>
+            </a:r>
+            <a:r>
+              <a:rPr lang="de-DE" b="1" dirty="0" err="1"/>
+              <a:t>Executor</a:t>
+            </a:r>
+            <a:endParaRPr lang="de-DE" b="1" dirty="0"/>
+          </a:p>
+          <a:p>
+            <a:pPr>
+              <a:buFont typeface="Arial" panose="020B0604020202020204" pitchFamily="34" charset="0"/>
+              <a:buChar char="•"/>
+            </a:pPr>
+            <a:r>
+              <a:rPr lang="de-DE" dirty="0"/>
+              <a:t>Use Case</a:t>
+            </a:r>
+          </a:p>
+          <a:p>
+            <a:pPr lvl="1">
+              <a:buFont typeface="Arial" panose="020B0604020202020204" pitchFamily="34" charset="0"/>
+              <a:buChar char="•"/>
+            </a:pPr>
+            <a:r>
+              <a:rPr lang="de-DE" dirty="0" err="1"/>
+              <a:t>GitLab</a:t>
+            </a:r>
+            <a:r>
+              <a:rPr lang="de-DE" dirty="0"/>
+              <a:t> Server nur per SSH erreichbar? Das ist der Weg.</a:t>
+            </a:r>
+          </a:p>
+          <a:p>
+            <a:pPr lvl="1">
+              <a:buFont typeface="Arial" panose="020B0604020202020204" pitchFamily="34" charset="0"/>
+              <a:buChar char="•"/>
+            </a:pPr>
+            <a:r>
+              <a:rPr lang="de-DE" dirty="0"/>
+              <a:t>Es kann kein </a:t>
+            </a:r>
+            <a:r>
+              <a:rPr lang="de-DE" dirty="0" err="1"/>
+              <a:t>GitLab</a:t>
+            </a:r>
+            <a:r>
+              <a:rPr lang="de-DE" dirty="0"/>
+              <a:t> Runner auf einer anderen Maschine installiert werden</a:t>
+            </a:r>
+          </a:p>
+          <a:p>
+            <a:pPr>
+              <a:buFont typeface="Arial" panose="020B0604020202020204" pitchFamily="34" charset="0"/>
+              <a:buChar char="•"/>
+            </a:pPr>
+            <a:r>
+              <a:rPr lang="de-DE" dirty="0"/>
+              <a:t>Zu beachten (analog zu Shell)</a:t>
+            </a:r>
+          </a:p>
+          <a:p>
+            <a:pPr lvl="1">
+              <a:buFont typeface="Arial" panose="020B0604020202020204" pitchFamily="34" charset="0"/>
+              <a:buChar char="•"/>
+            </a:pPr>
+            <a:r>
+              <a:rPr lang="de-DE" dirty="0"/>
+              <a:t>Umgebung kann unzureichend dokumentiert sein</a:t>
+            </a:r>
+          </a:p>
+          <a:p>
+            <a:pPr lvl="2">
+              <a:buFont typeface="Arial" panose="020B0604020202020204" pitchFamily="34" charset="0"/>
+              <a:buChar char="•"/>
+            </a:pPr>
+            <a:r>
+              <a:rPr lang="de-DE" sz="1800" dirty="0"/>
+              <a:t>Welche Versionen werden verwendet?</a:t>
+            </a:r>
+          </a:p>
+          <a:p>
+            <a:pPr lvl="2">
+              <a:buFont typeface="Arial" panose="020B0604020202020204" pitchFamily="34" charset="0"/>
+              <a:buChar char="•"/>
+            </a:pPr>
+            <a:r>
+              <a:rPr lang="de-DE" sz="1800" dirty="0"/>
+              <a:t>Job auf andere Infrastruktur </a:t>
+            </a:r>
+            <a:r>
+              <a:rPr lang="de-DE" sz="1800" dirty="0">
+                <a:sym typeface="Wingdings" panose="05000000000000000000" pitchFamily="2" charset="2"/>
+              </a:rPr>
+              <a:t> Welche </a:t>
+            </a:r>
+            <a:r>
+              <a:rPr lang="de-DE" sz="1800" dirty="0" err="1">
+                <a:sym typeface="Wingdings" panose="05000000000000000000" pitchFamily="2" charset="2"/>
+              </a:rPr>
+              <a:t>Dependencies</a:t>
+            </a:r>
+            <a:r>
+              <a:rPr lang="de-DE" sz="1800" dirty="0">
+                <a:sym typeface="Wingdings" panose="05000000000000000000" pitchFamily="2" charset="2"/>
+              </a:rPr>
+              <a:t> in welcher Version werden benötigt?</a:t>
+            </a:r>
+          </a:p>
+          <a:p>
+            <a:pPr lvl="1">
+              <a:buFont typeface="Arial" panose="020B0604020202020204" pitchFamily="34" charset="0"/>
+              <a:buChar char="•"/>
+            </a:pPr>
+            <a:r>
+              <a:rPr lang="de-DE" dirty="0">
+                <a:sym typeface="Wingdings" panose="05000000000000000000" pitchFamily="2" charset="2"/>
+              </a:rPr>
+              <a:t>„</a:t>
+            </a:r>
+            <a:r>
+              <a:rPr lang="de-DE" dirty="0" err="1">
+                <a:sym typeface="Wingdings" panose="05000000000000000000" pitchFamily="2" charset="2"/>
+              </a:rPr>
+              <a:t>Left-overs</a:t>
+            </a:r>
+            <a:r>
+              <a:rPr lang="de-DE" dirty="0">
+                <a:sym typeface="Wingdings" panose="05000000000000000000" pitchFamily="2" charset="2"/>
+              </a:rPr>
+              <a:t>“ aus vorherigen Jobs  keine saubere </a:t>
+            </a:r>
+            <a:r>
+              <a:rPr lang="de-DE" dirty="0" err="1">
+                <a:sym typeface="Wingdings" panose="05000000000000000000" pitchFamily="2" charset="2"/>
+              </a:rPr>
+              <a:t>build</a:t>
+            </a:r>
+            <a:r>
+              <a:rPr lang="de-DE" dirty="0">
+                <a:sym typeface="Wingdings" panose="05000000000000000000" pitchFamily="2" charset="2"/>
+              </a:rPr>
+              <a:t> Umgebung</a:t>
+            </a:r>
+          </a:p>
+          <a:p>
+            <a:pPr lvl="1">
+              <a:buFont typeface="Arial" panose="020B0604020202020204" pitchFamily="34" charset="0"/>
+              <a:buChar char="•"/>
+            </a:pPr>
+            <a:r>
+              <a:rPr lang="de-DE" dirty="0" err="1">
+                <a:sym typeface="Wingdings" panose="05000000000000000000" pitchFamily="2" charset="2"/>
+              </a:rPr>
+              <a:t>Dependency</a:t>
+            </a:r>
+            <a:r>
+              <a:rPr lang="de-DE" dirty="0">
+                <a:sym typeface="Wingdings" panose="05000000000000000000" pitchFamily="2" charset="2"/>
+              </a:rPr>
+              <a:t>-Management</a:t>
+            </a:r>
+          </a:p>
+          <a:p>
+            <a:pPr lvl="2">
+              <a:buFont typeface="Arial" panose="020B0604020202020204" pitchFamily="34" charset="0"/>
+              <a:buChar char="•"/>
+            </a:pPr>
+            <a:r>
+              <a:rPr lang="de-DE" sz="1800" dirty="0"/>
+              <a:t>Ein Projekt benötigt Node.js v20 ein Anderes v18</a:t>
+            </a:r>
+          </a:p>
+          <a:p>
+            <a:pPr lvl="1">
+              <a:buFont typeface="Arial" panose="020B0604020202020204" pitchFamily="34" charset="0"/>
+              <a:buChar char="•"/>
+            </a:pPr>
+            <a:r>
+              <a:rPr lang="de-DE" dirty="0"/>
+              <a:t>Muss den anderen Jobs vertrauen</a:t>
+            </a:r>
+          </a:p>
+          <a:p>
+            <a:pPr lvl="2">
+              <a:buFont typeface="Arial" panose="020B0604020202020204" pitchFamily="34" charset="0"/>
+              <a:buChar char="•"/>
+            </a:pPr>
+            <a:r>
+              <a:rPr lang="de-DE" sz="1800" dirty="0"/>
+              <a:t>Haben vollen Zugriff auf das Projekt + Secrets</a:t>
+            </a:r>
+          </a:p>
+          <a:p>
+            <a:pPr lvl="1">
+              <a:buFont typeface="Arial" panose="020B0604020202020204" pitchFamily="34" charset="0"/>
+              <a:buChar char="•"/>
+            </a:pPr>
+            <a:endParaRPr lang="de-DE" dirty="0"/>
+          </a:p>
+        </p:txBody>
+      </p:sp>
+    </p:spTree>
+    <p:extLst>
+      <p:ext uri="{BB962C8B-B14F-4D97-AF65-F5344CB8AC3E}">
+        <p14:creationId xmlns:p14="http://schemas.microsoft.com/office/powerpoint/2010/main" val="321110184"/>
+      </p:ext>
+    </p:extLst>
+  </p:cSld>
+  <p:clrMapOvr>
+    <a:masterClrMapping/>
+  </p:clrMapOvr>
+</p:sld>
+</file>
+
+<file path=ppt/slides/slide88.xml><?xml version="1.0" encoding="utf-8"?>
+<p:sld xmlns:a="http://schemas.openxmlformats.org/drawingml/2006/main" xmlns:r="http://schemas.openxmlformats.org/officeDocument/2006/relationships" xmlns:p="http://schemas.openxmlformats.org/presentationml/2006/main">
+  <p:cSld>
+    <p:spTree>
+      <p:nvGrpSpPr>
+        <p:cNvPr id="1" name=""/>
+        <p:cNvGrpSpPr/>
+        <p:nvPr/>
+      </p:nvGrpSpPr>
+      <p:grpSpPr>
+        <a:xfrm>
+          <a:off x="0" y="0"/>
+          <a:ext cx="0" cy="0"/>
+          <a:chOff x="0" y="0"/>
+          <a:chExt cx="0" cy="0"/>
+        </a:xfrm>
+      </p:grpSpPr>
+      <p:sp>
+        <p:nvSpPr>
+          <p:cNvPr id="2" name="Titel 1">
+            <a:extLst>
+              <a:ext uri="{FF2B5EF4-FFF2-40B4-BE49-F238E27FC236}">
+                <a16:creationId xmlns:a16="http://schemas.microsoft.com/office/drawing/2014/main" id="{636D030D-F3AD-0E05-927C-1A44033BC2CA}"/>
+              </a:ext>
+            </a:extLst>
+          </p:cNvPr>
+          <p:cNvSpPr>
+            <a:spLocks noGrp="1"/>
+          </p:cNvSpPr>
+          <p:nvPr>
+            <p:ph type="title"/>
+          </p:nvPr>
+        </p:nvSpPr>
+        <p:spPr/>
+        <p:txBody>
+          <a:bodyPr/>
+          <a:lstStyle/>
+          <a:p>
+            <a:r>
+              <a:rPr lang="de-DE" dirty="0" err="1"/>
+              <a:t>GitLab</a:t>
+            </a:r>
+            <a:r>
+              <a:rPr lang="de-DE" dirty="0"/>
+              <a:t> Runner</a:t>
+            </a:r>
+          </a:p>
+        </p:txBody>
+      </p:sp>
+      <p:sp>
+        <p:nvSpPr>
+          <p:cNvPr id="3" name="Inhaltsplatzhalter 2">
+            <a:extLst>
+              <a:ext uri="{FF2B5EF4-FFF2-40B4-BE49-F238E27FC236}">
+                <a16:creationId xmlns:a16="http://schemas.microsoft.com/office/drawing/2014/main" id="{6B363AE5-3FFC-FDCB-5266-588E48BCE963}"/>
+              </a:ext>
+            </a:extLst>
+          </p:cNvPr>
+          <p:cNvSpPr>
+            <a:spLocks noGrp="1"/>
+          </p:cNvSpPr>
+          <p:nvPr>
+            <p:ph idx="1"/>
+          </p:nvPr>
+        </p:nvSpPr>
+        <p:spPr/>
+        <p:txBody>
+          <a:bodyPr/>
+          <a:lstStyle/>
+          <a:p>
+            <a:pPr marL="0" indent="0">
+              <a:buNone/>
+            </a:pPr>
+            <a:r>
+              <a:rPr lang="de-DE" b="1" dirty="0"/>
+              <a:t>Virtual </a:t>
+            </a:r>
+            <a:r>
+              <a:rPr lang="de-DE" b="1" dirty="0" err="1"/>
+              <a:t>Machine</a:t>
+            </a:r>
+            <a:r>
+              <a:rPr lang="de-DE" b="1" dirty="0"/>
+              <a:t> </a:t>
+            </a:r>
+            <a:r>
+              <a:rPr lang="de-DE" b="1" dirty="0" err="1"/>
+              <a:t>Executor</a:t>
+            </a:r>
+            <a:r>
+              <a:rPr lang="de-DE" b="1" dirty="0"/>
+              <a:t> (VirtualBox / Parallels)</a:t>
+            </a:r>
+          </a:p>
+          <a:p>
+            <a:pPr>
+              <a:buFont typeface="Arial" panose="020B0604020202020204" pitchFamily="34" charset="0"/>
+              <a:buChar char="•"/>
+            </a:pPr>
+            <a:r>
+              <a:rPr lang="de-DE" dirty="0"/>
+              <a:t>Eine bereits bestehende virtuelle Maschine wird genutzt</a:t>
+            </a:r>
+          </a:p>
+          <a:p>
+            <a:pPr lvl="1">
+              <a:buFont typeface="Arial" panose="020B0604020202020204" pitchFamily="34" charset="0"/>
+              <a:buChar char="•"/>
+            </a:pPr>
+            <a:r>
+              <a:rPr lang="de-DE" dirty="0"/>
+              <a:t>Wird </a:t>
+            </a:r>
+            <a:r>
+              <a:rPr lang="de-DE" dirty="0" err="1"/>
+              <a:t>gecloned</a:t>
+            </a:r>
+            <a:r>
+              <a:rPr lang="de-DE" dirty="0"/>
+              <a:t> und darauf läuft dann der </a:t>
+            </a:r>
+            <a:r>
+              <a:rPr lang="de-DE" dirty="0" err="1"/>
+              <a:t>Build</a:t>
+            </a:r>
+            <a:r>
+              <a:rPr lang="de-DE" dirty="0"/>
+              <a:t>.</a:t>
+            </a:r>
+          </a:p>
+          <a:p>
+            <a:pPr>
+              <a:buFont typeface="Arial" panose="020B0604020202020204" pitchFamily="34" charset="0"/>
+              <a:buChar char="•"/>
+            </a:pPr>
+            <a:r>
+              <a:rPr lang="de-DE" dirty="0"/>
+              <a:t>Jeder Job startet dementsprechend in einer virtuellen Umgebung</a:t>
+            </a:r>
+          </a:p>
+          <a:p>
+            <a:pPr lvl="1">
+              <a:buFont typeface="Arial" panose="020B0604020202020204" pitchFamily="34" charset="0"/>
+              <a:buChar char="•"/>
+            </a:pPr>
+            <a:r>
+              <a:rPr lang="de-DE" dirty="0"/>
+              <a:t>Windows, Linux, </a:t>
+            </a:r>
+            <a:r>
+              <a:rPr lang="de-DE" dirty="0" err="1"/>
+              <a:t>macOS</a:t>
+            </a:r>
+            <a:r>
+              <a:rPr lang="de-DE" dirty="0"/>
+              <a:t> oder FreeBSD</a:t>
+            </a:r>
+          </a:p>
+          <a:p>
+            <a:pPr>
+              <a:buFont typeface="Arial" panose="020B0604020202020204" pitchFamily="34" charset="0"/>
+              <a:buChar char="•"/>
+            </a:pPr>
+            <a:endParaRPr lang="de-DE" dirty="0"/>
+          </a:p>
+          <a:p>
+            <a:pPr marL="457200" lvl="1" indent="0">
+              <a:buNone/>
+            </a:pPr>
+            <a:endParaRPr lang="de-DE" dirty="0"/>
+          </a:p>
+        </p:txBody>
+      </p:sp>
+    </p:spTree>
+    <p:extLst>
+      <p:ext uri="{BB962C8B-B14F-4D97-AF65-F5344CB8AC3E}">
+        <p14:creationId xmlns:p14="http://schemas.microsoft.com/office/powerpoint/2010/main" val="3485536096"/>
+      </p:ext>
+    </p:extLst>
+  </p:cSld>
+  <p:clrMapOvr>
+    <a:masterClrMapping/>
+  </p:clrMapOvr>
+</p:sld>
+</file>
+
+<file path=ppt/slides/slide89.xml><?xml version="1.0" encoding="utf-8"?>
+<p:sld xmlns:a="http://schemas.openxmlformats.org/drawingml/2006/main" xmlns:r="http://schemas.openxmlformats.org/officeDocument/2006/relationships" xmlns:p="http://schemas.openxmlformats.org/presentationml/2006/main">
+  <p:cSld>
+    <p:spTree>
+      <p:nvGrpSpPr>
+        <p:cNvPr id="1" name=""/>
+        <p:cNvGrpSpPr/>
+        <p:nvPr/>
+      </p:nvGrpSpPr>
+      <p:grpSpPr>
+        <a:xfrm>
+          <a:off x="0" y="0"/>
+          <a:ext cx="0" cy="0"/>
+          <a:chOff x="0" y="0"/>
+          <a:chExt cx="0" cy="0"/>
+        </a:xfrm>
+      </p:grpSpPr>
+      <p:sp>
+        <p:nvSpPr>
+          <p:cNvPr id="2" name="Titel 1">
+            <a:extLst>
+              <a:ext uri="{FF2B5EF4-FFF2-40B4-BE49-F238E27FC236}">
+                <a16:creationId xmlns:a16="http://schemas.microsoft.com/office/drawing/2014/main" id="{636D030D-F3AD-0E05-927C-1A44033BC2CA}"/>
+              </a:ext>
+            </a:extLst>
+          </p:cNvPr>
+          <p:cNvSpPr>
+            <a:spLocks noGrp="1"/>
+          </p:cNvSpPr>
+          <p:nvPr>
+            <p:ph type="title"/>
+          </p:nvPr>
+        </p:nvSpPr>
+        <p:spPr/>
+        <p:txBody>
+          <a:bodyPr/>
+          <a:lstStyle/>
+          <a:p>
+            <a:r>
+              <a:rPr lang="de-DE" dirty="0" err="1"/>
+              <a:t>GitLab</a:t>
+            </a:r>
+            <a:r>
+              <a:rPr lang="de-DE" dirty="0"/>
+              <a:t> Runner</a:t>
+            </a:r>
+          </a:p>
+        </p:txBody>
+      </p:sp>
+      <p:sp>
+        <p:nvSpPr>
+          <p:cNvPr id="3" name="Inhaltsplatzhalter 2">
+            <a:extLst>
+              <a:ext uri="{FF2B5EF4-FFF2-40B4-BE49-F238E27FC236}">
+                <a16:creationId xmlns:a16="http://schemas.microsoft.com/office/drawing/2014/main" id="{6B363AE5-3FFC-FDCB-5266-588E48BCE963}"/>
+              </a:ext>
+            </a:extLst>
+          </p:cNvPr>
+          <p:cNvSpPr>
+            <a:spLocks noGrp="1"/>
+          </p:cNvSpPr>
+          <p:nvPr>
+            <p:ph idx="1"/>
+          </p:nvPr>
+        </p:nvSpPr>
+        <p:spPr/>
+        <p:txBody>
+          <a:bodyPr/>
+          <a:lstStyle/>
+          <a:p>
+            <a:pPr marL="0" indent="0">
+              <a:buNone/>
+            </a:pPr>
+            <a:r>
+              <a:rPr lang="de-DE" b="1" dirty="0"/>
+              <a:t>Virtual </a:t>
+            </a:r>
+            <a:r>
+              <a:rPr lang="de-DE" b="1" dirty="0" err="1"/>
+              <a:t>Machine</a:t>
+            </a:r>
+            <a:r>
+              <a:rPr lang="de-DE" b="1" dirty="0"/>
+              <a:t> </a:t>
+            </a:r>
+            <a:r>
+              <a:rPr lang="de-DE" b="1" dirty="0" err="1"/>
+              <a:t>Executor</a:t>
+            </a:r>
+            <a:r>
+              <a:rPr lang="de-DE" b="1" dirty="0"/>
+              <a:t> (VirtualBox / Parallels)</a:t>
+            </a:r>
+          </a:p>
+          <a:p>
+            <a:pPr>
+              <a:buFont typeface="Arial" panose="020B0604020202020204" pitchFamily="34" charset="0"/>
+              <a:buChar char="•"/>
+            </a:pPr>
+            <a:r>
+              <a:rPr lang="de-DE" dirty="0"/>
+              <a:t>Use Case</a:t>
+            </a:r>
+          </a:p>
+          <a:p>
+            <a:pPr lvl="1">
+              <a:buFont typeface="Arial" panose="020B0604020202020204" pitchFamily="34" charset="0"/>
+              <a:buChar char="•"/>
+            </a:pPr>
+            <a:r>
+              <a:rPr lang="de-DE" dirty="0"/>
+              <a:t>Verschiedene Umgebungen durch Virtualisierung</a:t>
+            </a:r>
+          </a:p>
+          <a:p>
+            <a:pPr lvl="2">
+              <a:buFont typeface="Arial" panose="020B0604020202020204" pitchFamily="34" charset="0"/>
+              <a:buChar char="•"/>
+            </a:pPr>
+            <a:r>
+              <a:rPr lang="de-DE" sz="1800" dirty="0"/>
+              <a:t>Testen mit verschiedenen Betriebssystemen</a:t>
+            </a:r>
+          </a:p>
+          <a:p>
+            <a:pPr lvl="1">
+              <a:buFont typeface="Arial" panose="020B0604020202020204" pitchFamily="34" charset="0"/>
+              <a:buChar char="•"/>
+            </a:pPr>
+            <a:r>
+              <a:rPr lang="de-DE" dirty="0"/>
+              <a:t>Falls Docker nicht angenommen oder verstanden wird</a:t>
+            </a:r>
+          </a:p>
+          <a:p>
+            <a:pPr lvl="1">
+              <a:buFont typeface="Arial" panose="020B0604020202020204" pitchFamily="34" charset="0"/>
+              <a:buChar char="•"/>
+            </a:pPr>
+            <a:r>
+              <a:rPr lang="de-DE" dirty="0"/>
+              <a:t>Falls VirtualBox/Parallels bereits eingesetzt werden</a:t>
+            </a:r>
+          </a:p>
+          <a:p>
+            <a:pPr lvl="1">
+              <a:buFont typeface="Arial" panose="020B0604020202020204" pitchFamily="34" charset="0"/>
+              <a:buChar char="•"/>
+            </a:pPr>
+            <a:endParaRPr lang="de-DE" dirty="0"/>
+          </a:p>
+          <a:p>
+            <a:pPr>
+              <a:buFont typeface="Arial" panose="020B0604020202020204" pitchFamily="34" charset="0"/>
+              <a:buChar char="•"/>
+            </a:pPr>
+            <a:r>
+              <a:rPr lang="de-DE" dirty="0"/>
+              <a:t>Zu beachten</a:t>
+            </a:r>
+          </a:p>
+          <a:p>
+            <a:pPr lvl="1">
+              <a:buFont typeface="Arial" panose="020B0604020202020204" pitchFamily="34" charset="0"/>
+              <a:buChar char="•"/>
+            </a:pPr>
+            <a:r>
+              <a:rPr lang="de-DE" dirty="0"/>
+              <a:t>Overhead </a:t>
+            </a:r>
+            <a:r>
+              <a:rPr lang="de-DE" dirty="0">
+                <a:sym typeface="Wingdings" panose="05000000000000000000" pitchFamily="2" charset="2"/>
+              </a:rPr>
+              <a:t> Betriebssystem starten</a:t>
+            </a:r>
+          </a:p>
+          <a:p>
+            <a:pPr lvl="1">
+              <a:buFont typeface="Arial" panose="020B0604020202020204" pitchFamily="34" charset="0"/>
+              <a:buChar char="•"/>
+            </a:pPr>
+            <a:r>
+              <a:rPr lang="de-DE" dirty="0">
+                <a:sym typeface="Wingdings" panose="05000000000000000000" pitchFamily="2" charset="2"/>
+              </a:rPr>
+              <a:t>Debugging schwerer (bei Job-fail)</a:t>
+            </a:r>
+          </a:p>
+          <a:p>
+            <a:pPr lvl="1">
+              <a:buFont typeface="Arial" panose="020B0604020202020204" pitchFamily="34" charset="0"/>
+              <a:buChar char="•"/>
+            </a:pPr>
+            <a:r>
+              <a:rPr lang="de-DE" dirty="0">
+                <a:sym typeface="Wingdings" panose="05000000000000000000" pitchFamily="2" charset="2"/>
+              </a:rPr>
+              <a:t>Verbindung läuft über SSH! (Fehlerquellenmöglichkeit)</a:t>
+            </a:r>
+          </a:p>
+          <a:p>
+            <a:pPr lvl="1">
+              <a:buFont typeface="Arial" panose="020B0604020202020204" pitchFamily="34" charset="0"/>
+              <a:buChar char="•"/>
+            </a:pPr>
+            <a:r>
+              <a:rPr lang="de-DE" dirty="0"/>
+              <a:t>Zusätzliche </a:t>
+            </a:r>
+            <a:r>
+              <a:rPr lang="de-DE" dirty="0" err="1"/>
+              <a:t>Config</a:t>
+            </a:r>
+            <a:r>
+              <a:rPr lang="de-DE" dirty="0"/>
+              <a:t>/Fehlersuche beim Hochladen von Job-Artefakten</a:t>
+            </a:r>
+          </a:p>
+          <a:p>
+            <a:pPr lvl="2">
+              <a:buFont typeface="Arial" panose="020B0604020202020204" pitchFamily="34" charset="0"/>
+              <a:buChar char="•"/>
+            </a:pPr>
+            <a:endParaRPr lang="de-DE" sz="1800" dirty="0"/>
+          </a:p>
+          <a:p>
+            <a:pPr lvl="1">
+              <a:buFont typeface="Arial" panose="020B0604020202020204" pitchFamily="34" charset="0"/>
+              <a:buChar char="•"/>
+            </a:pPr>
+            <a:endParaRPr lang="de-DE" dirty="0"/>
+          </a:p>
+          <a:p>
+            <a:pPr>
+              <a:buFont typeface="Arial" panose="020B0604020202020204" pitchFamily="34" charset="0"/>
+              <a:buChar char="•"/>
+            </a:pPr>
+            <a:endParaRPr lang="de-DE" dirty="0"/>
+          </a:p>
+          <a:p>
+            <a:pPr marL="457200" lvl="1" indent="0">
+              <a:buNone/>
+            </a:pPr>
+            <a:endParaRPr lang="de-DE" dirty="0"/>
+          </a:p>
+        </p:txBody>
+      </p:sp>
+    </p:spTree>
+    <p:extLst>
+      <p:ext uri="{BB962C8B-B14F-4D97-AF65-F5344CB8AC3E}">
+        <p14:creationId xmlns:p14="http://schemas.microsoft.com/office/powerpoint/2010/main" val="3795063915"/>
       </p:ext>
     </p:extLst>
   </p:cSld>
@@ -35495,6 +37446,1216 @@
       <p:bldP spid="18" grpId="0" animBg="1"/>
     </p:bldLst>
   </p:timing>
+</p:sld>
+</file>
+
+<file path=ppt/slides/slide90.xml><?xml version="1.0" encoding="utf-8"?>
+<p:sld xmlns:a="http://schemas.openxmlformats.org/drawingml/2006/main" xmlns:r="http://schemas.openxmlformats.org/officeDocument/2006/relationships" xmlns:p="http://schemas.openxmlformats.org/presentationml/2006/main">
+  <p:cSld>
+    <p:spTree>
+      <p:nvGrpSpPr>
+        <p:cNvPr id="1" name=""/>
+        <p:cNvGrpSpPr/>
+        <p:nvPr/>
+      </p:nvGrpSpPr>
+      <p:grpSpPr>
+        <a:xfrm>
+          <a:off x="0" y="0"/>
+          <a:ext cx="0" cy="0"/>
+          <a:chOff x="0" y="0"/>
+          <a:chExt cx="0" cy="0"/>
+        </a:xfrm>
+      </p:grpSpPr>
+      <p:sp>
+        <p:nvSpPr>
+          <p:cNvPr id="2" name="Titel 1">
+            <a:extLst>
+              <a:ext uri="{FF2B5EF4-FFF2-40B4-BE49-F238E27FC236}">
+                <a16:creationId xmlns:a16="http://schemas.microsoft.com/office/drawing/2014/main" id="{A687ACE8-5859-D0EF-6259-CEB1CE4B6775}"/>
+              </a:ext>
+            </a:extLst>
+          </p:cNvPr>
+          <p:cNvSpPr>
+            <a:spLocks noGrp="1"/>
+          </p:cNvSpPr>
+          <p:nvPr>
+            <p:ph type="title"/>
+          </p:nvPr>
+        </p:nvSpPr>
+        <p:spPr/>
+        <p:txBody>
+          <a:bodyPr/>
+          <a:lstStyle/>
+          <a:p>
+            <a:r>
+              <a:rPr lang="de-DE" dirty="0" err="1"/>
+              <a:t>GitLab</a:t>
+            </a:r>
+            <a:r>
+              <a:rPr lang="de-DE" dirty="0"/>
+              <a:t> Runner</a:t>
+            </a:r>
+          </a:p>
+        </p:txBody>
+      </p:sp>
+      <p:sp>
+        <p:nvSpPr>
+          <p:cNvPr id="3" name="Inhaltsplatzhalter 2">
+            <a:extLst>
+              <a:ext uri="{FF2B5EF4-FFF2-40B4-BE49-F238E27FC236}">
+                <a16:creationId xmlns:a16="http://schemas.microsoft.com/office/drawing/2014/main" id="{293A39AC-4648-E7E6-41B0-15D4D30E2D19}"/>
+              </a:ext>
+            </a:extLst>
+          </p:cNvPr>
+          <p:cNvSpPr>
+            <a:spLocks noGrp="1"/>
+          </p:cNvSpPr>
+          <p:nvPr>
+            <p:ph idx="1"/>
+          </p:nvPr>
+        </p:nvSpPr>
+        <p:spPr/>
+        <p:txBody>
+          <a:bodyPr/>
+          <a:lstStyle/>
+          <a:p>
+            <a:pPr marL="0" indent="0">
+              <a:buNone/>
+            </a:pPr>
+            <a:r>
+              <a:rPr lang="de-DE" b="1" dirty="0"/>
+              <a:t>Docker </a:t>
+            </a:r>
+            <a:r>
+              <a:rPr lang="de-DE" b="1" dirty="0" err="1"/>
+              <a:t>Executor</a:t>
+            </a:r>
+            <a:endParaRPr lang="de-DE" b="1" dirty="0"/>
+          </a:p>
+          <a:p>
+            <a:pPr>
+              <a:buFont typeface="Arial" panose="020B0604020202020204" pitchFamily="34" charset="0"/>
+              <a:buChar char="•"/>
+            </a:pPr>
+            <a:r>
+              <a:rPr lang="de-DE" dirty="0"/>
+              <a:t>Docker Container wird in der Pipeline definiert</a:t>
+            </a:r>
+          </a:p>
+          <a:p>
+            <a:pPr>
+              <a:buFont typeface="Arial" panose="020B0604020202020204" pitchFamily="34" charset="0"/>
+              <a:buChar char="•"/>
+            </a:pPr>
+            <a:r>
+              <a:rPr lang="de-DE" dirty="0"/>
+              <a:t>Simple Laufzeitumgebungen</a:t>
+            </a:r>
+          </a:p>
+          <a:p>
+            <a:pPr>
+              <a:buFont typeface="Arial" panose="020B0604020202020204" pitchFamily="34" charset="0"/>
+              <a:buChar char="•"/>
+            </a:pPr>
+            <a:r>
+              <a:rPr lang="de-DE" dirty="0"/>
+              <a:t>Mehrere Jobs gleichzeitig</a:t>
+            </a:r>
+          </a:p>
+          <a:p>
+            <a:pPr lvl="1">
+              <a:buFont typeface="Arial" panose="020B0604020202020204" pitchFamily="34" charset="0"/>
+              <a:buChar char="•"/>
+            </a:pPr>
+            <a:r>
+              <a:rPr lang="de-DE" dirty="0"/>
+              <a:t>Ohne Interferenzen (außer Systemlast/Performance)</a:t>
+            </a:r>
+          </a:p>
+          <a:p>
+            <a:pPr>
+              <a:buFont typeface="Arial" panose="020B0604020202020204" pitchFamily="34" charset="0"/>
+              <a:buChar char="•"/>
+            </a:pPr>
+            <a:r>
+              <a:rPr lang="de-DE" dirty="0"/>
+              <a:t>Docker Umgebung für die meisten Projekte sinnvoll</a:t>
+            </a:r>
+          </a:p>
+          <a:p>
+            <a:pPr>
+              <a:buFont typeface="Arial" panose="020B0604020202020204" pitchFamily="34" charset="0"/>
+              <a:buChar char="•"/>
+            </a:pPr>
+            <a:r>
+              <a:rPr lang="de-DE" dirty="0"/>
+              <a:t>Alle Abhängigkeiten im Docker Image definiert</a:t>
+            </a:r>
+          </a:p>
+          <a:p>
+            <a:pPr marL="0" indent="0">
+              <a:buNone/>
+            </a:pPr>
+            <a:endParaRPr lang="de-DE" dirty="0"/>
+          </a:p>
+        </p:txBody>
+      </p:sp>
+    </p:spTree>
+    <p:extLst>
+      <p:ext uri="{BB962C8B-B14F-4D97-AF65-F5344CB8AC3E}">
+        <p14:creationId xmlns:p14="http://schemas.microsoft.com/office/powerpoint/2010/main" val="3296130149"/>
+      </p:ext>
+    </p:extLst>
+  </p:cSld>
+  <p:clrMapOvr>
+    <a:masterClrMapping/>
+  </p:clrMapOvr>
+</p:sld>
+</file>
+
+<file path=ppt/slides/slide91.xml><?xml version="1.0" encoding="utf-8"?>
+<p:sld xmlns:a="http://schemas.openxmlformats.org/drawingml/2006/main" xmlns:r="http://schemas.openxmlformats.org/officeDocument/2006/relationships" xmlns:p="http://schemas.openxmlformats.org/presentationml/2006/main">
+  <p:cSld>
+    <p:spTree>
+      <p:nvGrpSpPr>
+        <p:cNvPr id="1" name=""/>
+        <p:cNvGrpSpPr/>
+        <p:nvPr/>
+      </p:nvGrpSpPr>
+      <p:grpSpPr>
+        <a:xfrm>
+          <a:off x="0" y="0"/>
+          <a:ext cx="0" cy="0"/>
+          <a:chOff x="0" y="0"/>
+          <a:chExt cx="0" cy="0"/>
+        </a:xfrm>
+      </p:grpSpPr>
+      <p:sp>
+        <p:nvSpPr>
+          <p:cNvPr id="2" name="Titel 1">
+            <a:extLst>
+              <a:ext uri="{FF2B5EF4-FFF2-40B4-BE49-F238E27FC236}">
+                <a16:creationId xmlns:a16="http://schemas.microsoft.com/office/drawing/2014/main" id="{A687ACE8-5859-D0EF-6259-CEB1CE4B6775}"/>
+              </a:ext>
+            </a:extLst>
+          </p:cNvPr>
+          <p:cNvSpPr>
+            <a:spLocks noGrp="1"/>
+          </p:cNvSpPr>
+          <p:nvPr>
+            <p:ph type="title"/>
+          </p:nvPr>
+        </p:nvSpPr>
+        <p:spPr/>
+        <p:txBody>
+          <a:bodyPr/>
+          <a:lstStyle/>
+          <a:p>
+            <a:r>
+              <a:rPr lang="de-DE" dirty="0" err="1"/>
+              <a:t>GitLab</a:t>
+            </a:r>
+            <a:r>
+              <a:rPr lang="de-DE" dirty="0"/>
+              <a:t> Runner</a:t>
+            </a:r>
+          </a:p>
+        </p:txBody>
+      </p:sp>
+      <p:sp>
+        <p:nvSpPr>
+          <p:cNvPr id="3" name="Inhaltsplatzhalter 2">
+            <a:extLst>
+              <a:ext uri="{FF2B5EF4-FFF2-40B4-BE49-F238E27FC236}">
+                <a16:creationId xmlns:a16="http://schemas.microsoft.com/office/drawing/2014/main" id="{293A39AC-4648-E7E6-41B0-15D4D30E2D19}"/>
+              </a:ext>
+            </a:extLst>
+          </p:cNvPr>
+          <p:cNvSpPr>
+            <a:spLocks noGrp="1"/>
+          </p:cNvSpPr>
+          <p:nvPr>
+            <p:ph idx="1"/>
+          </p:nvPr>
+        </p:nvSpPr>
+        <p:spPr/>
+        <p:txBody>
+          <a:bodyPr/>
+          <a:lstStyle/>
+          <a:p>
+            <a:pPr marL="0" indent="0">
+              <a:buNone/>
+            </a:pPr>
+            <a:r>
+              <a:rPr lang="de-DE" b="1" dirty="0"/>
+              <a:t>Docker </a:t>
+            </a:r>
+            <a:r>
+              <a:rPr lang="de-DE" b="1" dirty="0" err="1"/>
+              <a:t>Executor</a:t>
+            </a:r>
+            <a:endParaRPr lang="de-DE" b="1" dirty="0"/>
+          </a:p>
+          <a:p>
+            <a:pPr>
+              <a:buFont typeface="Arial" panose="020B0604020202020204" pitchFamily="34" charset="0"/>
+              <a:buChar char="•"/>
+            </a:pPr>
+            <a:r>
+              <a:rPr lang="de-DE" dirty="0"/>
+              <a:t>Use Case</a:t>
+            </a:r>
+          </a:p>
+          <a:p>
+            <a:pPr lvl="1">
+              <a:buFont typeface="Arial" panose="020B0604020202020204" pitchFamily="34" charset="0"/>
+              <a:buChar char="•"/>
+            </a:pPr>
+            <a:r>
+              <a:rPr lang="de-DE" dirty="0"/>
+              <a:t>Saubere Umgebung für jeden Job</a:t>
+            </a:r>
+          </a:p>
+          <a:p>
+            <a:pPr lvl="1">
+              <a:buFont typeface="Arial" panose="020B0604020202020204" pitchFamily="34" charset="0"/>
+              <a:buChar char="•"/>
+            </a:pPr>
+            <a:r>
+              <a:rPr lang="de-DE" dirty="0"/>
+              <a:t>Projekte unabhängig voneinander</a:t>
+            </a:r>
+          </a:p>
+          <a:p>
+            <a:pPr lvl="1">
+              <a:buFont typeface="Arial" panose="020B0604020202020204" pitchFamily="34" charset="0"/>
+              <a:buChar char="•"/>
+            </a:pPr>
+            <a:endParaRPr lang="de-DE" dirty="0"/>
+          </a:p>
+          <a:p>
+            <a:pPr>
+              <a:buFont typeface="Arial" panose="020B0604020202020204" pitchFamily="34" charset="0"/>
+              <a:buChar char="•"/>
+            </a:pPr>
+            <a:r>
+              <a:rPr lang="de-DE" dirty="0"/>
+              <a:t>Zu beachten</a:t>
+            </a:r>
+          </a:p>
+          <a:p>
+            <a:pPr lvl="1">
+              <a:buFont typeface="Arial" panose="020B0604020202020204" pitchFamily="34" charset="0"/>
+              <a:buChar char="•"/>
+            </a:pPr>
+            <a:r>
+              <a:rPr lang="de-DE" dirty="0"/>
+              <a:t>Overhead vom „Pulling“</a:t>
+            </a:r>
+          </a:p>
+          <a:p>
+            <a:pPr lvl="2">
+              <a:buFont typeface="Arial" panose="020B0604020202020204" pitchFamily="34" charset="0"/>
+              <a:buChar char="•"/>
+            </a:pPr>
+            <a:r>
+              <a:rPr lang="de-DE" sz="1800" dirty="0"/>
+              <a:t>Für jeden Job wird das Docker Image heruntergeladen</a:t>
+            </a:r>
+          </a:p>
+          <a:p>
+            <a:pPr marL="0" indent="0">
+              <a:buNone/>
+            </a:pPr>
+            <a:endParaRPr lang="de-DE" dirty="0"/>
+          </a:p>
+        </p:txBody>
+      </p:sp>
+    </p:spTree>
+    <p:extLst>
+      <p:ext uri="{BB962C8B-B14F-4D97-AF65-F5344CB8AC3E}">
+        <p14:creationId xmlns:p14="http://schemas.microsoft.com/office/powerpoint/2010/main" val="2752538356"/>
+      </p:ext>
+    </p:extLst>
+  </p:cSld>
+  <p:clrMapOvr>
+    <a:masterClrMapping/>
+  </p:clrMapOvr>
+</p:sld>
+</file>
+
+<file path=ppt/slides/slide92.xml><?xml version="1.0" encoding="utf-8"?>
+<p:sld xmlns:a="http://schemas.openxmlformats.org/drawingml/2006/main" xmlns:r="http://schemas.openxmlformats.org/officeDocument/2006/relationships" xmlns:p="http://schemas.openxmlformats.org/presentationml/2006/main">
+  <p:cSld>
+    <p:spTree>
+      <p:nvGrpSpPr>
+        <p:cNvPr id="1" name=""/>
+        <p:cNvGrpSpPr/>
+        <p:nvPr/>
+      </p:nvGrpSpPr>
+      <p:grpSpPr>
+        <a:xfrm>
+          <a:off x="0" y="0"/>
+          <a:ext cx="0" cy="0"/>
+          <a:chOff x="0" y="0"/>
+          <a:chExt cx="0" cy="0"/>
+        </a:xfrm>
+      </p:grpSpPr>
+      <p:sp>
+        <p:nvSpPr>
+          <p:cNvPr id="2" name="Titel 1">
+            <a:extLst>
+              <a:ext uri="{FF2B5EF4-FFF2-40B4-BE49-F238E27FC236}">
+                <a16:creationId xmlns:a16="http://schemas.microsoft.com/office/drawing/2014/main" id="{218B108F-4359-A7C8-35DF-1CC4117C913A}"/>
+              </a:ext>
+            </a:extLst>
+          </p:cNvPr>
+          <p:cNvSpPr>
+            <a:spLocks noGrp="1"/>
+          </p:cNvSpPr>
+          <p:nvPr>
+            <p:ph type="title"/>
+          </p:nvPr>
+        </p:nvSpPr>
+        <p:spPr/>
+        <p:txBody>
+          <a:bodyPr/>
+          <a:lstStyle/>
+          <a:p>
+            <a:r>
+              <a:rPr lang="de-DE" dirty="0" err="1"/>
+              <a:t>GitLab</a:t>
+            </a:r>
+            <a:r>
+              <a:rPr lang="de-DE" dirty="0"/>
+              <a:t> Runner</a:t>
+            </a:r>
+          </a:p>
+        </p:txBody>
+      </p:sp>
+      <p:sp>
+        <p:nvSpPr>
+          <p:cNvPr id="3" name="Inhaltsplatzhalter 2">
+            <a:extLst>
+              <a:ext uri="{FF2B5EF4-FFF2-40B4-BE49-F238E27FC236}">
+                <a16:creationId xmlns:a16="http://schemas.microsoft.com/office/drawing/2014/main" id="{37EEF0A0-6AD3-9946-8C67-EF5ED1DD105C}"/>
+              </a:ext>
+            </a:extLst>
+          </p:cNvPr>
+          <p:cNvSpPr>
+            <a:spLocks noGrp="1"/>
+          </p:cNvSpPr>
+          <p:nvPr>
+            <p:ph idx="1"/>
+          </p:nvPr>
+        </p:nvSpPr>
+        <p:spPr/>
+        <p:txBody>
+          <a:bodyPr/>
+          <a:lstStyle/>
+          <a:p>
+            <a:pPr marL="0" indent="0">
+              <a:buNone/>
+            </a:pPr>
+            <a:r>
+              <a:rPr lang="de-DE" b="1" dirty="0"/>
+              <a:t>Docker </a:t>
+            </a:r>
+            <a:r>
+              <a:rPr lang="de-DE" b="1" dirty="0" err="1"/>
+              <a:t>Machine</a:t>
+            </a:r>
+            <a:r>
+              <a:rPr lang="de-DE" b="1" dirty="0"/>
+              <a:t> </a:t>
+            </a:r>
+            <a:r>
+              <a:rPr lang="de-DE" b="1" dirty="0" err="1"/>
+              <a:t>Executor</a:t>
+            </a:r>
+            <a:endParaRPr lang="de-DE" b="1" dirty="0"/>
+          </a:p>
+          <a:p>
+            <a:pPr>
+              <a:buFont typeface="Arial" panose="020B0604020202020204" pitchFamily="34" charset="0"/>
+              <a:buChar char="•"/>
+            </a:pPr>
+            <a:r>
+              <a:rPr lang="de-DE" dirty="0"/>
+              <a:t>Spezielle Version des Docker </a:t>
+            </a:r>
+            <a:r>
+              <a:rPr lang="de-DE" dirty="0" err="1"/>
+              <a:t>Executor</a:t>
+            </a:r>
+            <a:endParaRPr lang="de-DE" dirty="0"/>
+          </a:p>
+          <a:p>
+            <a:pPr lvl="1">
+              <a:buFont typeface="Arial" panose="020B0604020202020204" pitchFamily="34" charset="0"/>
+              <a:buChar char="•"/>
+            </a:pPr>
+            <a:r>
+              <a:rPr lang="de-DE" dirty="0"/>
+              <a:t>Mit Support für auto-</a:t>
+            </a:r>
+            <a:r>
+              <a:rPr lang="de-DE" dirty="0" err="1"/>
+              <a:t>scaling</a:t>
+            </a:r>
+            <a:endParaRPr lang="de-DE" dirty="0"/>
+          </a:p>
+          <a:p>
+            <a:pPr>
+              <a:buFont typeface="Arial" panose="020B0604020202020204" pitchFamily="34" charset="0"/>
+              <a:buChar char="•"/>
+            </a:pPr>
+            <a:r>
+              <a:rPr lang="de-DE" dirty="0"/>
+              <a:t>Funktioniert auch wie der Docker </a:t>
+            </a:r>
+            <a:r>
+              <a:rPr lang="de-DE" dirty="0" err="1"/>
+              <a:t>Executor</a:t>
+            </a:r>
+            <a:endParaRPr lang="de-DE" dirty="0"/>
+          </a:p>
+          <a:p>
+            <a:pPr lvl="1">
+              <a:buFont typeface="Arial" panose="020B0604020202020204" pitchFamily="34" charset="0"/>
+              <a:buChar char="•"/>
+            </a:pPr>
+            <a:r>
+              <a:rPr lang="de-DE" dirty="0"/>
+              <a:t>Aber mit </a:t>
+            </a:r>
+            <a:r>
+              <a:rPr lang="de-DE" dirty="0" err="1"/>
+              <a:t>Build</a:t>
+            </a:r>
+            <a:r>
+              <a:rPr lang="de-DE" dirty="0"/>
+              <a:t> Hosts</a:t>
+            </a:r>
+          </a:p>
+          <a:p>
+            <a:pPr lvl="2">
+              <a:buFont typeface="Arial" panose="020B0604020202020204" pitchFamily="34" charset="0"/>
+              <a:buChar char="•"/>
+            </a:pPr>
+            <a:r>
+              <a:rPr lang="de-DE" sz="1800" dirty="0"/>
+              <a:t>Werden bei Bedarf von der Docker Maschine erstellt</a:t>
+            </a:r>
+          </a:p>
+          <a:p>
+            <a:pPr lvl="2">
+              <a:buFont typeface="Arial" panose="020B0604020202020204" pitchFamily="34" charset="0"/>
+              <a:buChar char="•"/>
+            </a:pPr>
+            <a:endParaRPr lang="de-DE" sz="1800" dirty="0"/>
+          </a:p>
+          <a:p>
+            <a:pPr>
+              <a:buFont typeface="Arial" panose="020B0604020202020204" pitchFamily="34" charset="0"/>
+              <a:buChar char="•"/>
+            </a:pPr>
+            <a:r>
+              <a:rPr lang="de-DE" dirty="0"/>
+              <a:t>Use Case</a:t>
+            </a:r>
+          </a:p>
+          <a:p>
+            <a:pPr lvl="1">
+              <a:buFont typeface="Arial" panose="020B0604020202020204" pitchFamily="34" charset="0"/>
+              <a:buChar char="•"/>
+            </a:pPr>
+            <a:r>
+              <a:rPr lang="de-DE" dirty="0"/>
+              <a:t>Skalierbare </a:t>
+            </a:r>
+            <a:r>
+              <a:rPr lang="de-DE" dirty="0" err="1"/>
+              <a:t>Build</a:t>
+            </a:r>
+            <a:r>
+              <a:rPr lang="de-DE" dirty="0"/>
+              <a:t>-Infrastruktur</a:t>
+            </a:r>
+          </a:p>
+          <a:p>
+            <a:pPr lvl="1">
+              <a:buFont typeface="Arial" panose="020B0604020202020204" pitchFamily="34" charset="0"/>
+              <a:buChar char="•"/>
+            </a:pPr>
+            <a:endParaRPr lang="de-DE" dirty="0"/>
+          </a:p>
+          <a:p>
+            <a:pPr>
+              <a:buFont typeface="Arial" panose="020B0604020202020204" pitchFamily="34" charset="0"/>
+              <a:buChar char="•"/>
+            </a:pPr>
+            <a:r>
+              <a:rPr lang="de-DE" dirty="0"/>
+              <a:t>Zu beachten</a:t>
+            </a:r>
+          </a:p>
+          <a:p>
+            <a:pPr lvl="1">
+              <a:buFont typeface="Arial" panose="020B0604020202020204" pitchFamily="34" charset="0"/>
+              <a:buChar char="•"/>
+            </a:pPr>
+            <a:r>
+              <a:rPr lang="de-DE" dirty="0"/>
+              <a:t>… </a:t>
+            </a:r>
+            <a:r>
+              <a:rPr lang="de-DE" dirty="0" err="1"/>
+              <a:t>Kubernetes</a:t>
+            </a:r>
+            <a:r>
+              <a:rPr lang="de-DE" dirty="0"/>
+              <a:t>? </a:t>
+            </a:r>
+            <a:r>
+              <a:rPr lang="de-DE" dirty="0">
+                <a:sym typeface="Wingdings" panose="05000000000000000000" pitchFamily="2" charset="2"/>
+              </a:rPr>
+              <a:t></a:t>
+            </a:r>
+            <a:endParaRPr lang="de-DE" dirty="0"/>
+          </a:p>
+          <a:p>
+            <a:pPr>
+              <a:buFont typeface="Arial" panose="020B0604020202020204" pitchFamily="34" charset="0"/>
+              <a:buChar char="•"/>
+            </a:pPr>
+            <a:endParaRPr lang="de-DE" sz="1800" dirty="0"/>
+          </a:p>
+        </p:txBody>
+      </p:sp>
+    </p:spTree>
+    <p:extLst>
+      <p:ext uri="{BB962C8B-B14F-4D97-AF65-F5344CB8AC3E}">
+        <p14:creationId xmlns:p14="http://schemas.microsoft.com/office/powerpoint/2010/main" val="4182737790"/>
+      </p:ext>
+    </p:extLst>
+  </p:cSld>
+  <p:clrMapOvr>
+    <a:masterClrMapping/>
+  </p:clrMapOvr>
+</p:sld>
+</file>
+
+<file path=ppt/slides/slide93.xml><?xml version="1.0" encoding="utf-8"?>
+<p:sld xmlns:a="http://schemas.openxmlformats.org/drawingml/2006/main" xmlns:r="http://schemas.openxmlformats.org/officeDocument/2006/relationships" xmlns:p="http://schemas.openxmlformats.org/presentationml/2006/main">
+  <p:cSld>
+    <p:spTree>
+      <p:nvGrpSpPr>
+        <p:cNvPr id="1" name=""/>
+        <p:cNvGrpSpPr/>
+        <p:nvPr/>
+      </p:nvGrpSpPr>
+      <p:grpSpPr>
+        <a:xfrm>
+          <a:off x="0" y="0"/>
+          <a:ext cx="0" cy="0"/>
+          <a:chOff x="0" y="0"/>
+          <a:chExt cx="0" cy="0"/>
+        </a:xfrm>
+      </p:grpSpPr>
+      <p:sp>
+        <p:nvSpPr>
+          <p:cNvPr id="2" name="Titel 1">
+            <a:extLst>
+              <a:ext uri="{FF2B5EF4-FFF2-40B4-BE49-F238E27FC236}">
+                <a16:creationId xmlns:a16="http://schemas.microsoft.com/office/drawing/2014/main" id="{9C01E39F-71D2-4C99-8956-C7E62161571A}"/>
+              </a:ext>
+            </a:extLst>
+          </p:cNvPr>
+          <p:cNvSpPr>
+            <a:spLocks noGrp="1"/>
+          </p:cNvSpPr>
+          <p:nvPr>
+            <p:ph type="title"/>
+          </p:nvPr>
+        </p:nvSpPr>
+        <p:spPr/>
+        <p:txBody>
+          <a:bodyPr/>
+          <a:lstStyle/>
+          <a:p>
+            <a:r>
+              <a:rPr lang="de-DE" dirty="0" err="1"/>
+              <a:t>GitLab</a:t>
+            </a:r>
+            <a:r>
+              <a:rPr lang="de-DE" dirty="0"/>
+              <a:t> Runner</a:t>
+            </a:r>
+          </a:p>
+        </p:txBody>
+      </p:sp>
+      <p:sp>
+        <p:nvSpPr>
+          <p:cNvPr id="3" name="Inhaltsplatzhalter 2">
+            <a:extLst>
+              <a:ext uri="{FF2B5EF4-FFF2-40B4-BE49-F238E27FC236}">
+                <a16:creationId xmlns:a16="http://schemas.microsoft.com/office/drawing/2014/main" id="{06E05289-68A2-EF74-FCD0-F8F9801A4459}"/>
+              </a:ext>
+            </a:extLst>
+          </p:cNvPr>
+          <p:cNvSpPr>
+            <a:spLocks noGrp="1"/>
+          </p:cNvSpPr>
+          <p:nvPr>
+            <p:ph idx="1"/>
+          </p:nvPr>
+        </p:nvSpPr>
+        <p:spPr/>
+        <p:txBody>
+          <a:bodyPr/>
+          <a:lstStyle/>
+          <a:p>
+            <a:pPr marL="0" indent="0">
+              <a:buNone/>
+            </a:pPr>
+            <a:r>
+              <a:rPr lang="de-DE" b="1" dirty="0" err="1"/>
+              <a:t>Kubernetes</a:t>
+            </a:r>
+            <a:r>
+              <a:rPr lang="de-DE" b="1" dirty="0"/>
+              <a:t> </a:t>
+            </a:r>
+            <a:r>
+              <a:rPr lang="de-DE" b="1" dirty="0" err="1"/>
+              <a:t>Executor</a:t>
+            </a:r>
+            <a:endParaRPr lang="de-DE" b="1" dirty="0"/>
+          </a:p>
+          <a:p>
+            <a:pPr>
+              <a:buFont typeface="Arial" panose="020B0604020202020204" pitchFamily="34" charset="0"/>
+              <a:buChar char="•"/>
+            </a:pPr>
+            <a:r>
+              <a:rPr lang="de-DE" dirty="0"/>
+              <a:t>Bestehendes </a:t>
+            </a:r>
+            <a:r>
+              <a:rPr lang="de-DE" dirty="0" err="1"/>
+              <a:t>Kubernetes</a:t>
+            </a:r>
+            <a:r>
+              <a:rPr lang="de-DE" dirty="0"/>
+              <a:t>-Cluster wird verwendet</a:t>
+            </a:r>
+          </a:p>
+          <a:p>
+            <a:pPr>
+              <a:buFont typeface="Arial" panose="020B0604020202020204" pitchFamily="34" charset="0"/>
+              <a:buChar char="•"/>
+            </a:pPr>
+            <a:r>
+              <a:rPr lang="de-DE" dirty="0"/>
+              <a:t>Jobs werden auf dem </a:t>
+            </a:r>
+            <a:r>
+              <a:rPr lang="de-DE" dirty="0" err="1"/>
+              <a:t>Kubernetes</a:t>
+            </a:r>
+            <a:r>
+              <a:rPr lang="de-DE" dirty="0"/>
+              <a:t> Cluster ausgeführt</a:t>
+            </a:r>
+          </a:p>
+          <a:p>
+            <a:pPr>
+              <a:buFont typeface="Arial" panose="020B0604020202020204" pitchFamily="34" charset="0"/>
+              <a:buChar char="•"/>
+            </a:pPr>
+            <a:r>
+              <a:rPr lang="de-DE" dirty="0" err="1"/>
+              <a:t>Executor</a:t>
+            </a:r>
+            <a:r>
+              <a:rPr lang="de-DE" dirty="0"/>
+              <a:t> ruft die API auf und erzeugt neuen Pod</a:t>
+            </a:r>
+          </a:p>
+          <a:p>
+            <a:pPr lvl="1">
+              <a:buFont typeface="Arial" panose="020B0604020202020204" pitchFamily="34" charset="0"/>
+              <a:buChar char="•"/>
+            </a:pPr>
+            <a:r>
+              <a:rPr lang="de-DE" dirty="0"/>
+              <a:t>Mit einem </a:t>
+            </a:r>
+            <a:r>
+              <a:rPr lang="de-DE" dirty="0" err="1"/>
+              <a:t>Build-Contrainer</a:t>
+            </a:r>
+            <a:r>
+              <a:rPr lang="de-DE" dirty="0"/>
+              <a:t> und Services-Containers</a:t>
+            </a:r>
+          </a:p>
+          <a:p>
+            <a:pPr lvl="1">
+              <a:buFont typeface="Arial" panose="020B0604020202020204" pitchFamily="34" charset="0"/>
+              <a:buChar char="•"/>
+            </a:pPr>
+            <a:r>
+              <a:rPr lang="de-DE" dirty="0"/>
+              <a:t>Für jeden </a:t>
+            </a:r>
+            <a:r>
+              <a:rPr lang="de-DE" dirty="0" err="1"/>
+              <a:t>GitLab</a:t>
+            </a:r>
+            <a:r>
+              <a:rPr lang="de-DE" dirty="0"/>
+              <a:t> CI Job</a:t>
+            </a:r>
+          </a:p>
+          <a:p>
+            <a:pPr lvl="1">
+              <a:buFont typeface="Arial" panose="020B0604020202020204" pitchFamily="34" charset="0"/>
+              <a:buChar char="•"/>
+            </a:pPr>
+            <a:endParaRPr lang="de-DE" dirty="0"/>
+          </a:p>
+          <a:p>
+            <a:pPr>
+              <a:buFont typeface="Arial" panose="020B0604020202020204" pitchFamily="34" charset="0"/>
+              <a:buChar char="•"/>
+            </a:pPr>
+            <a:r>
+              <a:rPr lang="de-DE" dirty="0"/>
+              <a:t>Use Case</a:t>
+            </a:r>
+          </a:p>
+          <a:p>
+            <a:pPr lvl="1">
+              <a:buFont typeface="Arial" panose="020B0604020202020204" pitchFamily="34" charset="0"/>
+              <a:buChar char="•"/>
+            </a:pPr>
+            <a:r>
+              <a:rPr lang="de-DE" dirty="0"/>
+              <a:t>Skalierbare </a:t>
+            </a:r>
+            <a:r>
+              <a:rPr lang="de-DE" dirty="0" err="1"/>
+              <a:t>Build</a:t>
+            </a:r>
+            <a:r>
+              <a:rPr lang="de-DE" dirty="0"/>
+              <a:t>-Infrastruktur</a:t>
+            </a:r>
+          </a:p>
+          <a:p>
+            <a:pPr lvl="1">
+              <a:buFont typeface="Arial" panose="020B0604020202020204" pitchFamily="34" charset="0"/>
+              <a:buChar char="•"/>
+            </a:pPr>
+            <a:r>
+              <a:rPr lang="de-DE" dirty="0"/>
+              <a:t>Bei bestehendem </a:t>
+            </a:r>
+            <a:r>
+              <a:rPr lang="de-DE" dirty="0" err="1"/>
+              <a:t>Kubernetes</a:t>
+            </a:r>
+            <a:r>
+              <a:rPr lang="de-DE"/>
+              <a:t>-Cluster</a:t>
+            </a:r>
+            <a:endParaRPr lang="de-DE" dirty="0"/>
+          </a:p>
+          <a:p>
+            <a:pPr>
+              <a:buFont typeface="Arial" panose="020B0604020202020204" pitchFamily="34" charset="0"/>
+              <a:buChar char="•"/>
+            </a:pPr>
+            <a:endParaRPr lang="de-DE" dirty="0"/>
+          </a:p>
+        </p:txBody>
+      </p:sp>
+    </p:spTree>
+    <p:extLst>
+      <p:ext uri="{BB962C8B-B14F-4D97-AF65-F5344CB8AC3E}">
+        <p14:creationId xmlns:p14="http://schemas.microsoft.com/office/powerpoint/2010/main" val="1121981447"/>
+      </p:ext>
+    </p:extLst>
+  </p:cSld>
+  <p:clrMapOvr>
+    <a:masterClrMapping/>
+  </p:clrMapOvr>
+</p:sld>
+</file>
+
+<file path=ppt/slides/slide94.xml><?xml version="1.0" encoding="utf-8"?>
+<p:sld xmlns:a="http://schemas.openxmlformats.org/drawingml/2006/main" xmlns:r="http://schemas.openxmlformats.org/officeDocument/2006/relationships" xmlns:p="http://schemas.openxmlformats.org/presentationml/2006/main">
+  <p:cSld>
+    <p:spTree>
+      <p:nvGrpSpPr>
+        <p:cNvPr id="1" name=""/>
+        <p:cNvGrpSpPr/>
+        <p:nvPr/>
+      </p:nvGrpSpPr>
+      <p:grpSpPr>
+        <a:xfrm>
+          <a:off x="0" y="0"/>
+          <a:ext cx="0" cy="0"/>
+          <a:chOff x="0" y="0"/>
+          <a:chExt cx="0" cy="0"/>
+        </a:xfrm>
+      </p:grpSpPr>
+      <p:sp>
+        <p:nvSpPr>
+          <p:cNvPr id="2" name="Titel 1">
+            <a:extLst>
+              <a:ext uri="{FF2B5EF4-FFF2-40B4-BE49-F238E27FC236}">
+                <a16:creationId xmlns:a16="http://schemas.microsoft.com/office/drawing/2014/main" id="{A5185172-EEA1-3642-0873-7093D2601ADE}"/>
+              </a:ext>
+            </a:extLst>
+          </p:cNvPr>
+          <p:cNvSpPr>
+            <a:spLocks noGrp="1"/>
+          </p:cNvSpPr>
+          <p:nvPr>
+            <p:ph type="title"/>
+          </p:nvPr>
+        </p:nvSpPr>
+        <p:spPr/>
+        <p:txBody>
+          <a:bodyPr/>
+          <a:lstStyle/>
+          <a:p>
+            <a:r>
+              <a:rPr lang="de-DE" dirty="0" err="1"/>
+              <a:t>GitLab</a:t>
+            </a:r>
+            <a:r>
+              <a:rPr lang="de-DE" dirty="0"/>
+              <a:t> Runner</a:t>
+            </a:r>
+          </a:p>
+        </p:txBody>
+      </p:sp>
+      <p:sp>
+        <p:nvSpPr>
+          <p:cNvPr id="3" name="Inhaltsplatzhalter 2">
+            <a:extLst>
+              <a:ext uri="{FF2B5EF4-FFF2-40B4-BE49-F238E27FC236}">
+                <a16:creationId xmlns:a16="http://schemas.microsoft.com/office/drawing/2014/main" id="{0C243C8F-069E-05CC-C7F2-094EE8DEF709}"/>
+              </a:ext>
+            </a:extLst>
+          </p:cNvPr>
+          <p:cNvSpPr>
+            <a:spLocks noGrp="1"/>
+          </p:cNvSpPr>
+          <p:nvPr>
+            <p:ph idx="1"/>
+          </p:nvPr>
+        </p:nvSpPr>
+        <p:spPr/>
+        <p:txBody>
+          <a:bodyPr/>
+          <a:lstStyle/>
+          <a:p>
+            <a:pPr marL="0" indent="0">
+              <a:buNone/>
+            </a:pPr>
+            <a:r>
+              <a:rPr lang="de-DE" b="1" dirty="0"/>
+              <a:t>Welcher </a:t>
+            </a:r>
+            <a:r>
+              <a:rPr lang="de-DE" b="1" dirty="0" err="1"/>
+              <a:t>Executor</a:t>
+            </a:r>
+            <a:r>
+              <a:rPr lang="de-DE" b="1" dirty="0"/>
+              <a:t> wird genutzt?</a:t>
+            </a:r>
+          </a:p>
+          <a:p>
+            <a:pPr marL="0" indent="0">
+              <a:buNone/>
+            </a:pPr>
+            <a:endParaRPr lang="de-DE" b="1" dirty="0"/>
+          </a:p>
+          <a:p>
+            <a:pPr marL="0" indent="0">
+              <a:buNone/>
+            </a:pPr>
+            <a:r>
+              <a:rPr lang="de-DE" b="1" dirty="0"/>
+              <a:t>TODO Screenshot aus </a:t>
+            </a:r>
+            <a:r>
+              <a:rPr lang="de-DE" b="1" dirty="0" err="1"/>
+              <a:t>gitlab</a:t>
+            </a:r>
+            <a:r>
+              <a:rPr lang="de-DE" b="1" dirty="0"/>
+              <a:t> einfügen von Logs, dort wo die Pipeline gestartet wird.</a:t>
+            </a:r>
+          </a:p>
+        </p:txBody>
+      </p:sp>
+    </p:spTree>
+    <p:extLst>
+      <p:ext uri="{BB962C8B-B14F-4D97-AF65-F5344CB8AC3E}">
+        <p14:creationId xmlns:p14="http://schemas.microsoft.com/office/powerpoint/2010/main" val="2509929445"/>
+      </p:ext>
+    </p:extLst>
+  </p:cSld>
+  <p:clrMapOvr>
+    <a:masterClrMapping/>
+  </p:clrMapOvr>
+</p:sld>
+</file>
+
+<file path=ppt/slides/slide95.xml><?xml version="1.0" encoding="utf-8"?>
+<p:sld xmlns:a="http://schemas.openxmlformats.org/drawingml/2006/main" xmlns:r="http://schemas.openxmlformats.org/officeDocument/2006/relationships" xmlns:p="http://schemas.openxmlformats.org/presentationml/2006/main">
+  <p:cSld>
+    <p:spTree>
+      <p:nvGrpSpPr>
+        <p:cNvPr id="1" name=""/>
+        <p:cNvGrpSpPr/>
+        <p:nvPr/>
+      </p:nvGrpSpPr>
+      <p:grpSpPr>
+        <a:xfrm>
+          <a:off x="0" y="0"/>
+          <a:ext cx="0" cy="0"/>
+          <a:chOff x="0" y="0"/>
+          <a:chExt cx="0" cy="0"/>
+        </a:xfrm>
+      </p:grpSpPr>
+      <p:sp>
+        <p:nvSpPr>
+          <p:cNvPr id="2" name="Titel 1"/>
+          <p:cNvSpPr>
+            <a:spLocks noGrp="1"/>
+          </p:cNvSpPr>
+          <p:nvPr>
+            <p:ph type="title"/>
+          </p:nvPr>
+        </p:nvSpPr>
+        <p:spPr/>
+        <p:txBody>
+          <a:bodyPr/>
+          <a:lstStyle/>
+          <a:p>
+            <a:r>
+              <a:rPr lang="de-DE" cap="none" dirty="0"/>
+              <a:t>Container/Docker Registry</a:t>
+            </a:r>
+          </a:p>
+        </p:txBody>
+      </p:sp>
+      <p:sp>
+        <p:nvSpPr>
+          <p:cNvPr id="3" name="Untertitel 2"/>
+          <p:cNvSpPr>
+            <a:spLocks noGrp="1"/>
+          </p:cNvSpPr>
+          <p:nvPr>
+            <p:ph type="body" idx="1"/>
+          </p:nvPr>
+        </p:nvSpPr>
+        <p:spPr/>
+        <p:txBody>
+          <a:bodyPr/>
+          <a:lstStyle/>
+          <a:p>
+            <a:r>
+              <a:rPr lang="de-DE" dirty="0"/>
+              <a:t>Grundlagen von</a:t>
+            </a:r>
+          </a:p>
+        </p:txBody>
+      </p:sp>
+    </p:spTree>
+    <p:extLst>
+      <p:ext uri="{BB962C8B-B14F-4D97-AF65-F5344CB8AC3E}">
+        <p14:creationId xmlns:p14="http://schemas.microsoft.com/office/powerpoint/2010/main" val="2809021556"/>
+      </p:ext>
+    </p:extLst>
+  </p:cSld>
+  <p:clrMapOvr>
+    <a:masterClrMapping/>
+  </p:clrMapOvr>
+</p:sld>
+</file>
+
+<file path=ppt/slides/slide96.xml><?xml version="1.0" encoding="utf-8"?>
+<p:sld xmlns:a="http://schemas.openxmlformats.org/drawingml/2006/main" xmlns:r="http://schemas.openxmlformats.org/officeDocument/2006/relationships" xmlns:p="http://schemas.openxmlformats.org/presentationml/2006/main">
+  <p:cSld>
+    <p:spTree>
+      <p:nvGrpSpPr>
+        <p:cNvPr id="1" name=""/>
+        <p:cNvGrpSpPr/>
+        <p:nvPr/>
+      </p:nvGrpSpPr>
+      <p:grpSpPr>
+        <a:xfrm>
+          <a:off x="0" y="0"/>
+          <a:ext cx="0" cy="0"/>
+          <a:chOff x="0" y="0"/>
+          <a:chExt cx="0" cy="0"/>
+        </a:xfrm>
+      </p:grpSpPr>
+      <p:sp>
+        <p:nvSpPr>
+          <p:cNvPr id="2" name="Titel 1">
+            <a:extLst>
+              <a:ext uri="{FF2B5EF4-FFF2-40B4-BE49-F238E27FC236}">
+                <a16:creationId xmlns:a16="http://schemas.microsoft.com/office/drawing/2014/main" id="{25E7C6E1-B055-3AFC-5E69-1173C8DA414C}"/>
+              </a:ext>
+            </a:extLst>
+          </p:cNvPr>
+          <p:cNvSpPr>
+            <a:spLocks noGrp="1"/>
+          </p:cNvSpPr>
+          <p:nvPr>
+            <p:ph type="title"/>
+          </p:nvPr>
+        </p:nvSpPr>
+        <p:spPr/>
+        <p:txBody>
+          <a:bodyPr/>
+          <a:lstStyle/>
+          <a:p>
+            <a:r>
+              <a:rPr lang="de-DE" dirty="0"/>
+              <a:t>Container Registry</a:t>
+            </a:r>
+          </a:p>
+        </p:txBody>
+      </p:sp>
+      <p:pic>
+        <p:nvPicPr>
+          <p:cNvPr id="5" name="Inhaltsplatzhalter 4">
+            <a:extLst>
+              <a:ext uri="{FF2B5EF4-FFF2-40B4-BE49-F238E27FC236}">
+                <a16:creationId xmlns:a16="http://schemas.microsoft.com/office/drawing/2014/main" id="{E7C5BE06-2B92-CC8B-9154-47007ABBF34A}"/>
+              </a:ext>
+            </a:extLst>
+          </p:cNvPr>
+          <p:cNvPicPr>
+            <a:picLocks noGrp="1" noChangeAspect="1"/>
+          </p:cNvPicPr>
+          <p:nvPr>
+            <p:ph idx="1"/>
+          </p:nvPr>
+        </p:nvPicPr>
+        <p:blipFill>
+          <a:blip r:embed="rId2">
+            <a:extLst>
+              <a:ext uri="{28A0092B-C50C-407E-A947-70E740481C1C}">
+                <a14:useLocalDpi xmlns:a14="http://schemas.microsoft.com/office/drawing/2010/main" val="0"/>
+              </a:ext>
+            </a:extLst>
+          </a:blip>
+          <a:stretch>
+            <a:fillRect/>
+          </a:stretch>
+        </p:blipFill>
+        <p:spPr>
+          <a:xfrm>
+            <a:off x="107504" y="2996952"/>
+            <a:ext cx="4300736" cy="4300736"/>
+          </a:xfrm>
+        </p:spPr>
+      </p:pic>
+      <p:pic>
+        <p:nvPicPr>
+          <p:cNvPr id="7" name="Grafik 6">
+            <a:extLst>
+              <a:ext uri="{FF2B5EF4-FFF2-40B4-BE49-F238E27FC236}">
+                <a16:creationId xmlns:a16="http://schemas.microsoft.com/office/drawing/2014/main" id="{BE9CCB7C-8C17-285C-7F88-68B9D147713B}"/>
+              </a:ext>
+            </a:extLst>
+          </p:cNvPr>
+          <p:cNvPicPr>
+            <a:picLocks noChangeAspect="1"/>
+          </p:cNvPicPr>
+          <p:nvPr/>
+        </p:nvPicPr>
+        <p:blipFill>
+          <a:blip r:embed="rId3">
+            <a:extLst>
+              <a:ext uri="{28A0092B-C50C-407E-A947-70E740481C1C}">
+                <a14:useLocalDpi xmlns:a14="http://schemas.microsoft.com/office/drawing/2010/main" val="0"/>
+              </a:ext>
+            </a:extLst>
+          </a:blip>
+          <a:stretch>
+            <a:fillRect/>
+          </a:stretch>
+        </p:blipFill>
+        <p:spPr>
+          <a:xfrm>
+            <a:off x="6516216" y="4495773"/>
+            <a:ext cx="1534942" cy="1412776"/>
+          </a:xfrm>
+          <a:prstGeom prst="rect">
+            <a:avLst/>
+          </a:prstGeom>
+        </p:spPr>
+      </p:pic>
+      <p:pic>
+        <p:nvPicPr>
+          <p:cNvPr id="9" name="Grafik 8">
+            <a:extLst>
+              <a:ext uri="{FF2B5EF4-FFF2-40B4-BE49-F238E27FC236}">
+                <a16:creationId xmlns:a16="http://schemas.microsoft.com/office/drawing/2014/main" id="{D8643DA2-0E30-D480-2AA8-859C9431F89F}"/>
+              </a:ext>
+            </a:extLst>
+          </p:cNvPr>
+          <p:cNvPicPr>
+            <a:picLocks noChangeAspect="1"/>
+          </p:cNvPicPr>
+          <p:nvPr/>
+        </p:nvPicPr>
+        <p:blipFill>
+          <a:blip r:embed="rId4">
+            <a:extLst>
+              <a:ext uri="{28A0092B-C50C-407E-A947-70E740481C1C}">
+                <a14:useLocalDpi xmlns:a14="http://schemas.microsoft.com/office/drawing/2010/main" val="0"/>
+              </a:ext>
+            </a:extLst>
+          </a:blip>
+          <a:stretch>
+            <a:fillRect/>
+          </a:stretch>
+        </p:blipFill>
+        <p:spPr>
+          <a:xfrm>
+            <a:off x="1353879" y="980728"/>
+            <a:ext cx="6336704" cy="3136668"/>
+          </a:xfrm>
+          <a:prstGeom prst="rect">
+            <a:avLst/>
+          </a:prstGeom>
+        </p:spPr>
+      </p:pic>
+    </p:spTree>
+    <p:extLst>
+      <p:ext uri="{BB962C8B-B14F-4D97-AF65-F5344CB8AC3E}">
+        <p14:creationId xmlns:p14="http://schemas.microsoft.com/office/powerpoint/2010/main" val="81545675"/>
+      </p:ext>
+    </p:extLst>
+  </p:cSld>
+  <p:clrMapOvr>
+    <a:masterClrMapping/>
+  </p:clrMapOvr>
 </p:sld>
 </file>
 

</xml_diff>

<commit_message>
Tag-3_2: Container Registry, Dockerfile, ci pipeline (gitlab-ci), usw. hinzugefügt.
</commit_message>
<xml_diff>
--- a/slides/Tag-3_2-GitLab-Runner-Container-Registry.pptx
+++ b/slides/Tag-3_2-GitLab-Runner-Container-Registry.pptx
@@ -6,10 +6,10 @@
     <p:sldMasterId id="2147483649" r:id="rId2"/>
   </p:sldMasterIdLst>
   <p:notesMasterIdLst>
-    <p:notesMasterId r:id="rId126"/>
+    <p:notesMasterId r:id="rId132"/>
   </p:notesMasterIdLst>
   <p:handoutMasterIdLst>
-    <p:handoutMasterId r:id="rId127"/>
+    <p:handoutMasterId r:id="rId133"/>
   </p:handoutMasterIdLst>
   <p:sldIdLst>
     <p:sldId id="288" r:id="rId3"/>
@@ -122,19 +122,25 @@
     <p:sldId id="707" r:id="rId110"/>
     <p:sldId id="700" r:id="rId111"/>
     <p:sldId id="714" r:id="rId112"/>
-    <p:sldId id="708" r:id="rId113"/>
-    <p:sldId id="701" r:id="rId114"/>
-    <p:sldId id="702" r:id="rId115"/>
-    <p:sldId id="709" r:id="rId116"/>
-    <p:sldId id="703" r:id="rId117"/>
-    <p:sldId id="710" r:id="rId118"/>
-    <p:sldId id="704" r:id="rId119"/>
-    <p:sldId id="711" r:id="rId120"/>
-    <p:sldId id="713" r:id="rId121"/>
-    <p:sldId id="705" r:id="rId122"/>
-    <p:sldId id="706" r:id="rId123"/>
-    <p:sldId id="712" r:id="rId124"/>
-    <p:sldId id="595" r:id="rId125"/>
+    <p:sldId id="715" r:id="rId113"/>
+    <p:sldId id="716" r:id="rId114"/>
+    <p:sldId id="718" r:id="rId115"/>
+    <p:sldId id="717" r:id="rId116"/>
+    <p:sldId id="708" r:id="rId117"/>
+    <p:sldId id="701" r:id="rId118"/>
+    <p:sldId id="719" r:id="rId119"/>
+    <p:sldId id="720" r:id="rId120"/>
+    <p:sldId id="702" r:id="rId121"/>
+    <p:sldId id="709" r:id="rId122"/>
+    <p:sldId id="703" r:id="rId123"/>
+    <p:sldId id="710" r:id="rId124"/>
+    <p:sldId id="704" r:id="rId125"/>
+    <p:sldId id="711" r:id="rId126"/>
+    <p:sldId id="713" r:id="rId127"/>
+    <p:sldId id="705" r:id="rId128"/>
+    <p:sldId id="706" r:id="rId129"/>
+    <p:sldId id="712" r:id="rId130"/>
+    <p:sldId id="595" r:id="rId131"/>
   </p:sldIdLst>
   <p:sldSz cx="9144000" cy="6858000" type="screen4x3"/>
   <p:notesSz cx="6784975" cy="9921875"/>
@@ -9993,7 +9999,216 @@
           <a:bodyPr/>
           <a:lstStyle/>
           <a:p>
-            <a:endParaRPr lang="de-DE" dirty="0"/>
+            <a:r>
+              <a:rPr lang="de-DE" dirty="0"/>
+              <a:t>Hier könnte man auch ein schlankeres Image </a:t>
+            </a:r>
+            <a:r>
+              <a:rPr lang="de-DE"/>
+              <a:t>(alpine?) </a:t>
+            </a:r>
+            <a:r>
+              <a:rPr lang="de-DE" dirty="0"/>
+              <a:t>verwenden. Könnte.</a:t>
+            </a:r>
+          </a:p>
+          <a:p>
+            <a:r>
+              <a:rPr lang="de-DE" dirty="0"/>
+              <a:t>Das Learning bzgl. der Image-Größen ist allerdings wichtig.</a:t>
+            </a:r>
+          </a:p>
+        </p:txBody>
+      </p:sp>
+      <p:sp>
+        <p:nvSpPr>
+          <p:cNvPr id="4" name="Foliennummernplatzhalter 3"/>
+          <p:cNvSpPr>
+            <a:spLocks noGrp="1"/>
+          </p:cNvSpPr>
+          <p:nvPr>
+            <p:ph type="sldNum" sz="quarter" idx="5"/>
+          </p:nvPr>
+        </p:nvSpPr>
+        <p:spPr/>
+        <p:txBody>
+          <a:bodyPr/>
+          <a:lstStyle/>
+          <a:p>
+            <a:fld id="{18182567-388C-4D33-8B7B-A651F195F118}" type="slidenum">
+              <a:rPr lang="de-DE" altLang="de-DE" smtClean="0"/>
+              <a:pPr/>
+              <a:t>112</a:t>
+            </a:fld>
+            <a:endParaRPr lang="de-DE" altLang="de-DE"/>
+          </a:p>
+        </p:txBody>
+      </p:sp>
+    </p:spTree>
+    <p:extLst>
+      <p:ext uri="{BB962C8B-B14F-4D97-AF65-F5344CB8AC3E}">
+        <p14:creationId xmlns:p14="http://schemas.microsoft.com/office/powerpoint/2010/main" val="3568015380"/>
+      </p:ext>
+    </p:extLst>
+  </p:cSld>
+  <p:clrMapOvr>
+    <a:masterClrMapping/>
+  </p:clrMapOvr>
+</p:notes>
+</file>
+
+<file path=ppt/notesSlides/notesSlide86.xml><?xml version="1.0" encoding="utf-8"?>
+<p:notes xmlns:a="http://schemas.openxmlformats.org/drawingml/2006/main" xmlns:r="http://schemas.openxmlformats.org/officeDocument/2006/relationships" xmlns:p="http://schemas.openxmlformats.org/presentationml/2006/main">
+  <p:cSld>
+    <p:spTree>
+      <p:nvGrpSpPr>
+        <p:cNvPr id="1" name=""/>
+        <p:cNvGrpSpPr/>
+        <p:nvPr/>
+      </p:nvGrpSpPr>
+      <p:grpSpPr>
+        <a:xfrm>
+          <a:off x="0" y="0"/>
+          <a:ext cx="0" cy="0"/>
+          <a:chOff x="0" y="0"/>
+          <a:chExt cx="0" cy="0"/>
+        </a:xfrm>
+      </p:grpSpPr>
+      <p:sp>
+        <p:nvSpPr>
+          <p:cNvPr id="2" name="Folienbildplatzhalter 1"/>
+          <p:cNvSpPr>
+            <a:spLocks noGrp="1" noRot="1" noChangeAspect="1"/>
+          </p:cNvSpPr>
+          <p:nvPr>
+            <p:ph type="sldImg"/>
+          </p:nvPr>
+        </p:nvSpPr>
+        <p:spPr/>
+      </p:sp>
+      <p:sp>
+        <p:nvSpPr>
+          <p:cNvPr id="3" name="Notizenplatzhalter 2"/>
+          <p:cNvSpPr>
+            <a:spLocks noGrp="1"/>
+          </p:cNvSpPr>
+          <p:nvPr>
+            <p:ph type="body" idx="1"/>
+          </p:nvPr>
+        </p:nvSpPr>
+        <p:spPr/>
+        <p:txBody>
+          <a:bodyPr/>
+          <a:lstStyle/>
+          <a:p>
+            <a:r>
+              <a:rPr lang="de-DE" dirty="0"/>
+              <a:t>Dort werden dann die gesamten Tags aufgelistet. Wir haben aktuell nur ein einziges Tag und das ist „</a:t>
+            </a:r>
+            <a:r>
+              <a:rPr lang="de-DE" dirty="0" err="1"/>
+              <a:t>latest</a:t>
+            </a:r>
+            <a:r>
+              <a:rPr lang="de-DE" dirty="0"/>
+              <a:t>“.</a:t>
+            </a:r>
+          </a:p>
+        </p:txBody>
+      </p:sp>
+      <p:sp>
+        <p:nvSpPr>
+          <p:cNvPr id="4" name="Foliennummernplatzhalter 3"/>
+          <p:cNvSpPr>
+            <a:spLocks noGrp="1"/>
+          </p:cNvSpPr>
+          <p:nvPr>
+            <p:ph type="sldNum" sz="quarter" idx="5"/>
+          </p:nvPr>
+        </p:nvSpPr>
+        <p:spPr/>
+        <p:txBody>
+          <a:bodyPr/>
+          <a:lstStyle/>
+          <a:p>
+            <a:fld id="{18182567-388C-4D33-8B7B-A651F195F118}" type="slidenum">
+              <a:rPr lang="de-DE" altLang="de-DE" smtClean="0"/>
+              <a:pPr/>
+              <a:t>117</a:t>
+            </a:fld>
+            <a:endParaRPr lang="de-DE" altLang="de-DE"/>
+          </a:p>
+        </p:txBody>
+      </p:sp>
+    </p:spTree>
+    <p:extLst>
+      <p:ext uri="{BB962C8B-B14F-4D97-AF65-F5344CB8AC3E}">
+        <p14:creationId xmlns:p14="http://schemas.microsoft.com/office/powerpoint/2010/main" val="1441243538"/>
+      </p:ext>
+    </p:extLst>
+  </p:cSld>
+  <p:clrMapOvr>
+    <a:masterClrMapping/>
+  </p:clrMapOvr>
+</p:notes>
+</file>
+
+<file path=ppt/notesSlides/notesSlide87.xml><?xml version="1.0" encoding="utf-8"?>
+<p:notes xmlns:a="http://schemas.openxmlformats.org/drawingml/2006/main" xmlns:r="http://schemas.openxmlformats.org/officeDocument/2006/relationships" xmlns:p="http://schemas.openxmlformats.org/presentationml/2006/main">
+  <p:cSld>
+    <p:spTree>
+      <p:nvGrpSpPr>
+        <p:cNvPr id="1" name=""/>
+        <p:cNvGrpSpPr/>
+        <p:nvPr/>
+      </p:nvGrpSpPr>
+      <p:grpSpPr>
+        <a:xfrm>
+          <a:off x="0" y="0"/>
+          <a:ext cx="0" cy="0"/>
+          <a:chOff x="0" y="0"/>
+          <a:chExt cx="0" cy="0"/>
+        </a:xfrm>
+      </p:grpSpPr>
+      <p:sp>
+        <p:nvSpPr>
+          <p:cNvPr id="2" name="Folienbildplatzhalter 1"/>
+          <p:cNvSpPr>
+            <a:spLocks noGrp="1" noRot="1" noChangeAspect="1"/>
+          </p:cNvSpPr>
+          <p:nvPr>
+            <p:ph type="sldImg"/>
+          </p:nvPr>
+        </p:nvSpPr>
+        <p:spPr/>
+      </p:sp>
+      <p:sp>
+        <p:nvSpPr>
+          <p:cNvPr id="3" name="Notizenplatzhalter 2"/>
+          <p:cNvSpPr>
+            <a:spLocks noGrp="1"/>
+          </p:cNvSpPr>
+          <p:nvPr>
+            <p:ph type="body" idx="1"/>
+          </p:nvPr>
+        </p:nvSpPr>
+        <p:spPr/>
+        <p:txBody>
+          <a:bodyPr/>
+          <a:lstStyle/>
+          <a:p>
+            <a:r>
+              <a:rPr lang="de-DE" dirty="0"/>
+              <a:t>Dort werden dann die gesamten Tags aufgelistet. Wir haben aktuell nur ein einziges Tag und das ist „</a:t>
+            </a:r>
+            <a:r>
+              <a:rPr lang="de-DE" dirty="0" err="1"/>
+              <a:t>latest</a:t>
+            </a:r>
+            <a:r>
+              <a:rPr lang="de-DE" dirty="0"/>
+              <a:t>“.</a:t>
+            </a:r>
           </a:p>
         </p:txBody>
       </p:sp>
@@ -10016,6 +10231,91 @@
               <a:rPr lang="de-DE" altLang="de-DE" smtClean="0"/>
               <a:pPr/>
               <a:t>118</a:t>
+            </a:fld>
+            <a:endParaRPr lang="de-DE" altLang="de-DE"/>
+          </a:p>
+        </p:txBody>
+      </p:sp>
+    </p:spTree>
+    <p:extLst>
+      <p:ext uri="{BB962C8B-B14F-4D97-AF65-F5344CB8AC3E}">
+        <p14:creationId xmlns:p14="http://schemas.microsoft.com/office/powerpoint/2010/main" val="3792026032"/>
+      </p:ext>
+    </p:extLst>
+  </p:cSld>
+  <p:clrMapOvr>
+    <a:masterClrMapping/>
+  </p:clrMapOvr>
+</p:notes>
+</file>
+
+<file path=ppt/notesSlides/notesSlide88.xml><?xml version="1.0" encoding="utf-8"?>
+<p:notes xmlns:a="http://schemas.openxmlformats.org/drawingml/2006/main" xmlns:r="http://schemas.openxmlformats.org/officeDocument/2006/relationships" xmlns:p="http://schemas.openxmlformats.org/presentationml/2006/main">
+  <p:cSld>
+    <p:spTree>
+      <p:nvGrpSpPr>
+        <p:cNvPr id="1" name=""/>
+        <p:cNvGrpSpPr/>
+        <p:nvPr/>
+      </p:nvGrpSpPr>
+      <p:grpSpPr>
+        <a:xfrm>
+          <a:off x="0" y="0"/>
+          <a:ext cx="0" cy="0"/>
+          <a:chOff x="0" y="0"/>
+          <a:chExt cx="0" cy="0"/>
+        </a:xfrm>
+      </p:grpSpPr>
+      <p:sp>
+        <p:nvSpPr>
+          <p:cNvPr id="2" name="Folienbildplatzhalter 1"/>
+          <p:cNvSpPr>
+            <a:spLocks noGrp="1" noRot="1" noChangeAspect="1"/>
+          </p:cNvSpPr>
+          <p:nvPr>
+            <p:ph type="sldImg"/>
+          </p:nvPr>
+        </p:nvSpPr>
+        <p:spPr/>
+      </p:sp>
+      <p:sp>
+        <p:nvSpPr>
+          <p:cNvPr id="3" name="Notizenplatzhalter 2"/>
+          <p:cNvSpPr>
+            <a:spLocks noGrp="1"/>
+          </p:cNvSpPr>
+          <p:nvPr>
+            <p:ph type="body" idx="1"/>
+          </p:nvPr>
+        </p:nvSpPr>
+        <p:spPr/>
+        <p:txBody>
+          <a:bodyPr/>
+          <a:lstStyle/>
+          <a:p>
+            <a:endParaRPr lang="de-DE" dirty="0"/>
+          </a:p>
+        </p:txBody>
+      </p:sp>
+      <p:sp>
+        <p:nvSpPr>
+          <p:cNvPr id="4" name="Foliennummernplatzhalter 3"/>
+          <p:cNvSpPr>
+            <a:spLocks noGrp="1"/>
+          </p:cNvSpPr>
+          <p:nvPr>
+            <p:ph type="sldNum" sz="quarter" idx="5"/>
+          </p:nvPr>
+        </p:nvSpPr>
+        <p:spPr/>
+        <p:txBody>
+          <a:bodyPr/>
+          <a:lstStyle/>
+          <a:p>
+            <a:fld id="{18182567-388C-4D33-8B7B-A651F195F118}" type="slidenum">
+              <a:rPr lang="de-DE" altLang="de-DE" smtClean="0"/>
+              <a:pPr/>
+              <a:t>124</a:t>
             </a:fld>
             <a:endParaRPr lang="de-DE" altLang="de-DE"/>
           </a:p>
@@ -10612,7 +10912,7 @@
               <a:pPr algn="ctr">
                 <a:defRPr/>
               </a:pPr>
-              <a:t>29.05.2024</a:t>
+              <a:t>30.05.2024</a:t>
             </a:fld>
             <a:endParaRPr lang="de-DE" sz="1000">
               <a:solidFill>
@@ -17435,7 +17735,7 @@
           <a:lstStyle/>
           <a:p>
             <a:r>
-              <a:rPr lang="de-DE"/>
+              <a:rPr lang="de-DE" dirty="0"/>
               <a:t>Container Registry</a:t>
             </a:r>
           </a:p>
@@ -17511,7 +17811,7 @@
           <p:cNvPr id="2" name="Titel 1">
             <a:extLst>
               <a:ext uri="{FF2B5EF4-FFF2-40B4-BE49-F238E27FC236}">
-                <a16:creationId xmlns:a16="http://schemas.microsoft.com/office/drawing/2014/main" id="{6AA67486-2598-533D-4DB5-FC490AB10E2A}"/>
+                <a16:creationId xmlns:a16="http://schemas.microsoft.com/office/drawing/2014/main" id="{80E60108-BD0C-71E3-2804-92F654F44B87}"/>
               </a:ext>
             </a:extLst>
           </p:cNvPr>
@@ -17539,7 +17839,7 @@
           <p:cNvPr id="3" name="Inhaltsplatzhalter 2">
             <a:extLst>
               <a:ext uri="{FF2B5EF4-FFF2-40B4-BE49-F238E27FC236}">
-                <a16:creationId xmlns:a16="http://schemas.microsoft.com/office/drawing/2014/main" id="{CA708DD8-2C30-488D-3B3A-0BE38FE0786D}"/>
+                <a16:creationId xmlns:a16="http://schemas.microsoft.com/office/drawing/2014/main" id="{8EE2252E-8F03-9CA6-D022-702FAA99519F}"/>
               </a:ext>
             </a:extLst>
           </p:cNvPr>
@@ -17555,81 +17855,209 @@
           <a:bodyPr/>
           <a:lstStyle/>
           <a:p>
-            <a:pPr>
-              <a:buFont typeface="Arial" panose="020B0604020202020204" pitchFamily="34" charset="0"/>
-              <a:buChar char="•"/>
-            </a:pPr>
-            <a:r>
-              <a:rPr lang="de-DE" dirty="0"/>
-              <a:t>Container Registry ansehen</a:t>
-            </a:r>
-          </a:p>
-          <a:p>
-            <a:pPr>
-              <a:buFont typeface="Arial" panose="020B0604020202020204" pitchFamily="34" charset="0"/>
-              <a:buChar char="•"/>
-            </a:pPr>
-            <a:r>
-              <a:rPr lang="de-DE" u="sng" dirty="0"/>
-              <a:t>Tags eines bestimmten Container Image ansehen</a:t>
-            </a:r>
-          </a:p>
-          <a:p>
-            <a:pPr>
-              <a:buFont typeface="Arial" panose="020B0604020202020204" pitchFamily="34" charset="0"/>
-              <a:buChar char="•"/>
-            </a:pPr>
-            <a:r>
-              <a:rPr lang="de-DE" dirty="0"/>
-              <a:t>Container Images von der Container Registry nutzen</a:t>
-            </a:r>
-          </a:p>
-          <a:p>
-            <a:pPr>
-              <a:buFont typeface="Arial" panose="020B0604020202020204" pitchFamily="34" charset="0"/>
-              <a:buChar char="•"/>
-            </a:pPr>
-            <a:r>
-              <a:rPr lang="de-DE" dirty="0"/>
-              <a:t>Naming Convention für Container Images</a:t>
-            </a:r>
-          </a:p>
-          <a:p>
-            <a:pPr>
-              <a:buFont typeface="Arial" panose="020B0604020202020204" pitchFamily="34" charset="0"/>
-              <a:buChar char="•"/>
-            </a:pPr>
-            <a:r>
-              <a:rPr lang="de-DE" dirty="0"/>
-              <a:t>Verschieben oder Umbenennen einer Container Registry</a:t>
-            </a:r>
-          </a:p>
-          <a:p>
-            <a:pPr>
-              <a:buFont typeface="Arial" panose="020B0604020202020204" pitchFamily="34" charset="0"/>
-              <a:buChar char="•"/>
-            </a:pPr>
-            <a:r>
-              <a:rPr lang="de-DE" dirty="0"/>
-              <a:t>Container Registry für ein Projekt deaktivieren</a:t>
-            </a:r>
-          </a:p>
-          <a:p>
-            <a:pPr>
-              <a:buFont typeface="Arial" panose="020B0604020202020204" pitchFamily="34" charset="0"/>
-              <a:buChar char="•"/>
-            </a:pPr>
-            <a:r>
-              <a:rPr lang="de-DE" dirty="0"/>
-              <a:t>Sichtbarkeit der Container Registry ändern</a:t>
-            </a:r>
+            <a:pPr marL="0" indent="0">
+              <a:buNone/>
+            </a:pPr>
+            <a:r>
+              <a:rPr lang="de-DE" b="1" dirty="0"/>
+              <a:t>Wir brauchen ein Docker Image!</a:t>
+            </a:r>
+          </a:p>
+          <a:p>
+            <a:pPr marL="457200" indent="-457200">
+              <a:buFont typeface="+mj-lt"/>
+              <a:buAutoNum type="arabicPeriod"/>
+            </a:pPr>
+            <a:r>
+              <a:rPr lang="de-DE" dirty="0"/>
+              <a:t>Docker muss installiert sein</a:t>
+            </a:r>
+          </a:p>
+          <a:p>
+            <a:pPr marL="457200" indent="-457200">
+              <a:buFont typeface="+mj-lt"/>
+              <a:buAutoNum type="arabicPeriod"/>
+            </a:pPr>
+            <a:r>
+              <a:rPr lang="de-DE" dirty="0"/>
+              <a:t>Mit Docker auf </a:t>
+            </a:r>
+            <a:r>
+              <a:rPr lang="de-DE" dirty="0" err="1"/>
+              <a:t>GitLab</a:t>
+            </a:r>
+            <a:r>
+              <a:rPr lang="de-DE" dirty="0"/>
+              <a:t> einloggen</a:t>
+            </a:r>
+          </a:p>
+          <a:p>
+            <a:pPr marL="857250" lvl="1" indent="-457200">
+              <a:buFont typeface="Arial" panose="020B0604020202020204" pitchFamily="34" charset="0"/>
+              <a:buChar char="•"/>
+            </a:pPr>
+            <a:r>
+              <a:rPr lang="de-DE" dirty="0"/>
+              <a:t>Siehe Vorschlagstext von </a:t>
+            </a:r>
+            <a:r>
+              <a:rPr lang="de-DE" dirty="0" err="1"/>
+              <a:t>GitLab</a:t>
+            </a:r>
+            <a:r>
+              <a:rPr lang="de-DE" dirty="0"/>
+              <a:t>!</a:t>
+            </a:r>
+          </a:p>
+          <a:p>
+            <a:pPr marL="857250" lvl="1" indent="-457200">
+              <a:buFont typeface="Arial" panose="020B0604020202020204" pitchFamily="34" charset="0"/>
+              <a:buChar char="•"/>
+            </a:pPr>
+            <a:r>
+              <a:rPr lang="de-DE" dirty="0"/>
+              <a:t>Hier: </a:t>
+            </a:r>
+            <a:r>
+              <a:rPr lang="de-DE" dirty="0" err="1"/>
+              <a:t>docker</a:t>
+            </a:r>
+            <a:r>
+              <a:rPr lang="de-DE" dirty="0"/>
+              <a:t> </a:t>
+            </a:r>
+            <a:r>
+              <a:rPr lang="de-DE" dirty="0" err="1"/>
+              <a:t>login</a:t>
+            </a:r>
+            <a:r>
+              <a:rPr lang="de-DE" dirty="0"/>
+              <a:t> gitlab.ads.anderscore.com:5006</a:t>
+            </a:r>
+          </a:p>
+          <a:p>
+            <a:pPr marL="457200" indent="-457200">
+              <a:buFont typeface="+mj-lt"/>
+              <a:buAutoNum type="arabicPeriod"/>
+            </a:pPr>
+            <a:r>
+              <a:rPr lang="de-DE" dirty="0"/>
+              <a:t>Lokales </a:t>
+            </a:r>
+            <a:r>
+              <a:rPr lang="de-DE" dirty="0" err="1"/>
+              <a:t>Dockerfile</a:t>
+            </a:r>
+            <a:r>
+              <a:rPr lang="de-DE" dirty="0"/>
+              <a:t> im Projekt erstellen</a:t>
+            </a:r>
+          </a:p>
+          <a:p>
+            <a:pPr marL="457200" indent="-457200">
+              <a:buFont typeface="+mj-lt"/>
+              <a:buAutoNum type="arabicPeriod"/>
+            </a:pPr>
+            <a:r>
+              <a:rPr lang="de-DE" dirty="0"/>
+              <a:t>Docker Image bauen</a:t>
+            </a:r>
+          </a:p>
+          <a:p>
+            <a:pPr marL="857250" lvl="1" indent="-457200">
+              <a:buFont typeface="Arial" panose="020B0604020202020204" pitchFamily="34" charset="0"/>
+              <a:buChar char="•"/>
+            </a:pPr>
+            <a:r>
+              <a:rPr lang="de-DE" dirty="0" err="1"/>
+              <a:t>docker</a:t>
+            </a:r>
+            <a:r>
+              <a:rPr lang="de-DE" dirty="0"/>
+              <a:t> </a:t>
+            </a:r>
+            <a:r>
+              <a:rPr lang="de-DE" dirty="0" err="1"/>
+              <a:t>build</a:t>
+            </a:r>
+            <a:r>
+              <a:rPr lang="de-DE" dirty="0"/>
+              <a:t> -t gitlab.ads.anderscore.com:5006/</a:t>
+            </a:r>
+            <a:r>
+              <a:rPr lang="de-DE" dirty="0" err="1"/>
+              <a:t>trainings</a:t>
+            </a:r>
+            <a:r>
+              <a:rPr lang="de-DE" dirty="0"/>
+              <a:t>/</a:t>
+            </a:r>
+            <a:r>
+              <a:rPr lang="de-DE" dirty="0" err="1"/>
+              <a:t>gitlab</a:t>
+            </a:r>
+            <a:r>
+              <a:rPr lang="de-DE" dirty="0"/>
+              <a:t> .</a:t>
+            </a:r>
+          </a:p>
+          <a:p>
+            <a:pPr marL="457200" indent="-457200">
+              <a:buFont typeface="+mj-lt"/>
+              <a:buAutoNum type="arabicPeriod"/>
+            </a:pPr>
+            <a:r>
+              <a:rPr lang="de-DE" dirty="0"/>
+              <a:t>Docker Image in die </a:t>
+            </a:r>
+            <a:r>
+              <a:rPr lang="de-DE" dirty="0" err="1"/>
+              <a:t>GitLab</a:t>
+            </a:r>
+            <a:r>
+              <a:rPr lang="de-DE" dirty="0"/>
+              <a:t> Container Registry pushen</a:t>
+            </a:r>
+          </a:p>
+          <a:p>
+            <a:pPr marL="857250" lvl="1" indent="-457200">
+              <a:buFont typeface="Arial" panose="020B0604020202020204" pitchFamily="34" charset="0"/>
+              <a:buChar char="•"/>
+            </a:pPr>
+            <a:r>
+              <a:rPr lang="de-DE" dirty="0" err="1"/>
+              <a:t>docker</a:t>
+            </a:r>
+            <a:r>
+              <a:rPr lang="de-DE" dirty="0"/>
+              <a:t> push gitlab.ads.anderscore.com:5006/</a:t>
+            </a:r>
+            <a:r>
+              <a:rPr lang="de-DE" dirty="0" err="1"/>
+              <a:t>trainings</a:t>
+            </a:r>
+            <a:r>
+              <a:rPr lang="de-DE" dirty="0"/>
+              <a:t>/</a:t>
+            </a:r>
+            <a:r>
+              <a:rPr lang="de-DE" dirty="0" err="1"/>
+              <a:t>gitlab</a:t>
+            </a:r>
+            <a:endParaRPr lang="de-DE" dirty="0"/>
+          </a:p>
+          <a:p>
+            <a:pPr marL="0" indent="0">
+              <a:buNone/>
+            </a:pPr>
+            <a:endParaRPr lang="de-DE" b="1" dirty="0"/>
           </a:p>
         </p:txBody>
       </p:sp>
     </p:spTree>
     <p:extLst>
       <p:ext uri="{BB962C8B-B14F-4D97-AF65-F5344CB8AC3E}">
-        <p14:creationId xmlns:p14="http://schemas.microsoft.com/office/powerpoint/2010/main" val="1518629705"/>
+        <p14:creationId xmlns:p14="http://schemas.microsoft.com/office/powerpoint/2010/main" val="1822228289"/>
       </p:ext>
     </p:extLst>
   </p:cSld>
@@ -17661,7 +18089,7 @@
           <p:cNvPr id="2" name="Titel 1">
             <a:extLst>
               <a:ext uri="{FF2B5EF4-FFF2-40B4-BE49-F238E27FC236}">
-                <a16:creationId xmlns:a16="http://schemas.microsoft.com/office/drawing/2014/main" id="{6AA67486-2598-533D-4DB5-FC490AB10E2A}"/>
+                <a16:creationId xmlns:a16="http://schemas.microsoft.com/office/drawing/2014/main" id="{E8451361-0E67-CBAF-BAC8-61E8FC26ED7E}"/>
               </a:ext>
             </a:extLst>
           </p:cNvPr>
@@ -17689,7 +18117,7 @@
           <p:cNvPr id="3" name="Inhaltsplatzhalter 2">
             <a:extLst>
               <a:ext uri="{FF2B5EF4-FFF2-40B4-BE49-F238E27FC236}">
-                <a16:creationId xmlns:a16="http://schemas.microsoft.com/office/drawing/2014/main" id="{CA708DD8-2C30-488D-3B3A-0BE38FE0786D}"/>
+                <a16:creationId xmlns:a16="http://schemas.microsoft.com/office/drawing/2014/main" id="{B4D2FE18-90E4-6B13-8F57-52B0A416EABC}"/>
               </a:ext>
             </a:extLst>
           </p:cNvPr>
@@ -17702,29 +18130,938 @@
         </p:nvSpPr>
         <p:spPr/>
         <p:txBody>
-          <a:bodyPr/>
+          <a:bodyPr numCol="2"/>
           <a:lstStyle/>
           <a:p>
             <a:pPr marL="0" indent="0">
               <a:buNone/>
             </a:pPr>
             <a:r>
-              <a:rPr lang="de-DE" b="1" dirty="0"/>
-              <a:t>Tags eines bestimmten Container Image ansehen</a:t>
-            </a:r>
+              <a:rPr lang="de-DE" sz="1400" b="1" dirty="0" err="1"/>
+              <a:t>Dockerfile</a:t>
+            </a:r>
+            <a:endParaRPr lang="de-DE" sz="1400" b="1" dirty="0"/>
           </a:p>
           <a:p>
             <a:pPr marL="0" indent="0">
               <a:buNone/>
             </a:pPr>
-            <a:endParaRPr lang="de-DE" dirty="0"/>
+            <a:r>
+              <a:rPr lang="de-DE" sz="1400" dirty="0">
+                <a:latin typeface="Consolas" panose="020B0609020204030204" pitchFamily="49" charset="0"/>
+              </a:rPr>
+              <a:t>FROM centos:7</a:t>
+            </a:r>
+          </a:p>
+          <a:p>
+            <a:pPr marL="0" indent="0">
+              <a:buNone/>
+            </a:pPr>
+            <a:r>
+              <a:rPr lang="de-DE" sz="1400" dirty="0">
+                <a:latin typeface="Consolas" panose="020B0609020204030204" pitchFamily="49" charset="0"/>
+              </a:rPr>
+              <a:t>LABEL </a:t>
+            </a:r>
+            <a:r>
+              <a:rPr lang="de-DE" sz="1400" dirty="0" err="1">
+                <a:latin typeface="Consolas" panose="020B0609020204030204" pitchFamily="49" charset="0"/>
+              </a:rPr>
+              <a:t>maintainer</a:t>
+            </a:r>
+            <a:r>
+              <a:rPr lang="de-DE" sz="1400" dirty="0">
+                <a:latin typeface="Consolas" panose="020B0609020204030204" pitchFamily="49" charset="0"/>
+              </a:rPr>
+              <a:t>="Patrick </a:t>
+            </a:r>
+            <a:r>
+              <a:rPr lang="de-DE" sz="1400" dirty="0" err="1">
+                <a:latin typeface="Consolas" panose="020B0609020204030204" pitchFamily="49" charset="0"/>
+              </a:rPr>
+              <a:t>Ungewiß</a:t>
+            </a:r>
+            <a:r>
+              <a:rPr lang="de-DE" sz="1400" dirty="0">
+                <a:latin typeface="Consolas" panose="020B0609020204030204" pitchFamily="49" charset="0"/>
+              </a:rPr>
+              <a:t>"</a:t>
+            </a:r>
+          </a:p>
+          <a:p>
+            <a:pPr marL="0" indent="0">
+              <a:buNone/>
+            </a:pPr>
+            <a:r>
+              <a:rPr lang="de-DE" sz="1400" dirty="0">
+                <a:latin typeface="Consolas" panose="020B0609020204030204" pitchFamily="49" charset="0"/>
+              </a:rPr>
+              <a:t>ARG TIMEZONE="Germany/Cologne"</a:t>
+            </a:r>
+          </a:p>
+          <a:p>
+            <a:pPr marL="0" indent="0">
+              <a:buNone/>
+            </a:pPr>
+            <a:endParaRPr lang="de-DE" sz="1400" dirty="0">
+              <a:latin typeface="Consolas" panose="020B0609020204030204" pitchFamily="49" charset="0"/>
+            </a:endParaRPr>
+          </a:p>
+          <a:p>
+            <a:pPr marL="0" indent="0">
+              <a:buNone/>
+            </a:pPr>
+            <a:r>
+              <a:rPr lang="de-DE" sz="1400" dirty="0">
+                <a:latin typeface="Consolas" panose="020B0609020204030204" pitchFamily="49" charset="0"/>
+              </a:rPr>
+              <a:t># </a:t>
+            </a:r>
+            <a:r>
+              <a:rPr lang="de-DE" sz="1400" dirty="0" err="1">
+                <a:latin typeface="Consolas" panose="020B0609020204030204" pitchFamily="49" charset="0"/>
+              </a:rPr>
+              <a:t>set</a:t>
+            </a:r>
+            <a:r>
+              <a:rPr lang="de-DE" sz="1400" dirty="0">
+                <a:latin typeface="Consolas" panose="020B0609020204030204" pitchFamily="49" charset="0"/>
+              </a:rPr>
+              <a:t> a </a:t>
+            </a:r>
+            <a:r>
+              <a:rPr lang="de-DE" sz="1400" dirty="0" err="1">
+                <a:latin typeface="Consolas" panose="020B0609020204030204" pitchFamily="49" charset="0"/>
+              </a:rPr>
+              <a:t>directory</a:t>
+            </a:r>
+            <a:r>
+              <a:rPr lang="de-DE" sz="1400" dirty="0">
+                <a:latin typeface="Consolas" panose="020B0609020204030204" pitchFamily="49" charset="0"/>
+              </a:rPr>
+              <a:t> </a:t>
+            </a:r>
+            <a:r>
+              <a:rPr lang="de-DE" sz="1400" dirty="0" err="1">
+                <a:latin typeface="Consolas" panose="020B0609020204030204" pitchFamily="49" charset="0"/>
+              </a:rPr>
+              <a:t>for</a:t>
+            </a:r>
+            <a:r>
+              <a:rPr lang="de-DE" sz="1400" dirty="0">
+                <a:latin typeface="Consolas" panose="020B0609020204030204" pitchFamily="49" charset="0"/>
+              </a:rPr>
+              <a:t> </a:t>
+            </a:r>
+            <a:r>
+              <a:rPr lang="de-DE" sz="1400" dirty="0" err="1">
+                <a:latin typeface="Consolas" panose="020B0609020204030204" pitchFamily="49" charset="0"/>
+              </a:rPr>
+              <a:t>the</a:t>
+            </a:r>
+            <a:r>
+              <a:rPr lang="de-DE" sz="1400" dirty="0">
+                <a:latin typeface="Consolas" panose="020B0609020204030204" pitchFamily="49" charset="0"/>
+              </a:rPr>
+              <a:t> </a:t>
+            </a:r>
+            <a:r>
+              <a:rPr lang="de-DE" sz="1400" dirty="0" err="1">
+                <a:latin typeface="Consolas" panose="020B0609020204030204" pitchFamily="49" charset="0"/>
+              </a:rPr>
+              <a:t>app</a:t>
+            </a:r>
+            <a:endParaRPr lang="de-DE" sz="1400" dirty="0">
+              <a:latin typeface="Consolas" panose="020B0609020204030204" pitchFamily="49" charset="0"/>
+            </a:endParaRPr>
+          </a:p>
+          <a:p>
+            <a:pPr marL="0" indent="0">
+              <a:buNone/>
+            </a:pPr>
+            <a:r>
+              <a:rPr lang="de-DE" sz="1400" dirty="0">
+                <a:latin typeface="Consolas" panose="020B0609020204030204" pitchFamily="49" charset="0"/>
+              </a:rPr>
+              <a:t>WORKDIR /</a:t>
+            </a:r>
+            <a:r>
+              <a:rPr lang="de-DE" sz="1400" dirty="0" err="1">
+                <a:latin typeface="Consolas" panose="020B0609020204030204" pitchFamily="49" charset="0"/>
+              </a:rPr>
+              <a:t>usr</a:t>
+            </a:r>
+            <a:r>
+              <a:rPr lang="de-DE" sz="1400" dirty="0">
+                <a:latin typeface="Consolas" panose="020B0609020204030204" pitchFamily="49" charset="0"/>
+              </a:rPr>
+              <a:t>/</a:t>
+            </a:r>
+            <a:r>
+              <a:rPr lang="de-DE" sz="1400" dirty="0" err="1">
+                <a:latin typeface="Consolas" panose="020B0609020204030204" pitchFamily="49" charset="0"/>
+              </a:rPr>
+              <a:t>src</a:t>
+            </a:r>
+            <a:r>
+              <a:rPr lang="de-DE" sz="1400" dirty="0">
+                <a:latin typeface="Consolas" panose="020B0609020204030204" pitchFamily="49" charset="0"/>
+              </a:rPr>
+              <a:t>/</a:t>
+            </a:r>
+            <a:r>
+              <a:rPr lang="de-DE" sz="1400" dirty="0" err="1">
+                <a:latin typeface="Consolas" panose="020B0609020204030204" pitchFamily="49" charset="0"/>
+              </a:rPr>
+              <a:t>app</a:t>
+            </a:r>
+            <a:endParaRPr lang="de-DE" sz="1400" dirty="0">
+              <a:latin typeface="Consolas" panose="020B0609020204030204" pitchFamily="49" charset="0"/>
+            </a:endParaRPr>
+          </a:p>
+          <a:p>
+            <a:pPr marL="0" indent="0">
+              <a:buNone/>
+            </a:pPr>
+            <a:endParaRPr lang="de-DE" sz="1400" dirty="0">
+              <a:latin typeface="Consolas" panose="020B0609020204030204" pitchFamily="49" charset="0"/>
+            </a:endParaRPr>
+          </a:p>
+          <a:p>
+            <a:pPr marL="0" indent="0">
+              <a:buNone/>
+            </a:pPr>
+            <a:r>
+              <a:rPr lang="de-DE" sz="1400" dirty="0">
+                <a:latin typeface="Consolas" panose="020B0609020204030204" pitchFamily="49" charset="0"/>
+              </a:rPr>
+              <a:t># </a:t>
+            </a:r>
+            <a:r>
+              <a:rPr lang="de-DE" sz="1400" dirty="0" err="1">
+                <a:latin typeface="Consolas" panose="020B0609020204030204" pitchFamily="49" charset="0"/>
+              </a:rPr>
+              <a:t>copy</a:t>
+            </a:r>
+            <a:r>
+              <a:rPr lang="de-DE" sz="1400" dirty="0">
+                <a:latin typeface="Consolas" panose="020B0609020204030204" pitchFamily="49" charset="0"/>
+              </a:rPr>
+              <a:t> all </a:t>
+            </a:r>
+            <a:r>
+              <a:rPr lang="de-DE" sz="1400" dirty="0" err="1">
+                <a:latin typeface="Consolas" panose="020B0609020204030204" pitchFamily="49" charset="0"/>
+              </a:rPr>
+              <a:t>the</a:t>
+            </a:r>
+            <a:r>
+              <a:rPr lang="de-DE" sz="1400" dirty="0">
+                <a:latin typeface="Consolas" panose="020B0609020204030204" pitchFamily="49" charset="0"/>
+              </a:rPr>
+              <a:t> </a:t>
+            </a:r>
+            <a:r>
+              <a:rPr lang="de-DE" sz="1400" dirty="0" err="1">
+                <a:latin typeface="Consolas" panose="020B0609020204030204" pitchFamily="49" charset="0"/>
+              </a:rPr>
+              <a:t>files</a:t>
+            </a:r>
+            <a:r>
+              <a:rPr lang="de-DE" sz="1400" dirty="0">
+                <a:latin typeface="Consolas" panose="020B0609020204030204" pitchFamily="49" charset="0"/>
+              </a:rPr>
+              <a:t> </a:t>
+            </a:r>
+            <a:r>
+              <a:rPr lang="de-DE" sz="1400" dirty="0" err="1">
+                <a:latin typeface="Consolas" panose="020B0609020204030204" pitchFamily="49" charset="0"/>
+              </a:rPr>
+              <a:t>to</a:t>
+            </a:r>
+            <a:r>
+              <a:rPr lang="de-DE" sz="1400" dirty="0">
+                <a:latin typeface="Consolas" panose="020B0609020204030204" pitchFamily="49" charset="0"/>
+              </a:rPr>
+              <a:t> </a:t>
+            </a:r>
+            <a:r>
+              <a:rPr lang="de-DE" sz="1400" dirty="0" err="1">
+                <a:latin typeface="Consolas" panose="020B0609020204030204" pitchFamily="49" charset="0"/>
+              </a:rPr>
+              <a:t>the</a:t>
+            </a:r>
+            <a:r>
+              <a:rPr lang="de-DE" sz="1400" dirty="0">
+                <a:latin typeface="Consolas" panose="020B0609020204030204" pitchFamily="49" charset="0"/>
+              </a:rPr>
+              <a:t> </a:t>
+            </a:r>
+            <a:r>
+              <a:rPr lang="de-DE" sz="1400" dirty="0" err="1">
+                <a:latin typeface="Consolas" panose="020B0609020204030204" pitchFamily="49" charset="0"/>
+              </a:rPr>
+              <a:t>container</a:t>
+            </a:r>
+            <a:endParaRPr lang="de-DE" sz="1400" dirty="0">
+              <a:latin typeface="Consolas" panose="020B0609020204030204" pitchFamily="49" charset="0"/>
+            </a:endParaRPr>
+          </a:p>
+          <a:p>
+            <a:pPr marL="0" indent="0">
+              <a:buNone/>
+            </a:pPr>
+            <a:r>
+              <a:rPr lang="de-DE" sz="1400" dirty="0">
+                <a:latin typeface="Consolas" panose="020B0609020204030204" pitchFamily="49" charset="0"/>
+              </a:rPr>
+              <a:t>COPY . .</a:t>
+            </a:r>
+          </a:p>
+          <a:p>
+            <a:pPr marL="0" indent="0">
+              <a:buNone/>
+            </a:pPr>
+            <a:endParaRPr lang="de-DE" sz="1400" dirty="0">
+              <a:latin typeface="Consolas" panose="020B0609020204030204" pitchFamily="49" charset="0"/>
+            </a:endParaRPr>
+          </a:p>
+          <a:p>
+            <a:pPr marL="0" indent="0">
+              <a:buNone/>
+            </a:pPr>
+            <a:r>
+              <a:rPr lang="de-DE" sz="1400" dirty="0">
+                <a:latin typeface="Consolas" panose="020B0609020204030204" pitchFamily="49" charset="0"/>
+              </a:rPr>
+              <a:t>#update </a:t>
+            </a:r>
+            <a:r>
+              <a:rPr lang="de-DE" sz="1400" dirty="0" err="1">
+                <a:latin typeface="Consolas" panose="020B0609020204030204" pitchFamily="49" charset="0"/>
+              </a:rPr>
+              <a:t>yum</a:t>
+            </a:r>
+            <a:endParaRPr lang="de-DE" sz="1400" dirty="0">
+              <a:latin typeface="Consolas" panose="020B0609020204030204" pitchFamily="49" charset="0"/>
+            </a:endParaRPr>
+          </a:p>
+          <a:p>
+            <a:pPr marL="0" indent="0">
+              <a:buNone/>
+            </a:pPr>
+            <a:r>
+              <a:rPr lang="de-DE" sz="1400" dirty="0">
+                <a:latin typeface="Consolas" panose="020B0609020204030204" pitchFamily="49" charset="0"/>
+              </a:rPr>
+              <a:t>RUN </a:t>
+            </a:r>
+            <a:r>
+              <a:rPr lang="de-DE" sz="1400" dirty="0" err="1">
+                <a:latin typeface="Consolas" panose="020B0609020204030204" pitchFamily="49" charset="0"/>
+              </a:rPr>
+              <a:t>yum</a:t>
+            </a:r>
+            <a:r>
+              <a:rPr lang="de-DE" sz="1400" dirty="0">
+                <a:latin typeface="Consolas" panose="020B0609020204030204" pitchFamily="49" charset="0"/>
+              </a:rPr>
+              <a:t> update -y &amp;&amp; \</a:t>
+            </a:r>
+          </a:p>
+          <a:p>
+            <a:pPr marL="0" indent="0">
+              <a:buNone/>
+            </a:pPr>
+            <a:r>
+              <a:rPr lang="de-DE" sz="1400" dirty="0" err="1">
+                <a:latin typeface="Consolas" panose="020B0609020204030204" pitchFamily="49" charset="0"/>
+              </a:rPr>
+              <a:t>yum</a:t>
+            </a:r>
+            <a:r>
+              <a:rPr lang="de-DE" sz="1400" dirty="0">
+                <a:latin typeface="Consolas" panose="020B0609020204030204" pitchFamily="49" charset="0"/>
+              </a:rPr>
+              <a:t> clean all</a:t>
+            </a:r>
+          </a:p>
+          <a:p>
+            <a:pPr marL="0" indent="0">
+              <a:buNone/>
+            </a:pPr>
+            <a:endParaRPr lang="de-DE" sz="1400" dirty="0">
+              <a:latin typeface="Consolas" panose="020B0609020204030204" pitchFamily="49" charset="0"/>
+            </a:endParaRPr>
+          </a:p>
+          <a:p>
+            <a:pPr marL="0" indent="0">
+              <a:buNone/>
+            </a:pPr>
+            <a:r>
+              <a:rPr lang="de-DE" sz="1400" dirty="0">
+                <a:latin typeface="Consolas" panose="020B0609020204030204" pitchFamily="49" charset="0"/>
+              </a:rPr>
+              <a:t># </a:t>
+            </a:r>
+            <a:r>
+              <a:rPr lang="de-DE" sz="1400" dirty="0" err="1">
+                <a:latin typeface="Consolas" panose="020B0609020204030204" pitchFamily="49" charset="0"/>
+              </a:rPr>
+              <a:t>installing</a:t>
+            </a:r>
+            <a:r>
+              <a:rPr lang="de-DE" sz="1400" dirty="0">
+                <a:latin typeface="Consolas" panose="020B0609020204030204" pitchFamily="49" charset="0"/>
+              </a:rPr>
+              <a:t> </a:t>
+            </a:r>
+            <a:r>
+              <a:rPr lang="de-DE" sz="1400" dirty="0" err="1">
+                <a:latin typeface="Consolas" panose="020B0609020204030204" pitchFamily="49" charset="0"/>
+              </a:rPr>
+              <a:t>sshd</a:t>
+            </a:r>
+            <a:r>
+              <a:rPr lang="de-DE" sz="1400" dirty="0">
+                <a:latin typeface="Consolas" panose="020B0609020204030204" pitchFamily="49" charset="0"/>
+              </a:rPr>
+              <a:t>, </a:t>
+            </a:r>
+            <a:r>
+              <a:rPr lang="de-DE" sz="1400" dirty="0" err="1">
+                <a:latin typeface="Consolas" panose="020B0609020204030204" pitchFamily="49" charset="0"/>
+              </a:rPr>
+              <a:t>httpd</a:t>
+            </a:r>
+            <a:r>
+              <a:rPr lang="de-DE" sz="1400" dirty="0">
+                <a:latin typeface="Consolas" panose="020B0609020204030204" pitchFamily="49" charset="0"/>
+              </a:rPr>
+              <a:t>, </a:t>
+            </a:r>
+            <a:r>
+              <a:rPr lang="de-DE" sz="1400" dirty="0" err="1">
+                <a:latin typeface="Consolas" panose="020B0609020204030204" pitchFamily="49" charset="0"/>
+              </a:rPr>
+              <a:t>sudo</a:t>
+            </a:r>
+            <a:r>
+              <a:rPr lang="de-DE" sz="1400" dirty="0">
+                <a:latin typeface="Consolas" panose="020B0609020204030204" pitchFamily="49" charset="0"/>
+              </a:rPr>
+              <a:t>, </a:t>
+            </a:r>
+            <a:r>
+              <a:rPr lang="de-DE" sz="1400" dirty="0" err="1">
+                <a:latin typeface="Consolas" panose="020B0609020204030204" pitchFamily="49" charset="0"/>
+              </a:rPr>
+              <a:t>openssl</a:t>
+            </a:r>
+            <a:endParaRPr lang="de-DE" sz="1400" dirty="0">
+              <a:latin typeface="Consolas" panose="020B0609020204030204" pitchFamily="49" charset="0"/>
+            </a:endParaRPr>
+          </a:p>
+          <a:p>
+            <a:pPr marL="0" indent="0">
+              <a:buNone/>
+            </a:pPr>
+            <a:r>
+              <a:rPr lang="de-DE" sz="1400" dirty="0">
+                <a:latin typeface="Consolas" panose="020B0609020204030204" pitchFamily="49" charset="0"/>
+              </a:rPr>
+              <a:t>RUN </a:t>
+            </a:r>
+            <a:r>
+              <a:rPr lang="de-DE" sz="1400" dirty="0" err="1">
+                <a:latin typeface="Consolas" panose="020B0609020204030204" pitchFamily="49" charset="0"/>
+              </a:rPr>
+              <a:t>yum</a:t>
+            </a:r>
+            <a:r>
+              <a:rPr lang="de-DE" sz="1400" dirty="0">
+                <a:latin typeface="Consolas" panose="020B0609020204030204" pitchFamily="49" charset="0"/>
+              </a:rPr>
+              <a:t> </a:t>
+            </a:r>
+            <a:r>
+              <a:rPr lang="de-DE" sz="1400" dirty="0" err="1">
+                <a:latin typeface="Consolas" panose="020B0609020204030204" pitchFamily="49" charset="0"/>
+              </a:rPr>
+              <a:t>install</a:t>
+            </a:r>
+            <a:r>
+              <a:rPr lang="de-DE" sz="1400" dirty="0">
+                <a:latin typeface="Consolas" panose="020B0609020204030204" pitchFamily="49" charset="0"/>
+              </a:rPr>
+              <a:t> -y \</a:t>
+            </a:r>
+          </a:p>
+          <a:p>
+            <a:pPr marL="0" indent="0">
+              <a:buNone/>
+            </a:pPr>
+            <a:r>
+              <a:rPr lang="de-DE" sz="1400" dirty="0" err="1">
+                <a:latin typeface="Consolas" panose="020B0609020204030204" pitchFamily="49" charset="0"/>
+              </a:rPr>
+              <a:t>openssh</a:t>
+            </a:r>
+            <a:r>
+              <a:rPr lang="de-DE" sz="1400" dirty="0">
+                <a:latin typeface="Consolas" panose="020B0609020204030204" pitchFamily="49" charset="0"/>
+              </a:rPr>
+              <a:t>-server \</a:t>
+            </a:r>
+          </a:p>
+          <a:p>
+            <a:pPr marL="0" indent="0">
+              <a:buNone/>
+            </a:pPr>
+            <a:r>
+              <a:rPr lang="de-DE" sz="1400" dirty="0" err="1">
+                <a:latin typeface="Consolas" panose="020B0609020204030204" pitchFamily="49" charset="0"/>
+              </a:rPr>
+              <a:t>openssh</a:t>
+            </a:r>
+            <a:r>
+              <a:rPr lang="de-DE" sz="1400" dirty="0">
+                <a:latin typeface="Consolas" panose="020B0609020204030204" pitchFamily="49" charset="0"/>
+              </a:rPr>
+              <a:t>-clients \</a:t>
+            </a:r>
+          </a:p>
+          <a:p>
+            <a:pPr marL="0" indent="0">
+              <a:buNone/>
+            </a:pPr>
+            <a:r>
+              <a:rPr lang="de-DE" sz="1400" dirty="0" err="1">
+                <a:latin typeface="Consolas" panose="020B0609020204030204" pitchFamily="49" charset="0"/>
+              </a:rPr>
+              <a:t>httpd</a:t>
+            </a:r>
+            <a:r>
+              <a:rPr lang="de-DE" sz="1400" dirty="0">
+                <a:latin typeface="Consolas" panose="020B0609020204030204" pitchFamily="49" charset="0"/>
+              </a:rPr>
+              <a:t> \</a:t>
+            </a:r>
+          </a:p>
+          <a:p>
+            <a:pPr marL="0" indent="0">
+              <a:buNone/>
+            </a:pPr>
+            <a:r>
+              <a:rPr lang="de-DE" sz="1400" dirty="0" err="1">
+                <a:latin typeface="Consolas" panose="020B0609020204030204" pitchFamily="49" charset="0"/>
+              </a:rPr>
+              <a:t>httpd</a:t>
+            </a:r>
+            <a:r>
+              <a:rPr lang="de-DE" sz="1400" dirty="0">
+                <a:latin typeface="Consolas" panose="020B0609020204030204" pitchFamily="49" charset="0"/>
+              </a:rPr>
+              <a:t>-tools \</a:t>
+            </a:r>
+          </a:p>
+          <a:p>
+            <a:pPr marL="0" indent="0">
+              <a:buNone/>
+            </a:pPr>
+            <a:r>
+              <a:rPr lang="de-DE" sz="1400" dirty="0" err="1">
+                <a:latin typeface="Consolas" panose="020B0609020204030204" pitchFamily="49" charset="0"/>
+              </a:rPr>
+              <a:t>sudo</a:t>
+            </a:r>
+            <a:r>
+              <a:rPr lang="de-DE" sz="1400" dirty="0">
+                <a:latin typeface="Consolas" panose="020B0609020204030204" pitchFamily="49" charset="0"/>
+              </a:rPr>
+              <a:t> \</a:t>
+            </a:r>
+          </a:p>
+          <a:p>
+            <a:pPr marL="0" indent="0">
+              <a:buNone/>
+            </a:pPr>
+            <a:r>
+              <a:rPr lang="de-DE" sz="1400" dirty="0" err="1">
+                <a:latin typeface="Consolas" panose="020B0609020204030204" pitchFamily="49" charset="0"/>
+              </a:rPr>
+              <a:t>openssl</a:t>
+            </a:r>
+            <a:r>
+              <a:rPr lang="de-DE" sz="1400" dirty="0">
+                <a:latin typeface="Consolas" panose="020B0609020204030204" pitchFamily="49" charset="0"/>
+              </a:rPr>
+              <a:t> &amp;&amp; \</a:t>
+            </a:r>
+          </a:p>
+          <a:p>
+            <a:pPr marL="0" indent="0">
+              <a:buNone/>
+            </a:pPr>
+            <a:r>
+              <a:rPr lang="de-DE" sz="1400" dirty="0" err="1">
+                <a:latin typeface="Consolas" panose="020B0609020204030204" pitchFamily="49" charset="0"/>
+              </a:rPr>
+              <a:t>yum</a:t>
+            </a:r>
+            <a:r>
+              <a:rPr lang="de-DE" sz="1400" dirty="0">
+                <a:latin typeface="Consolas" panose="020B0609020204030204" pitchFamily="49" charset="0"/>
+              </a:rPr>
+              <a:t> clean all</a:t>
+            </a:r>
+          </a:p>
+          <a:p>
+            <a:pPr marL="0" indent="0">
+              <a:buNone/>
+            </a:pPr>
+            <a:endParaRPr lang="de-DE" sz="1400" dirty="0">
+              <a:latin typeface="Consolas" panose="020B0609020204030204" pitchFamily="49" charset="0"/>
+            </a:endParaRPr>
+          </a:p>
+          <a:p>
+            <a:pPr marL="0" indent="0">
+              <a:buNone/>
+            </a:pPr>
+            <a:r>
+              <a:rPr lang="de-DE" sz="1400" dirty="0">
+                <a:latin typeface="Consolas" panose="020B0609020204030204" pitchFamily="49" charset="0"/>
+              </a:rPr>
+              <a:t># </a:t>
+            </a:r>
+            <a:r>
+              <a:rPr lang="de-DE" sz="1400" dirty="0" err="1">
+                <a:latin typeface="Consolas" panose="020B0609020204030204" pitchFamily="49" charset="0"/>
+              </a:rPr>
+              <a:t>installing</a:t>
+            </a:r>
+            <a:r>
+              <a:rPr lang="de-DE" sz="1400" dirty="0">
+                <a:latin typeface="Consolas" panose="020B0609020204030204" pitchFamily="49" charset="0"/>
+              </a:rPr>
+              <a:t> </a:t>
+            </a:r>
+            <a:r>
+              <a:rPr lang="de-DE" sz="1400" dirty="0" err="1">
+                <a:latin typeface="Consolas" panose="020B0609020204030204" pitchFamily="49" charset="0"/>
+              </a:rPr>
+              <a:t>more</a:t>
+            </a:r>
+            <a:r>
+              <a:rPr lang="de-DE" sz="1400" dirty="0">
+                <a:latin typeface="Consolas" panose="020B0609020204030204" pitchFamily="49" charset="0"/>
+              </a:rPr>
+              <a:t> </a:t>
+            </a:r>
+            <a:r>
+              <a:rPr lang="de-DE" sz="1400" dirty="0" err="1">
+                <a:latin typeface="Consolas" panose="020B0609020204030204" pitchFamily="49" charset="0"/>
+              </a:rPr>
+              <a:t>tools</a:t>
+            </a:r>
+            <a:endParaRPr lang="de-DE" sz="1400" dirty="0">
+              <a:latin typeface="Consolas" panose="020B0609020204030204" pitchFamily="49" charset="0"/>
+            </a:endParaRPr>
+          </a:p>
+          <a:p>
+            <a:pPr marL="0" indent="0">
+              <a:buNone/>
+            </a:pPr>
+            <a:r>
+              <a:rPr lang="de-DE" sz="1400" dirty="0">
+                <a:latin typeface="Consolas" panose="020B0609020204030204" pitchFamily="49" charset="0"/>
+              </a:rPr>
+              <a:t>RUN </a:t>
+            </a:r>
+            <a:r>
+              <a:rPr lang="de-DE" sz="1400" dirty="0" err="1">
+                <a:latin typeface="Consolas" panose="020B0609020204030204" pitchFamily="49" charset="0"/>
+              </a:rPr>
+              <a:t>yum</a:t>
+            </a:r>
+            <a:r>
+              <a:rPr lang="de-DE" sz="1400" dirty="0">
+                <a:latin typeface="Consolas" panose="020B0609020204030204" pitchFamily="49" charset="0"/>
+              </a:rPr>
+              <a:t> </a:t>
+            </a:r>
+            <a:r>
+              <a:rPr lang="de-DE" sz="1400" dirty="0" err="1">
+                <a:latin typeface="Consolas" panose="020B0609020204030204" pitchFamily="49" charset="0"/>
+              </a:rPr>
+              <a:t>install</a:t>
+            </a:r>
+            <a:r>
+              <a:rPr lang="de-DE" sz="1400" dirty="0">
+                <a:latin typeface="Consolas" panose="020B0609020204030204" pitchFamily="49" charset="0"/>
+              </a:rPr>
+              <a:t> -y \</a:t>
+            </a:r>
+          </a:p>
+          <a:p>
+            <a:pPr marL="0" indent="0">
+              <a:buNone/>
+            </a:pPr>
+            <a:r>
+              <a:rPr lang="de-DE" sz="1400" dirty="0" err="1">
+                <a:latin typeface="Consolas" panose="020B0609020204030204" pitchFamily="49" charset="0"/>
+              </a:rPr>
+              <a:t>git</a:t>
+            </a:r>
+            <a:r>
+              <a:rPr lang="de-DE" sz="1400" dirty="0">
+                <a:latin typeface="Consolas" panose="020B0609020204030204" pitchFamily="49" charset="0"/>
+              </a:rPr>
+              <a:t> \</a:t>
+            </a:r>
+          </a:p>
+          <a:p>
+            <a:pPr marL="0" indent="0">
+              <a:buNone/>
+            </a:pPr>
+            <a:r>
+              <a:rPr lang="de-DE" sz="1400" dirty="0">
+                <a:latin typeface="Consolas" panose="020B0609020204030204" pitchFamily="49" charset="0"/>
+              </a:rPr>
+              <a:t>sed \</a:t>
+            </a:r>
+          </a:p>
+          <a:p>
+            <a:pPr marL="0" indent="0">
+              <a:buNone/>
+            </a:pPr>
+            <a:r>
+              <a:rPr lang="de-DE" sz="1400" dirty="0" err="1">
+                <a:latin typeface="Consolas" panose="020B0609020204030204" pitchFamily="49" charset="0"/>
+              </a:rPr>
+              <a:t>telnet</a:t>
+            </a:r>
+            <a:r>
+              <a:rPr lang="de-DE" sz="1400" dirty="0">
+                <a:latin typeface="Consolas" panose="020B0609020204030204" pitchFamily="49" charset="0"/>
+              </a:rPr>
+              <a:t> \</a:t>
+            </a:r>
+          </a:p>
+          <a:p>
+            <a:pPr marL="0" indent="0">
+              <a:buNone/>
+            </a:pPr>
+            <a:r>
+              <a:rPr lang="de-DE" sz="1400" dirty="0" err="1">
+                <a:latin typeface="Consolas" panose="020B0609020204030204" pitchFamily="49" charset="0"/>
+              </a:rPr>
+              <a:t>vim</a:t>
+            </a:r>
+            <a:r>
+              <a:rPr lang="de-DE" sz="1400" dirty="0">
+                <a:latin typeface="Consolas" panose="020B0609020204030204" pitchFamily="49" charset="0"/>
+              </a:rPr>
+              <a:t> \</a:t>
+            </a:r>
+          </a:p>
+          <a:p>
+            <a:pPr marL="0" indent="0">
+              <a:buNone/>
+            </a:pPr>
+            <a:r>
+              <a:rPr lang="de-DE" sz="1400" dirty="0" err="1">
+                <a:latin typeface="Consolas" panose="020B0609020204030204" pitchFamily="49" charset="0"/>
+              </a:rPr>
+              <a:t>unzip</a:t>
+            </a:r>
+            <a:r>
+              <a:rPr lang="de-DE" sz="1400" dirty="0">
+                <a:latin typeface="Consolas" panose="020B0609020204030204" pitchFamily="49" charset="0"/>
+              </a:rPr>
+              <a:t> \</a:t>
+            </a:r>
+          </a:p>
+          <a:p>
+            <a:pPr marL="0" indent="0">
+              <a:buNone/>
+            </a:pPr>
+            <a:r>
+              <a:rPr lang="de-DE" sz="1400" dirty="0" err="1">
+                <a:latin typeface="Consolas" panose="020B0609020204030204" pitchFamily="49" charset="0"/>
+              </a:rPr>
+              <a:t>crontabs</a:t>
+            </a:r>
+            <a:r>
+              <a:rPr lang="de-DE" sz="1400" dirty="0">
+                <a:latin typeface="Consolas" panose="020B0609020204030204" pitchFamily="49" charset="0"/>
+              </a:rPr>
+              <a:t> \</a:t>
+            </a:r>
+          </a:p>
+          <a:p>
+            <a:pPr marL="0" indent="0">
+              <a:buNone/>
+            </a:pPr>
+            <a:r>
+              <a:rPr lang="de-DE" sz="1400" dirty="0" err="1">
+                <a:latin typeface="Consolas" panose="020B0609020204030204" pitchFamily="49" charset="0"/>
+              </a:rPr>
+              <a:t>zip</a:t>
+            </a:r>
+            <a:r>
+              <a:rPr lang="de-DE" sz="1400" dirty="0">
+                <a:latin typeface="Consolas" panose="020B0609020204030204" pitchFamily="49" charset="0"/>
+              </a:rPr>
+              <a:t> &amp;&amp; \</a:t>
+            </a:r>
+          </a:p>
+          <a:p>
+            <a:pPr marL="0" indent="0">
+              <a:buNone/>
+            </a:pPr>
+            <a:r>
+              <a:rPr lang="de-DE" sz="1400" dirty="0" err="1">
+                <a:latin typeface="Consolas" panose="020B0609020204030204" pitchFamily="49" charset="0"/>
+              </a:rPr>
+              <a:t>yum</a:t>
+            </a:r>
+            <a:r>
+              <a:rPr lang="de-DE" sz="1400" dirty="0">
+                <a:latin typeface="Consolas" panose="020B0609020204030204" pitchFamily="49" charset="0"/>
+              </a:rPr>
+              <a:t> clean all</a:t>
+            </a:r>
+          </a:p>
+          <a:p>
+            <a:pPr marL="0" indent="0">
+              <a:buNone/>
+            </a:pPr>
+            <a:endParaRPr lang="de-DE" sz="1400" dirty="0">
+              <a:latin typeface="Consolas" panose="020B0609020204030204" pitchFamily="49" charset="0"/>
+            </a:endParaRPr>
+          </a:p>
+          <a:p>
+            <a:pPr marL="0" indent="0">
+              <a:buNone/>
+            </a:pPr>
+            <a:r>
+              <a:rPr lang="de-DE" sz="1400" dirty="0">
+                <a:latin typeface="Consolas" panose="020B0609020204030204" pitchFamily="49" charset="0"/>
+              </a:rPr>
+              <a:t># </a:t>
+            </a:r>
+            <a:r>
+              <a:rPr lang="de-DE" sz="1400" dirty="0" err="1">
+                <a:latin typeface="Consolas" panose="020B0609020204030204" pitchFamily="49" charset="0"/>
+              </a:rPr>
+              <a:t>define</a:t>
+            </a:r>
+            <a:r>
+              <a:rPr lang="de-DE" sz="1400" dirty="0">
+                <a:latin typeface="Consolas" panose="020B0609020204030204" pitchFamily="49" charset="0"/>
+              </a:rPr>
+              <a:t> </a:t>
+            </a:r>
+            <a:r>
+              <a:rPr lang="de-DE" sz="1400" dirty="0" err="1">
+                <a:latin typeface="Consolas" panose="020B0609020204030204" pitchFamily="49" charset="0"/>
+              </a:rPr>
+              <a:t>the</a:t>
+            </a:r>
+            <a:r>
+              <a:rPr lang="de-DE" sz="1400" dirty="0">
+                <a:latin typeface="Consolas" panose="020B0609020204030204" pitchFamily="49" charset="0"/>
+              </a:rPr>
+              <a:t> </a:t>
+            </a:r>
+            <a:r>
+              <a:rPr lang="de-DE" sz="1400" dirty="0" err="1">
+                <a:latin typeface="Consolas" panose="020B0609020204030204" pitchFamily="49" charset="0"/>
+              </a:rPr>
+              <a:t>port</a:t>
+            </a:r>
+            <a:r>
+              <a:rPr lang="de-DE" sz="1400" dirty="0">
+                <a:latin typeface="Consolas" panose="020B0609020204030204" pitchFamily="49" charset="0"/>
+              </a:rPr>
+              <a:t> </a:t>
+            </a:r>
+            <a:r>
+              <a:rPr lang="de-DE" sz="1400" dirty="0" err="1">
+                <a:latin typeface="Consolas" panose="020B0609020204030204" pitchFamily="49" charset="0"/>
+              </a:rPr>
+              <a:t>number</a:t>
+            </a:r>
+            <a:r>
+              <a:rPr lang="de-DE" sz="1400" dirty="0">
+                <a:latin typeface="Consolas" panose="020B0609020204030204" pitchFamily="49" charset="0"/>
+              </a:rPr>
+              <a:t> </a:t>
+            </a:r>
+            <a:r>
+              <a:rPr lang="de-DE" sz="1400" dirty="0" err="1">
+                <a:latin typeface="Consolas" panose="020B0609020204030204" pitchFamily="49" charset="0"/>
+              </a:rPr>
+              <a:t>the</a:t>
+            </a:r>
+            <a:r>
+              <a:rPr lang="de-DE" sz="1400" dirty="0">
+                <a:latin typeface="Consolas" panose="020B0609020204030204" pitchFamily="49" charset="0"/>
+              </a:rPr>
+              <a:t> </a:t>
+            </a:r>
+            <a:r>
+              <a:rPr lang="de-DE" sz="1400" dirty="0" err="1">
+                <a:latin typeface="Consolas" panose="020B0609020204030204" pitchFamily="49" charset="0"/>
+              </a:rPr>
+              <a:t>container</a:t>
+            </a:r>
+            <a:r>
+              <a:rPr lang="de-DE" sz="1400" dirty="0">
+                <a:latin typeface="Consolas" panose="020B0609020204030204" pitchFamily="49" charset="0"/>
+              </a:rPr>
+              <a:t> </a:t>
+            </a:r>
+            <a:r>
+              <a:rPr lang="de-DE" sz="1400" dirty="0" err="1">
+                <a:latin typeface="Consolas" panose="020B0609020204030204" pitchFamily="49" charset="0"/>
+              </a:rPr>
+              <a:t>should</a:t>
+            </a:r>
+            <a:r>
+              <a:rPr lang="de-DE" sz="1400" dirty="0">
+                <a:latin typeface="Consolas" panose="020B0609020204030204" pitchFamily="49" charset="0"/>
+              </a:rPr>
+              <a:t> </a:t>
+            </a:r>
+            <a:r>
+              <a:rPr lang="de-DE" sz="1400" dirty="0" err="1">
+                <a:latin typeface="Consolas" panose="020B0609020204030204" pitchFamily="49" charset="0"/>
+              </a:rPr>
+              <a:t>expose</a:t>
+            </a:r>
+            <a:endParaRPr lang="de-DE" sz="1400" dirty="0">
+              <a:latin typeface="Consolas" panose="020B0609020204030204" pitchFamily="49" charset="0"/>
+            </a:endParaRPr>
+          </a:p>
+          <a:p>
+            <a:pPr marL="0" indent="0">
+              <a:buNone/>
+            </a:pPr>
+            <a:r>
+              <a:rPr lang="de-DE" sz="1400" dirty="0">
+                <a:latin typeface="Consolas" panose="020B0609020204030204" pitchFamily="49" charset="0"/>
+              </a:rPr>
+              <a:t>EXPOSE 5000</a:t>
+            </a:r>
           </a:p>
         </p:txBody>
       </p:sp>
     </p:spTree>
     <p:extLst>
       <p:ext uri="{BB962C8B-B14F-4D97-AF65-F5344CB8AC3E}">
-        <p14:creationId xmlns:p14="http://schemas.microsoft.com/office/powerpoint/2010/main" val="1897709238"/>
+        <p14:creationId xmlns:p14="http://schemas.microsoft.com/office/powerpoint/2010/main" val="1640661838"/>
       </p:ext>
     </p:extLst>
   </p:cSld>
@@ -17756,7 +19093,7 @@
           <p:cNvPr id="2" name="Titel 1">
             <a:extLst>
               <a:ext uri="{FF2B5EF4-FFF2-40B4-BE49-F238E27FC236}">
-                <a16:creationId xmlns:a16="http://schemas.microsoft.com/office/drawing/2014/main" id="{6AA67486-2598-533D-4DB5-FC490AB10E2A}"/>
+                <a16:creationId xmlns:a16="http://schemas.microsoft.com/office/drawing/2014/main" id="{631A25DF-992F-CF4E-F32B-E5531501F3DD}"/>
               </a:ext>
             </a:extLst>
           </p:cNvPr>
@@ -17779,102 +19116,45 @@
           </a:p>
         </p:txBody>
       </p:sp>
-      <p:sp>
-        <p:nvSpPr>
-          <p:cNvPr id="3" name="Inhaltsplatzhalter 2">
+      <p:pic>
+        <p:nvPicPr>
+          <p:cNvPr id="5" name="Inhaltsplatzhalter 4">
             <a:extLst>
               <a:ext uri="{FF2B5EF4-FFF2-40B4-BE49-F238E27FC236}">
-                <a16:creationId xmlns:a16="http://schemas.microsoft.com/office/drawing/2014/main" id="{CA708DD8-2C30-488D-3B3A-0BE38FE0786D}"/>
+                <a16:creationId xmlns:a16="http://schemas.microsoft.com/office/drawing/2014/main" id="{35DD14E3-6D68-687A-690E-403B4712E0D6}"/>
               </a:ext>
             </a:extLst>
           </p:cNvPr>
-          <p:cNvSpPr>
-            <a:spLocks noGrp="1"/>
-          </p:cNvSpPr>
+          <p:cNvPicPr>
+            <a:picLocks noGrp="1" noChangeAspect="1"/>
+          </p:cNvPicPr>
           <p:nvPr>
             <p:ph idx="1"/>
           </p:nvPr>
-        </p:nvSpPr>
-        <p:spPr/>
-        <p:txBody>
-          <a:bodyPr/>
-          <a:lstStyle/>
-          <a:p>
-            <a:pPr>
-              <a:buFont typeface="Arial" panose="020B0604020202020204" pitchFamily="34" charset="0"/>
-              <a:buChar char="•"/>
-            </a:pPr>
-            <a:r>
-              <a:rPr lang="de-DE" dirty="0"/>
-              <a:t>Container Registry ansehen</a:t>
-            </a:r>
-          </a:p>
-          <a:p>
-            <a:pPr>
-              <a:buFont typeface="Arial" panose="020B0604020202020204" pitchFamily="34" charset="0"/>
-              <a:buChar char="•"/>
-            </a:pPr>
-            <a:r>
-              <a:rPr lang="de-DE" dirty="0"/>
-              <a:t>Tags eines bestimmten Container Image ansehen</a:t>
-            </a:r>
-          </a:p>
-          <a:p>
-            <a:pPr>
-              <a:buFont typeface="Arial" panose="020B0604020202020204" pitchFamily="34" charset="0"/>
-              <a:buChar char="•"/>
-            </a:pPr>
-            <a:r>
-              <a:rPr lang="de-DE" u="sng" dirty="0"/>
-              <a:t>Container Images von der Container Registry nutzen</a:t>
-            </a:r>
-          </a:p>
-          <a:p>
-            <a:pPr>
-              <a:buFont typeface="Arial" panose="020B0604020202020204" pitchFamily="34" charset="0"/>
-              <a:buChar char="•"/>
-            </a:pPr>
-            <a:r>
-              <a:rPr lang="de-DE" dirty="0"/>
-              <a:t>Naming Convention für Container Images</a:t>
-            </a:r>
-          </a:p>
-          <a:p>
-            <a:pPr>
-              <a:buFont typeface="Arial" panose="020B0604020202020204" pitchFamily="34" charset="0"/>
-              <a:buChar char="•"/>
-            </a:pPr>
-            <a:r>
-              <a:rPr lang="de-DE" dirty="0"/>
-              <a:t>Verschieben oder Umbenennen einer Container Registry</a:t>
-            </a:r>
-          </a:p>
-          <a:p>
-            <a:pPr>
-              <a:buFont typeface="Arial" panose="020B0604020202020204" pitchFamily="34" charset="0"/>
-              <a:buChar char="•"/>
-            </a:pPr>
-            <a:r>
-              <a:rPr lang="de-DE" dirty="0"/>
-              <a:t>Container Registry für ein Projekt deaktivieren</a:t>
-            </a:r>
-          </a:p>
-          <a:p>
-            <a:pPr>
-              <a:buFont typeface="Arial" panose="020B0604020202020204" pitchFamily="34" charset="0"/>
-              <a:buChar char="•"/>
-            </a:pPr>
-            <a:r>
-              <a:rPr lang="de-DE" dirty="0"/>
-              <a:t>Sichtbarkeit der Container Registry ändern</a:t>
-            </a:r>
-          </a:p>
-        </p:txBody>
-      </p:sp>
+        </p:nvPicPr>
+        <p:blipFill>
+          <a:blip r:embed="rId2">
+            <a:extLst>
+              <a:ext uri="{28A0092B-C50C-407E-A947-70E740481C1C}">
+                <a14:useLocalDpi xmlns:a14="http://schemas.microsoft.com/office/drawing/2010/main" val="0"/>
+              </a:ext>
+            </a:extLst>
+          </a:blip>
+          <a:stretch>
+            <a:fillRect/>
+          </a:stretch>
+        </p:blipFill>
+        <p:spPr>
+          <a:xfrm>
+            <a:off x="508228" y="1152172"/>
+            <a:ext cx="8106906" cy="5058481"/>
+          </a:xfrm>
+        </p:spPr>
+      </p:pic>
     </p:spTree>
     <p:extLst>
       <p:ext uri="{BB962C8B-B14F-4D97-AF65-F5344CB8AC3E}">
-        <p14:creationId xmlns:p14="http://schemas.microsoft.com/office/powerpoint/2010/main" val="1938619157"/>
+        <p14:creationId xmlns:p14="http://schemas.microsoft.com/office/powerpoint/2010/main" val="4222492689"/>
       </p:ext>
     </p:extLst>
   </p:cSld>
@@ -17906,7 +19186,7 @@
           <p:cNvPr id="2" name="Titel 1">
             <a:extLst>
               <a:ext uri="{FF2B5EF4-FFF2-40B4-BE49-F238E27FC236}">
-                <a16:creationId xmlns:a16="http://schemas.microsoft.com/office/drawing/2014/main" id="{6AA67486-2598-533D-4DB5-FC490AB10E2A}"/>
+                <a16:creationId xmlns:a16="http://schemas.microsoft.com/office/drawing/2014/main" id="{EC46CEF1-687D-48E5-B114-D9B0E139BEF6}"/>
               </a:ext>
             </a:extLst>
           </p:cNvPr>
@@ -17934,7 +19214,7 @@
           <p:cNvPr id="3" name="Inhaltsplatzhalter 2">
             <a:extLst>
               <a:ext uri="{FF2B5EF4-FFF2-40B4-BE49-F238E27FC236}">
-                <a16:creationId xmlns:a16="http://schemas.microsoft.com/office/drawing/2014/main" id="{CA708DD8-2C30-488D-3B3A-0BE38FE0786D}"/>
+                <a16:creationId xmlns:a16="http://schemas.microsoft.com/office/drawing/2014/main" id="{C9516D61-DCF3-C639-FA07-8F0403ADF2DE}"/>
               </a:ext>
             </a:extLst>
           </p:cNvPr>
@@ -17950,26 +19230,197 @@
           <a:bodyPr/>
           <a:lstStyle/>
           <a:p>
-            <a:pPr marL="0" indent="0">
-              <a:buNone/>
-            </a:pPr>
-            <a:r>
-              <a:rPr lang="de-DE" b="1" dirty="0"/>
-              <a:t>Container Images von der Container Registry nutzen</a:t>
-            </a:r>
-          </a:p>
-          <a:p>
-            <a:pPr marL="0" indent="0">
-              <a:buNone/>
-            </a:pPr>
-            <a:endParaRPr lang="de-DE" dirty="0"/>
+            <a:pPr>
+              <a:buFont typeface="Arial" panose="020B0604020202020204" pitchFamily="34" charset="0"/>
+              <a:buChar char="•"/>
+            </a:pPr>
+            <a:r>
+              <a:rPr lang="de-DE" dirty="0"/>
+              <a:t>Das Pushen hat lange gedauert…</a:t>
+            </a:r>
+          </a:p>
+          <a:p>
+            <a:pPr lvl="1">
+              <a:buFont typeface="Arial" panose="020B0604020202020204" pitchFamily="34" charset="0"/>
+              <a:buChar char="•"/>
+            </a:pPr>
+            <a:r>
+              <a:rPr lang="de-DE" dirty="0">
+                <a:sym typeface="Wingdings" panose="05000000000000000000" pitchFamily="2" charset="2"/>
+              </a:rPr>
+              <a:t> Image </a:t>
+            </a:r>
+            <a:r>
+              <a:rPr lang="de-DE" dirty="0" err="1">
+                <a:sym typeface="Wingdings" panose="05000000000000000000" pitchFamily="2" charset="2"/>
+              </a:rPr>
+              <a:t>größe</a:t>
+            </a:r>
+            <a:r>
+              <a:rPr lang="de-DE" dirty="0">
+                <a:sym typeface="Wingdings" panose="05000000000000000000" pitchFamily="2" charset="2"/>
+              </a:rPr>
+              <a:t> beachten!</a:t>
+            </a:r>
+          </a:p>
+          <a:p>
+            <a:pPr lvl="1">
+              <a:buFont typeface="Arial" panose="020B0604020202020204" pitchFamily="34" charset="0"/>
+              <a:buChar char="•"/>
+            </a:pPr>
+            <a:r>
+              <a:rPr lang="de-DE" dirty="0">
+                <a:sym typeface="Wingdings" panose="05000000000000000000" pitchFamily="2" charset="2"/>
+              </a:rPr>
+              <a:t>Später bei </a:t>
+            </a:r>
+            <a:r>
+              <a:rPr lang="de-DE" dirty="0" err="1">
+                <a:sym typeface="Wingdings" panose="05000000000000000000" pitchFamily="2" charset="2"/>
+              </a:rPr>
+              <a:t>best</a:t>
+            </a:r>
+            <a:r>
+              <a:rPr lang="de-DE" dirty="0">
+                <a:sym typeface="Wingdings" panose="05000000000000000000" pitchFamily="2" charset="2"/>
+              </a:rPr>
+              <a:t> </a:t>
+            </a:r>
+            <a:r>
+              <a:rPr lang="de-DE" dirty="0" err="1">
+                <a:sym typeface="Wingdings" panose="05000000000000000000" pitchFamily="2" charset="2"/>
+              </a:rPr>
+              <a:t>practises</a:t>
+            </a:r>
+            <a:r>
+              <a:rPr lang="de-DE" dirty="0">
+                <a:sym typeface="Wingdings" panose="05000000000000000000" pitchFamily="2" charset="2"/>
+              </a:rPr>
+              <a:t> mehr.</a:t>
+            </a:r>
+          </a:p>
+          <a:p>
+            <a:pPr lvl="1">
+              <a:buFont typeface="Arial" panose="020B0604020202020204" pitchFamily="34" charset="0"/>
+              <a:buChar char="•"/>
+            </a:pPr>
+            <a:r>
+              <a:rPr lang="de-DE" dirty="0">
+                <a:sym typeface="Wingdings" panose="05000000000000000000" pitchFamily="2" charset="2"/>
+              </a:rPr>
+              <a:t>Siehe: </a:t>
+            </a:r>
+          </a:p>
+          <a:p>
+            <a:pPr lvl="2">
+              <a:buFont typeface="Arial" panose="020B0604020202020204" pitchFamily="34" charset="0"/>
+              <a:buChar char="•"/>
+            </a:pPr>
+            <a:r>
+              <a:rPr lang="en-US" sz="1600" dirty="0"/>
+              <a:t>It is considered bad practice to use the latest version of a Docker image as this will always change and could break your pipeline. The version you are using changes all the time if you:</a:t>
+            </a:r>
+          </a:p>
+          <a:p>
+            <a:pPr lvl="2">
+              <a:buFont typeface="Arial" panose="020B0604020202020204" pitchFamily="34" charset="0"/>
+              <a:buChar char="•"/>
+            </a:pPr>
+            <a:endParaRPr lang="en-US" sz="1600" dirty="0"/>
+          </a:p>
+          <a:p>
+            <a:pPr lvl="2">
+              <a:buFont typeface="Arial" panose="020B0604020202020204" pitchFamily="34" charset="0"/>
+              <a:buChar char="•"/>
+            </a:pPr>
+            <a:r>
+              <a:rPr lang="en-US" sz="1600" dirty="0"/>
+              <a:t>don't specify a version (e.g. docker)</a:t>
+            </a:r>
+          </a:p>
+          <a:p>
+            <a:pPr lvl="2">
+              <a:buFont typeface="Arial" panose="020B0604020202020204" pitchFamily="34" charset="0"/>
+              <a:buChar char="•"/>
+            </a:pPr>
+            <a:r>
+              <a:rPr lang="en-US" sz="1600" dirty="0"/>
+              <a:t>use the latest tag (e.g. </a:t>
+            </a:r>
+            <a:r>
+              <a:rPr lang="en-US" sz="1600" dirty="0" err="1"/>
+              <a:t>docker:latest</a:t>
+            </a:r>
+            <a:r>
+              <a:rPr lang="en-US" sz="1600" dirty="0"/>
+              <a:t>)</a:t>
+            </a:r>
+          </a:p>
+          <a:p>
+            <a:pPr lvl="2">
+              <a:buFont typeface="Arial" panose="020B0604020202020204" pitchFamily="34" charset="0"/>
+              <a:buChar char="•"/>
+            </a:pPr>
+            <a:r>
+              <a:rPr lang="en-US" sz="1600" dirty="0"/>
+              <a:t>use the stable tag (e.g. </a:t>
+            </a:r>
+            <a:r>
+              <a:rPr lang="en-US" sz="1600" dirty="0" err="1"/>
+              <a:t>docker:stable</a:t>
+            </a:r>
+            <a:r>
+              <a:rPr lang="en-US" sz="1600" dirty="0"/>
+              <a:t>)</a:t>
+            </a:r>
+          </a:p>
+          <a:p>
+            <a:pPr lvl="2">
+              <a:buFont typeface="Arial" panose="020B0604020202020204" pitchFamily="34" charset="0"/>
+              <a:buChar char="•"/>
+            </a:pPr>
+            <a:r>
+              <a:rPr lang="en-US" sz="1600" dirty="0"/>
+              <a:t>use a major version tag(e.g. docker:20)</a:t>
+            </a:r>
+          </a:p>
+          <a:p>
+            <a:pPr lvl="1">
+              <a:buFont typeface="Arial" panose="020B0604020202020204" pitchFamily="34" charset="0"/>
+              <a:buChar char="•"/>
+            </a:pPr>
+            <a:r>
+              <a:rPr lang="en-US" sz="1800" dirty="0"/>
+              <a:t>Consider the following:</a:t>
+            </a:r>
+          </a:p>
+          <a:p>
+            <a:pPr lvl="2">
+              <a:buFont typeface="Arial" panose="020B0604020202020204" pitchFamily="34" charset="0"/>
+              <a:buChar char="•"/>
+            </a:pPr>
+            <a:r>
+              <a:rPr lang="en-US" sz="1600" dirty="0"/>
+              <a:t>Use a specific version, like docker:20.10.10 &amp; docker:20.10.10-dind (recommended).</a:t>
+            </a:r>
+          </a:p>
+          <a:p>
+            <a:pPr lvl="2">
+              <a:buFont typeface="Arial" panose="020B0604020202020204" pitchFamily="34" charset="0"/>
+              <a:buChar char="•"/>
+            </a:pPr>
+            <a:r>
+              <a:rPr lang="en-US" sz="1600" dirty="0"/>
+              <a:t>Log the version with --version (this can help you figure out which was the version that worked).</a:t>
+            </a:r>
+            <a:endParaRPr lang="de-DE" sz="1600" dirty="0"/>
           </a:p>
         </p:txBody>
       </p:sp>
     </p:spTree>
     <p:extLst>
       <p:ext uri="{BB962C8B-B14F-4D97-AF65-F5344CB8AC3E}">
-        <p14:creationId xmlns:p14="http://schemas.microsoft.com/office/powerpoint/2010/main" val="1221504503"/>
+        <p14:creationId xmlns:p14="http://schemas.microsoft.com/office/powerpoint/2010/main" val="1431740569"/>
       </p:ext>
     </p:extLst>
   </p:cSld>
@@ -18060,7 +19511,7 @@
               <a:buChar char="•"/>
             </a:pPr>
             <a:r>
-              <a:rPr lang="de-DE" dirty="0"/>
+              <a:rPr lang="de-DE" u="sng" dirty="0"/>
               <a:t>Tags eines bestimmten Container Image ansehen</a:t>
             </a:r>
           </a:p>
@@ -18080,7 +19531,7 @@
               <a:buChar char="•"/>
             </a:pPr>
             <a:r>
-              <a:rPr lang="de-DE" u="sng" dirty="0"/>
+              <a:rPr lang="de-DE" dirty="0"/>
               <a:t>Naming Convention für Container Images</a:t>
             </a:r>
           </a:p>
@@ -18119,7 +19570,7 @@
     </p:spTree>
     <p:extLst>
       <p:ext uri="{BB962C8B-B14F-4D97-AF65-F5344CB8AC3E}">
-        <p14:creationId xmlns:p14="http://schemas.microsoft.com/office/powerpoint/2010/main" val="2645450426"/>
+        <p14:creationId xmlns:p14="http://schemas.microsoft.com/office/powerpoint/2010/main" val="1518629705"/>
       </p:ext>
     </p:extLst>
   </p:cSld>
@@ -18200,12 +19651,96 @@
             </a:pPr>
             <a:r>
               <a:rPr lang="de-DE" b="1" dirty="0"/>
-              <a:t>Naming Convention für Container Images</a:t>
-            </a:r>
-          </a:p>
-          <a:p>
-            <a:pPr marL="0" indent="0">
-              <a:buNone/>
+              <a:t>Tags eines bestimmten Container Image ansehen</a:t>
+            </a:r>
+          </a:p>
+          <a:p>
+            <a:pPr>
+              <a:buFont typeface="Arial" panose="020B0604020202020204" pitchFamily="34" charset="0"/>
+              <a:buChar char="•"/>
+            </a:pPr>
+            <a:r>
+              <a:rPr lang="de-DE" dirty="0"/>
+              <a:t>In </a:t>
+            </a:r>
+            <a:r>
+              <a:rPr lang="de-DE" dirty="0" err="1"/>
+              <a:t>GitLab</a:t>
+            </a:r>
+            <a:r>
+              <a:rPr lang="de-DE" dirty="0"/>
+              <a:t> kann man die „Tag Details“-Seite einsehen, um eine Liste der Tags zu erhalten, welche mit dem Image in Verbindung stehen</a:t>
+            </a:r>
+          </a:p>
+          <a:p>
+            <a:pPr>
+              <a:buFont typeface="Arial" panose="020B0604020202020204" pitchFamily="34" charset="0"/>
+              <a:buChar char="•"/>
+            </a:pPr>
+            <a:endParaRPr lang="de-DE" dirty="0"/>
+          </a:p>
+          <a:p>
+            <a:pPr marL="457200" indent="-457200">
+              <a:buFont typeface="+mj-lt"/>
+              <a:buAutoNum type="arabicPeriod"/>
+            </a:pPr>
+            <a:r>
+              <a:rPr lang="de-DE" dirty="0"/>
+              <a:t>Gewünschtes Projekt oder Gruppe in </a:t>
+            </a:r>
+            <a:r>
+              <a:rPr lang="de-DE" dirty="0" err="1"/>
+              <a:t>GitLab</a:t>
+            </a:r>
+            <a:r>
+              <a:rPr lang="de-DE" dirty="0"/>
+              <a:t> auswählen</a:t>
+            </a:r>
+          </a:p>
+          <a:p>
+            <a:pPr marL="457200" indent="-457200">
+              <a:buFont typeface="+mj-lt"/>
+              <a:buAutoNum type="arabicPeriod"/>
+            </a:pPr>
+            <a:r>
+              <a:rPr lang="de-DE" dirty="0"/>
+              <a:t>„Deploy“ </a:t>
+            </a:r>
+            <a:r>
+              <a:rPr lang="de-DE" dirty="0">
+                <a:sym typeface="Wingdings" panose="05000000000000000000" pitchFamily="2" charset="2"/>
+              </a:rPr>
+              <a:t> „Container Registry“</a:t>
+            </a:r>
+          </a:p>
+          <a:p>
+            <a:pPr marL="457200" indent="-457200">
+              <a:buFont typeface="+mj-lt"/>
+              <a:buAutoNum type="arabicPeriod"/>
+            </a:pPr>
+            <a:r>
+              <a:rPr lang="de-DE" dirty="0">
+                <a:sym typeface="Wingdings" panose="05000000000000000000" pitchFamily="2" charset="2"/>
+              </a:rPr>
+              <a:t>Gewünschtes Container Image selektieren</a:t>
+            </a:r>
+          </a:p>
+          <a:p>
+            <a:pPr marL="457200" indent="-457200">
+              <a:buFont typeface="+mj-lt"/>
+              <a:buAutoNum type="arabicPeriod"/>
+            </a:pPr>
+            <a:r>
+              <a:rPr lang="de-DE" dirty="0">
+                <a:sym typeface="Wingdings" panose="05000000000000000000" pitchFamily="2" charset="2"/>
+              </a:rPr>
+              <a:t>„Tag-Details“-Seite wird angezeigt</a:t>
+            </a:r>
+          </a:p>
+          <a:p>
+            <a:pPr marL="457200" indent="-457200">
+              <a:buFont typeface="+mj-lt"/>
+              <a:buAutoNum type="arabicPeriod"/>
             </a:pPr>
             <a:endParaRPr lang="de-DE" dirty="0"/>
           </a:p>
@@ -18214,7 +19749,7 @@
     </p:spTree>
     <p:extLst>
       <p:ext uri="{BB962C8B-B14F-4D97-AF65-F5344CB8AC3E}">
-        <p14:creationId xmlns:p14="http://schemas.microsoft.com/office/powerpoint/2010/main" val="1335975550"/>
+        <p14:creationId xmlns:p14="http://schemas.microsoft.com/office/powerpoint/2010/main" val="1897709238"/>
       </p:ext>
     </p:extLst>
   </p:cSld>
@@ -18246,7 +19781,7 @@
           <p:cNvPr id="2" name="Titel 1">
             <a:extLst>
               <a:ext uri="{FF2B5EF4-FFF2-40B4-BE49-F238E27FC236}">
-                <a16:creationId xmlns:a16="http://schemas.microsoft.com/office/drawing/2014/main" id="{6AA67486-2598-533D-4DB5-FC490AB10E2A}"/>
+                <a16:creationId xmlns:a16="http://schemas.microsoft.com/office/drawing/2014/main" id="{631A25DF-992F-CF4E-F32B-E5531501F3DD}"/>
               </a:ext>
             </a:extLst>
           </p:cNvPr>
@@ -18269,102 +19804,45 @@
           </a:p>
         </p:txBody>
       </p:sp>
-      <p:sp>
-        <p:nvSpPr>
-          <p:cNvPr id="3" name="Inhaltsplatzhalter 2">
+      <p:pic>
+        <p:nvPicPr>
+          <p:cNvPr id="6" name="Inhaltsplatzhalter 5">
             <a:extLst>
               <a:ext uri="{FF2B5EF4-FFF2-40B4-BE49-F238E27FC236}">
-                <a16:creationId xmlns:a16="http://schemas.microsoft.com/office/drawing/2014/main" id="{CA708DD8-2C30-488D-3B3A-0BE38FE0786D}"/>
+                <a16:creationId xmlns:a16="http://schemas.microsoft.com/office/drawing/2014/main" id="{25666A37-8A9A-F2B4-1A48-5AE787123783}"/>
               </a:ext>
             </a:extLst>
           </p:cNvPr>
-          <p:cNvSpPr>
-            <a:spLocks noGrp="1"/>
-          </p:cNvSpPr>
+          <p:cNvPicPr>
+            <a:picLocks noGrp="1" noChangeAspect="1"/>
+          </p:cNvPicPr>
           <p:nvPr>
             <p:ph idx="1"/>
           </p:nvPr>
-        </p:nvSpPr>
-        <p:spPr/>
-        <p:txBody>
-          <a:bodyPr/>
-          <a:lstStyle/>
-          <a:p>
-            <a:pPr>
-              <a:buFont typeface="Arial" panose="020B0604020202020204" pitchFamily="34" charset="0"/>
-              <a:buChar char="•"/>
-            </a:pPr>
-            <a:r>
-              <a:rPr lang="de-DE" dirty="0"/>
-              <a:t>Container Registry ansehen</a:t>
-            </a:r>
-          </a:p>
-          <a:p>
-            <a:pPr>
-              <a:buFont typeface="Arial" panose="020B0604020202020204" pitchFamily="34" charset="0"/>
-              <a:buChar char="•"/>
-            </a:pPr>
-            <a:r>
-              <a:rPr lang="de-DE" dirty="0"/>
-              <a:t>Tags eines bestimmten Container Image ansehen</a:t>
-            </a:r>
-          </a:p>
-          <a:p>
-            <a:pPr>
-              <a:buFont typeface="Arial" panose="020B0604020202020204" pitchFamily="34" charset="0"/>
-              <a:buChar char="•"/>
-            </a:pPr>
-            <a:r>
-              <a:rPr lang="de-DE" dirty="0"/>
-              <a:t>Container Images von der Container Registry nutzen</a:t>
-            </a:r>
-          </a:p>
-          <a:p>
-            <a:pPr>
-              <a:buFont typeface="Arial" panose="020B0604020202020204" pitchFamily="34" charset="0"/>
-              <a:buChar char="•"/>
-            </a:pPr>
-            <a:r>
-              <a:rPr lang="de-DE" dirty="0"/>
-              <a:t>Naming Convention für Container Images</a:t>
-            </a:r>
-          </a:p>
-          <a:p>
-            <a:pPr>
-              <a:buFont typeface="Arial" panose="020B0604020202020204" pitchFamily="34" charset="0"/>
-              <a:buChar char="•"/>
-            </a:pPr>
-            <a:r>
-              <a:rPr lang="de-DE" u="sng" dirty="0"/>
-              <a:t>Verschieben oder Umbenennen einer Container Registry</a:t>
-            </a:r>
-          </a:p>
-          <a:p>
-            <a:pPr>
-              <a:buFont typeface="Arial" panose="020B0604020202020204" pitchFamily="34" charset="0"/>
-              <a:buChar char="•"/>
-            </a:pPr>
-            <a:r>
-              <a:rPr lang="de-DE" dirty="0"/>
-              <a:t>Container Registry für ein Projekt deaktivieren</a:t>
-            </a:r>
-          </a:p>
-          <a:p>
-            <a:pPr>
-              <a:buFont typeface="Arial" panose="020B0604020202020204" pitchFamily="34" charset="0"/>
-              <a:buChar char="•"/>
-            </a:pPr>
-            <a:r>
-              <a:rPr lang="de-DE" dirty="0"/>
-              <a:t>Sichtbarkeit der Container Registry ändern</a:t>
-            </a:r>
-          </a:p>
-        </p:txBody>
-      </p:sp>
+        </p:nvPicPr>
+        <p:blipFill>
+          <a:blip r:embed="rId3">
+            <a:extLst>
+              <a:ext uri="{28A0092B-C50C-407E-A947-70E740481C1C}">
+                <a14:useLocalDpi xmlns:a14="http://schemas.microsoft.com/office/drawing/2010/main" val="0"/>
+              </a:ext>
+            </a:extLst>
+          </a:blip>
+          <a:stretch>
+            <a:fillRect/>
+          </a:stretch>
+        </p:blipFill>
+        <p:spPr>
+          <a:xfrm>
+            <a:off x="1541835" y="1142645"/>
+            <a:ext cx="6039693" cy="5077534"/>
+          </a:xfrm>
+        </p:spPr>
+      </p:pic>
     </p:spTree>
     <p:extLst>
       <p:ext uri="{BB962C8B-B14F-4D97-AF65-F5344CB8AC3E}">
-        <p14:creationId xmlns:p14="http://schemas.microsoft.com/office/powerpoint/2010/main" val="1588285644"/>
+        <p14:creationId xmlns:p14="http://schemas.microsoft.com/office/powerpoint/2010/main" val="2767908473"/>
       </p:ext>
     </p:extLst>
   </p:cSld>
@@ -18396,7 +19874,7 @@
           <p:cNvPr id="2" name="Titel 1">
             <a:extLst>
               <a:ext uri="{FF2B5EF4-FFF2-40B4-BE49-F238E27FC236}">
-                <a16:creationId xmlns:a16="http://schemas.microsoft.com/office/drawing/2014/main" id="{6AA67486-2598-533D-4DB5-FC490AB10E2A}"/>
+                <a16:creationId xmlns:a16="http://schemas.microsoft.com/office/drawing/2014/main" id="{631A25DF-992F-CF4E-F32B-E5531501F3DD}"/>
               </a:ext>
             </a:extLst>
           </p:cNvPr>
@@ -18419,47 +19897,45 @@
           </a:p>
         </p:txBody>
       </p:sp>
-      <p:sp>
-        <p:nvSpPr>
-          <p:cNvPr id="3" name="Inhaltsplatzhalter 2">
+      <p:pic>
+        <p:nvPicPr>
+          <p:cNvPr id="5" name="Inhaltsplatzhalter 4">
             <a:extLst>
               <a:ext uri="{FF2B5EF4-FFF2-40B4-BE49-F238E27FC236}">
-                <a16:creationId xmlns:a16="http://schemas.microsoft.com/office/drawing/2014/main" id="{CA708DD8-2C30-488D-3B3A-0BE38FE0786D}"/>
+                <a16:creationId xmlns:a16="http://schemas.microsoft.com/office/drawing/2014/main" id="{6BCDCE79-6AC3-B675-C590-98065969EEA3}"/>
               </a:ext>
             </a:extLst>
           </p:cNvPr>
-          <p:cNvSpPr>
-            <a:spLocks noGrp="1"/>
-          </p:cNvSpPr>
+          <p:cNvPicPr>
+            <a:picLocks noGrp="1" noChangeAspect="1"/>
+          </p:cNvPicPr>
           <p:nvPr>
             <p:ph idx="1"/>
           </p:nvPr>
-        </p:nvSpPr>
-        <p:spPr/>
-        <p:txBody>
-          <a:bodyPr/>
-          <a:lstStyle/>
-          <a:p>
-            <a:pPr marL="0" indent="0">
-              <a:buNone/>
-            </a:pPr>
-            <a:r>
-              <a:rPr lang="de-DE" b="1" dirty="0"/>
-              <a:t>Verschieben oder Umbenennen einer Container Registry</a:t>
-            </a:r>
-          </a:p>
-          <a:p>
-            <a:pPr marL="0" indent="0">
-              <a:buNone/>
-            </a:pPr>
-            <a:endParaRPr lang="de-DE" dirty="0"/>
-          </a:p>
-        </p:txBody>
-      </p:sp>
+        </p:nvPicPr>
+        <p:blipFill>
+          <a:blip r:embed="rId3">
+            <a:extLst>
+              <a:ext uri="{28A0092B-C50C-407E-A947-70E740481C1C}">
+                <a14:useLocalDpi xmlns:a14="http://schemas.microsoft.com/office/drawing/2010/main" val="0"/>
+              </a:ext>
+            </a:extLst>
+          </a:blip>
+          <a:stretch>
+            <a:fillRect/>
+          </a:stretch>
+        </p:blipFill>
+        <p:spPr>
+          <a:xfrm>
+            <a:off x="303213" y="2334208"/>
+            <a:ext cx="8516937" cy="2694409"/>
+          </a:xfrm>
+        </p:spPr>
+      </p:pic>
     </p:spTree>
     <p:extLst>
       <p:ext uri="{BB962C8B-B14F-4D97-AF65-F5344CB8AC3E}">
-        <p14:creationId xmlns:p14="http://schemas.microsoft.com/office/powerpoint/2010/main" val="4269851796"/>
+        <p14:creationId xmlns:p14="http://schemas.microsoft.com/office/powerpoint/2010/main" val="2006203252"/>
       </p:ext>
     </p:extLst>
   </p:cSld>
@@ -18560,7 +20036,7 @@
               <a:buChar char="•"/>
             </a:pPr>
             <a:r>
-              <a:rPr lang="de-DE" dirty="0"/>
+              <a:rPr lang="de-DE" u="sng" dirty="0"/>
               <a:t>Container Images von der Container Registry nutzen</a:t>
             </a:r>
           </a:p>
@@ -18590,7 +20066,7 @@
               <a:buChar char="•"/>
             </a:pPr>
             <a:r>
-              <a:rPr lang="de-DE" b="1" dirty="0"/>
+              <a:rPr lang="de-DE" dirty="0"/>
               <a:t>Container Registry für ein Projekt deaktivieren</a:t>
             </a:r>
           </a:p>
@@ -18609,7 +20085,7 @@
     </p:spTree>
     <p:extLst>
       <p:ext uri="{BB962C8B-B14F-4D97-AF65-F5344CB8AC3E}">
-        <p14:creationId xmlns:p14="http://schemas.microsoft.com/office/powerpoint/2010/main" val="2844639609"/>
+        <p14:creationId xmlns:p14="http://schemas.microsoft.com/office/powerpoint/2010/main" val="1938619157"/>
       </p:ext>
     </p:extLst>
   </p:cSld>
@@ -18855,15 +20331,21 @@
             </a:pPr>
             <a:r>
               <a:rPr lang="de-DE" b="1" dirty="0"/>
-              <a:t>Container Registry für ein Projekt deaktivieren</a:t>
-            </a:r>
+              <a:t>Container Images von der Container Registry nutzen</a:t>
+            </a:r>
+          </a:p>
+          <a:p>
+            <a:pPr marL="0" indent="0">
+              <a:buNone/>
+            </a:pPr>
+            <a:endParaRPr lang="de-DE" dirty="0"/>
           </a:p>
         </p:txBody>
       </p:sp>
     </p:spTree>
     <p:extLst>
       <p:ext uri="{BB962C8B-B14F-4D97-AF65-F5344CB8AC3E}">
-        <p14:creationId xmlns:p14="http://schemas.microsoft.com/office/powerpoint/2010/main" val="3312416891"/>
+        <p14:creationId xmlns:p14="http://schemas.microsoft.com/office/powerpoint/2010/main" val="1221504503"/>
       </p:ext>
     </p:extLst>
   </p:cSld>
@@ -18974,7 +20456,7 @@
               <a:buChar char="•"/>
             </a:pPr>
             <a:r>
-              <a:rPr lang="de-DE" dirty="0"/>
+              <a:rPr lang="de-DE" u="sng" dirty="0"/>
               <a:t>Naming Convention für Container Images</a:t>
             </a:r>
           </a:p>
@@ -19004,7 +20486,7 @@
               <a:buChar char="•"/>
             </a:pPr>
             <a:r>
-              <a:rPr lang="de-DE" u="sng" dirty="0"/>
+              <a:rPr lang="de-DE" dirty="0"/>
               <a:t>Sichtbarkeit der Container Registry ändern</a:t>
             </a:r>
           </a:p>
@@ -19013,7 +20495,7 @@
     </p:spTree>
     <p:extLst>
       <p:ext uri="{BB962C8B-B14F-4D97-AF65-F5344CB8AC3E}">
-        <p14:creationId xmlns:p14="http://schemas.microsoft.com/office/powerpoint/2010/main" val="1284672836"/>
+        <p14:creationId xmlns:p14="http://schemas.microsoft.com/office/powerpoint/2010/main" val="2645450426"/>
       </p:ext>
     </p:extLst>
   </p:cSld>
@@ -19094,6 +20576,735 @@
             </a:pPr>
             <a:r>
               <a:rPr lang="de-DE" b="1" dirty="0"/>
+              <a:t>Naming Convention für Container Images</a:t>
+            </a:r>
+          </a:p>
+          <a:p>
+            <a:pPr marL="0" indent="0">
+              <a:buNone/>
+            </a:pPr>
+            <a:endParaRPr lang="de-DE" dirty="0"/>
+          </a:p>
+        </p:txBody>
+      </p:sp>
+    </p:spTree>
+    <p:extLst>
+      <p:ext uri="{BB962C8B-B14F-4D97-AF65-F5344CB8AC3E}">
+        <p14:creationId xmlns:p14="http://schemas.microsoft.com/office/powerpoint/2010/main" val="1335975550"/>
+      </p:ext>
+    </p:extLst>
+  </p:cSld>
+  <p:clrMapOvr>
+    <a:masterClrMapping/>
+  </p:clrMapOvr>
+</p:sld>
+</file>
+
+<file path=ppt/slides/slide123.xml><?xml version="1.0" encoding="utf-8"?>
+<p:sld xmlns:a="http://schemas.openxmlformats.org/drawingml/2006/main" xmlns:r="http://schemas.openxmlformats.org/officeDocument/2006/relationships" xmlns:p="http://schemas.openxmlformats.org/presentationml/2006/main">
+  <p:cSld>
+    <p:spTree>
+      <p:nvGrpSpPr>
+        <p:cNvPr id="1" name=""/>
+        <p:cNvGrpSpPr/>
+        <p:nvPr/>
+      </p:nvGrpSpPr>
+      <p:grpSpPr>
+        <a:xfrm>
+          <a:off x="0" y="0"/>
+          <a:ext cx="0" cy="0"/>
+          <a:chOff x="0" y="0"/>
+          <a:chExt cx="0" cy="0"/>
+        </a:xfrm>
+      </p:grpSpPr>
+      <p:sp>
+        <p:nvSpPr>
+          <p:cNvPr id="2" name="Titel 1">
+            <a:extLst>
+              <a:ext uri="{FF2B5EF4-FFF2-40B4-BE49-F238E27FC236}">
+                <a16:creationId xmlns:a16="http://schemas.microsoft.com/office/drawing/2014/main" id="{6AA67486-2598-533D-4DB5-FC490AB10E2A}"/>
+              </a:ext>
+            </a:extLst>
+          </p:cNvPr>
+          <p:cNvSpPr>
+            <a:spLocks noGrp="1"/>
+          </p:cNvSpPr>
+          <p:nvPr>
+            <p:ph type="title"/>
+          </p:nvPr>
+        </p:nvSpPr>
+        <p:spPr/>
+        <p:txBody>
+          <a:bodyPr/>
+          <a:lstStyle/>
+          <a:p>
+            <a:r>
+              <a:rPr lang="de-DE" dirty="0"/>
+              <a:t>Container Registry</a:t>
+            </a:r>
+          </a:p>
+        </p:txBody>
+      </p:sp>
+      <p:sp>
+        <p:nvSpPr>
+          <p:cNvPr id="3" name="Inhaltsplatzhalter 2">
+            <a:extLst>
+              <a:ext uri="{FF2B5EF4-FFF2-40B4-BE49-F238E27FC236}">
+                <a16:creationId xmlns:a16="http://schemas.microsoft.com/office/drawing/2014/main" id="{CA708DD8-2C30-488D-3B3A-0BE38FE0786D}"/>
+              </a:ext>
+            </a:extLst>
+          </p:cNvPr>
+          <p:cNvSpPr>
+            <a:spLocks noGrp="1"/>
+          </p:cNvSpPr>
+          <p:nvPr>
+            <p:ph idx="1"/>
+          </p:nvPr>
+        </p:nvSpPr>
+        <p:spPr/>
+        <p:txBody>
+          <a:bodyPr/>
+          <a:lstStyle/>
+          <a:p>
+            <a:pPr>
+              <a:buFont typeface="Arial" panose="020B0604020202020204" pitchFamily="34" charset="0"/>
+              <a:buChar char="•"/>
+            </a:pPr>
+            <a:r>
+              <a:rPr lang="de-DE" dirty="0"/>
+              <a:t>Container Registry ansehen</a:t>
+            </a:r>
+          </a:p>
+          <a:p>
+            <a:pPr>
+              <a:buFont typeface="Arial" panose="020B0604020202020204" pitchFamily="34" charset="0"/>
+              <a:buChar char="•"/>
+            </a:pPr>
+            <a:r>
+              <a:rPr lang="de-DE" dirty="0"/>
+              <a:t>Tags eines bestimmten Container Image ansehen</a:t>
+            </a:r>
+          </a:p>
+          <a:p>
+            <a:pPr>
+              <a:buFont typeface="Arial" panose="020B0604020202020204" pitchFamily="34" charset="0"/>
+              <a:buChar char="•"/>
+            </a:pPr>
+            <a:r>
+              <a:rPr lang="de-DE" dirty="0"/>
+              <a:t>Container Images von der Container Registry nutzen</a:t>
+            </a:r>
+          </a:p>
+          <a:p>
+            <a:pPr>
+              <a:buFont typeface="Arial" panose="020B0604020202020204" pitchFamily="34" charset="0"/>
+              <a:buChar char="•"/>
+            </a:pPr>
+            <a:r>
+              <a:rPr lang="de-DE" dirty="0"/>
+              <a:t>Naming Convention für Container Images</a:t>
+            </a:r>
+          </a:p>
+          <a:p>
+            <a:pPr>
+              <a:buFont typeface="Arial" panose="020B0604020202020204" pitchFamily="34" charset="0"/>
+              <a:buChar char="•"/>
+            </a:pPr>
+            <a:r>
+              <a:rPr lang="de-DE" u="sng" dirty="0"/>
+              <a:t>Verschieben oder Umbenennen einer Container Registry</a:t>
+            </a:r>
+          </a:p>
+          <a:p>
+            <a:pPr>
+              <a:buFont typeface="Arial" panose="020B0604020202020204" pitchFamily="34" charset="0"/>
+              <a:buChar char="•"/>
+            </a:pPr>
+            <a:r>
+              <a:rPr lang="de-DE" dirty="0"/>
+              <a:t>Container Registry für ein Projekt deaktivieren</a:t>
+            </a:r>
+          </a:p>
+          <a:p>
+            <a:pPr>
+              <a:buFont typeface="Arial" panose="020B0604020202020204" pitchFamily="34" charset="0"/>
+              <a:buChar char="•"/>
+            </a:pPr>
+            <a:r>
+              <a:rPr lang="de-DE" dirty="0"/>
+              <a:t>Sichtbarkeit der Container Registry ändern</a:t>
+            </a:r>
+          </a:p>
+        </p:txBody>
+      </p:sp>
+    </p:spTree>
+    <p:extLst>
+      <p:ext uri="{BB962C8B-B14F-4D97-AF65-F5344CB8AC3E}">
+        <p14:creationId xmlns:p14="http://schemas.microsoft.com/office/powerpoint/2010/main" val="1588285644"/>
+      </p:ext>
+    </p:extLst>
+  </p:cSld>
+  <p:clrMapOvr>
+    <a:masterClrMapping/>
+  </p:clrMapOvr>
+</p:sld>
+</file>
+
+<file path=ppt/slides/slide124.xml><?xml version="1.0" encoding="utf-8"?>
+<p:sld xmlns:a="http://schemas.openxmlformats.org/drawingml/2006/main" xmlns:r="http://schemas.openxmlformats.org/officeDocument/2006/relationships" xmlns:p="http://schemas.openxmlformats.org/presentationml/2006/main">
+  <p:cSld>
+    <p:spTree>
+      <p:nvGrpSpPr>
+        <p:cNvPr id="1" name=""/>
+        <p:cNvGrpSpPr/>
+        <p:nvPr/>
+      </p:nvGrpSpPr>
+      <p:grpSpPr>
+        <a:xfrm>
+          <a:off x="0" y="0"/>
+          <a:ext cx="0" cy="0"/>
+          <a:chOff x="0" y="0"/>
+          <a:chExt cx="0" cy="0"/>
+        </a:xfrm>
+      </p:grpSpPr>
+      <p:sp>
+        <p:nvSpPr>
+          <p:cNvPr id="2" name="Titel 1">
+            <a:extLst>
+              <a:ext uri="{FF2B5EF4-FFF2-40B4-BE49-F238E27FC236}">
+                <a16:creationId xmlns:a16="http://schemas.microsoft.com/office/drawing/2014/main" id="{6AA67486-2598-533D-4DB5-FC490AB10E2A}"/>
+              </a:ext>
+            </a:extLst>
+          </p:cNvPr>
+          <p:cNvSpPr>
+            <a:spLocks noGrp="1"/>
+          </p:cNvSpPr>
+          <p:nvPr>
+            <p:ph type="title"/>
+          </p:nvPr>
+        </p:nvSpPr>
+        <p:spPr/>
+        <p:txBody>
+          <a:bodyPr/>
+          <a:lstStyle/>
+          <a:p>
+            <a:r>
+              <a:rPr lang="de-DE" dirty="0"/>
+              <a:t>Container Registry</a:t>
+            </a:r>
+          </a:p>
+        </p:txBody>
+      </p:sp>
+      <p:sp>
+        <p:nvSpPr>
+          <p:cNvPr id="3" name="Inhaltsplatzhalter 2">
+            <a:extLst>
+              <a:ext uri="{FF2B5EF4-FFF2-40B4-BE49-F238E27FC236}">
+                <a16:creationId xmlns:a16="http://schemas.microsoft.com/office/drawing/2014/main" id="{CA708DD8-2C30-488D-3B3A-0BE38FE0786D}"/>
+              </a:ext>
+            </a:extLst>
+          </p:cNvPr>
+          <p:cNvSpPr>
+            <a:spLocks noGrp="1"/>
+          </p:cNvSpPr>
+          <p:nvPr>
+            <p:ph idx="1"/>
+          </p:nvPr>
+        </p:nvSpPr>
+        <p:spPr/>
+        <p:txBody>
+          <a:bodyPr/>
+          <a:lstStyle/>
+          <a:p>
+            <a:pPr marL="0" indent="0">
+              <a:buNone/>
+            </a:pPr>
+            <a:r>
+              <a:rPr lang="de-DE" b="1" dirty="0"/>
+              <a:t>Verschieben oder Umbenennen einer Container Registry</a:t>
+            </a:r>
+          </a:p>
+          <a:p>
+            <a:pPr marL="0" indent="0">
+              <a:buNone/>
+            </a:pPr>
+            <a:endParaRPr lang="de-DE" dirty="0"/>
+          </a:p>
+        </p:txBody>
+      </p:sp>
+    </p:spTree>
+    <p:extLst>
+      <p:ext uri="{BB962C8B-B14F-4D97-AF65-F5344CB8AC3E}">
+        <p14:creationId xmlns:p14="http://schemas.microsoft.com/office/powerpoint/2010/main" val="4269851796"/>
+      </p:ext>
+    </p:extLst>
+  </p:cSld>
+  <p:clrMapOvr>
+    <a:masterClrMapping/>
+  </p:clrMapOvr>
+</p:sld>
+</file>
+
+<file path=ppt/slides/slide125.xml><?xml version="1.0" encoding="utf-8"?>
+<p:sld xmlns:a="http://schemas.openxmlformats.org/drawingml/2006/main" xmlns:r="http://schemas.openxmlformats.org/officeDocument/2006/relationships" xmlns:p="http://schemas.openxmlformats.org/presentationml/2006/main">
+  <p:cSld>
+    <p:spTree>
+      <p:nvGrpSpPr>
+        <p:cNvPr id="1" name=""/>
+        <p:cNvGrpSpPr/>
+        <p:nvPr/>
+      </p:nvGrpSpPr>
+      <p:grpSpPr>
+        <a:xfrm>
+          <a:off x="0" y="0"/>
+          <a:ext cx="0" cy="0"/>
+          <a:chOff x="0" y="0"/>
+          <a:chExt cx="0" cy="0"/>
+        </a:xfrm>
+      </p:grpSpPr>
+      <p:sp>
+        <p:nvSpPr>
+          <p:cNvPr id="2" name="Titel 1">
+            <a:extLst>
+              <a:ext uri="{FF2B5EF4-FFF2-40B4-BE49-F238E27FC236}">
+                <a16:creationId xmlns:a16="http://schemas.microsoft.com/office/drawing/2014/main" id="{6AA67486-2598-533D-4DB5-FC490AB10E2A}"/>
+              </a:ext>
+            </a:extLst>
+          </p:cNvPr>
+          <p:cNvSpPr>
+            <a:spLocks noGrp="1"/>
+          </p:cNvSpPr>
+          <p:nvPr>
+            <p:ph type="title"/>
+          </p:nvPr>
+        </p:nvSpPr>
+        <p:spPr/>
+        <p:txBody>
+          <a:bodyPr/>
+          <a:lstStyle/>
+          <a:p>
+            <a:r>
+              <a:rPr lang="de-DE" dirty="0"/>
+              <a:t>Container Registry</a:t>
+            </a:r>
+          </a:p>
+        </p:txBody>
+      </p:sp>
+      <p:sp>
+        <p:nvSpPr>
+          <p:cNvPr id="3" name="Inhaltsplatzhalter 2">
+            <a:extLst>
+              <a:ext uri="{FF2B5EF4-FFF2-40B4-BE49-F238E27FC236}">
+                <a16:creationId xmlns:a16="http://schemas.microsoft.com/office/drawing/2014/main" id="{CA708DD8-2C30-488D-3B3A-0BE38FE0786D}"/>
+              </a:ext>
+            </a:extLst>
+          </p:cNvPr>
+          <p:cNvSpPr>
+            <a:spLocks noGrp="1"/>
+          </p:cNvSpPr>
+          <p:nvPr>
+            <p:ph idx="1"/>
+          </p:nvPr>
+        </p:nvSpPr>
+        <p:spPr/>
+        <p:txBody>
+          <a:bodyPr/>
+          <a:lstStyle/>
+          <a:p>
+            <a:pPr>
+              <a:buFont typeface="Arial" panose="020B0604020202020204" pitchFamily="34" charset="0"/>
+              <a:buChar char="•"/>
+            </a:pPr>
+            <a:r>
+              <a:rPr lang="de-DE" dirty="0"/>
+              <a:t>Container Registry ansehen</a:t>
+            </a:r>
+          </a:p>
+          <a:p>
+            <a:pPr>
+              <a:buFont typeface="Arial" panose="020B0604020202020204" pitchFamily="34" charset="0"/>
+              <a:buChar char="•"/>
+            </a:pPr>
+            <a:r>
+              <a:rPr lang="de-DE" dirty="0"/>
+              <a:t>Tags eines bestimmten Container Image ansehen</a:t>
+            </a:r>
+          </a:p>
+          <a:p>
+            <a:pPr>
+              <a:buFont typeface="Arial" panose="020B0604020202020204" pitchFamily="34" charset="0"/>
+              <a:buChar char="•"/>
+            </a:pPr>
+            <a:r>
+              <a:rPr lang="de-DE" dirty="0"/>
+              <a:t>Container Images von der Container Registry nutzen</a:t>
+            </a:r>
+          </a:p>
+          <a:p>
+            <a:pPr>
+              <a:buFont typeface="Arial" panose="020B0604020202020204" pitchFamily="34" charset="0"/>
+              <a:buChar char="•"/>
+            </a:pPr>
+            <a:r>
+              <a:rPr lang="de-DE" dirty="0"/>
+              <a:t>Naming Convention für Container Images</a:t>
+            </a:r>
+          </a:p>
+          <a:p>
+            <a:pPr>
+              <a:buFont typeface="Arial" panose="020B0604020202020204" pitchFamily="34" charset="0"/>
+              <a:buChar char="•"/>
+            </a:pPr>
+            <a:r>
+              <a:rPr lang="de-DE" dirty="0"/>
+              <a:t>Verschieben oder Umbenennen einer Container Registry</a:t>
+            </a:r>
+          </a:p>
+          <a:p>
+            <a:pPr>
+              <a:buFont typeface="Arial" panose="020B0604020202020204" pitchFamily="34" charset="0"/>
+              <a:buChar char="•"/>
+            </a:pPr>
+            <a:r>
+              <a:rPr lang="de-DE" b="1" dirty="0"/>
+              <a:t>Container Registry für ein Projekt deaktivieren</a:t>
+            </a:r>
+          </a:p>
+          <a:p>
+            <a:pPr>
+              <a:buFont typeface="Arial" panose="020B0604020202020204" pitchFamily="34" charset="0"/>
+              <a:buChar char="•"/>
+            </a:pPr>
+            <a:r>
+              <a:rPr lang="de-DE" dirty="0"/>
+              <a:t>Sichtbarkeit der Container Registry ändern</a:t>
+            </a:r>
+          </a:p>
+        </p:txBody>
+      </p:sp>
+    </p:spTree>
+    <p:extLst>
+      <p:ext uri="{BB962C8B-B14F-4D97-AF65-F5344CB8AC3E}">
+        <p14:creationId xmlns:p14="http://schemas.microsoft.com/office/powerpoint/2010/main" val="2844639609"/>
+      </p:ext>
+    </p:extLst>
+  </p:cSld>
+  <p:clrMapOvr>
+    <a:masterClrMapping/>
+  </p:clrMapOvr>
+</p:sld>
+</file>
+
+<file path=ppt/slides/slide126.xml><?xml version="1.0" encoding="utf-8"?>
+<p:sld xmlns:a="http://schemas.openxmlformats.org/drawingml/2006/main" xmlns:r="http://schemas.openxmlformats.org/officeDocument/2006/relationships" xmlns:p="http://schemas.openxmlformats.org/presentationml/2006/main">
+  <p:cSld>
+    <p:spTree>
+      <p:nvGrpSpPr>
+        <p:cNvPr id="1" name=""/>
+        <p:cNvGrpSpPr/>
+        <p:nvPr/>
+      </p:nvGrpSpPr>
+      <p:grpSpPr>
+        <a:xfrm>
+          <a:off x="0" y="0"/>
+          <a:ext cx="0" cy="0"/>
+          <a:chOff x="0" y="0"/>
+          <a:chExt cx="0" cy="0"/>
+        </a:xfrm>
+      </p:grpSpPr>
+      <p:sp>
+        <p:nvSpPr>
+          <p:cNvPr id="2" name="Titel 1">
+            <a:extLst>
+              <a:ext uri="{FF2B5EF4-FFF2-40B4-BE49-F238E27FC236}">
+                <a16:creationId xmlns:a16="http://schemas.microsoft.com/office/drawing/2014/main" id="{6AA67486-2598-533D-4DB5-FC490AB10E2A}"/>
+              </a:ext>
+            </a:extLst>
+          </p:cNvPr>
+          <p:cNvSpPr>
+            <a:spLocks noGrp="1"/>
+          </p:cNvSpPr>
+          <p:nvPr>
+            <p:ph type="title"/>
+          </p:nvPr>
+        </p:nvSpPr>
+        <p:spPr/>
+        <p:txBody>
+          <a:bodyPr/>
+          <a:lstStyle/>
+          <a:p>
+            <a:r>
+              <a:rPr lang="de-DE" dirty="0"/>
+              <a:t>Container Registry</a:t>
+            </a:r>
+          </a:p>
+        </p:txBody>
+      </p:sp>
+      <p:sp>
+        <p:nvSpPr>
+          <p:cNvPr id="3" name="Inhaltsplatzhalter 2">
+            <a:extLst>
+              <a:ext uri="{FF2B5EF4-FFF2-40B4-BE49-F238E27FC236}">
+                <a16:creationId xmlns:a16="http://schemas.microsoft.com/office/drawing/2014/main" id="{CA708DD8-2C30-488D-3B3A-0BE38FE0786D}"/>
+              </a:ext>
+            </a:extLst>
+          </p:cNvPr>
+          <p:cNvSpPr>
+            <a:spLocks noGrp="1"/>
+          </p:cNvSpPr>
+          <p:nvPr>
+            <p:ph idx="1"/>
+          </p:nvPr>
+        </p:nvSpPr>
+        <p:spPr/>
+        <p:txBody>
+          <a:bodyPr/>
+          <a:lstStyle/>
+          <a:p>
+            <a:pPr marL="0" indent="0">
+              <a:buNone/>
+            </a:pPr>
+            <a:r>
+              <a:rPr lang="de-DE" b="1" dirty="0"/>
+              <a:t>Container Registry für ein Projekt deaktivieren</a:t>
+            </a:r>
+          </a:p>
+        </p:txBody>
+      </p:sp>
+    </p:spTree>
+    <p:extLst>
+      <p:ext uri="{BB962C8B-B14F-4D97-AF65-F5344CB8AC3E}">
+        <p14:creationId xmlns:p14="http://schemas.microsoft.com/office/powerpoint/2010/main" val="3312416891"/>
+      </p:ext>
+    </p:extLst>
+  </p:cSld>
+  <p:clrMapOvr>
+    <a:masterClrMapping/>
+  </p:clrMapOvr>
+</p:sld>
+</file>
+
+<file path=ppt/slides/slide127.xml><?xml version="1.0" encoding="utf-8"?>
+<p:sld xmlns:a="http://schemas.openxmlformats.org/drawingml/2006/main" xmlns:r="http://schemas.openxmlformats.org/officeDocument/2006/relationships" xmlns:p="http://schemas.openxmlformats.org/presentationml/2006/main">
+  <p:cSld>
+    <p:spTree>
+      <p:nvGrpSpPr>
+        <p:cNvPr id="1" name=""/>
+        <p:cNvGrpSpPr/>
+        <p:nvPr/>
+      </p:nvGrpSpPr>
+      <p:grpSpPr>
+        <a:xfrm>
+          <a:off x="0" y="0"/>
+          <a:ext cx="0" cy="0"/>
+          <a:chOff x="0" y="0"/>
+          <a:chExt cx="0" cy="0"/>
+        </a:xfrm>
+      </p:grpSpPr>
+      <p:sp>
+        <p:nvSpPr>
+          <p:cNvPr id="2" name="Titel 1">
+            <a:extLst>
+              <a:ext uri="{FF2B5EF4-FFF2-40B4-BE49-F238E27FC236}">
+                <a16:creationId xmlns:a16="http://schemas.microsoft.com/office/drawing/2014/main" id="{6AA67486-2598-533D-4DB5-FC490AB10E2A}"/>
+              </a:ext>
+            </a:extLst>
+          </p:cNvPr>
+          <p:cNvSpPr>
+            <a:spLocks noGrp="1"/>
+          </p:cNvSpPr>
+          <p:nvPr>
+            <p:ph type="title"/>
+          </p:nvPr>
+        </p:nvSpPr>
+        <p:spPr/>
+        <p:txBody>
+          <a:bodyPr/>
+          <a:lstStyle/>
+          <a:p>
+            <a:r>
+              <a:rPr lang="de-DE" dirty="0"/>
+              <a:t>Container Registry</a:t>
+            </a:r>
+          </a:p>
+        </p:txBody>
+      </p:sp>
+      <p:sp>
+        <p:nvSpPr>
+          <p:cNvPr id="3" name="Inhaltsplatzhalter 2">
+            <a:extLst>
+              <a:ext uri="{FF2B5EF4-FFF2-40B4-BE49-F238E27FC236}">
+                <a16:creationId xmlns:a16="http://schemas.microsoft.com/office/drawing/2014/main" id="{CA708DD8-2C30-488D-3B3A-0BE38FE0786D}"/>
+              </a:ext>
+            </a:extLst>
+          </p:cNvPr>
+          <p:cNvSpPr>
+            <a:spLocks noGrp="1"/>
+          </p:cNvSpPr>
+          <p:nvPr>
+            <p:ph idx="1"/>
+          </p:nvPr>
+        </p:nvSpPr>
+        <p:spPr/>
+        <p:txBody>
+          <a:bodyPr/>
+          <a:lstStyle/>
+          <a:p>
+            <a:pPr>
+              <a:buFont typeface="Arial" panose="020B0604020202020204" pitchFamily="34" charset="0"/>
+              <a:buChar char="•"/>
+            </a:pPr>
+            <a:r>
+              <a:rPr lang="de-DE" dirty="0"/>
+              <a:t>Container Registry ansehen</a:t>
+            </a:r>
+          </a:p>
+          <a:p>
+            <a:pPr>
+              <a:buFont typeface="Arial" panose="020B0604020202020204" pitchFamily="34" charset="0"/>
+              <a:buChar char="•"/>
+            </a:pPr>
+            <a:r>
+              <a:rPr lang="de-DE" dirty="0"/>
+              <a:t>Tags eines bestimmten Container Image ansehen</a:t>
+            </a:r>
+          </a:p>
+          <a:p>
+            <a:pPr>
+              <a:buFont typeface="Arial" panose="020B0604020202020204" pitchFamily="34" charset="0"/>
+              <a:buChar char="•"/>
+            </a:pPr>
+            <a:r>
+              <a:rPr lang="de-DE" dirty="0"/>
+              <a:t>Container Images von der Container Registry nutzen</a:t>
+            </a:r>
+          </a:p>
+          <a:p>
+            <a:pPr>
+              <a:buFont typeface="Arial" panose="020B0604020202020204" pitchFamily="34" charset="0"/>
+              <a:buChar char="•"/>
+            </a:pPr>
+            <a:r>
+              <a:rPr lang="de-DE" dirty="0"/>
+              <a:t>Naming Convention für Container Images</a:t>
+            </a:r>
+          </a:p>
+          <a:p>
+            <a:pPr>
+              <a:buFont typeface="Arial" panose="020B0604020202020204" pitchFamily="34" charset="0"/>
+              <a:buChar char="•"/>
+            </a:pPr>
+            <a:r>
+              <a:rPr lang="de-DE" dirty="0"/>
+              <a:t>Verschieben oder Umbenennen einer Container Registry</a:t>
+            </a:r>
+          </a:p>
+          <a:p>
+            <a:pPr>
+              <a:buFont typeface="Arial" panose="020B0604020202020204" pitchFamily="34" charset="0"/>
+              <a:buChar char="•"/>
+            </a:pPr>
+            <a:r>
+              <a:rPr lang="de-DE" dirty="0"/>
+              <a:t>Container Registry für ein Projekt deaktivieren</a:t>
+            </a:r>
+          </a:p>
+          <a:p>
+            <a:pPr>
+              <a:buFont typeface="Arial" panose="020B0604020202020204" pitchFamily="34" charset="0"/>
+              <a:buChar char="•"/>
+            </a:pPr>
+            <a:r>
+              <a:rPr lang="de-DE" u="sng" dirty="0"/>
+              <a:t>Sichtbarkeit der Container Registry ändern</a:t>
+            </a:r>
+          </a:p>
+        </p:txBody>
+      </p:sp>
+    </p:spTree>
+    <p:extLst>
+      <p:ext uri="{BB962C8B-B14F-4D97-AF65-F5344CB8AC3E}">
+        <p14:creationId xmlns:p14="http://schemas.microsoft.com/office/powerpoint/2010/main" val="1284672836"/>
+      </p:ext>
+    </p:extLst>
+  </p:cSld>
+  <p:clrMapOvr>
+    <a:masterClrMapping/>
+  </p:clrMapOvr>
+</p:sld>
+</file>
+
+<file path=ppt/slides/slide128.xml><?xml version="1.0" encoding="utf-8"?>
+<p:sld xmlns:a="http://schemas.openxmlformats.org/drawingml/2006/main" xmlns:r="http://schemas.openxmlformats.org/officeDocument/2006/relationships" xmlns:p="http://schemas.openxmlformats.org/presentationml/2006/main">
+  <p:cSld>
+    <p:spTree>
+      <p:nvGrpSpPr>
+        <p:cNvPr id="1" name=""/>
+        <p:cNvGrpSpPr/>
+        <p:nvPr/>
+      </p:nvGrpSpPr>
+      <p:grpSpPr>
+        <a:xfrm>
+          <a:off x="0" y="0"/>
+          <a:ext cx="0" cy="0"/>
+          <a:chOff x="0" y="0"/>
+          <a:chExt cx="0" cy="0"/>
+        </a:xfrm>
+      </p:grpSpPr>
+      <p:sp>
+        <p:nvSpPr>
+          <p:cNvPr id="2" name="Titel 1">
+            <a:extLst>
+              <a:ext uri="{FF2B5EF4-FFF2-40B4-BE49-F238E27FC236}">
+                <a16:creationId xmlns:a16="http://schemas.microsoft.com/office/drawing/2014/main" id="{6AA67486-2598-533D-4DB5-FC490AB10E2A}"/>
+              </a:ext>
+            </a:extLst>
+          </p:cNvPr>
+          <p:cNvSpPr>
+            <a:spLocks noGrp="1"/>
+          </p:cNvSpPr>
+          <p:nvPr>
+            <p:ph type="title"/>
+          </p:nvPr>
+        </p:nvSpPr>
+        <p:spPr/>
+        <p:txBody>
+          <a:bodyPr/>
+          <a:lstStyle/>
+          <a:p>
+            <a:r>
+              <a:rPr lang="de-DE" dirty="0"/>
+              <a:t>Container Registry</a:t>
+            </a:r>
+          </a:p>
+        </p:txBody>
+      </p:sp>
+      <p:sp>
+        <p:nvSpPr>
+          <p:cNvPr id="3" name="Inhaltsplatzhalter 2">
+            <a:extLst>
+              <a:ext uri="{FF2B5EF4-FFF2-40B4-BE49-F238E27FC236}">
+                <a16:creationId xmlns:a16="http://schemas.microsoft.com/office/drawing/2014/main" id="{CA708DD8-2C30-488D-3B3A-0BE38FE0786D}"/>
+              </a:ext>
+            </a:extLst>
+          </p:cNvPr>
+          <p:cNvSpPr>
+            <a:spLocks noGrp="1"/>
+          </p:cNvSpPr>
+          <p:nvPr>
+            <p:ph idx="1"/>
+          </p:nvPr>
+        </p:nvSpPr>
+        <p:spPr/>
+        <p:txBody>
+          <a:bodyPr/>
+          <a:lstStyle/>
+          <a:p>
+            <a:pPr marL="0" indent="0">
+              <a:buNone/>
+            </a:pPr>
+            <a:r>
+              <a:rPr lang="de-DE" b="1" dirty="0"/>
               <a:t>Sichtbarkeit der Container Registry ändern</a:t>
             </a:r>
           </a:p>
@@ -19118,7 +21329,7 @@
 </p:sld>
 </file>
 
-<file path=ppt/slides/slide123.xml><?xml version="1.0" encoding="utf-8"?>
+<file path=ppt/slides/slide129.xml><?xml version="1.0" encoding="utf-8"?>
 <p:sld xmlns:a="http://schemas.openxmlformats.org/drawingml/2006/main" xmlns:r="http://schemas.openxmlformats.org/officeDocument/2006/relationships" xmlns:p="http://schemas.openxmlformats.org/presentationml/2006/main">
   <p:cSld>
     <p:spTree>

</xml_diff>

<commit_message>
Tag-3_2: Images aus Registry nutzen, Naming Convetion, zusätzliche Bilder...
</commit_message>
<xml_diff>
--- a/slides/Tag-3_2-GitLab-Runner-Container-Registry.pptx
+++ b/slides/Tag-3_2-GitLab-Runner-Container-Registry.pptx
@@ -10001,15 +10001,7 @@
           <a:p>
             <a:r>
               <a:rPr lang="de-DE" dirty="0"/>
-              <a:t>Hier könnte man auch ein schlankeres Image </a:t>
-            </a:r>
-            <a:r>
-              <a:rPr lang="de-DE"/>
-              <a:t>(alpine?) </a:t>
-            </a:r>
-            <a:r>
-              <a:rPr lang="de-DE" dirty="0"/>
-              <a:t>verwenden. Könnte.</a:t>
+              <a:t>Hier könnte man auch ein schlankeres Image (alpine?) verwenden. Könnte.</a:t>
             </a:r>
           </a:p>
           <a:p>
@@ -10208,6 +10200,15 @@
             <a:r>
               <a:rPr lang="de-DE" dirty="0"/>
               <a:t>“.</a:t>
+            </a:r>
+          </a:p>
+          <a:p>
+            <a:endParaRPr lang="de-DE" dirty="0"/>
+          </a:p>
+          <a:p>
+            <a:r>
+              <a:rPr lang="de-DE" dirty="0"/>
+              <a:t>Hier sieht man auch mal den Speicherverbrau des Images ganz gut.</a:t>
             </a:r>
           </a:p>
         </p:txBody>
@@ -20335,13 +20336,275 @@
             </a:r>
           </a:p>
           <a:p>
-            <a:pPr marL="0" indent="0">
-              <a:buNone/>
-            </a:pPr>
-            <a:endParaRPr lang="de-DE" dirty="0"/>
+            <a:pPr>
+              <a:buFont typeface="Arial" panose="020B0604020202020204" pitchFamily="34" charset="0"/>
+              <a:buChar char="•"/>
+            </a:pPr>
+            <a:r>
+              <a:rPr lang="de-DE" dirty="0"/>
+              <a:t>Um ein Container Image aus der </a:t>
+            </a:r>
+            <a:r>
+              <a:rPr lang="de-DE" dirty="0" err="1"/>
+              <a:t>GitLab</a:t>
+            </a:r>
+            <a:r>
+              <a:rPr lang="de-DE" dirty="0"/>
+              <a:t> Container Registry herunterzuladen und nutzen zu können:</a:t>
+            </a:r>
+          </a:p>
+          <a:p>
+            <a:pPr marL="457200" indent="-457200">
+              <a:buFont typeface="+mj-lt"/>
+              <a:buAutoNum type="arabicPeriod"/>
+            </a:pPr>
+            <a:r>
+              <a:rPr lang="de-DE" dirty="0"/>
+              <a:t>Gewünschtes Projekt oder Gruppe in </a:t>
+            </a:r>
+            <a:r>
+              <a:rPr lang="de-DE" dirty="0" err="1"/>
+              <a:t>GitLab</a:t>
+            </a:r>
+            <a:r>
+              <a:rPr lang="de-DE" dirty="0"/>
+              <a:t> auswählen</a:t>
+            </a:r>
+          </a:p>
+          <a:p>
+            <a:pPr marL="457200" indent="-457200">
+              <a:buFont typeface="+mj-lt"/>
+              <a:buAutoNum type="arabicPeriod"/>
+            </a:pPr>
+            <a:r>
+              <a:rPr lang="de-DE" dirty="0"/>
+              <a:t>„Deploy“ </a:t>
+            </a:r>
+            <a:r>
+              <a:rPr lang="de-DE" dirty="0">
+                <a:sym typeface="Wingdings" panose="05000000000000000000" pitchFamily="2" charset="2"/>
+              </a:rPr>
+              <a:t> „Container Registry“</a:t>
+            </a:r>
+          </a:p>
+          <a:p>
+            <a:pPr marL="457200" indent="-457200">
+              <a:buFont typeface="+mj-lt"/>
+              <a:buAutoNum type="arabicPeriod"/>
+            </a:pPr>
+            <a:r>
+              <a:rPr lang="de-DE" dirty="0">
+                <a:sym typeface="Wingdings" panose="05000000000000000000" pitchFamily="2" charset="2"/>
+              </a:rPr>
+              <a:t>Gewünschtes Container Image auswählen</a:t>
+            </a:r>
+            <a:br>
+              <a:rPr lang="de-DE" dirty="0">
+                <a:sym typeface="Wingdings" panose="05000000000000000000" pitchFamily="2" charset="2"/>
+              </a:rPr>
+            </a:br>
+            <a:r>
+              <a:rPr lang="de-DE" dirty="0">
+                <a:sym typeface="Wingdings" panose="05000000000000000000" pitchFamily="2" charset="2"/>
+              </a:rPr>
+              <a:t>und „Copy </a:t>
+            </a:r>
+            <a:r>
+              <a:rPr lang="de-DE" dirty="0" err="1">
+                <a:sym typeface="Wingdings" panose="05000000000000000000" pitchFamily="2" charset="2"/>
+              </a:rPr>
+              <a:t>image</a:t>
+            </a:r>
+            <a:r>
+              <a:rPr lang="de-DE" dirty="0">
+                <a:sym typeface="Wingdings" panose="05000000000000000000" pitchFamily="2" charset="2"/>
+              </a:rPr>
+              <a:t> </a:t>
+            </a:r>
+            <a:r>
+              <a:rPr lang="de-DE" dirty="0" err="1">
+                <a:sym typeface="Wingdings" panose="05000000000000000000" pitchFamily="2" charset="2"/>
+              </a:rPr>
+              <a:t>path</a:t>
+            </a:r>
+            <a:r>
+              <a:rPr lang="de-DE" dirty="0">
+                <a:sym typeface="Wingdings" panose="05000000000000000000" pitchFamily="2" charset="2"/>
+              </a:rPr>
+              <a:t>“      auswählen</a:t>
+            </a:r>
+          </a:p>
+          <a:p>
+            <a:pPr marL="457200" indent="-457200">
+              <a:buFont typeface="+mj-lt"/>
+              <a:buAutoNum type="arabicPeriod"/>
+            </a:pPr>
+            <a:r>
+              <a:rPr lang="de-DE" dirty="0">
+                <a:sym typeface="Wingdings" panose="05000000000000000000" pitchFamily="2" charset="2"/>
+              </a:rPr>
+              <a:t>„</a:t>
+            </a:r>
+            <a:r>
+              <a:rPr lang="de-DE" dirty="0" err="1">
+                <a:sym typeface="Wingdings" panose="05000000000000000000" pitchFamily="2" charset="2"/>
+              </a:rPr>
+              <a:t>docker</a:t>
+            </a:r>
+            <a:r>
+              <a:rPr lang="de-DE" dirty="0">
+                <a:sym typeface="Wingdings" panose="05000000000000000000" pitchFamily="2" charset="2"/>
+              </a:rPr>
+              <a:t> </a:t>
+            </a:r>
+            <a:r>
+              <a:rPr lang="de-DE" dirty="0" err="1">
+                <a:sym typeface="Wingdings" panose="05000000000000000000" pitchFamily="2" charset="2"/>
+              </a:rPr>
+              <a:t>run</a:t>
+            </a:r>
+            <a:r>
+              <a:rPr lang="de-DE" dirty="0">
+                <a:sym typeface="Wingdings" panose="05000000000000000000" pitchFamily="2" charset="2"/>
+              </a:rPr>
+              <a:t>“ mit dem kopierten Link ausführen</a:t>
+            </a:r>
+          </a:p>
+          <a:p>
+            <a:pPr marL="857250" lvl="1" indent="-457200">
+              <a:buFont typeface="Arial" panose="020B0604020202020204" pitchFamily="34" charset="0"/>
+              <a:buChar char="•"/>
+            </a:pPr>
+            <a:r>
+              <a:rPr lang="de-DE" dirty="0" err="1">
+                <a:latin typeface="Consolas" panose="020B0609020204030204" pitchFamily="49" charset="0"/>
+              </a:rPr>
+              <a:t>docker</a:t>
+            </a:r>
+            <a:r>
+              <a:rPr lang="de-DE" dirty="0">
+                <a:latin typeface="Consolas" panose="020B0609020204030204" pitchFamily="49" charset="0"/>
+              </a:rPr>
+              <a:t> </a:t>
+            </a:r>
+            <a:r>
+              <a:rPr lang="de-DE" dirty="0" err="1">
+                <a:latin typeface="Consolas" panose="020B0609020204030204" pitchFamily="49" charset="0"/>
+              </a:rPr>
+              <a:t>run</a:t>
+            </a:r>
+            <a:r>
+              <a:rPr lang="de-DE" dirty="0">
+                <a:latin typeface="Consolas" panose="020B0609020204030204" pitchFamily="49" charset="0"/>
+              </a:rPr>
+              <a:t> [</a:t>
+            </a:r>
+            <a:r>
+              <a:rPr lang="de-DE" dirty="0" err="1">
+                <a:latin typeface="Consolas" panose="020B0609020204030204" pitchFamily="49" charset="0"/>
+              </a:rPr>
+              <a:t>options</a:t>
+            </a:r>
+            <a:r>
+              <a:rPr lang="de-DE" dirty="0">
+                <a:latin typeface="Consolas" panose="020B0609020204030204" pitchFamily="49" charset="0"/>
+              </a:rPr>
+              <a:t>] </a:t>
+            </a:r>
+            <a:r>
+              <a:rPr lang="nl-NL" dirty="0">
+                <a:latin typeface="Consolas" panose="020B0609020204030204" pitchFamily="49" charset="0"/>
+              </a:rPr>
+              <a:t>gitlab.ads.anderscore.com:5006/trainings/gitlab:latest [arguments]</a:t>
+            </a:r>
+          </a:p>
+          <a:p>
+            <a:pPr marL="457200" indent="-457200">
+              <a:buFont typeface="Arial" panose="020B0604020202020204" pitchFamily="34" charset="0"/>
+              <a:buChar char="•"/>
+            </a:pPr>
+            <a:r>
+              <a:rPr lang="nl-NL" dirty="0">
+                <a:latin typeface="Consolas" panose="020B0609020204030204" pitchFamily="49" charset="0"/>
+              </a:rPr>
+              <a:t>docker ps –a </a:t>
+            </a:r>
+            <a:r>
+              <a:rPr lang="nl-NL" dirty="0"/>
+              <a:t>Sollte nun einen weiteren Container anzeigen</a:t>
+            </a:r>
+            <a:endParaRPr lang="de-DE" dirty="0">
+              <a:latin typeface="Consolas" panose="020B0609020204030204" pitchFamily="49" charset="0"/>
+            </a:endParaRPr>
           </a:p>
         </p:txBody>
       </p:sp>
+      <p:pic>
+        <p:nvPicPr>
+          <p:cNvPr id="5" name="Grafik 4">
+            <a:extLst>
+              <a:ext uri="{FF2B5EF4-FFF2-40B4-BE49-F238E27FC236}">
+                <a16:creationId xmlns:a16="http://schemas.microsoft.com/office/drawing/2014/main" id="{4D37ACD4-0CDB-0185-3850-4E841639F9DB}"/>
+              </a:ext>
+            </a:extLst>
+          </p:cNvPr>
+          <p:cNvPicPr>
+            <a:picLocks noChangeAspect="1"/>
+          </p:cNvPicPr>
+          <p:nvPr/>
+        </p:nvPicPr>
+        <p:blipFill>
+          <a:blip r:embed="rId2"/>
+          <a:stretch>
+            <a:fillRect/>
+          </a:stretch>
+        </p:blipFill>
+        <p:spPr>
+          <a:xfrm>
+            <a:off x="4067944" y="3444209"/>
+            <a:ext cx="288032" cy="474406"/>
+          </a:xfrm>
+          <a:prstGeom prst="rect">
+            <a:avLst/>
+          </a:prstGeom>
+        </p:spPr>
+      </p:pic>
+      <p:pic>
+        <p:nvPicPr>
+          <p:cNvPr id="9" name="Grafik 8">
+            <a:extLst>
+              <a:ext uri="{FF2B5EF4-FFF2-40B4-BE49-F238E27FC236}">
+                <a16:creationId xmlns:a16="http://schemas.microsoft.com/office/drawing/2014/main" id="{B9FBF1BF-B50B-DE8D-1736-146CCD93AF59}"/>
+              </a:ext>
+            </a:extLst>
+          </p:cNvPr>
+          <p:cNvPicPr>
+            <a:picLocks noChangeAspect="1"/>
+          </p:cNvPicPr>
+          <p:nvPr/>
+        </p:nvPicPr>
+        <p:blipFill>
+          <a:blip r:embed="rId3">
+            <a:extLst>
+              <a:ext uri="{28A0092B-C50C-407E-A947-70E740481C1C}">
+                <a14:useLocalDpi xmlns:a14="http://schemas.microsoft.com/office/drawing/2010/main" val="0"/>
+              </a:ext>
+            </a:extLst>
+          </a:blip>
+          <a:stretch>
+            <a:fillRect/>
+          </a:stretch>
+        </p:blipFill>
+        <p:spPr>
+          <a:xfrm>
+            <a:off x="6948264" y="2780928"/>
+            <a:ext cx="1716164" cy="1599418"/>
+          </a:xfrm>
+          <a:prstGeom prst="rect">
+            <a:avLst/>
+          </a:prstGeom>
+        </p:spPr>
+      </p:pic>
     </p:spTree>
     <p:extLst>
       <p:ext uri="{BB962C8B-B14F-4D97-AF65-F5344CB8AC3E}">
@@ -20580,10 +20843,184 @@
             </a:r>
           </a:p>
           <a:p>
-            <a:pPr marL="0" indent="0">
-              <a:buNone/>
-            </a:pPr>
-            <a:endParaRPr lang="de-DE" dirty="0"/>
+            <a:pPr>
+              <a:buFont typeface="Arial" panose="020B0604020202020204" pitchFamily="34" charset="0"/>
+              <a:buChar char="•"/>
+            </a:pPr>
+            <a:r>
+              <a:rPr lang="en-US" sz="2000" dirty="0">
+                <a:latin typeface="Consolas" panose="020B0609020204030204" pitchFamily="49" charset="0"/>
+              </a:rPr>
+              <a:t>&lt;registry server&gt;/&lt;namespace&gt;/&lt;project&gt;[/&lt;optional path&gt;]</a:t>
+            </a:r>
+          </a:p>
+          <a:p>
+            <a:pPr>
+              <a:buFont typeface="Arial" panose="020B0604020202020204" pitchFamily="34" charset="0"/>
+              <a:buChar char="•"/>
+            </a:pPr>
+            <a:r>
+              <a:rPr lang="de-DE" b="0" i="0" dirty="0">
+                <a:solidFill>
+                  <a:srgbClr val="404040"/>
+                </a:solidFill>
+                <a:effectLst/>
+                <a:latin typeface="GitLab Mono"/>
+              </a:rPr>
+              <a:t>gitlab.example.com/</a:t>
+            </a:r>
+            <a:r>
+              <a:rPr lang="de-DE" b="0" i="0" dirty="0" err="1">
+                <a:solidFill>
+                  <a:srgbClr val="404040"/>
+                </a:solidFill>
+                <a:effectLst/>
+                <a:latin typeface="GitLab Mono"/>
+              </a:rPr>
+              <a:t>mynamespace</a:t>
+            </a:r>
+            <a:r>
+              <a:rPr lang="de-DE" b="0" i="0" dirty="0">
+                <a:solidFill>
+                  <a:srgbClr val="404040"/>
+                </a:solidFill>
+                <a:effectLst/>
+                <a:latin typeface="GitLab Mono"/>
+              </a:rPr>
+              <a:t>/</a:t>
+            </a:r>
+            <a:r>
+              <a:rPr lang="de-DE" b="0" i="0" dirty="0" err="1">
+                <a:solidFill>
+                  <a:srgbClr val="404040"/>
+                </a:solidFill>
+                <a:effectLst/>
+                <a:latin typeface="GitLab Mono"/>
+              </a:rPr>
+              <a:t>myproject</a:t>
+            </a:r>
+            <a:endParaRPr lang="en-US" dirty="0">
+              <a:latin typeface="Consolas" panose="020B0609020204030204" pitchFamily="49" charset="0"/>
+            </a:endParaRPr>
+          </a:p>
+          <a:p>
+            <a:pPr>
+              <a:buFont typeface="Arial" panose="020B0604020202020204" pitchFamily="34" charset="0"/>
+              <a:buChar char="•"/>
+            </a:pPr>
+            <a:endParaRPr lang="en-US" sz="2000" dirty="0">
+              <a:latin typeface="Consolas" panose="020B0609020204030204" pitchFamily="49" charset="0"/>
+            </a:endParaRPr>
+          </a:p>
+          <a:p>
+            <a:pPr>
+              <a:buFont typeface="Arial" panose="020B0604020202020204" pitchFamily="34" charset="0"/>
+              <a:buChar char="•"/>
+            </a:pPr>
+            <a:r>
+              <a:rPr lang="en-US" dirty="0"/>
+              <a:t>Project: </a:t>
+            </a:r>
+            <a:r>
+              <a:rPr lang="nl-NL" dirty="0"/>
+              <a:t>gitlab.ads.anderscore.com/trainings/gitlab</a:t>
+            </a:r>
+          </a:p>
+          <a:p>
+            <a:pPr>
+              <a:buFont typeface="Arial" panose="020B0604020202020204" pitchFamily="34" charset="0"/>
+              <a:buChar char="•"/>
+            </a:pPr>
+            <a:r>
+              <a:rPr lang="nl-NL" dirty="0"/>
+              <a:t>Image </a:t>
+            </a:r>
+            <a:r>
+              <a:rPr lang="nl-NL" dirty="0">
+                <a:sym typeface="Wingdings" panose="05000000000000000000" pitchFamily="2" charset="2"/>
+              </a:rPr>
+              <a:t> gitlab.ads.anderscore.com/trainings/gitlab</a:t>
+            </a:r>
+          </a:p>
+          <a:p>
+            <a:pPr>
+              <a:buFont typeface="Arial" panose="020B0604020202020204" pitchFamily="34" charset="0"/>
+              <a:buChar char="•"/>
+            </a:pPr>
+            <a:r>
+              <a:rPr lang="nl-NL" dirty="0">
+                <a:sym typeface="Wingdings" panose="05000000000000000000" pitchFamily="2" charset="2"/>
+              </a:rPr>
+              <a:t>Zusätzliche Namen ans Ende des Images sind erlaubt</a:t>
+            </a:r>
+          </a:p>
+          <a:p>
+            <a:pPr lvl="1">
+              <a:buFont typeface="Arial" panose="020B0604020202020204" pitchFamily="34" charset="0"/>
+              <a:buChar char="•"/>
+            </a:pPr>
+            <a:r>
+              <a:rPr lang="nl-NL" sz="1800" dirty="0">
+                <a:sym typeface="Wingdings" panose="05000000000000000000" pitchFamily="2" charset="2"/>
+              </a:rPr>
+              <a:t>Aber: nur bis zu zwei Ebenen tief!</a:t>
+            </a:r>
+          </a:p>
+          <a:p>
+            <a:pPr>
+              <a:buFont typeface="Arial" panose="020B0604020202020204" pitchFamily="34" charset="0"/>
+              <a:buChar char="•"/>
+            </a:pPr>
+            <a:r>
+              <a:rPr lang="nl-NL" dirty="0">
+                <a:sym typeface="Wingdings" panose="05000000000000000000" pitchFamily="2" charset="2"/>
+              </a:rPr>
+              <a:t>Beispiele:</a:t>
+            </a:r>
+          </a:p>
+          <a:p>
+            <a:pPr lvl="1">
+              <a:buFont typeface="Arial" panose="020B0604020202020204" pitchFamily="34" charset="0"/>
+              <a:buChar char="•"/>
+            </a:pPr>
+            <a:r>
+              <a:rPr lang="nl-NL" sz="1800" dirty="0">
+                <a:sym typeface="Wingdings" panose="05000000000000000000" pitchFamily="2" charset="2"/>
+              </a:rPr>
+              <a:t>gitlab.ads.anderscore.com/trainings/gitlab:some-tag</a:t>
+            </a:r>
+          </a:p>
+          <a:p>
+            <a:pPr lvl="1">
+              <a:buFont typeface="Arial" panose="020B0604020202020204" pitchFamily="34" charset="0"/>
+              <a:buChar char="•"/>
+            </a:pPr>
+            <a:r>
+              <a:rPr lang="nl-NL" sz="1800" dirty="0">
+                <a:sym typeface="Wingdings" panose="05000000000000000000" pitchFamily="2" charset="2"/>
+              </a:rPr>
+              <a:t>gitlab.ads.anderscore.com/trainings/gitlab/image:latest</a:t>
+            </a:r>
+          </a:p>
+          <a:p>
+            <a:pPr lvl="1">
+              <a:buFont typeface="Arial" panose="020B0604020202020204" pitchFamily="34" charset="0"/>
+              <a:buChar char="•"/>
+            </a:pPr>
+            <a:r>
+              <a:rPr lang="nl-NL" sz="1800" dirty="0">
+                <a:sym typeface="Wingdings" panose="05000000000000000000" pitchFamily="2" charset="2"/>
+              </a:rPr>
+              <a:t>gitlab.ads.anderscore.com/trainings/gitlab/my/image:rc1</a:t>
+            </a:r>
+            <a:endParaRPr lang="nl-NL" sz="1800" dirty="0"/>
+          </a:p>
+          <a:p>
+            <a:pPr lvl="1">
+              <a:buFont typeface="Arial" panose="020B0604020202020204" pitchFamily="34" charset="0"/>
+              <a:buChar char="•"/>
+            </a:pPr>
+            <a:endParaRPr lang="en-US" sz="1600" dirty="0"/>
           </a:p>
         </p:txBody>
       </p:sp>

</xml_diff>

<commit_message>
Tag-3_2: Container Registry done
</commit_message>
<xml_diff>
--- a/slides/Tag-3_2-GitLab-Runner-Container-Registry.pptx
+++ b/slides/Tag-3_2-GitLab-Runner-Container-Registry.pptx
@@ -142,7 +142,7 @@
     <p:sldId id="705" r:id="rId130"/>
     <p:sldId id="706" r:id="rId131"/>
     <p:sldId id="712" r:id="rId132"/>
-    <p:sldId id="595" r:id="rId133"/>
+    <p:sldId id="724" r:id="rId133"/>
   </p:sldIdLst>
   <p:sldSz cx="9144000" cy="6858000" type="screen4x3"/>
   <p:notesSz cx="6784975" cy="9921875"/>
@@ -9656,7 +9656,7 @@
           </a:p>
           <a:p>
             <a:r>
-              <a:rPr lang="de-DE" b="0" i="0">
+              <a:rPr lang="de-DE" b="0" i="0" dirty="0">
                 <a:solidFill>
                   <a:srgbClr val="202122"/>
                 </a:solidFill>
@@ -9665,7 +9665,7 @@
               </a:rPr>
               <a:t>- https://de.wikipedia.org/wiki/Vagrant_(Software)</a:t>
             </a:r>
-            <a:endParaRPr lang="de-DE"/>
+            <a:endParaRPr lang="de-DE" dirty="0"/>
           </a:p>
         </p:txBody>
       </p:sp>
@@ -11097,6 +11097,139 @@
     <p:extLst>
       <p:ext uri="{BB962C8B-B14F-4D97-AF65-F5344CB8AC3E}">
         <p14:creationId xmlns:p14="http://schemas.microsoft.com/office/powerpoint/2010/main" val="3056766989"/>
+      </p:ext>
+    </p:extLst>
+  </p:cSld>
+  <p:clrMapOvr>
+    <a:masterClrMapping/>
+  </p:clrMapOvr>
+</p:notes>
+</file>
+
+<file path=ppt/notesSlides/notesSlide91.xml><?xml version="1.0" encoding="utf-8"?>
+<p:notes xmlns:a="http://schemas.openxmlformats.org/drawingml/2006/main" xmlns:r="http://schemas.openxmlformats.org/officeDocument/2006/relationships" xmlns:p="http://schemas.openxmlformats.org/presentationml/2006/main">
+  <p:cSld>
+    <p:spTree>
+      <p:nvGrpSpPr>
+        <p:cNvPr id="1" name=""/>
+        <p:cNvGrpSpPr/>
+        <p:nvPr/>
+      </p:nvGrpSpPr>
+      <p:grpSpPr>
+        <a:xfrm>
+          <a:off x="0" y="0"/>
+          <a:ext cx="0" cy="0"/>
+          <a:chOff x="0" y="0"/>
+          <a:chExt cx="0" cy="0"/>
+        </a:xfrm>
+      </p:grpSpPr>
+      <p:sp>
+        <p:nvSpPr>
+          <p:cNvPr id="2" name="Folienbildplatzhalter 1"/>
+          <p:cNvSpPr>
+            <a:spLocks noGrp="1" noRot="1" noChangeAspect="1"/>
+          </p:cNvSpPr>
+          <p:nvPr>
+            <p:ph type="sldImg"/>
+          </p:nvPr>
+        </p:nvSpPr>
+        <p:spPr/>
+      </p:sp>
+      <p:sp>
+        <p:nvSpPr>
+          <p:cNvPr id="3" name="Notizenplatzhalter 2"/>
+          <p:cNvSpPr>
+            <a:spLocks noGrp="1"/>
+          </p:cNvSpPr>
+          <p:nvPr>
+            <p:ph type="body" idx="1"/>
+          </p:nvPr>
+        </p:nvSpPr>
+        <p:spPr/>
+        <p:txBody>
+          <a:bodyPr/>
+          <a:lstStyle/>
+          <a:p>
+            <a:r>
+              <a:rPr lang="de-DE" dirty="0"/>
+              <a:t>https://docs.gitlab.com/ee/user/packages/container_registry/</a:t>
+            </a:r>
+          </a:p>
+          <a:p>
+            <a:endParaRPr lang="de-DE" dirty="0"/>
+          </a:p>
+          <a:p>
+            <a:r>
+              <a:rPr lang="de-DE" dirty="0"/>
+              <a:t>Docker V2: https://distribution.github.io/distribution/spec/manifest-v2-2/</a:t>
+            </a:r>
+          </a:p>
+          <a:p>
+            <a:endParaRPr lang="de-DE" dirty="0"/>
+          </a:p>
+          <a:p>
+            <a:r>
+              <a:rPr lang="de-DE" dirty="0"/>
+              <a:t>OCI: https://github.com/opencontainers/image-spec/blob/main/spec.md</a:t>
+            </a:r>
+          </a:p>
+          <a:p>
+            <a:endParaRPr lang="de-DE" dirty="0"/>
+          </a:p>
+          <a:p>
+            <a:endParaRPr lang="de-DE" dirty="0"/>
+          </a:p>
+          <a:p>
+            <a:r>
+              <a:rPr lang="de-DE" dirty="0"/>
+              <a:t>Weiterführende Themen:</a:t>
+            </a:r>
+          </a:p>
+          <a:p>
+            <a:r>
+              <a:rPr lang="de-DE" dirty="0"/>
+              <a:t>https://docs.gitlab.com/ee/user/packages/container_registry/#container-image-signatures</a:t>
+            </a:r>
+          </a:p>
+          <a:p>
+            <a:endParaRPr lang="de-DE" dirty="0"/>
+          </a:p>
+          <a:p>
+            <a:r>
+              <a:rPr lang="de-DE" dirty="0"/>
+              <a:t>https://docs.gitlab.com/ee/user/packages/container_registry/#sign-container-images-with-oci-referrer-data</a:t>
+            </a:r>
+          </a:p>
+        </p:txBody>
+      </p:sp>
+      <p:sp>
+        <p:nvSpPr>
+          <p:cNvPr id="4" name="Foliennummernplatzhalter 3"/>
+          <p:cNvSpPr>
+            <a:spLocks noGrp="1"/>
+          </p:cNvSpPr>
+          <p:nvPr>
+            <p:ph type="sldNum" sz="quarter" idx="5"/>
+          </p:nvPr>
+        </p:nvSpPr>
+        <p:spPr/>
+        <p:txBody>
+          <a:bodyPr/>
+          <a:lstStyle/>
+          <a:p>
+            <a:fld id="{18182567-388C-4D33-8B7B-A651F195F118}" type="slidenum">
+              <a:rPr lang="de-DE" altLang="de-DE" smtClean="0"/>
+              <a:pPr/>
+              <a:t>131</a:t>
+            </a:fld>
+            <a:endParaRPr lang="de-DE" altLang="de-DE"/>
+          </a:p>
+        </p:txBody>
+      </p:sp>
+    </p:spTree>
+    <p:extLst>
+      <p:ext uri="{BB962C8B-B14F-4D97-AF65-F5344CB8AC3E}">
+        <p14:creationId xmlns:p14="http://schemas.microsoft.com/office/powerpoint/2010/main" val="629651273"/>
       </p:ext>
     </p:extLst>
   </p:cSld>
@@ -22241,6 +22374,108 @@
             </a:r>
           </a:p>
           <a:p>
+            <a:pPr>
+              <a:buFont typeface="Arial" panose="020B0604020202020204" pitchFamily="34" charset="0"/>
+              <a:buChar char="•"/>
+            </a:pPr>
+            <a:r>
+              <a:rPr lang="de-DE" dirty="0"/>
+              <a:t>Der Pfad der Registry </a:t>
+            </a:r>
+            <a:r>
+              <a:rPr lang="de-DE" dirty="0" err="1"/>
+              <a:t>matched</a:t>
+            </a:r>
+            <a:r>
+              <a:rPr lang="de-DE" dirty="0"/>
+              <a:t> immer dem zugehörigen Projekt</a:t>
+            </a:r>
+          </a:p>
+          <a:p>
+            <a:pPr lvl="1">
+              <a:buFont typeface="Arial" panose="020B0604020202020204" pitchFamily="34" charset="0"/>
+              <a:buChar char="•"/>
+            </a:pPr>
+            <a:r>
+              <a:rPr lang="de-DE" dirty="0"/>
+              <a:t>Daher muss man entweder das Projekt verschieben oder umbenennen</a:t>
+            </a:r>
+          </a:p>
+          <a:p>
+            <a:pPr>
+              <a:buFont typeface="Arial" panose="020B0604020202020204" pitchFamily="34" charset="0"/>
+              <a:buChar char="•"/>
+            </a:pPr>
+            <a:r>
+              <a:rPr lang="de-DE" dirty="0"/>
+              <a:t>Wird von GitLab.com gehosteten Instanzen unterstützt</a:t>
+            </a:r>
+          </a:p>
+          <a:p>
+            <a:pPr>
+              <a:buFont typeface="Arial" panose="020B0604020202020204" pitchFamily="34" charset="0"/>
+              <a:buChar char="•"/>
+            </a:pPr>
+            <a:r>
+              <a:rPr lang="de-DE" dirty="0"/>
+              <a:t>Self-</a:t>
+            </a:r>
+            <a:r>
+              <a:rPr lang="de-DE" dirty="0" err="1"/>
+              <a:t>managed</a:t>
+            </a:r>
+            <a:r>
+              <a:rPr lang="de-DE" dirty="0"/>
+              <a:t>:</a:t>
+            </a:r>
+          </a:p>
+          <a:p>
+            <a:pPr lvl="1">
+              <a:buFont typeface="Arial" panose="020B0604020202020204" pitchFamily="34" charset="0"/>
+              <a:buChar char="•"/>
+            </a:pPr>
+            <a:r>
+              <a:rPr lang="de-DE" dirty="0"/>
+              <a:t>Alle Container Images müssen vorher gelöscht werden</a:t>
+            </a:r>
+          </a:p>
+          <a:p>
+            <a:pPr lvl="1">
+              <a:buFont typeface="Arial" panose="020B0604020202020204" pitchFamily="34" charset="0"/>
+              <a:buChar char="•"/>
+            </a:pPr>
+            <a:r>
+              <a:rPr lang="de-DE" dirty="0">
+                <a:hlinkClick r:id="rId3"/>
+              </a:rPr>
+              <a:t>https://gitlab.com/gitlab-org/gitlab/-/issues/18383#possible-workaround</a:t>
+            </a:r>
+            <a:endParaRPr lang="de-DE" dirty="0"/>
+          </a:p>
+          <a:p>
+            <a:pPr lvl="1">
+              <a:buFont typeface="Arial" panose="020B0604020202020204" pitchFamily="34" charset="0"/>
+              <a:buChar char="•"/>
+            </a:pPr>
+            <a:r>
+              <a:rPr lang="de-DE" dirty="0">
+                <a:hlinkClick r:id="rId4"/>
+              </a:rPr>
+              <a:t>https://gitlab.com/groups/gitlab-org/-/epics/9459</a:t>
+            </a:r>
+            <a:r>
+              <a:rPr lang="de-DE" dirty="0"/>
+              <a:t> </a:t>
+            </a:r>
+          </a:p>
+          <a:p>
+            <a:pPr>
+              <a:buFont typeface="Arial" panose="020B0604020202020204" pitchFamily="34" charset="0"/>
+              <a:buChar char="•"/>
+            </a:pPr>
+            <a:endParaRPr lang="de-DE" dirty="0"/>
+          </a:p>
+          <a:p>
             <a:pPr marL="0" indent="0">
               <a:buNone/>
             </a:pPr>
@@ -22485,6 +22720,171 @@
               <a:t>Container Registry für ein Projekt deaktivieren</a:t>
             </a:r>
           </a:p>
+          <a:p>
+            <a:pPr>
+              <a:buFont typeface="Arial" panose="020B0604020202020204" pitchFamily="34" charset="0"/>
+              <a:buChar char="•"/>
+            </a:pPr>
+            <a:r>
+              <a:rPr lang="de-DE" dirty="0"/>
+              <a:t>Default: </a:t>
+            </a:r>
+            <a:r>
+              <a:rPr lang="de-DE" dirty="0" err="1"/>
+              <a:t>enabled</a:t>
+            </a:r>
+            <a:endParaRPr lang="de-DE" dirty="0"/>
+          </a:p>
+          <a:p>
+            <a:pPr>
+              <a:buFont typeface="Arial" panose="020B0604020202020204" pitchFamily="34" charset="0"/>
+              <a:buChar char="•"/>
+            </a:pPr>
+            <a:endParaRPr lang="de-DE" dirty="0"/>
+          </a:p>
+          <a:p>
+            <a:pPr marL="457200" indent="-457200">
+              <a:buFont typeface="+mj-lt"/>
+              <a:buAutoNum type="arabicPeriod"/>
+            </a:pPr>
+            <a:r>
+              <a:rPr lang="de-DE" dirty="0"/>
+              <a:t>Gewünschtes Projekt in </a:t>
+            </a:r>
+            <a:r>
+              <a:rPr lang="de-DE" dirty="0" err="1"/>
+              <a:t>GitLab</a:t>
+            </a:r>
+            <a:r>
+              <a:rPr lang="de-DE" dirty="0"/>
+              <a:t> auswählen</a:t>
+            </a:r>
+          </a:p>
+          <a:p>
+            <a:pPr marL="457200" indent="-457200">
+              <a:buFont typeface="+mj-lt"/>
+              <a:buAutoNum type="arabicPeriod"/>
+            </a:pPr>
+            <a:r>
+              <a:rPr lang="de-DE" dirty="0"/>
+              <a:t>„Settings“ </a:t>
+            </a:r>
+            <a:r>
+              <a:rPr lang="de-DE" dirty="0">
+                <a:sym typeface="Wingdings" panose="05000000000000000000" pitchFamily="2" charset="2"/>
+              </a:rPr>
+              <a:t> „General“</a:t>
+            </a:r>
+          </a:p>
+          <a:p>
+            <a:pPr marL="457200" indent="-457200">
+              <a:buFont typeface="+mj-lt"/>
+              <a:buAutoNum type="arabicPeriod"/>
+            </a:pPr>
+            <a:r>
+              <a:rPr lang="de-DE" dirty="0"/>
+              <a:t>„</a:t>
+            </a:r>
+            <a:r>
+              <a:rPr lang="de-DE" dirty="0" err="1"/>
+              <a:t>Visibility</a:t>
+            </a:r>
+            <a:r>
+              <a:rPr lang="de-DE" dirty="0"/>
+              <a:t>, </a:t>
+            </a:r>
+            <a:r>
+              <a:rPr lang="de-DE" dirty="0" err="1"/>
+              <a:t>project</a:t>
+            </a:r>
+            <a:r>
+              <a:rPr lang="de-DE" dirty="0"/>
+              <a:t> </a:t>
+            </a:r>
+            <a:r>
+              <a:rPr lang="de-DE" dirty="0" err="1"/>
+              <a:t>features</a:t>
+            </a:r>
+            <a:r>
+              <a:rPr lang="de-DE" dirty="0"/>
+              <a:t>, </a:t>
+            </a:r>
+            <a:r>
+              <a:rPr lang="de-DE" dirty="0" err="1"/>
+              <a:t>permissions</a:t>
+            </a:r>
+            <a:r>
+              <a:rPr lang="de-DE" dirty="0"/>
+              <a:t>“ aufklappen</a:t>
+            </a:r>
+          </a:p>
+          <a:p>
+            <a:pPr marL="457200" indent="-457200">
+              <a:buFont typeface="+mj-lt"/>
+              <a:buAutoNum type="arabicPeriod"/>
+            </a:pPr>
+            <a:r>
+              <a:rPr lang="de-DE" dirty="0">
+                <a:sym typeface="Wingdings" panose="05000000000000000000" pitchFamily="2" charset="2"/>
+              </a:rPr>
+              <a:t>„Container </a:t>
+            </a:r>
+            <a:r>
+              <a:rPr lang="de-DE" dirty="0" err="1">
+                <a:sym typeface="Wingdings" panose="05000000000000000000" pitchFamily="2" charset="2"/>
+              </a:rPr>
+              <a:t>registry</a:t>
+            </a:r>
+            <a:r>
+              <a:rPr lang="de-DE" dirty="0">
+                <a:sym typeface="Wingdings" panose="05000000000000000000" pitchFamily="2" charset="2"/>
+              </a:rPr>
+              <a:t>“ deaktivieren</a:t>
+            </a:r>
+          </a:p>
+          <a:p>
+            <a:pPr marL="457200" indent="-457200">
+              <a:buFont typeface="+mj-lt"/>
+              <a:buAutoNum type="arabicPeriod"/>
+            </a:pPr>
+            <a:r>
+              <a:rPr lang="de-DE" dirty="0">
+                <a:sym typeface="Wingdings" panose="05000000000000000000" pitchFamily="2" charset="2"/>
+              </a:rPr>
+              <a:t>„Save </a:t>
+            </a:r>
+            <a:r>
+              <a:rPr lang="de-DE" dirty="0" err="1">
+                <a:sym typeface="Wingdings" panose="05000000000000000000" pitchFamily="2" charset="2"/>
+              </a:rPr>
+              <a:t>changes</a:t>
+            </a:r>
+            <a:r>
+              <a:rPr lang="de-DE" dirty="0">
+                <a:sym typeface="Wingdings" panose="05000000000000000000" pitchFamily="2" charset="2"/>
+              </a:rPr>
+              <a:t>“ auswählen</a:t>
+            </a:r>
+          </a:p>
+          <a:p>
+            <a:pPr marL="457200" indent="-457200">
+              <a:buFont typeface="+mj-lt"/>
+              <a:buAutoNum type="arabicPeriod"/>
+            </a:pPr>
+            <a:r>
+              <a:rPr lang="de-DE" dirty="0">
+                <a:sym typeface="Wingdings" panose="05000000000000000000" pitchFamily="2" charset="2"/>
+              </a:rPr>
+              <a:t>Daraufhin wird „Deploy“  „Container Registry“ aus der linken Sidebar entfernt</a:t>
+            </a:r>
+          </a:p>
+          <a:p>
+            <a:pPr marL="457200" indent="-457200">
+              <a:buFont typeface="+mj-lt"/>
+              <a:buAutoNum type="arabicPeriod"/>
+            </a:pPr>
+            <a:endParaRPr lang="de-DE" dirty="0"/>
+          </a:p>
         </p:txBody>
       </p:sp>
     </p:spTree>
@@ -22988,6 +23388,232 @@
             </a:r>
           </a:p>
           <a:p>
+            <a:pPr>
+              <a:buFont typeface="Arial" panose="020B0604020202020204" pitchFamily="34" charset="0"/>
+              <a:buChar char="•"/>
+            </a:pPr>
+            <a:r>
+              <a:rPr lang="de-DE" dirty="0"/>
+              <a:t>Default: Für jeden Sichtbar mit Zugriff aufs Projekt</a:t>
+            </a:r>
+          </a:p>
+          <a:p>
+            <a:pPr>
+              <a:buFont typeface="Arial" panose="020B0604020202020204" pitchFamily="34" charset="0"/>
+              <a:buChar char="•"/>
+            </a:pPr>
+            <a:r>
+              <a:rPr lang="de-DE" dirty="0"/>
+              <a:t>Sichtbarkeit kann jedoch pro Projekt geändert werden</a:t>
+            </a:r>
+          </a:p>
+          <a:p>
+            <a:pPr>
+              <a:buFont typeface="Arial" panose="020B0604020202020204" pitchFamily="34" charset="0"/>
+              <a:buChar char="•"/>
+            </a:pPr>
+            <a:endParaRPr lang="de-DE" dirty="0"/>
+          </a:p>
+          <a:p>
+            <a:pPr marL="457200" indent="-457200">
+              <a:buFont typeface="+mj-lt"/>
+              <a:buAutoNum type="arabicPeriod"/>
+            </a:pPr>
+            <a:r>
+              <a:rPr lang="de-DE" dirty="0"/>
+              <a:t>Gewünschtes Projekt in </a:t>
+            </a:r>
+            <a:r>
+              <a:rPr lang="de-DE" dirty="0" err="1"/>
+              <a:t>GitLab</a:t>
+            </a:r>
+            <a:r>
+              <a:rPr lang="de-DE" dirty="0"/>
+              <a:t> auswählen</a:t>
+            </a:r>
+          </a:p>
+          <a:p>
+            <a:pPr marL="457200" indent="-457200">
+              <a:buFont typeface="+mj-lt"/>
+              <a:buAutoNum type="arabicPeriod"/>
+            </a:pPr>
+            <a:r>
+              <a:rPr lang="de-DE" dirty="0"/>
+              <a:t>„Settings“ &gt; „General“</a:t>
+            </a:r>
+          </a:p>
+          <a:p>
+            <a:pPr marL="457200" indent="-457200">
+              <a:buFont typeface="+mj-lt"/>
+              <a:buAutoNum type="arabicPeriod"/>
+            </a:pPr>
+            <a:r>
+              <a:rPr lang="de-DE" dirty="0"/>
+              <a:t>„</a:t>
+            </a:r>
+            <a:r>
+              <a:rPr lang="de-DE" dirty="0" err="1"/>
+              <a:t>Visibility</a:t>
+            </a:r>
+            <a:r>
+              <a:rPr lang="de-DE" dirty="0"/>
+              <a:t>, </a:t>
+            </a:r>
+            <a:r>
+              <a:rPr lang="de-DE" dirty="0" err="1"/>
+              <a:t>project</a:t>
+            </a:r>
+            <a:r>
+              <a:rPr lang="de-DE" dirty="0"/>
+              <a:t> </a:t>
+            </a:r>
+            <a:r>
+              <a:rPr lang="de-DE" dirty="0" err="1"/>
+              <a:t>features</a:t>
+            </a:r>
+            <a:r>
+              <a:rPr lang="de-DE" dirty="0"/>
+              <a:t>, </a:t>
+            </a:r>
+            <a:r>
+              <a:rPr lang="de-DE" dirty="0" err="1"/>
+              <a:t>permissions</a:t>
+            </a:r>
+            <a:r>
+              <a:rPr lang="de-DE" dirty="0"/>
+              <a:t>“ aufklappen</a:t>
+            </a:r>
+          </a:p>
+          <a:p>
+            <a:pPr marL="457200" indent="-457200">
+              <a:buFont typeface="+mj-lt"/>
+              <a:buAutoNum type="arabicPeriod"/>
+            </a:pPr>
+            <a:r>
+              <a:rPr lang="de-DE" dirty="0"/>
+              <a:t>Unter „Container </a:t>
+            </a:r>
+            <a:r>
+              <a:rPr lang="de-DE" dirty="0" err="1"/>
+              <a:t>registry</a:t>
+            </a:r>
+            <a:r>
+              <a:rPr lang="de-DE" dirty="0"/>
+              <a:t>“ eine Auswahl treffen</a:t>
+            </a:r>
+          </a:p>
+          <a:p>
+            <a:pPr marL="857250" lvl="1" indent="-457200">
+              <a:buFont typeface="Arial" panose="020B0604020202020204" pitchFamily="34" charset="0"/>
+              <a:buChar char="•"/>
+            </a:pPr>
+            <a:r>
+              <a:rPr lang="de-DE" dirty="0"/>
+              <a:t>„</a:t>
+            </a:r>
+            <a:r>
+              <a:rPr lang="de-DE" dirty="0" err="1"/>
+              <a:t>Everyone</a:t>
+            </a:r>
+            <a:r>
+              <a:rPr lang="de-DE" dirty="0"/>
+              <a:t> </a:t>
+            </a:r>
+            <a:r>
+              <a:rPr lang="de-DE" dirty="0" err="1"/>
+              <a:t>With</a:t>
+            </a:r>
+            <a:r>
+              <a:rPr lang="de-DE" dirty="0"/>
+              <a:t> Access“ (Default)</a:t>
+            </a:r>
+          </a:p>
+          <a:p>
+            <a:pPr marL="1257300" lvl="2" indent="-457200">
+              <a:buFont typeface="Arial" panose="020B0604020202020204" pitchFamily="34" charset="0"/>
+              <a:buChar char="•"/>
+            </a:pPr>
+            <a:r>
+              <a:rPr lang="de-DE" sz="1800" dirty="0"/>
+              <a:t>Container Registry hat das Sichtbarkeitslevel des Projekts!</a:t>
+            </a:r>
+          </a:p>
+          <a:p>
+            <a:pPr marL="857250" lvl="1" indent="-457200">
+              <a:buFont typeface="Arial" panose="020B0604020202020204" pitchFamily="34" charset="0"/>
+              <a:buChar char="•"/>
+            </a:pPr>
+            <a:r>
+              <a:rPr lang="de-DE" dirty="0"/>
+              <a:t>„</a:t>
+            </a:r>
+            <a:r>
+              <a:rPr lang="de-DE" dirty="0" err="1"/>
+              <a:t>Only</a:t>
+            </a:r>
+            <a:r>
+              <a:rPr lang="de-DE" dirty="0"/>
+              <a:t> Project Members“</a:t>
+            </a:r>
+          </a:p>
+          <a:p>
+            <a:pPr marL="1257300" lvl="2" indent="-457200">
+              <a:buFont typeface="Arial" panose="020B0604020202020204" pitchFamily="34" charset="0"/>
+              <a:buChar char="•"/>
+            </a:pPr>
+            <a:r>
+              <a:rPr lang="de-DE" sz="1800" dirty="0"/>
+              <a:t>Vergleichbar mit: private </a:t>
+            </a:r>
+            <a:r>
+              <a:rPr lang="de-DE" sz="1800" dirty="0" err="1"/>
+              <a:t>project</a:t>
+            </a:r>
+            <a:r>
+              <a:rPr lang="de-DE" sz="1800" dirty="0"/>
+              <a:t> + </a:t>
+            </a:r>
+            <a:r>
+              <a:rPr lang="de-DE" sz="1800" dirty="0" err="1"/>
+              <a:t>everyone</a:t>
+            </a:r>
+            <a:r>
+              <a:rPr lang="de-DE" sz="1800" dirty="0"/>
+              <a:t> </a:t>
+            </a:r>
+            <a:r>
+              <a:rPr lang="de-DE" sz="1800" dirty="0" err="1"/>
+              <a:t>with</a:t>
+            </a:r>
+            <a:r>
+              <a:rPr lang="de-DE" sz="1800" dirty="0"/>
+              <a:t> </a:t>
+            </a:r>
+            <a:r>
+              <a:rPr lang="de-DE" sz="1800" dirty="0" err="1"/>
+              <a:t>access</a:t>
+            </a:r>
+            <a:endParaRPr lang="de-DE" sz="1800" dirty="0"/>
+          </a:p>
+          <a:p>
+            <a:pPr marL="457200" indent="-457200">
+              <a:buFont typeface="Arial" panose="020B0604020202020204" pitchFamily="34" charset="0"/>
+              <a:buChar char="•"/>
+            </a:pPr>
+            <a:r>
+              <a:rPr lang="de-DE" dirty="0"/>
+              <a:t>„Save </a:t>
+            </a:r>
+            <a:r>
+              <a:rPr lang="de-DE" dirty="0" err="1"/>
+              <a:t>changes</a:t>
+            </a:r>
+            <a:r>
+              <a:rPr lang="de-DE" dirty="0"/>
+              <a:t>“ auswählen</a:t>
+            </a:r>
+          </a:p>
+          <a:p>
             <a:pPr marL="0" indent="0">
               <a:buNone/>
             </a:pPr>
@@ -23030,7 +23656,7 @@
           <p:cNvPr id="2" name="Titel 1">
             <a:extLst>
               <a:ext uri="{FF2B5EF4-FFF2-40B4-BE49-F238E27FC236}">
-                <a16:creationId xmlns:a16="http://schemas.microsoft.com/office/drawing/2014/main" id="{25E7C6E1-B055-3AFC-5E69-1173C8DA414C}"/>
+                <a16:creationId xmlns:a16="http://schemas.microsoft.com/office/drawing/2014/main" id="{50C1DD80-CF73-A980-3BD6-69B26337A0D5}"/>
               </a:ext>
             </a:extLst>
           </p:cNvPr>
@@ -23053,340 +23679,76 @@
           </a:p>
         </p:txBody>
       </p:sp>
-      <p:pic>
-        <p:nvPicPr>
-          <p:cNvPr id="5" name="Inhaltsplatzhalter 4">
+      <p:sp>
+        <p:nvSpPr>
+          <p:cNvPr id="3" name="Inhaltsplatzhalter 2">
             <a:extLst>
               <a:ext uri="{FF2B5EF4-FFF2-40B4-BE49-F238E27FC236}">
-                <a16:creationId xmlns:a16="http://schemas.microsoft.com/office/drawing/2014/main" id="{E7C5BE06-2B92-CC8B-9154-47007ABBF34A}"/>
+                <a16:creationId xmlns:a16="http://schemas.microsoft.com/office/drawing/2014/main" id="{22FD9754-BEAB-D513-52D5-A20FA5E69928}"/>
               </a:ext>
             </a:extLst>
           </p:cNvPr>
-          <p:cNvPicPr>
-            <a:picLocks noGrp="1" noChangeAspect="1"/>
-          </p:cNvPicPr>
+          <p:cNvSpPr>
+            <a:spLocks noGrp="1"/>
+          </p:cNvSpPr>
           <p:nvPr>
             <p:ph idx="1"/>
           </p:nvPr>
-        </p:nvPicPr>
-        <p:blipFill>
-          <a:blip r:embed="rId2">
-            <a:extLst>
-              <a:ext uri="{28A0092B-C50C-407E-A947-70E740481C1C}">
-                <a14:useLocalDpi xmlns:a14="http://schemas.microsoft.com/office/drawing/2010/main" val="0"/>
-              </a:ext>
-            </a:extLst>
-          </a:blip>
-          <a:stretch>
-            <a:fillRect/>
-          </a:stretch>
-        </p:blipFill>
-        <p:spPr>
-          <a:xfrm>
-            <a:off x="107504" y="2996952"/>
-            <a:ext cx="4300736" cy="4300736"/>
-          </a:xfrm>
-        </p:spPr>
-      </p:pic>
-      <p:pic>
-        <p:nvPicPr>
-          <p:cNvPr id="7" name="Grafik 6">
-            <a:extLst>
-              <a:ext uri="{FF2B5EF4-FFF2-40B4-BE49-F238E27FC236}">
-                <a16:creationId xmlns:a16="http://schemas.microsoft.com/office/drawing/2014/main" id="{BE9CCB7C-8C17-285C-7F88-68B9D147713B}"/>
-              </a:ext>
-            </a:extLst>
-          </p:cNvPr>
-          <p:cNvPicPr>
-            <a:picLocks noChangeAspect="1"/>
-          </p:cNvPicPr>
-          <p:nvPr/>
-        </p:nvPicPr>
-        <p:blipFill>
-          <a:blip r:embed="rId3">
-            <a:extLst>
-              <a:ext uri="{28A0092B-C50C-407E-A947-70E740481C1C}">
-                <a14:useLocalDpi xmlns:a14="http://schemas.microsoft.com/office/drawing/2010/main" val="0"/>
-              </a:ext>
-            </a:extLst>
-          </a:blip>
-          <a:stretch>
-            <a:fillRect/>
-          </a:stretch>
-        </p:blipFill>
-        <p:spPr>
-          <a:xfrm rot="1830949">
-            <a:off x="3145794" y="4216465"/>
-            <a:ext cx="1170797" cy="1030198"/>
-          </a:xfrm>
-          <a:prstGeom prst="rect">
-            <a:avLst/>
-          </a:prstGeom>
-        </p:spPr>
-      </p:pic>
-      <p:pic>
-        <p:nvPicPr>
-          <p:cNvPr id="3" name="Grafik 2">
-            <a:extLst>
-              <a:ext uri="{FF2B5EF4-FFF2-40B4-BE49-F238E27FC236}">
-                <a16:creationId xmlns:a16="http://schemas.microsoft.com/office/drawing/2014/main" id="{E305C248-1E25-17F8-5683-4BC2D377E760}"/>
-              </a:ext>
-            </a:extLst>
-          </p:cNvPr>
-          <p:cNvPicPr>
-            <a:picLocks noChangeAspect="1"/>
-          </p:cNvPicPr>
-          <p:nvPr/>
-        </p:nvPicPr>
-        <p:blipFill>
-          <a:blip r:embed="rId4">
-            <a:extLst>
-              <a:ext uri="{28A0092B-C50C-407E-A947-70E740481C1C}">
-                <a14:useLocalDpi xmlns:a14="http://schemas.microsoft.com/office/drawing/2010/main" val="0"/>
-              </a:ext>
-            </a:extLst>
-          </a:blip>
-          <a:stretch>
-            <a:fillRect/>
-          </a:stretch>
-        </p:blipFill>
-        <p:spPr>
-          <a:xfrm>
-            <a:off x="1763688" y="1291321"/>
-            <a:ext cx="1637727" cy="1637727"/>
-          </a:xfrm>
-          <a:prstGeom prst="rect">
-            <a:avLst/>
-          </a:prstGeom>
-        </p:spPr>
-      </p:pic>
-      <p:pic>
-        <p:nvPicPr>
-          <p:cNvPr id="4" name="Grafik 3">
-            <a:extLst>
-              <a:ext uri="{FF2B5EF4-FFF2-40B4-BE49-F238E27FC236}">
-                <a16:creationId xmlns:a16="http://schemas.microsoft.com/office/drawing/2014/main" id="{33081F38-CDF8-607B-E8D4-C2F407408B36}"/>
-              </a:ext>
-            </a:extLst>
-          </p:cNvPr>
-          <p:cNvPicPr>
-            <a:picLocks noChangeAspect="1"/>
-          </p:cNvPicPr>
-          <p:nvPr/>
-        </p:nvPicPr>
-        <p:blipFill>
-          <a:blip r:embed="rId5">
-            <a:extLst>
-              <a:ext uri="{28A0092B-C50C-407E-A947-70E740481C1C}">
-                <a14:useLocalDpi xmlns:a14="http://schemas.microsoft.com/office/drawing/2010/main" val="0"/>
-              </a:ext>
-            </a:extLst>
-          </a:blip>
-          <a:stretch>
-            <a:fillRect/>
-          </a:stretch>
-        </p:blipFill>
-        <p:spPr>
-          <a:xfrm>
-            <a:off x="4815209" y="1251996"/>
-            <a:ext cx="1718015" cy="1718015"/>
-          </a:xfrm>
-          <a:prstGeom prst="rect">
-            <a:avLst/>
-          </a:prstGeom>
-        </p:spPr>
-      </p:pic>
-      <p:cxnSp>
-        <p:nvCxnSpPr>
-          <p:cNvPr id="6" name="Gerade Verbindung mit Pfeil 5">
-            <a:extLst>
-              <a:ext uri="{FF2B5EF4-FFF2-40B4-BE49-F238E27FC236}">
-                <a16:creationId xmlns:a16="http://schemas.microsoft.com/office/drawing/2014/main" id="{726C1A76-0CAF-5B4A-A3D3-4FEB54E478DC}"/>
-              </a:ext>
-            </a:extLst>
-          </p:cNvPr>
-          <p:cNvCxnSpPr>
-            <a:endCxn id="4" idx="1"/>
-          </p:cNvCxnSpPr>
-          <p:nvPr/>
-        </p:nvCxnSpPr>
-        <p:spPr bwMode="auto">
-          <a:xfrm>
-            <a:off x="3375049" y="2110185"/>
-            <a:ext cx="1440160" cy="819"/>
-          </a:xfrm>
-          <a:prstGeom prst="straightConnector1">
-            <a:avLst/>
-          </a:prstGeom>
-          <a:solidFill>
-            <a:schemeClr val="accent1"/>
-          </a:solidFill>
-          <a:ln w="12700" cap="flat" cmpd="sng" algn="ctr">
-            <a:solidFill>
-              <a:schemeClr val="tx1"/>
-            </a:solidFill>
-            <a:prstDash val="solid"/>
-            <a:round/>
-            <a:headEnd type="none" w="sm" len="sm"/>
-            <a:tailEnd type="triangle"/>
-          </a:ln>
-          <a:effectLst/>
-        </p:spPr>
-      </p:cxnSp>
-      <p:sp>
-        <p:nvSpPr>
-          <p:cNvPr id="8" name="Textfeld 7">
-            <a:extLst>
-              <a:ext uri="{FF2B5EF4-FFF2-40B4-BE49-F238E27FC236}">
-                <a16:creationId xmlns:a16="http://schemas.microsoft.com/office/drawing/2014/main" id="{8D7CB7A8-E3F5-FD0D-234C-D972B6A48585}"/>
-              </a:ext>
-            </a:extLst>
-          </p:cNvPr>
-          <p:cNvSpPr txBox="1"/>
-          <p:nvPr/>
-        </p:nvSpPr>
-        <p:spPr bwMode="auto">
-          <a:xfrm>
-            <a:off x="1704415" y="2773690"/>
-            <a:ext cx="1585094" cy="646331"/>
-          </a:xfrm>
-          <a:prstGeom prst="rect">
-            <a:avLst/>
-          </a:prstGeom>
-          <a:noFill/>
-          <a:ln w="9525">
-            <a:noFill/>
-            <a:miter lim="800000"/>
-            <a:headEnd/>
-            <a:tailEnd/>
-          </a:ln>
-        </p:spPr>
+        </p:nvSpPr>
+        <p:spPr/>
         <p:txBody>
-          <a:bodyPr wrap="square" rtlCol="0" anchor="ctr">
-            <a:spAutoFit/>
-          </a:bodyPr>
+          <a:bodyPr/>
           <a:lstStyle/>
           <a:p>
-            <a:pPr eaLnBrk="1" hangingPunct="1"/>
-            <a:r>
-              <a:rPr lang="de-DE" sz="1200" b="1" dirty="0">
-                <a:latin typeface="Arial" charset="0"/>
-              </a:rPr>
-              <a:t>Images</a:t>
-            </a:r>
-          </a:p>
-          <a:p>
-            <a:pPr eaLnBrk="1" hangingPunct="1"/>
-            <a:r>
-              <a:rPr lang="de-DE" sz="1200" dirty="0">
-                <a:latin typeface="Arial" charset="0"/>
-              </a:rPr>
-              <a:t>Statisch, Persistiert Container Image</a:t>
-            </a:r>
-          </a:p>
-        </p:txBody>
-      </p:sp>
-      <p:sp>
-        <p:nvSpPr>
-          <p:cNvPr id="10" name="Textfeld 9">
-            <a:extLst>
-              <a:ext uri="{FF2B5EF4-FFF2-40B4-BE49-F238E27FC236}">
-                <a16:creationId xmlns:a16="http://schemas.microsoft.com/office/drawing/2014/main" id="{B7B37830-9001-265C-DB90-CCE29E062C9C}"/>
-              </a:ext>
-            </a:extLst>
-          </p:cNvPr>
-          <p:cNvSpPr txBox="1"/>
-          <p:nvPr/>
-        </p:nvSpPr>
-        <p:spPr bwMode="auto">
-          <a:xfrm>
-            <a:off x="4702821" y="2772872"/>
-            <a:ext cx="1896163" cy="646331"/>
-          </a:xfrm>
-          <a:prstGeom prst="rect">
-            <a:avLst/>
-          </a:prstGeom>
-          <a:noFill/>
-          <a:ln w="9525">
-            <a:noFill/>
-            <a:miter lim="800000"/>
-            <a:headEnd/>
-            <a:tailEnd/>
-          </a:ln>
-        </p:spPr>
-        <p:txBody>
-          <a:bodyPr wrap="square" rtlCol="0" anchor="ctr">
-            <a:spAutoFit/>
-          </a:bodyPr>
-          <a:lstStyle/>
-          <a:p>
-            <a:pPr eaLnBrk="1" hangingPunct="1"/>
-            <a:r>
-              <a:rPr lang="de-DE" sz="1200" b="1" dirty="0">
-                <a:latin typeface="Arial" charset="0"/>
-              </a:rPr>
-              <a:t>Container</a:t>
-            </a:r>
-          </a:p>
-          <a:p>
-            <a:pPr eaLnBrk="1" hangingPunct="1"/>
-            <a:r>
-              <a:rPr lang="de-DE" sz="1200" dirty="0">
-                <a:latin typeface="Arial" charset="0"/>
-              </a:rPr>
-              <a:t>Isolierte, portable Einheit für Anwendungen</a:t>
-            </a:r>
-          </a:p>
-        </p:txBody>
-      </p:sp>
-      <p:sp>
-        <p:nvSpPr>
-          <p:cNvPr id="11" name="Textfeld 10">
-            <a:extLst>
-              <a:ext uri="{FF2B5EF4-FFF2-40B4-BE49-F238E27FC236}">
-                <a16:creationId xmlns:a16="http://schemas.microsoft.com/office/drawing/2014/main" id="{104991F2-6CAD-D77B-2EE4-0351CE25F1F4}"/>
-              </a:ext>
-            </a:extLst>
-          </p:cNvPr>
-          <p:cNvSpPr txBox="1"/>
-          <p:nvPr/>
-        </p:nvSpPr>
-        <p:spPr bwMode="auto">
-          <a:xfrm>
-            <a:off x="3763940" y="1797102"/>
-            <a:ext cx="688743" cy="276999"/>
-          </a:xfrm>
-          <a:prstGeom prst="rect">
-            <a:avLst/>
-          </a:prstGeom>
-          <a:noFill/>
-          <a:ln w="9525">
-            <a:noFill/>
-            <a:miter lim="800000"/>
-            <a:headEnd/>
-            <a:tailEnd/>
-          </a:ln>
-        </p:spPr>
-        <p:txBody>
-          <a:bodyPr wrap="square" rtlCol="0" anchor="ctr">
-            <a:spAutoFit/>
-          </a:bodyPr>
-          <a:lstStyle/>
-          <a:p>
-            <a:pPr eaLnBrk="1" hangingPunct="1"/>
-            <a:r>
-              <a:rPr lang="de-DE" sz="1200" b="1" dirty="0">
-                <a:latin typeface="Arial" charset="0"/>
-              </a:rPr>
-              <a:t>Run</a:t>
-            </a:r>
+            <a:pPr marL="0" indent="0">
+              <a:buNone/>
+            </a:pPr>
+            <a:r>
+              <a:rPr lang="de-DE" b="1" dirty="0"/>
+              <a:t>Unterstütze Image Formate</a:t>
+            </a:r>
+          </a:p>
+          <a:p>
+            <a:pPr>
+              <a:buFont typeface="Arial" panose="020B0604020202020204" pitchFamily="34" charset="0"/>
+              <a:buChar char="•"/>
+            </a:pPr>
+            <a:r>
+              <a:rPr lang="de-DE" dirty="0"/>
+              <a:t>Docker V2</a:t>
+            </a:r>
+          </a:p>
+          <a:p>
+            <a:pPr>
+              <a:buFont typeface="Arial" panose="020B0604020202020204" pitchFamily="34" charset="0"/>
+              <a:buChar char="•"/>
+            </a:pPr>
+            <a:r>
+              <a:rPr lang="de-DE" dirty="0"/>
+              <a:t>Open Container Initiative (OCI)</a:t>
+            </a:r>
+          </a:p>
+          <a:p>
+            <a:pPr>
+              <a:buFont typeface="Arial" panose="020B0604020202020204" pitchFamily="34" charset="0"/>
+              <a:buChar char="•"/>
+            </a:pPr>
+            <a:r>
+              <a:rPr lang="de-DE" dirty="0"/>
+              <a:t>Container Registry entspricht OCI-</a:t>
+            </a:r>
+            <a:r>
+              <a:rPr lang="de-DE" dirty="0" err="1"/>
+              <a:t>Verteilungspezifikation</a:t>
+            </a:r>
+            <a:endParaRPr lang="de-DE" dirty="0"/>
           </a:p>
         </p:txBody>
       </p:sp>
     </p:spTree>
     <p:extLst>
       <p:ext uri="{BB962C8B-B14F-4D97-AF65-F5344CB8AC3E}">
-        <p14:creationId xmlns:p14="http://schemas.microsoft.com/office/powerpoint/2010/main" val="81545675"/>
+        <p14:creationId xmlns:p14="http://schemas.microsoft.com/office/powerpoint/2010/main" val="883931548"/>
       </p:ext>
     </p:extLst>
   </p:cSld>

</xml_diff>

<commit_message>
Tag-3_2: bad & good practises hinzugefügt
</commit_message>
<xml_diff>
--- a/slides/Tag-3_2-GitLab-Runner-Container-Registry.pptx
+++ b/slides/Tag-3_2-GitLab-Runner-Container-Registry.pptx
@@ -20361,56 +20361,119 @@
               <a:rPr lang="de-DE" dirty="0">
                 <a:sym typeface="Wingdings" panose="05000000000000000000" pitchFamily="2" charset="2"/>
               </a:rPr>
-              <a:t> Image </a:t>
+              <a:t> Größe des Images beachten!</a:t>
+            </a:r>
+          </a:p>
+          <a:p>
+            <a:pPr>
+              <a:buFont typeface="Arial" panose="020B0604020202020204" pitchFamily="34" charset="0"/>
+              <a:buChar char="•"/>
+            </a:pPr>
+            <a:r>
+              <a:rPr lang="de-DE" dirty="0">
+                <a:sym typeface="Wingdings" panose="05000000000000000000" pitchFamily="2" charset="2"/>
+              </a:rPr>
+              <a:t>Bad </a:t>
             </a:r>
             <a:r>
               <a:rPr lang="de-DE" dirty="0" err="1">
                 <a:sym typeface="Wingdings" panose="05000000000000000000" pitchFamily="2" charset="2"/>
               </a:rPr>
-              <a:t>größe</a:t>
-            </a:r>
+              <a:t>practise</a:t>
+            </a:r>
+            <a:endParaRPr lang="de-DE" dirty="0">
+              <a:sym typeface="Wingdings" panose="05000000000000000000" pitchFamily="2" charset="2"/>
+            </a:endParaRPr>
+          </a:p>
+          <a:p>
+            <a:pPr lvl="1">
+              <a:buFont typeface="Arial" panose="020B0604020202020204" pitchFamily="34" charset="0"/>
+              <a:buChar char="•"/>
+            </a:pPr>
             <a:r>
               <a:rPr lang="de-DE" dirty="0">
                 <a:sym typeface="Wingdings" panose="05000000000000000000" pitchFamily="2" charset="2"/>
               </a:rPr>
-              <a:t> beachten!</a:t>
-            </a:r>
-          </a:p>
-          <a:p>
-            <a:pPr lvl="1">
-              <a:buFont typeface="Arial" panose="020B0604020202020204" pitchFamily="34" charset="0"/>
-              <a:buChar char="•"/>
-            </a:pPr>
+              <a:t>:</a:t>
+            </a:r>
+            <a:r>
+              <a:rPr lang="de-DE" dirty="0" err="1">
+                <a:sym typeface="Wingdings" panose="05000000000000000000" pitchFamily="2" charset="2"/>
+              </a:rPr>
+              <a:t>latest</a:t>
+            </a:r>
             <a:r>
               <a:rPr lang="de-DE" dirty="0">
                 <a:sym typeface="Wingdings" panose="05000000000000000000" pitchFamily="2" charset="2"/>
               </a:rPr>
-              <a:t>Später bei </a:t>
+              <a:t> bei einem Docker Image zu verwenden</a:t>
+            </a:r>
+          </a:p>
+          <a:p>
+            <a:pPr lvl="2">
+              <a:buFont typeface="Arial" panose="020B0604020202020204" pitchFamily="34" charset="0"/>
+              <a:buChar char="•"/>
+            </a:pPr>
+            <a:r>
+              <a:rPr lang="de-DE" sz="1800" dirty="0">
+                <a:sym typeface="Wingdings" panose="05000000000000000000" pitchFamily="2" charset="2"/>
+              </a:rPr>
+              <a:t>Weil sich dadurch das Image immer ändert! (durch die neue Version)</a:t>
+            </a:r>
+          </a:p>
+          <a:p>
+            <a:pPr lvl="1">
+              <a:buFont typeface="Arial" panose="020B0604020202020204" pitchFamily="34" charset="0"/>
+              <a:buChar char="•"/>
+            </a:pPr>
+            <a:r>
+              <a:rPr lang="de-DE" dirty="0">
+                <a:sym typeface="Wingdings" panose="05000000000000000000" pitchFamily="2" charset="2"/>
+              </a:rPr>
+              <a:t>Keine Version  z.B. </a:t>
             </a:r>
             <a:r>
               <a:rPr lang="de-DE" dirty="0" err="1">
                 <a:sym typeface="Wingdings" panose="05000000000000000000" pitchFamily="2" charset="2"/>
               </a:rPr>
-              <a:t>best</a:t>
-            </a:r>
+              <a:t>docker</a:t>
+            </a:r>
+            <a:endParaRPr lang="de-DE" dirty="0">
+              <a:sym typeface="Wingdings" panose="05000000000000000000" pitchFamily="2" charset="2"/>
+            </a:endParaRPr>
+          </a:p>
+          <a:p>
+            <a:pPr lvl="1">
+              <a:buFont typeface="Arial" panose="020B0604020202020204" pitchFamily="34" charset="0"/>
+              <a:buChar char="•"/>
+            </a:pPr>
             <a:r>
               <a:rPr lang="de-DE" dirty="0">
                 <a:sym typeface="Wingdings" panose="05000000000000000000" pitchFamily="2" charset="2"/>
               </a:rPr>
-              <a:t> </a:t>
+              <a:t>Das </a:t>
             </a:r>
             <a:r>
               <a:rPr lang="de-DE" dirty="0" err="1">
                 <a:sym typeface="Wingdings" panose="05000000000000000000" pitchFamily="2" charset="2"/>
               </a:rPr>
-              <a:t>practises</a:t>
+              <a:t>latest</a:t>
             </a:r>
             <a:r>
               <a:rPr lang="de-DE" dirty="0">
                 <a:sym typeface="Wingdings" panose="05000000000000000000" pitchFamily="2" charset="2"/>
               </a:rPr>
-              <a:t> mehr.</a:t>
-            </a:r>
+              <a:t> tag  z.B. </a:t>
+            </a:r>
+            <a:r>
+              <a:rPr lang="de-DE" dirty="0" err="1">
+                <a:sym typeface="Wingdings" panose="05000000000000000000" pitchFamily="2" charset="2"/>
+              </a:rPr>
+              <a:t>docker:latest</a:t>
+            </a:r>
+            <a:endParaRPr lang="de-DE" dirty="0">
+              <a:sym typeface="Wingdings" panose="05000000000000000000" pitchFamily="2" charset="2"/>
+            </a:endParaRPr>
           </a:p>
           <a:p>
             <a:pPr lvl="1">
@@ -20421,81 +20484,29 @@
               <a:rPr lang="de-DE" dirty="0">
                 <a:sym typeface="Wingdings" panose="05000000000000000000" pitchFamily="2" charset="2"/>
               </a:rPr>
-              <a:t>Siehe: </a:t>
-            </a:r>
-          </a:p>
-          <a:p>
-            <a:pPr lvl="2">
-              <a:buFont typeface="Arial" panose="020B0604020202020204" pitchFamily="34" charset="0"/>
-              <a:buChar char="•"/>
-            </a:pPr>
-            <a:r>
-              <a:rPr lang="en-US" sz="1600" dirty="0"/>
-              <a:t>It is considered bad practice to use the latest version of a Docker image as this will always change and could break your pipeline. The version you are using changes all the time if you:</a:t>
-            </a:r>
-          </a:p>
-          <a:p>
-            <a:pPr lvl="2">
-              <a:buFont typeface="Arial" panose="020B0604020202020204" pitchFamily="34" charset="0"/>
-              <a:buChar char="•"/>
-            </a:pPr>
-            <a:endParaRPr lang="en-US" sz="1600" dirty="0"/>
-          </a:p>
-          <a:p>
-            <a:pPr lvl="2">
-              <a:buFont typeface="Arial" panose="020B0604020202020204" pitchFamily="34" charset="0"/>
-              <a:buChar char="•"/>
-            </a:pPr>
-            <a:r>
-              <a:rPr lang="en-US" sz="1600" dirty="0"/>
-              <a:t>don't specify a version (e.g. docker)</a:t>
-            </a:r>
-          </a:p>
-          <a:p>
-            <a:pPr lvl="2">
-              <a:buFont typeface="Arial" panose="020B0604020202020204" pitchFamily="34" charset="0"/>
-              <a:buChar char="•"/>
-            </a:pPr>
-            <a:r>
-              <a:rPr lang="en-US" sz="1600" dirty="0"/>
-              <a:t>use the latest tag (e.g. </a:t>
-            </a:r>
-            <a:r>
-              <a:rPr lang="en-US" sz="1600" dirty="0" err="1"/>
-              <a:t>docker:latest</a:t>
-            </a:r>
-            <a:r>
-              <a:rPr lang="en-US" sz="1600" dirty="0"/>
-              <a:t>)</a:t>
-            </a:r>
-          </a:p>
-          <a:p>
-            <a:pPr lvl="2">
-              <a:buFont typeface="Arial" panose="020B0604020202020204" pitchFamily="34" charset="0"/>
-              <a:buChar char="•"/>
-            </a:pPr>
-            <a:r>
-              <a:rPr lang="en-US" sz="1600" dirty="0"/>
-              <a:t>use the stable tag (e.g. </a:t>
-            </a:r>
-            <a:r>
-              <a:rPr lang="en-US" sz="1600" dirty="0" err="1"/>
+              <a:t>Das </a:t>
+            </a:r>
+            <a:r>
+              <a:rPr lang="de-DE" dirty="0" err="1">
+                <a:sym typeface="Wingdings" panose="05000000000000000000" pitchFamily="2" charset="2"/>
+              </a:rPr>
+              <a:t>stable</a:t>
+            </a:r>
+            <a:r>
+              <a:rPr lang="de-DE" dirty="0">
+                <a:sym typeface="Wingdings" panose="05000000000000000000" pitchFamily="2" charset="2"/>
+              </a:rPr>
+              <a:t> tag  z.B. </a:t>
+            </a:r>
+            <a:r>
+              <a:rPr lang="de-DE" dirty="0" err="1">
+                <a:sym typeface="Wingdings" panose="05000000000000000000" pitchFamily="2" charset="2"/>
+              </a:rPr>
               <a:t>docker:stable</a:t>
             </a:r>
-            <a:r>
-              <a:rPr lang="en-US" sz="1600" dirty="0"/>
-              <a:t>)</a:t>
-            </a:r>
-          </a:p>
-          <a:p>
-            <a:pPr lvl="2">
-              <a:buFont typeface="Arial" panose="020B0604020202020204" pitchFamily="34" charset="0"/>
-              <a:buChar char="•"/>
-            </a:pPr>
-            <a:r>
-              <a:rPr lang="en-US" sz="1600" dirty="0"/>
-              <a:t>use a major version tag(e.g. docker:20)</a:t>
-            </a:r>
+            <a:endParaRPr lang="de-DE" dirty="0">
+              <a:sym typeface="Wingdings" panose="05000000000000000000" pitchFamily="2" charset="2"/>
+            </a:endParaRPr>
           </a:p>
           <a:p>
             <a:pPr lvl="1">
@@ -20503,30 +20514,75 @@
               <a:buChar char="•"/>
             </a:pPr>
             <a:r>
-              <a:rPr lang="en-US" sz="1800" dirty="0"/>
-              <a:t>Consider the following:</a:t>
-            </a:r>
-          </a:p>
-          <a:p>
-            <a:pPr lvl="2">
-              <a:buFont typeface="Arial" panose="020B0604020202020204" pitchFamily="34" charset="0"/>
-              <a:buChar char="•"/>
-            </a:pPr>
-            <a:r>
-              <a:rPr lang="en-US" sz="1600" dirty="0"/>
-              <a:t>Use a specific version, like docker:20.10.10 &amp; docker:20.10.10-dind (recommended).</a:t>
-            </a:r>
-          </a:p>
-          <a:p>
-            <a:pPr lvl="2">
-              <a:buFont typeface="Arial" panose="020B0604020202020204" pitchFamily="34" charset="0"/>
-              <a:buChar char="•"/>
-            </a:pPr>
-            <a:r>
-              <a:rPr lang="en-US" sz="1600" dirty="0"/>
-              <a:t>Log the version with --version (this can help you figure out which was the version that worked).</a:t>
-            </a:r>
-            <a:endParaRPr lang="de-DE" sz="1600" dirty="0"/>
+              <a:rPr lang="de-DE" dirty="0">
+                <a:sym typeface="Wingdings" panose="05000000000000000000" pitchFamily="2" charset="2"/>
+              </a:rPr>
+              <a:t>Major </a:t>
+            </a:r>
+            <a:r>
+              <a:rPr lang="de-DE" dirty="0" err="1">
+                <a:sym typeface="Wingdings" panose="05000000000000000000" pitchFamily="2" charset="2"/>
+              </a:rPr>
+              <a:t>version</a:t>
+            </a:r>
+            <a:r>
+              <a:rPr lang="de-DE" dirty="0">
+                <a:sym typeface="Wingdings" panose="05000000000000000000" pitchFamily="2" charset="2"/>
+              </a:rPr>
+              <a:t>  z.B. docker:26</a:t>
+            </a:r>
+          </a:p>
+          <a:p>
+            <a:pPr>
+              <a:buFont typeface="Arial" panose="020B0604020202020204" pitchFamily="34" charset="0"/>
+              <a:buChar char="•"/>
+            </a:pPr>
+            <a:r>
+              <a:rPr lang="de-DE" dirty="0" err="1">
+                <a:sym typeface="Wingdings" panose="05000000000000000000" pitchFamily="2" charset="2"/>
+              </a:rPr>
+              <a:t>Good</a:t>
+            </a:r>
+            <a:r>
+              <a:rPr lang="de-DE" dirty="0">
+                <a:sym typeface="Wingdings" panose="05000000000000000000" pitchFamily="2" charset="2"/>
+              </a:rPr>
+              <a:t> </a:t>
+            </a:r>
+            <a:r>
+              <a:rPr lang="de-DE" dirty="0" err="1">
+                <a:sym typeface="Wingdings" panose="05000000000000000000" pitchFamily="2" charset="2"/>
+              </a:rPr>
+              <a:t>practise</a:t>
+            </a:r>
+            <a:endParaRPr lang="de-DE" dirty="0">
+              <a:sym typeface="Wingdings" panose="05000000000000000000" pitchFamily="2" charset="2"/>
+            </a:endParaRPr>
+          </a:p>
+          <a:p>
+            <a:pPr lvl="1">
+              <a:buFont typeface="Arial" panose="020B0604020202020204" pitchFamily="34" charset="0"/>
+              <a:buChar char="•"/>
+            </a:pPr>
+            <a:r>
+              <a:rPr lang="de-DE" dirty="0">
+                <a:sym typeface="Wingdings" panose="05000000000000000000" pitchFamily="2" charset="2"/>
+              </a:rPr>
+              <a:t>Spezifische Version nutzen  z.B. docker:26.1.3-dind</a:t>
+            </a:r>
+          </a:p>
+          <a:p>
+            <a:pPr lvl="1">
+              <a:buFont typeface="Arial" panose="020B0604020202020204" pitchFamily="34" charset="0"/>
+              <a:buChar char="•"/>
+            </a:pPr>
+            <a:r>
+              <a:rPr lang="de-DE" dirty="0">
+                <a:sym typeface="Wingdings" panose="05000000000000000000" pitchFamily="2" charset="2"/>
+              </a:rPr>
+              <a:t>--version nutzen, um ggf. die zuletzt funktionierende Version anzuzeigen</a:t>
+            </a:r>
+            <a:endParaRPr lang="en-US" dirty="0"/>
           </a:p>
         </p:txBody>
       </p:sp>
@@ -22617,7 +22673,7 @@
               <a:buChar char="•"/>
             </a:pPr>
             <a:r>
-              <a:rPr lang="de-DE" b="1" dirty="0"/>
+              <a:rPr lang="de-DE" u="sng" dirty="0"/>
               <a:t>Container Registry für ein Projekt deaktivieren</a:t>
             </a:r>
           </a:p>

</xml_diff>

<commit_message>
Tag-3_2: Add meme: using docker labels
</commit_message>
<xml_diff>
--- a/slides/Tag-3_2-GitLab-Runner-Container-Registry.pptx
+++ b/slides/Tag-3_2-GitLab-Runner-Container-Registry.pptx
@@ -6,10 +6,10 @@
     <p:sldMasterId id="2147483649" r:id="rId2"/>
   </p:sldMasterIdLst>
   <p:notesMasterIdLst>
-    <p:notesMasterId r:id="rId134"/>
+    <p:notesMasterId r:id="rId135"/>
   </p:notesMasterIdLst>
   <p:handoutMasterIdLst>
-    <p:handoutMasterId r:id="rId135"/>
+    <p:handoutMasterId r:id="rId136"/>
   </p:handoutMasterIdLst>
   <p:sldIdLst>
     <p:sldId id="288" r:id="rId3"/>
@@ -128,21 +128,22 @@
     <p:sldId id="716" r:id="rId116"/>
     <p:sldId id="718" r:id="rId117"/>
     <p:sldId id="717" r:id="rId118"/>
-    <p:sldId id="708" r:id="rId119"/>
-    <p:sldId id="701" r:id="rId120"/>
-    <p:sldId id="719" r:id="rId121"/>
-    <p:sldId id="720" r:id="rId122"/>
-    <p:sldId id="702" r:id="rId123"/>
-    <p:sldId id="709" r:id="rId124"/>
-    <p:sldId id="703" r:id="rId125"/>
-    <p:sldId id="710" r:id="rId126"/>
-    <p:sldId id="704" r:id="rId127"/>
-    <p:sldId id="711" r:id="rId128"/>
-    <p:sldId id="713" r:id="rId129"/>
-    <p:sldId id="705" r:id="rId130"/>
-    <p:sldId id="706" r:id="rId131"/>
-    <p:sldId id="712" r:id="rId132"/>
-    <p:sldId id="724" r:id="rId133"/>
+    <p:sldId id="725" r:id="rId119"/>
+    <p:sldId id="708" r:id="rId120"/>
+    <p:sldId id="701" r:id="rId121"/>
+    <p:sldId id="719" r:id="rId122"/>
+    <p:sldId id="720" r:id="rId123"/>
+    <p:sldId id="702" r:id="rId124"/>
+    <p:sldId id="709" r:id="rId125"/>
+    <p:sldId id="703" r:id="rId126"/>
+    <p:sldId id="710" r:id="rId127"/>
+    <p:sldId id="704" r:id="rId128"/>
+    <p:sldId id="711" r:id="rId129"/>
+    <p:sldId id="713" r:id="rId130"/>
+    <p:sldId id="705" r:id="rId131"/>
+    <p:sldId id="706" r:id="rId132"/>
+    <p:sldId id="712" r:id="rId133"/>
+    <p:sldId id="724" r:id="rId134"/>
   </p:sldIdLst>
   <p:sldSz cx="9144000" cy="6858000" type="screen4x3"/>
   <p:notesSz cx="6784975" cy="9921875"/>
@@ -10794,7 +10795,7 @@
             <a:fld id="{18182567-388C-4D33-8B7B-A651F195F118}" type="slidenum">
               <a:rPr lang="de-DE" altLang="de-DE" smtClean="0"/>
               <a:pPr/>
-              <a:t>119</a:t>
+              <a:t>120</a:t>
             </a:fld>
             <a:endParaRPr lang="de-DE" altLang="de-DE"/>
           </a:p>
@@ -10899,7 +10900,7 @@
             <a:fld id="{18182567-388C-4D33-8B7B-A651F195F118}" type="slidenum">
               <a:rPr lang="de-DE" altLang="de-DE" smtClean="0"/>
               <a:pPr/>
-              <a:t>120</a:t>
+              <a:t>121</a:t>
             </a:fld>
             <a:endParaRPr lang="de-DE" altLang="de-DE"/>
           </a:p>
@@ -11087,7 +11088,7 @@
             <a:fld id="{18182567-388C-4D33-8B7B-A651F195F118}" type="slidenum">
               <a:rPr lang="de-DE" altLang="de-DE" smtClean="0"/>
               <a:pPr/>
-              <a:t>126</a:t>
+              <a:t>127</a:t>
             </a:fld>
             <a:endParaRPr lang="de-DE" altLang="de-DE"/>
           </a:p>
@@ -11220,7 +11221,7 @@
             <a:fld id="{18182567-388C-4D33-8B7B-A651F195F118}" type="slidenum">
               <a:rPr lang="de-DE" altLang="de-DE" smtClean="0"/>
               <a:pPr/>
-              <a:t>131</a:t>
+              <a:t>132</a:t>
             </a:fld>
             <a:endParaRPr lang="de-DE" altLang="de-DE"/>
           </a:p>
@@ -20621,7 +20622,7 @@
           <p:cNvPr id="2" name="Titel 1">
             <a:extLst>
               <a:ext uri="{FF2B5EF4-FFF2-40B4-BE49-F238E27FC236}">
-                <a16:creationId xmlns:a16="http://schemas.microsoft.com/office/drawing/2014/main" id="{6AA67486-2598-533D-4DB5-FC490AB10E2A}"/>
+                <a16:creationId xmlns:a16="http://schemas.microsoft.com/office/drawing/2014/main" id="{BCE18321-EDE0-6957-95B9-3FF5936707F8}"/>
               </a:ext>
             </a:extLst>
           </p:cNvPr>
@@ -20644,102 +20645,45 @@
           </a:p>
         </p:txBody>
       </p:sp>
-      <p:sp>
-        <p:nvSpPr>
-          <p:cNvPr id="3" name="Inhaltsplatzhalter 2">
+      <p:pic>
+        <p:nvPicPr>
+          <p:cNvPr id="5" name="Inhaltsplatzhalter 4">
             <a:extLst>
               <a:ext uri="{FF2B5EF4-FFF2-40B4-BE49-F238E27FC236}">
-                <a16:creationId xmlns:a16="http://schemas.microsoft.com/office/drawing/2014/main" id="{CA708DD8-2C30-488D-3B3A-0BE38FE0786D}"/>
+                <a16:creationId xmlns:a16="http://schemas.microsoft.com/office/drawing/2014/main" id="{285A119A-C72F-B7B5-141E-91DA1636D5F2}"/>
               </a:ext>
             </a:extLst>
           </p:cNvPr>
-          <p:cNvSpPr>
-            <a:spLocks noGrp="1"/>
-          </p:cNvSpPr>
+          <p:cNvPicPr>
+            <a:picLocks noGrp="1" noChangeAspect="1"/>
+          </p:cNvPicPr>
           <p:nvPr>
             <p:ph idx="1"/>
           </p:nvPr>
-        </p:nvSpPr>
-        <p:spPr/>
-        <p:txBody>
-          <a:bodyPr/>
-          <a:lstStyle/>
-          <a:p>
-            <a:pPr>
-              <a:buFont typeface="Arial" panose="020B0604020202020204" pitchFamily="34" charset="0"/>
-              <a:buChar char="•"/>
-            </a:pPr>
-            <a:r>
-              <a:rPr lang="de-DE" dirty="0"/>
-              <a:t>Container Registry ansehen</a:t>
-            </a:r>
-          </a:p>
-          <a:p>
-            <a:pPr>
-              <a:buFont typeface="Arial" panose="020B0604020202020204" pitchFamily="34" charset="0"/>
-              <a:buChar char="•"/>
-            </a:pPr>
-            <a:r>
-              <a:rPr lang="de-DE" u="sng" dirty="0"/>
-              <a:t>Tags eines bestimmten Container Image ansehen</a:t>
-            </a:r>
-          </a:p>
-          <a:p>
-            <a:pPr>
-              <a:buFont typeface="Arial" panose="020B0604020202020204" pitchFamily="34" charset="0"/>
-              <a:buChar char="•"/>
-            </a:pPr>
-            <a:r>
-              <a:rPr lang="de-DE" dirty="0"/>
-              <a:t>Container Images von der Container Registry nutzen</a:t>
-            </a:r>
-          </a:p>
-          <a:p>
-            <a:pPr>
-              <a:buFont typeface="Arial" panose="020B0604020202020204" pitchFamily="34" charset="0"/>
-              <a:buChar char="•"/>
-            </a:pPr>
-            <a:r>
-              <a:rPr lang="de-DE" dirty="0"/>
-              <a:t>Naming Convention für Container Images</a:t>
-            </a:r>
-          </a:p>
-          <a:p>
-            <a:pPr>
-              <a:buFont typeface="Arial" panose="020B0604020202020204" pitchFamily="34" charset="0"/>
-              <a:buChar char="•"/>
-            </a:pPr>
-            <a:r>
-              <a:rPr lang="de-DE" dirty="0"/>
-              <a:t>Verschieben oder Umbenennen einer Container Registry</a:t>
-            </a:r>
-          </a:p>
-          <a:p>
-            <a:pPr>
-              <a:buFont typeface="Arial" panose="020B0604020202020204" pitchFamily="34" charset="0"/>
-              <a:buChar char="•"/>
-            </a:pPr>
-            <a:r>
-              <a:rPr lang="de-DE" dirty="0"/>
-              <a:t>Container Registry für ein Projekt deaktivieren</a:t>
-            </a:r>
-          </a:p>
-          <a:p>
-            <a:pPr>
-              <a:buFont typeface="Arial" panose="020B0604020202020204" pitchFamily="34" charset="0"/>
-              <a:buChar char="•"/>
-            </a:pPr>
-            <a:r>
-              <a:rPr lang="de-DE" dirty="0"/>
-              <a:t>Sichtbarkeit der Container Registry ändern</a:t>
-            </a:r>
-          </a:p>
-        </p:txBody>
-      </p:sp>
+        </p:nvPicPr>
+        <p:blipFill>
+          <a:blip r:embed="rId2">
+            <a:extLst>
+              <a:ext uri="{28A0092B-C50C-407E-A947-70E740481C1C}">
+                <a14:useLocalDpi xmlns:a14="http://schemas.microsoft.com/office/drawing/2010/main" val="0"/>
+              </a:ext>
+            </a:extLst>
+          </a:blip>
+          <a:stretch>
+            <a:fillRect/>
+          </a:stretch>
+        </p:blipFill>
+        <p:spPr>
+          <a:xfrm>
+            <a:off x="2635621" y="981075"/>
+            <a:ext cx="3852121" cy="5400675"/>
+          </a:xfrm>
+        </p:spPr>
+      </p:pic>
     </p:spTree>
     <p:extLst>
       <p:ext uri="{BB962C8B-B14F-4D97-AF65-F5344CB8AC3E}">
-        <p14:creationId xmlns:p14="http://schemas.microsoft.com/office/powerpoint/2010/main" val="1518629705"/>
+        <p14:creationId xmlns:p14="http://schemas.microsoft.com/office/powerpoint/2010/main" val="249433093"/>
       </p:ext>
     </p:extLst>
   </p:cSld>
@@ -20815,6 +20759,156 @@
           <a:bodyPr/>
           <a:lstStyle/>
           <a:p>
+            <a:pPr>
+              <a:buFont typeface="Arial" panose="020B0604020202020204" pitchFamily="34" charset="0"/>
+              <a:buChar char="•"/>
+            </a:pPr>
+            <a:r>
+              <a:rPr lang="de-DE" dirty="0"/>
+              <a:t>Container Registry ansehen</a:t>
+            </a:r>
+          </a:p>
+          <a:p>
+            <a:pPr>
+              <a:buFont typeface="Arial" panose="020B0604020202020204" pitchFamily="34" charset="0"/>
+              <a:buChar char="•"/>
+            </a:pPr>
+            <a:r>
+              <a:rPr lang="de-DE" u="sng" dirty="0"/>
+              <a:t>Tags eines bestimmten Container Image ansehen</a:t>
+            </a:r>
+          </a:p>
+          <a:p>
+            <a:pPr>
+              <a:buFont typeface="Arial" panose="020B0604020202020204" pitchFamily="34" charset="0"/>
+              <a:buChar char="•"/>
+            </a:pPr>
+            <a:r>
+              <a:rPr lang="de-DE" dirty="0"/>
+              <a:t>Container Images von der Container Registry nutzen</a:t>
+            </a:r>
+          </a:p>
+          <a:p>
+            <a:pPr>
+              <a:buFont typeface="Arial" panose="020B0604020202020204" pitchFamily="34" charset="0"/>
+              <a:buChar char="•"/>
+            </a:pPr>
+            <a:r>
+              <a:rPr lang="de-DE" dirty="0"/>
+              <a:t>Naming Convention für Container Images</a:t>
+            </a:r>
+          </a:p>
+          <a:p>
+            <a:pPr>
+              <a:buFont typeface="Arial" panose="020B0604020202020204" pitchFamily="34" charset="0"/>
+              <a:buChar char="•"/>
+            </a:pPr>
+            <a:r>
+              <a:rPr lang="de-DE" dirty="0"/>
+              <a:t>Verschieben oder Umbenennen einer Container Registry</a:t>
+            </a:r>
+          </a:p>
+          <a:p>
+            <a:pPr>
+              <a:buFont typeface="Arial" panose="020B0604020202020204" pitchFamily="34" charset="0"/>
+              <a:buChar char="•"/>
+            </a:pPr>
+            <a:r>
+              <a:rPr lang="de-DE" dirty="0"/>
+              <a:t>Container Registry für ein Projekt deaktivieren</a:t>
+            </a:r>
+          </a:p>
+          <a:p>
+            <a:pPr>
+              <a:buFont typeface="Arial" panose="020B0604020202020204" pitchFamily="34" charset="0"/>
+              <a:buChar char="•"/>
+            </a:pPr>
+            <a:r>
+              <a:rPr lang="de-DE" dirty="0"/>
+              <a:t>Sichtbarkeit der Container Registry ändern</a:t>
+            </a:r>
+          </a:p>
+        </p:txBody>
+      </p:sp>
+    </p:spTree>
+    <p:extLst>
+      <p:ext uri="{BB962C8B-B14F-4D97-AF65-F5344CB8AC3E}">
+        <p14:creationId xmlns:p14="http://schemas.microsoft.com/office/powerpoint/2010/main" val="1518629705"/>
+      </p:ext>
+    </p:extLst>
+  </p:cSld>
+  <p:clrMapOvr>
+    <a:masterClrMapping/>
+  </p:clrMapOvr>
+</p:sld>
+</file>
+
+<file path=ppt/slides/slide119.xml><?xml version="1.0" encoding="utf-8"?>
+<p:sld xmlns:a="http://schemas.openxmlformats.org/drawingml/2006/main" xmlns:r="http://schemas.openxmlformats.org/officeDocument/2006/relationships" xmlns:p="http://schemas.openxmlformats.org/presentationml/2006/main">
+  <p:cSld>
+    <p:spTree>
+      <p:nvGrpSpPr>
+        <p:cNvPr id="1" name=""/>
+        <p:cNvGrpSpPr/>
+        <p:nvPr/>
+      </p:nvGrpSpPr>
+      <p:grpSpPr>
+        <a:xfrm>
+          <a:off x="0" y="0"/>
+          <a:ext cx="0" cy="0"/>
+          <a:chOff x="0" y="0"/>
+          <a:chExt cx="0" cy="0"/>
+        </a:xfrm>
+      </p:grpSpPr>
+      <p:sp>
+        <p:nvSpPr>
+          <p:cNvPr id="2" name="Titel 1">
+            <a:extLst>
+              <a:ext uri="{FF2B5EF4-FFF2-40B4-BE49-F238E27FC236}">
+                <a16:creationId xmlns:a16="http://schemas.microsoft.com/office/drawing/2014/main" id="{6AA67486-2598-533D-4DB5-FC490AB10E2A}"/>
+              </a:ext>
+            </a:extLst>
+          </p:cNvPr>
+          <p:cNvSpPr>
+            <a:spLocks noGrp="1"/>
+          </p:cNvSpPr>
+          <p:nvPr>
+            <p:ph type="title"/>
+          </p:nvPr>
+        </p:nvSpPr>
+        <p:spPr/>
+        <p:txBody>
+          <a:bodyPr/>
+          <a:lstStyle/>
+          <a:p>
+            <a:r>
+              <a:rPr lang="de-DE" dirty="0"/>
+              <a:t>Container Registry</a:t>
+            </a:r>
+          </a:p>
+        </p:txBody>
+      </p:sp>
+      <p:sp>
+        <p:nvSpPr>
+          <p:cNvPr id="3" name="Inhaltsplatzhalter 2">
+            <a:extLst>
+              <a:ext uri="{FF2B5EF4-FFF2-40B4-BE49-F238E27FC236}">
+                <a16:creationId xmlns:a16="http://schemas.microsoft.com/office/drawing/2014/main" id="{CA708DD8-2C30-488D-3B3A-0BE38FE0786D}"/>
+              </a:ext>
+            </a:extLst>
+          </p:cNvPr>
+          <p:cNvSpPr>
+            <a:spLocks noGrp="1"/>
+          </p:cNvSpPr>
+          <p:nvPr>
+            <p:ph idx="1"/>
+          </p:nvPr>
+        </p:nvSpPr>
+        <p:spPr/>
+        <p:txBody>
+          <a:bodyPr/>
+          <a:lstStyle/>
+          <a:p>
             <a:pPr marL="0" indent="0">
               <a:buNone/>
             </a:pPr>
@@ -20928,7 +21022,172 @@
 </p:sld>
 </file>
 
-<file path=ppt/slides/slide119.xml><?xml version="1.0" encoding="utf-8"?>
+<file path=ppt/slides/slide12.xml><?xml version="1.0" encoding="utf-8"?>
+<p:sld xmlns:a="http://schemas.openxmlformats.org/drawingml/2006/main" xmlns:r="http://schemas.openxmlformats.org/officeDocument/2006/relationships" xmlns:p="http://schemas.openxmlformats.org/presentationml/2006/main">
+  <p:cSld>
+    <p:spTree>
+      <p:nvGrpSpPr>
+        <p:cNvPr id="1" name=""/>
+        <p:cNvGrpSpPr/>
+        <p:nvPr/>
+      </p:nvGrpSpPr>
+      <p:grpSpPr>
+        <a:xfrm>
+          <a:off x="0" y="0"/>
+          <a:ext cx="0" cy="0"/>
+          <a:chOff x="0" y="0"/>
+          <a:chExt cx="0" cy="0"/>
+        </a:xfrm>
+      </p:grpSpPr>
+      <p:sp>
+        <p:nvSpPr>
+          <p:cNvPr id="2" name="Titel 1">
+            <a:extLst>
+              <a:ext uri="{FF2B5EF4-FFF2-40B4-BE49-F238E27FC236}">
+                <a16:creationId xmlns:a16="http://schemas.microsoft.com/office/drawing/2014/main" id="{2B9F73D1-0616-0915-95E4-06CBA79315C7}"/>
+              </a:ext>
+            </a:extLst>
+          </p:cNvPr>
+          <p:cNvSpPr>
+            <a:spLocks noGrp="1"/>
+          </p:cNvSpPr>
+          <p:nvPr>
+            <p:ph type="title"/>
+          </p:nvPr>
+        </p:nvSpPr>
+        <p:spPr/>
+        <p:txBody>
+          <a:bodyPr/>
+          <a:lstStyle/>
+          <a:p>
+            <a:r>
+              <a:rPr lang="de-DE" dirty="0" err="1"/>
+              <a:t>GitLab</a:t>
+            </a:r>
+            <a:r>
+              <a:rPr lang="de-DE" dirty="0"/>
+              <a:t> Runner</a:t>
+            </a:r>
+          </a:p>
+        </p:txBody>
+      </p:sp>
+      <p:sp>
+        <p:nvSpPr>
+          <p:cNvPr id="3" name="Inhaltsplatzhalter 2">
+            <a:extLst>
+              <a:ext uri="{FF2B5EF4-FFF2-40B4-BE49-F238E27FC236}">
+                <a16:creationId xmlns:a16="http://schemas.microsoft.com/office/drawing/2014/main" id="{3CE2D11A-801F-CE1E-A418-D35676D404C3}"/>
+              </a:ext>
+            </a:extLst>
+          </p:cNvPr>
+          <p:cNvSpPr>
+            <a:spLocks noGrp="1"/>
+          </p:cNvSpPr>
+          <p:nvPr>
+            <p:ph idx="1"/>
+          </p:nvPr>
+        </p:nvSpPr>
+        <p:spPr/>
+        <p:txBody>
+          <a:bodyPr/>
+          <a:lstStyle/>
+          <a:p>
+            <a:pPr marL="0" indent="0">
+              <a:buNone/>
+            </a:pPr>
+            <a:r>
+              <a:rPr lang="de-DE" b="1" dirty="0"/>
+              <a:t>Self-</a:t>
+            </a:r>
+            <a:r>
+              <a:rPr lang="de-DE" b="1" dirty="0" err="1"/>
+              <a:t>managed</a:t>
+            </a:r>
+            <a:r>
+              <a:rPr lang="de-DE" b="1" dirty="0"/>
+              <a:t> Runner</a:t>
+            </a:r>
+          </a:p>
+          <a:p>
+            <a:pPr>
+              <a:buFont typeface="Arial" panose="020B0604020202020204" pitchFamily="34" charset="0"/>
+              <a:buChar char="•"/>
+            </a:pPr>
+            <a:r>
+              <a:rPr lang="de-DE" dirty="0"/>
+              <a:t>Eigenen Project Runner benutzen</a:t>
+            </a:r>
+          </a:p>
+          <a:p>
+            <a:pPr>
+              <a:buFont typeface="Arial" panose="020B0604020202020204" pitchFamily="34" charset="0"/>
+              <a:buChar char="•"/>
+            </a:pPr>
+            <a:r>
+              <a:rPr lang="de-DE" dirty="0"/>
+              <a:t>Verschiedene Runner verwalten</a:t>
+            </a:r>
+          </a:p>
+          <a:p>
+            <a:pPr>
+              <a:buFont typeface="Arial" panose="020B0604020202020204" pitchFamily="34" charset="0"/>
+              <a:buChar char="•"/>
+            </a:pPr>
+            <a:r>
+              <a:rPr lang="de-DE" dirty="0"/>
+              <a:t>Runner registrieren</a:t>
+            </a:r>
+          </a:p>
+          <a:p>
+            <a:pPr>
+              <a:buFont typeface="Arial" panose="020B0604020202020204" pitchFamily="34" charset="0"/>
+              <a:buChar char="•"/>
+            </a:pPr>
+            <a:r>
+              <a:rPr lang="de-DE" dirty="0" err="1"/>
+              <a:t>Executors</a:t>
+            </a:r>
+            <a:endParaRPr lang="de-DE" dirty="0"/>
+          </a:p>
+          <a:p>
+            <a:pPr>
+              <a:buFont typeface="Arial" panose="020B0604020202020204" pitchFamily="34" charset="0"/>
+              <a:buChar char="•"/>
+            </a:pPr>
+            <a:r>
+              <a:rPr lang="de-DE" dirty="0"/>
+              <a:t>Runner konfigurieren</a:t>
+            </a:r>
+          </a:p>
+          <a:p>
+            <a:pPr>
+              <a:buFont typeface="Arial" panose="020B0604020202020204" pitchFamily="34" charset="0"/>
+              <a:buChar char="•"/>
+            </a:pPr>
+            <a:endParaRPr lang="de-DE" dirty="0"/>
+          </a:p>
+          <a:p>
+            <a:pPr marL="0" indent="0">
+              <a:buNone/>
+            </a:pPr>
+            <a:endParaRPr lang="de-DE" b="1" dirty="0"/>
+          </a:p>
+        </p:txBody>
+      </p:sp>
+    </p:spTree>
+    <p:extLst>
+      <p:ext uri="{BB962C8B-B14F-4D97-AF65-F5344CB8AC3E}">
+        <p14:creationId xmlns:p14="http://schemas.microsoft.com/office/powerpoint/2010/main" val="1130319195"/>
+      </p:ext>
+    </p:extLst>
+  </p:cSld>
+  <p:clrMapOvr>
+    <a:masterClrMapping/>
+  </p:clrMapOvr>
+</p:sld>
+</file>
+
+<file path=ppt/slides/slide120.xml><?xml version="1.0" encoding="utf-8"?>
 <p:sld xmlns:a="http://schemas.openxmlformats.org/drawingml/2006/main" xmlns:r="http://schemas.openxmlformats.org/officeDocument/2006/relationships" xmlns:p="http://schemas.openxmlformats.org/presentationml/2006/main">
   <p:cSld>
     <p:spTree>
@@ -21021,172 +21280,7 @@
 </p:sld>
 </file>
 
-<file path=ppt/slides/slide12.xml><?xml version="1.0" encoding="utf-8"?>
-<p:sld xmlns:a="http://schemas.openxmlformats.org/drawingml/2006/main" xmlns:r="http://schemas.openxmlformats.org/officeDocument/2006/relationships" xmlns:p="http://schemas.openxmlformats.org/presentationml/2006/main">
-  <p:cSld>
-    <p:spTree>
-      <p:nvGrpSpPr>
-        <p:cNvPr id="1" name=""/>
-        <p:cNvGrpSpPr/>
-        <p:nvPr/>
-      </p:nvGrpSpPr>
-      <p:grpSpPr>
-        <a:xfrm>
-          <a:off x="0" y="0"/>
-          <a:ext cx="0" cy="0"/>
-          <a:chOff x="0" y="0"/>
-          <a:chExt cx="0" cy="0"/>
-        </a:xfrm>
-      </p:grpSpPr>
-      <p:sp>
-        <p:nvSpPr>
-          <p:cNvPr id="2" name="Titel 1">
-            <a:extLst>
-              <a:ext uri="{FF2B5EF4-FFF2-40B4-BE49-F238E27FC236}">
-                <a16:creationId xmlns:a16="http://schemas.microsoft.com/office/drawing/2014/main" id="{2B9F73D1-0616-0915-95E4-06CBA79315C7}"/>
-              </a:ext>
-            </a:extLst>
-          </p:cNvPr>
-          <p:cNvSpPr>
-            <a:spLocks noGrp="1"/>
-          </p:cNvSpPr>
-          <p:nvPr>
-            <p:ph type="title"/>
-          </p:nvPr>
-        </p:nvSpPr>
-        <p:spPr/>
-        <p:txBody>
-          <a:bodyPr/>
-          <a:lstStyle/>
-          <a:p>
-            <a:r>
-              <a:rPr lang="de-DE" dirty="0" err="1"/>
-              <a:t>GitLab</a:t>
-            </a:r>
-            <a:r>
-              <a:rPr lang="de-DE" dirty="0"/>
-              <a:t> Runner</a:t>
-            </a:r>
-          </a:p>
-        </p:txBody>
-      </p:sp>
-      <p:sp>
-        <p:nvSpPr>
-          <p:cNvPr id="3" name="Inhaltsplatzhalter 2">
-            <a:extLst>
-              <a:ext uri="{FF2B5EF4-FFF2-40B4-BE49-F238E27FC236}">
-                <a16:creationId xmlns:a16="http://schemas.microsoft.com/office/drawing/2014/main" id="{3CE2D11A-801F-CE1E-A418-D35676D404C3}"/>
-              </a:ext>
-            </a:extLst>
-          </p:cNvPr>
-          <p:cNvSpPr>
-            <a:spLocks noGrp="1"/>
-          </p:cNvSpPr>
-          <p:nvPr>
-            <p:ph idx="1"/>
-          </p:nvPr>
-        </p:nvSpPr>
-        <p:spPr/>
-        <p:txBody>
-          <a:bodyPr/>
-          <a:lstStyle/>
-          <a:p>
-            <a:pPr marL="0" indent="0">
-              <a:buNone/>
-            </a:pPr>
-            <a:r>
-              <a:rPr lang="de-DE" b="1" dirty="0"/>
-              <a:t>Self-</a:t>
-            </a:r>
-            <a:r>
-              <a:rPr lang="de-DE" b="1" dirty="0" err="1"/>
-              <a:t>managed</a:t>
-            </a:r>
-            <a:r>
-              <a:rPr lang="de-DE" b="1" dirty="0"/>
-              <a:t> Runner</a:t>
-            </a:r>
-          </a:p>
-          <a:p>
-            <a:pPr>
-              <a:buFont typeface="Arial" panose="020B0604020202020204" pitchFamily="34" charset="0"/>
-              <a:buChar char="•"/>
-            </a:pPr>
-            <a:r>
-              <a:rPr lang="de-DE" dirty="0"/>
-              <a:t>Eigenen Project Runner benutzen</a:t>
-            </a:r>
-          </a:p>
-          <a:p>
-            <a:pPr>
-              <a:buFont typeface="Arial" panose="020B0604020202020204" pitchFamily="34" charset="0"/>
-              <a:buChar char="•"/>
-            </a:pPr>
-            <a:r>
-              <a:rPr lang="de-DE" dirty="0"/>
-              <a:t>Verschiedene Runner verwalten</a:t>
-            </a:r>
-          </a:p>
-          <a:p>
-            <a:pPr>
-              <a:buFont typeface="Arial" panose="020B0604020202020204" pitchFamily="34" charset="0"/>
-              <a:buChar char="•"/>
-            </a:pPr>
-            <a:r>
-              <a:rPr lang="de-DE" dirty="0"/>
-              <a:t>Runner registrieren</a:t>
-            </a:r>
-          </a:p>
-          <a:p>
-            <a:pPr>
-              <a:buFont typeface="Arial" panose="020B0604020202020204" pitchFamily="34" charset="0"/>
-              <a:buChar char="•"/>
-            </a:pPr>
-            <a:r>
-              <a:rPr lang="de-DE" dirty="0" err="1"/>
-              <a:t>Executors</a:t>
-            </a:r>
-            <a:endParaRPr lang="de-DE" dirty="0"/>
-          </a:p>
-          <a:p>
-            <a:pPr>
-              <a:buFont typeface="Arial" panose="020B0604020202020204" pitchFamily="34" charset="0"/>
-              <a:buChar char="•"/>
-            </a:pPr>
-            <a:r>
-              <a:rPr lang="de-DE" dirty="0"/>
-              <a:t>Runner konfigurieren</a:t>
-            </a:r>
-          </a:p>
-          <a:p>
-            <a:pPr>
-              <a:buFont typeface="Arial" panose="020B0604020202020204" pitchFamily="34" charset="0"/>
-              <a:buChar char="•"/>
-            </a:pPr>
-            <a:endParaRPr lang="de-DE" dirty="0"/>
-          </a:p>
-          <a:p>
-            <a:pPr marL="0" indent="0">
-              <a:buNone/>
-            </a:pPr>
-            <a:endParaRPr lang="de-DE" b="1" dirty="0"/>
-          </a:p>
-        </p:txBody>
-      </p:sp>
-    </p:spTree>
-    <p:extLst>
-      <p:ext uri="{BB962C8B-B14F-4D97-AF65-F5344CB8AC3E}">
-        <p14:creationId xmlns:p14="http://schemas.microsoft.com/office/powerpoint/2010/main" val="1130319195"/>
-      </p:ext>
-    </p:extLst>
-  </p:cSld>
-  <p:clrMapOvr>
-    <a:masterClrMapping/>
-  </p:clrMapOvr>
-</p:sld>
-</file>
-
-<file path=ppt/slides/slide120.xml><?xml version="1.0" encoding="utf-8"?>
+<file path=ppt/slides/slide121.xml><?xml version="1.0" encoding="utf-8"?>
 <p:sld xmlns:a="http://schemas.openxmlformats.org/drawingml/2006/main" xmlns:r="http://schemas.openxmlformats.org/officeDocument/2006/relationships" xmlns:p="http://schemas.openxmlformats.org/presentationml/2006/main">
   <p:cSld>
     <p:spTree>
@@ -21279,7 +21373,7 @@
 </p:sld>
 </file>
 
-<file path=ppt/slides/slide121.xml><?xml version="1.0" encoding="utf-8"?>
+<file path=ppt/slides/slide122.xml><?xml version="1.0" encoding="utf-8"?>
 <p:sld xmlns:a="http://schemas.openxmlformats.org/drawingml/2006/main" xmlns:r="http://schemas.openxmlformats.org/officeDocument/2006/relationships" xmlns:p="http://schemas.openxmlformats.org/presentationml/2006/main">
   <p:cSld>
     <p:spTree>
@@ -21429,7 +21523,7 @@
 </p:sld>
 </file>
 
-<file path=ppt/slides/slide122.xml><?xml version="1.0" encoding="utf-8"?>
+<file path=ppt/slides/slide123.xml><?xml version="1.0" encoding="utf-8"?>
 <p:sld xmlns:a="http://schemas.openxmlformats.org/drawingml/2006/main" xmlns:r="http://schemas.openxmlformats.org/officeDocument/2006/relationships" xmlns:p="http://schemas.openxmlformats.org/presentationml/2006/main">
   <p:cSld>
     <p:spTree>
@@ -21786,156 +21880,6 @@
 </p:sld>
 </file>
 
-<file path=ppt/slides/slide123.xml><?xml version="1.0" encoding="utf-8"?>
-<p:sld xmlns:a="http://schemas.openxmlformats.org/drawingml/2006/main" xmlns:r="http://schemas.openxmlformats.org/officeDocument/2006/relationships" xmlns:p="http://schemas.openxmlformats.org/presentationml/2006/main">
-  <p:cSld>
-    <p:spTree>
-      <p:nvGrpSpPr>
-        <p:cNvPr id="1" name=""/>
-        <p:cNvGrpSpPr/>
-        <p:nvPr/>
-      </p:nvGrpSpPr>
-      <p:grpSpPr>
-        <a:xfrm>
-          <a:off x="0" y="0"/>
-          <a:ext cx="0" cy="0"/>
-          <a:chOff x="0" y="0"/>
-          <a:chExt cx="0" cy="0"/>
-        </a:xfrm>
-      </p:grpSpPr>
-      <p:sp>
-        <p:nvSpPr>
-          <p:cNvPr id="2" name="Titel 1">
-            <a:extLst>
-              <a:ext uri="{FF2B5EF4-FFF2-40B4-BE49-F238E27FC236}">
-                <a16:creationId xmlns:a16="http://schemas.microsoft.com/office/drawing/2014/main" id="{6AA67486-2598-533D-4DB5-FC490AB10E2A}"/>
-              </a:ext>
-            </a:extLst>
-          </p:cNvPr>
-          <p:cNvSpPr>
-            <a:spLocks noGrp="1"/>
-          </p:cNvSpPr>
-          <p:nvPr>
-            <p:ph type="title"/>
-          </p:nvPr>
-        </p:nvSpPr>
-        <p:spPr/>
-        <p:txBody>
-          <a:bodyPr/>
-          <a:lstStyle/>
-          <a:p>
-            <a:r>
-              <a:rPr lang="de-DE" dirty="0"/>
-              <a:t>Container Registry</a:t>
-            </a:r>
-          </a:p>
-        </p:txBody>
-      </p:sp>
-      <p:sp>
-        <p:nvSpPr>
-          <p:cNvPr id="3" name="Inhaltsplatzhalter 2">
-            <a:extLst>
-              <a:ext uri="{FF2B5EF4-FFF2-40B4-BE49-F238E27FC236}">
-                <a16:creationId xmlns:a16="http://schemas.microsoft.com/office/drawing/2014/main" id="{CA708DD8-2C30-488D-3B3A-0BE38FE0786D}"/>
-              </a:ext>
-            </a:extLst>
-          </p:cNvPr>
-          <p:cNvSpPr>
-            <a:spLocks noGrp="1"/>
-          </p:cNvSpPr>
-          <p:nvPr>
-            <p:ph idx="1"/>
-          </p:nvPr>
-        </p:nvSpPr>
-        <p:spPr/>
-        <p:txBody>
-          <a:bodyPr/>
-          <a:lstStyle/>
-          <a:p>
-            <a:pPr>
-              <a:buFont typeface="Arial" panose="020B0604020202020204" pitchFamily="34" charset="0"/>
-              <a:buChar char="•"/>
-            </a:pPr>
-            <a:r>
-              <a:rPr lang="de-DE" dirty="0"/>
-              <a:t>Container Registry ansehen</a:t>
-            </a:r>
-          </a:p>
-          <a:p>
-            <a:pPr>
-              <a:buFont typeface="Arial" panose="020B0604020202020204" pitchFamily="34" charset="0"/>
-              <a:buChar char="•"/>
-            </a:pPr>
-            <a:r>
-              <a:rPr lang="de-DE" dirty="0"/>
-              <a:t>Tags eines bestimmten Container Image ansehen</a:t>
-            </a:r>
-          </a:p>
-          <a:p>
-            <a:pPr>
-              <a:buFont typeface="Arial" panose="020B0604020202020204" pitchFamily="34" charset="0"/>
-              <a:buChar char="•"/>
-            </a:pPr>
-            <a:r>
-              <a:rPr lang="de-DE" dirty="0"/>
-              <a:t>Container Images von der Container Registry nutzen</a:t>
-            </a:r>
-          </a:p>
-          <a:p>
-            <a:pPr>
-              <a:buFont typeface="Arial" panose="020B0604020202020204" pitchFamily="34" charset="0"/>
-              <a:buChar char="•"/>
-            </a:pPr>
-            <a:r>
-              <a:rPr lang="de-DE" u="sng" dirty="0"/>
-              <a:t>Naming Convention für Container Images</a:t>
-            </a:r>
-          </a:p>
-          <a:p>
-            <a:pPr>
-              <a:buFont typeface="Arial" panose="020B0604020202020204" pitchFamily="34" charset="0"/>
-              <a:buChar char="•"/>
-            </a:pPr>
-            <a:r>
-              <a:rPr lang="de-DE" dirty="0"/>
-              <a:t>Verschieben oder Umbenennen einer Container Registry</a:t>
-            </a:r>
-          </a:p>
-          <a:p>
-            <a:pPr>
-              <a:buFont typeface="Arial" panose="020B0604020202020204" pitchFamily="34" charset="0"/>
-              <a:buChar char="•"/>
-            </a:pPr>
-            <a:r>
-              <a:rPr lang="de-DE" dirty="0"/>
-              <a:t>Container Registry für ein Projekt deaktivieren</a:t>
-            </a:r>
-          </a:p>
-          <a:p>
-            <a:pPr>
-              <a:buFont typeface="Arial" panose="020B0604020202020204" pitchFamily="34" charset="0"/>
-              <a:buChar char="•"/>
-            </a:pPr>
-            <a:r>
-              <a:rPr lang="de-DE" dirty="0"/>
-              <a:t>Sichtbarkeit der Container Registry ändern</a:t>
-            </a:r>
-          </a:p>
-        </p:txBody>
-      </p:sp>
-    </p:spTree>
-    <p:extLst>
-      <p:ext uri="{BB962C8B-B14F-4D97-AF65-F5344CB8AC3E}">
-        <p14:creationId xmlns:p14="http://schemas.microsoft.com/office/powerpoint/2010/main" val="2645450426"/>
-      </p:ext>
-    </p:extLst>
-  </p:cSld>
-  <p:clrMapOvr>
-    <a:masterClrMapping/>
-  </p:clrMapOvr>
-</p:sld>
-</file>
-
 <file path=ppt/slides/slide124.xml><?xml version="1.0" encoding="utf-8"?>
 <p:sld xmlns:a="http://schemas.openxmlformats.org/drawingml/2006/main" xmlns:r="http://schemas.openxmlformats.org/officeDocument/2006/relationships" xmlns:p="http://schemas.openxmlformats.org/presentationml/2006/main">
   <p:cSld>
@@ -22002,11 +21946,42 @@
           <a:bodyPr/>
           <a:lstStyle/>
           <a:p>
-            <a:pPr marL="0" indent="0">
-              <a:buNone/>
-            </a:pPr>
-            <a:r>
-              <a:rPr lang="de-DE" b="1" dirty="0"/>
+            <a:pPr>
+              <a:buFont typeface="Arial" panose="020B0604020202020204" pitchFamily="34" charset="0"/>
+              <a:buChar char="•"/>
+            </a:pPr>
+            <a:r>
+              <a:rPr lang="de-DE" dirty="0"/>
+              <a:t>Container Registry ansehen</a:t>
+            </a:r>
+          </a:p>
+          <a:p>
+            <a:pPr>
+              <a:buFont typeface="Arial" panose="020B0604020202020204" pitchFamily="34" charset="0"/>
+              <a:buChar char="•"/>
+            </a:pPr>
+            <a:r>
+              <a:rPr lang="de-DE" dirty="0"/>
+              <a:t>Tags eines bestimmten Container Image ansehen</a:t>
+            </a:r>
+          </a:p>
+          <a:p>
+            <a:pPr>
+              <a:buFont typeface="Arial" panose="020B0604020202020204" pitchFamily="34" charset="0"/>
+              <a:buChar char="•"/>
+            </a:pPr>
+            <a:r>
+              <a:rPr lang="de-DE" dirty="0"/>
+              <a:t>Container Images von der Container Registry nutzen</a:t>
+            </a:r>
+          </a:p>
+          <a:p>
+            <a:pPr>
+              <a:buFont typeface="Arial" panose="020B0604020202020204" pitchFamily="34" charset="0"/>
+              <a:buChar char="•"/>
+            </a:pPr>
+            <a:r>
+              <a:rPr lang="de-DE" u="sng" dirty="0"/>
               <a:t>Naming Convention für Container Images</a:t>
             </a:r>
           </a:p>
@@ -22016,10 +21991,8 @@
               <a:buChar char="•"/>
             </a:pPr>
             <a:r>
-              <a:rPr lang="en-US" sz="2000" dirty="0">
-                <a:latin typeface="Consolas" panose="020B0609020204030204" pitchFamily="49" charset="0"/>
-              </a:rPr>
-              <a:t>&lt;registry server&gt;/&lt;namespace&gt;/&lt;project&gt;[/&lt;optional path&gt;]</a:t>
+              <a:rPr lang="de-DE" dirty="0"/>
+              <a:t>Verschieben oder Umbenennen einer Container Registry</a:t>
             </a:r>
           </a:p>
           <a:p>
@@ -22028,174 +22001,26 @@
               <a:buChar char="•"/>
             </a:pPr>
             <a:r>
-              <a:rPr lang="de-DE" b="0" i="0" dirty="0">
-                <a:solidFill>
-                  <a:srgbClr val="404040"/>
-                </a:solidFill>
-                <a:effectLst/>
-                <a:latin typeface="GitLab Mono"/>
-              </a:rPr>
-              <a:t>gitlab.example.com/</a:t>
-            </a:r>
-            <a:r>
-              <a:rPr lang="de-DE" b="0" i="0" dirty="0" err="1">
-                <a:solidFill>
-                  <a:srgbClr val="404040"/>
-                </a:solidFill>
-                <a:effectLst/>
-                <a:latin typeface="GitLab Mono"/>
-              </a:rPr>
-              <a:t>mynamespace</a:t>
-            </a:r>
-            <a:r>
-              <a:rPr lang="de-DE" b="0" i="0" dirty="0">
-                <a:solidFill>
-                  <a:srgbClr val="404040"/>
-                </a:solidFill>
-                <a:effectLst/>
-                <a:latin typeface="GitLab Mono"/>
-              </a:rPr>
-              <a:t>/</a:t>
-            </a:r>
-            <a:r>
-              <a:rPr lang="de-DE" b="0" i="0" dirty="0" err="1">
-                <a:solidFill>
-                  <a:srgbClr val="404040"/>
-                </a:solidFill>
-                <a:effectLst/>
-                <a:latin typeface="GitLab Mono"/>
-              </a:rPr>
-              <a:t>myproject</a:t>
-            </a:r>
-            <a:endParaRPr lang="en-US" dirty="0">
-              <a:latin typeface="Consolas" panose="020B0609020204030204" pitchFamily="49" charset="0"/>
-            </a:endParaRPr>
+              <a:rPr lang="de-DE" dirty="0"/>
+              <a:t>Container Registry für ein Projekt deaktivieren</a:t>
+            </a:r>
           </a:p>
           <a:p>
             <a:pPr>
               <a:buFont typeface="Arial" panose="020B0604020202020204" pitchFamily="34" charset="0"/>
               <a:buChar char="•"/>
             </a:pPr>
-            <a:endParaRPr lang="en-US" sz="2000" dirty="0">
-              <a:latin typeface="Consolas" panose="020B0609020204030204" pitchFamily="49" charset="0"/>
-            </a:endParaRPr>
-          </a:p>
-          <a:p>
-            <a:pPr>
-              <a:buFont typeface="Arial" panose="020B0604020202020204" pitchFamily="34" charset="0"/>
-              <a:buChar char="•"/>
-            </a:pPr>
-            <a:r>
-              <a:rPr lang="en-US" dirty="0"/>
-              <a:t>Project: </a:t>
-            </a:r>
-            <a:r>
-              <a:rPr lang="nl-NL" dirty="0"/>
-              <a:t>gitlab.ads.anderscore.com/trainings/gitlab</a:t>
-            </a:r>
-          </a:p>
-          <a:p>
-            <a:pPr>
-              <a:buFont typeface="Arial" panose="020B0604020202020204" pitchFamily="34" charset="0"/>
-              <a:buChar char="•"/>
-            </a:pPr>
-            <a:r>
-              <a:rPr lang="nl-NL" dirty="0"/>
-              <a:t>Image </a:t>
-            </a:r>
-            <a:r>
-              <a:rPr lang="nl-NL" dirty="0">
-                <a:sym typeface="Wingdings" panose="05000000000000000000" pitchFamily="2" charset="2"/>
-              </a:rPr>
-              <a:t> gitlab.ads.anderscore.com/trainings/gitlab</a:t>
-            </a:r>
-          </a:p>
-          <a:p>
-            <a:pPr>
-              <a:buFont typeface="Arial" panose="020B0604020202020204" pitchFamily="34" charset="0"/>
-              <a:buChar char="•"/>
-            </a:pPr>
-            <a:r>
-              <a:rPr lang="nl-NL" dirty="0">
-                <a:sym typeface="Wingdings" panose="05000000000000000000" pitchFamily="2" charset="2"/>
-              </a:rPr>
-              <a:t>Zusätzliche Namen ans Ende des Images sind erlaubt</a:t>
-            </a:r>
-          </a:p>
-          <a:p>
-            <a:pPr lvl="1">
-              <a:buFont typeface="Arial" panose="020B0604020202020204" pitchFamily="34" charset="0"/>
-              <a:buChar char="•"/>
-            </a:pPr>
-            <a:r>
-              <a:rPr lang="nl-NL" sz="1800" dirty="0">
-                <a:sym typeface="Wingdings" panose="05000000000000000000" pitchFamily="2" charset="2"/>
-              </a:rPr>
-              <a:t>Aber: nur bis zu zwei Ebenen tief!</a:t>
-            </a:r>
-          </a:p>
-          <a:p>
-            <a:pPr>
-              <a:buFont typeface="Arial" panose="020B0604020202020204" pitchFamily="34" charset="0"/>
-              <a:buChar char="•"/>
-            </a:pPr>
-            <a:r>
-              <a:rPr lang="nl-NL" dirty="0">
-                <a:sym typeface="Wingdings" panose="05000000000000000000" pitchFamily="2" charset="2"/>
-              </a:rPr>
-              <a:t>Beispiele:</a:t>
-            </a:r>
-          </a:p>
-          <a:p>
-            <a:pPr lvl="1">
-              <a:buFont typeface="Arial" panose="020B0604020202020204" pitchFamily="34" charset="0"/>
-              <a:buChar char="•"/>
-            </a:pPr>
-            <a:r>
-              <a:rPr lang="nl-NL" sz="1800" dirty="0">
-                <a:sym typeface="Wingdings" panose="05000000000000000000" pitchFamily="2" charset="2"/>
-              </a:rPr>
-              <a:t>gitlab.ads.anderscore.com/trainings/gitlab:some-tag</a:t>
-            </a:r>
-          </a:p>
-          <a:p>
-            <a:pPr lvl="1">
-              <a:buFont typeface="Arial" panose="020B0604020202020204" pitchFamily="34" charset="0"/>
-              <a:buChar char="•"/>
-            </a:pPr>
-            <a:r>
-              <a:rPr lang="nl-NL" sz="1800" dirty="0">
-                <a:sym typeface="Wingdings" panose="05000000000000000000" pitchFamily="2" charset="2"/>
-              </a:rPr>
-              <a:t>gitlab.ads.anderscore.com/trainings/gitlab/image:latest</a:t>
-            </a:r>
-          </a:p>
-          <a:p>
-            <a:pPr lvl="1">
-              <a:buFont typeface="Arial" panose="020B0604020202020204" pitchFamily="34" charset="0"/>
-              <a:buChar char="•"/>
-            </a:pPr>
-            <a:r>
-              <a:rPr lang="nl-NL" sz="1800" dirty="0">
-                <a:sym typeface="Wingdings" panose="05000000000000000000" pitchFamily="2" charset="2"/>
-              </a:rPr>
-              <a:t>gitlab.ads.anderscore.com/trainings/gitlab/my/image:rc1</a:t>
-            </a:r>
-            <a:endParaRPr lang="nl-NL" sz="1800" dirty="0"/>
-          </a:p>
-          <a:p>
-            <a:pPr lvl="1">
-              <a:buFont typeface="Arial" panose="020B0604020202020204" pitchFamily="34" charset="0"/>
-              <a:buChar char="•"/>
-            </a:pPr>
-            <a:endParaRPr lang="en-US" sz="1600" dirty="0"/>
+            <a:r>
+              <a:rPr lang="de-DE" dirty="0"/>
+              <a:t>Sichtbarkeit der Container Registry ändern</a:t>
+            </a:r>
           </a:p>
         </p:txBody>
       </p:sp>
     </p:spTree>
     <p:extLst>
       <p:ext uri="{BB962C8B-B14F-4D97-AF65-F5344CB8AC3E}">
-        <p14:creationId xmlns:p14="http://schemas.microsoft.com/office/powerpoint/2010/main" val="1335975550"/>
+        <p14:creationId xmlns:p14="http://schemas.microsoft.com/office/powerpoint/2010/main" val="2645450426"/>
       </p:ext>
     </p:extLst>
   </p:cSld>
@@ -22271,13 +22096,24 @@
           <a:bodyPr/>
           <a:lstStyle/>
           <a:p>
+            <a:pPr marL="0" indent="0">
+              <a:buNone/>
+            </a:pPr>
+            <a:r>
+              <a:rPr lang="de-DE" b="1" dirty="0"/>
+              <a:t>Naming Convention für Container Images</a:t>
+            </a:r>
+          </a:p>
+          <a:p>
             <a:pPr>
               <a:buFont typeface="Arial" panose="020B0604020202020204" pitchFamily="34" charset="0"/>
               <a:buChar char="•"/>
             </a:pPr>
             <a:r>
-              <a:rPr lang="de-DE" dirty="0"/>
-              <a:t>Container Registry ansehen</a:t>
+              <a:rPr lang="en-US" sz="2000" dirty="0">
+                <a:latin typeface="Consolas" panose="020B0609020204030204" pitchFamily="49" charset="0"/>
+              </a:rPr>
+              <a:t>&lt;registry server&gt;/&lt;namespace&gt;/&lt;project&gt;[/&lt;optional path&gt;]</a:t>
             </a:r>
           </a:p>
           <a:p>
@@ -22286,19 +22122,57 @@
               <a:buChar char="•"/>
             </a:pPr>
             <a:r>
-              <a:rPr lang="de-DE" dirty="0"/>
-              <a:t>Tags eines bestimmten Container Image ansehen</a:t>
-            </a:r>
+              <a:rPr lang="de-DE" b="0" i="0" dirty="0">
+                <a:solidFill>
+                  <a:srgbClr val="404040"/>
+                </a:solidFill>
+                <a:effectLst/>
+                <a:latin typeface="GitLab Mono"/>
+              </a:rPr>
+              <a:t>gitlab.example.com/</a:t>
+            </a:r>
+            <a:r>
+              <a:rPr lang="de-DE" b="0" i="0" dirty="0" err="1">
+                <a:solidFill>
+                  <a:srgbClr val="404040"/>
+                </a:solidFill>
+                <a:effectLst/>
+                <a:latin typeface="GitLab Mono"/>
+              </a:rPr>
+              <a:t>mynamespace</a:t>
+            </a:r>
+            <a:r>
+              <a:rPr lang="de-DE" b="0" i="0" dirty="0">
+                <a:solidFill>
+                  <a:srgbClr val="404040"/>
+                </a:solidFill>
+                <a:effectLst/>
+                <a:latin typeface="GitLab Mono"/>
+              </a:rPr>
+              <a:t>/</a:t>
+            </a:r>
+            <a:r>
+              <a:rPr lang="de-DE" b="0" i="0" dirty="0" err="1">
+                <a:solidFill>
+                  <a:srgbClr val="404040"/>
+                </a:solidFill>
+                <a:effectLst/>
+                <a:latin typeface="GitLab Mono"/>
+              </a:rPr>
+              <a:t>myproject</a:t>
+            </a:r>
+            <a:endParaRPr lang="en-US" dirty="0">
+              <a:latin typeface="Consolas" panose="020B0609020204030204" pitchFamily="49" charset="0"/>
+            </a:endParaRPr>
           </a:p>
           <a:p>
             <a:pPr>
               <a:buFont typeface="Arial" panose="020B0604020202020204" pitchFamily="34" charset="0"/>
               <a:buChar char="•"/>
             </a:pPr>
-            <a:r>
-              <a:rPr lang="de-DE" dirty="0"/>
-              <a:t>Container Images von der Container Registry nutzen</a:t>
-            </a:r>
+            <a:endParaRPr lang="en-US" sz="2000" dirty="0">
+              <a:latin typeface="Consolas" panose="020B0609020204030204" pitchFamily="49" charset="0"/>
+            </a:endParaRPr>
           </a:p>
           <a:p>
             <a:pPr>
@@ -22306,8 +22180,12 @@
               <a:buChar char="•"/>
             </a:pPr>
             <a:r>
-              <a:rPr lang="de-DE" dirty="0"/>
-              <a:t>Naming Convention für Container Images</a:t>
+              <a:rPr lang="en-US" dirty="0"/>
+              <a:t>Project: </a:t>
+            </a:r>
+            <a:r>
+              <a:rPr lang="nl-NL" dirty="0"/>
+              <a:t>gitlab.ads.anderscore.com/trainings/gitlab</a:t>
             </a:r>
           </a:p>
           <a:p>
@@ -22316,8 +22194,14 @@
               <a:buChar char="•"/>
             </a:pPr>
             <a:r>
-              <a:rPr lang="de-DE" u="sng" dirty="0"/>
-              <a:t>Verschieben oder Umbenennen einer Container Registry</a:t>
+              <a:rPr lang="nl-NL" dirty="0"/>
+              <a:t>Image </a:t>
+            </a:r>
+            <a:r>
+              <a:rPr lang="nl-NL" dirty="0">
+                <a:sym typeface="Wingdings" panose="05000000000000000000" pitchFamily="2" charset="2"/>
+              </a:rPr>
+              <a:t> gitlab.ads.anderscore.com/trainings/gitlab</a:t>
             </a:r>
           </a:p>
           <a:p>
@@ -22326,8 +22210,22 @@
               <a:buChar char="•"/>
             </a:pPr>
             <a:r>
-              <a:rPr lang="de-DE" dirty="0"/>
-              <a:t>Container Registry für ein Projekt deaktivieren</a:t>
+              <a:rPr lang="nl-NL" dirty="0">
+                <a:sym typeface="Wingdings" panose="05000000000000000000" pitchFamily="2" charset="2"/>
+              </a:rPr>
+              <a:t>Zusätzliche Namen ans Ende des Images sind erlaubt</a:t>
+            </a:r>
+          </a:p>
+          <a:p>
+            <a:pPr lvl="1">
+              <a:buFont typeface="Arial" panose="020B0604020202020204" pitchFamily="34" charset="0"/>
+              <a:buChar char="•"/>
+            </a:pPr>
+            <a:r>
+              <a:rPr lang="nl-NL" sz="1800" dirty="0">
+                <a:sym typeface="Wingdings" panose="05000000000000000000" pitchFamily="2" charset="2"/>
+              </a:rPr>
+              <a:t>Aber: nur bis zu zwei Ebenen tief!</a:t>
             </a:r>
           </a:p>
           <a:p>
@@ -22336,16 +22234,62 @@
               <a:buChar char="•"/>
             </a:pPr>
             <a:r>
-              <a:rPr lang="de-DE" dirty="0"/>
-              <a:t>Sichtbarkeit der Container Registry ändern</a:t>
-            </a:r>
+              <a:rPr lang="nl-NL" dirty="0">
+                <a:sym typeface="Wingdings" panose="05000000000000000000" pitchFamily="2" charset="2"/>
+              </a:rPr>
+              <a:t>Beispiele:</a:t>
+            </a:r>
+          </a:p>
+          <a:p>
+            <a:pPr lvl="1">
+              <a:buFont typeface="Arial" panose="020B0604020202020204" pitchFamily="34" charset="0"/>
+              <a:buChar char="•"/>
+            </a:pPr>
+            <a:r>
+              <a:rPr lang="nl-NL" sz="1800" dirty="0">
+                <a:sym typeface="Wingdings" panose="05000000000000000000" pitchFamily="2" charset="2"/>
+              </a:rPr>
+              <a:t>gitlab.ads.anderscore.com/trainings/gitlab:some-tag</a:t>
+            </a:r>
+          </a:p>
+          <a:p>
+            <a:pPr lvl="1">
+              <a:buFont typeface="Arial" panose="020B0604020202020204" pitchFamily="34" charset="0"/>
+              <a:buChar char="•"/>
+            </a:pPr>
+            <a:r>
+              <a:rPr lang="nl-NL" sz="1800" dirty="0">
+                <a:sym typeface="Wingdings" panose="05000000000000000000" pitchFamily="2" charset="2"/>
+              </a:rPr>
+              <a:t>gitlab.ads.anderscore.com/trainings/gitlab/image:latest</a:t>
+            </a:r>
+          </a:p>
+          <a:p>
+            <a:pPr lvl="1">
+              <a:buFont typeface="Arial" panose="020B0604020202020204" pitchFamily="34" charset="0"/>
+              <a:buChar char="•"/>
+            </a:pPr>
+            <a:r>
+              <a:rPr lang="nl-NL" sz="1800" dirty="0">
+                <a:sym typeface="Wingdings" panose="05000000000000000000" pitchFamily="2" charset="2"/>
+              </a:rPr>
+              <a:t>gitlab.ads.anderscore.com/trainings/gitlab/my/image:rc1</a:t>
+            </a:r>
+            <a:endParaRPr lang="nl-NL" sz="1800" dirty="0"/>
+          </a:p>
+          <a:p>
+            <a:pPr lvl="1">
+              <a:buFont typeface="Arial" panose="020B0604020202020204" pitchFamily="34" charset="0"/>
+              <a:buChar char="•"/>
+            </a:pPr>
+            <a:endParaRPr lang="en-US" sz="1600" dirty="0"/>
           </a:p>
         </p:txBody>
       </p:sp>
     </p:spTree>
     <p:extLst>
       <p:ext uri="{BB962C8B-B14F-4D97-AF65-F5344CB8AC3E}">
-        <p14:creationId xmlns:p14="http://schemas.microsoft.com/office/powerpoint/2010/main" val="1588285644"/>
+        <p14:creationId xmlns:p14="http://schemas.microsoft.com/office/powerpoint/2010/main" val="1335975550"/>
       </p:ext>
     </p:extLst>
   </p:cSld>
@@ -22421,11 +22365,52 @@
           <a:bodyPr/>
           <a:lstStyle/>
           <a:p>
-            <a:pPr marL="0" indent="0">
-              <a:buNone/>
-            </a:pPr>
-            <a:r>
-              <a:rPr lang="de-DE" b="1" dirty="0"/>
+            <a:pPr>
+              <a:buFont typeface="Arial" panose="020B0604020202020204" pitchFamily="34" charset="0"/>
+              <a:buChar char="•"/>
+            </a:pPr>
+            <a:r>
+              <a:rPr lang="de-DE" dirty="0"/>
+              <a:t>Container Registry ansehen</a:t>
+            </a:r>
+          </a:p>
+          <a:p>
+            <a:pPr>
+              <a:buFont typeface="Arial" panose="020B0604020202020204" pitchFamily="34" charset="0"/>
+              <a:buChar char="•"/>
+            </a:pPr>
+            <a:r>
+              <a:rPr lang="de-DE" dirty="0"/>
+              <a:t>Tags eines bestimmten Container Image ansehen</a:t>
+            </a:r>
+          </a:p>
+          <a:p>
+            <a:pPr>
+              <a:buFont typeface="Arial" panose="020B0604020202020204" pitchFamily="34" charset="0"/>
+              <a:buChar char="•"/>
+            </a:pPr>
+            <a:r>
+              <a:rPr lang="de-DE" dirty="0"/>
+              <a:t>Container Images von der Container Registry nutzen</a:t>
+            </a:r>
+          </a:p>
+          <a:p>
+            <a:pPr>
+              <a:buFont typeface="Arial" panose="020B0604020202020204" pitchFamily="34" charset="0"/>
+              <a:buChar char="•"/>
+            </a:pPr>
+            <a:r>
+              <a:rPr lang="de-DE" dirty="0"/>
+              <a:t>Naming Convention für Container Images</a:t>
+            </a:r>
+          </a:p>
+          <a:p>
+            <a:pPr>
+              <a:buFont typeface="Arial" panose="020B0604020202020204" pitchFamily="34" charset="0"/>
+              <a:buChar char="•"/>
+            </a:pPr>
+            <a:r>
+              <a:rPr lang="de-DE" u="sng" dirty="0"/>
               <a:t>Verschieben oder Umbenennen einer Container Registry</a:t>
             </a:r>
           </a:p>
@@ -22436,25 +22421,7 @@
             </a:pPr>
             <a:r>
               <a:rPr lang="de-DE" dirty="0"/>
-              <a:t>Der Pfad der Registry </a:t>
-            </a:r>
-            <a:r>
-              <a:rPr lang="de-DE" dirty="0" err="1"/>
-              <a:t>matched</a:t>
-            </a:r>
-            <a:r>
-              <a:rPr lang="de-DE" dirty="0"/>
-              <a:t> immer dem zugehörigen Projekt</a:t>
-            </a:r>
-          </a:p>
-          <a:p>
-            <a:pPr lvl="1">
-              <a:buFont typeface="Arial" panose="020B0604020202020204" pitchFamily="34" charset="0"/>
-              <a:buChar char="•"/>
-            </a:pPr>
-            <a:r>
-              <a:rPr lang="de-DE" dirty="0"/>
-              <a:t>Daher muss man entweder das Projekt verschieben oder umbenennen</a:t>
+              <a:t>Container Registry für ein Projekt deaktivieren</a:t>
             </a:r>
           </a:p>
           <a:p>
@@ -22464,85 +22431,15 @@
             </a:pPr>
             <a:r>
               <a:rPr lang="de-DE" dirty="0"/>
-              <a:t>Wird von GitLab.com gehosteten Instanzen unterstützt</a:t>
-            </a:r>
-          </a:p>
-          <a:p>
-            <a:pPr>
-              <a:buFont typeface="Arial" panose="020B0604020202020204" pitchFamily="34" charset="0"/>
-              <a:buChar char="•"/>
-            </a:pPr>
-            <a:r>
-              <a:rPr lang="de-DE" dirty="0"/>
-              <a:t>Self-</a:t>
-            </a:r>
-            <a:r>
-              <a:rPr lang="de-DE" dirty="0" err="1"/>
-              <a:t>managed</a:t>
-            </a:r>
-            <a:r>
-              <a:rPr lang="de-DE" dirty="0"/>
-              <a:t>:</a:t>
-            </a:r>
-          </a:p>
-          <a:p>
-            <a:pPr lvl="1">
-              <a:buFont typeface="Arial" panose="020B0604020202020204" pitchFamily="34" charset="0"/>
-              <a:buChar char="•"/>
-            </a:pPr>
-            <a:r>
-              <a:rPr lang="de-DE" dirty="0"/>
-              <a:t>Alle Container Images müssen vorher gelöscht werden</a:t>
-            </a:r>
-          </a:p>
-          <a:p>
-            <a:pPr lvl="1">
-              <a:buFont typeface="Arial" panose="020B0604020202020204" pitchFamily="34" charset="0"/>
-              <a:buChar char="•"/>
-            </a:pPr>
-            <a:r>
-              <a:rPr lang="de-DE" dirty="0">
-                <a:hlinkClick r:id="rId3"/>
-              </a:rPr>
-              <a:t>https://gitlab.com/gitlab-org/gitlab/-/issues/18383#possible-workaround</a:t>
-            </a:r>
-            <a:endParaRPr lang="de-DE" dirty="0"/>
-          </a:p>
-          <a:p>
-            <a:pPr lvl="1">
-              <a:buFont typeface="Arial" panose="020B0604020202020204" pitchFamily="34" charset="0"/>
-              <a:buChar char="•"/>
-            </a:pPr>
-            <a:r>
-              <a:rPr lang="de-DE" dirty="0">
-                <a:hlinkClick r:id="rId4"/>
-              </a:rPr>
-              <a:t>https://gitlab.com/groups/gitlab-org/-/epics/9459</a:t>
-            </a:r>
-            <a:r>
-              <a:rPr lang="de-DE" dirty="0"/>
-              <a:t> </a:t>
-            </a:r>
-          </a:p>
-          <a:p>
-            <a:pPr>
-              <a:buFont typeface="Arial" panose="020B0604020202020204" pitchFamily="34" charset="0"/>
-              <a:buChar char="•"/>
-            </a:pPr>
-            <a:endParaRPr lang="de-DE" dirty="0"/>
-          </a:p>
-          <a:p>
-            <a:pPr marL="0" indent="0">
-              <a:buNone/>
-            </a:pPr>
-            <a:endParaRPr lang="de-DE" dirty="0"/>
+              <a:t>Sichtbarkeit der Container Registry ändern</a:t>
+            </a:r>
           </a:p>
         </p:txBody>
       </p:sp>
     </p:spTree>
     <p:extLst>
       <p:ext uri="{BB962C8B-B14F-4D97-AF65-F5344CB8AC3E}">
-        <p14:creationId xmlns:p14="http://schemas.microsoft.com/office/powerpoint/2010/main" val="4269851796"/>
+        <p14:creationId xmlns:p14="http://schemas.microsoft.com/office/powerpoint/2010/main" val="1588285644"/>
       </p:ext>
     </p:extLst>
   </p:cSld>
@@ -22618,13 +22515,40 @@
           <a:bodyPr/>
           <a:lstStyle/>
           <a:p>
+            <a:pPr marL="0" indent="0">
+              <a:buNone/>
+            </a:pPr>
+            <a:r>
+              <a:rPr lang="de-DE" b="1" dirty="0"/>
+              <a:t>Verschieben oder Umbenennen einer Container Registry</a:t>
+            </a:r>
+          </a:p>
+          <a:p>
             <a:pPr>
               <a:buFont typeface="Arial" panose="020B0604020202020204" pitchFamily="34" charset="0"/>
               <a:buChar char="•"/>
             </a:pPr>
             <a:r>
               <a:rPr lang="de-DE" dirty="0"/>
-              <a:t>Container Registry ansehen</a:t>
+              <a:t>Der Pfad der Registry </a:t>
+            </a:r>
+            <a:r>
+              <a:rPr lang="de-DE" dirty="0" err="1"/>
+              <a:t>matched</a:t>
+            </a:r>
+            <a:r>
+              <a:rPr lang="de-DE" dirty="0"/>
+              <a:t> immer dem zugehörigen Projekt</a:t>
+            </a:r>
+          </a:p>
+          <a:p>
+            <a:pPr lvl="1">
+              <a:buFont typeface="Arial" panose="020B0604020202020204" pitchFamily="34" charset="0"/>
+              <a:buChar char="•"/>
+            </a:pPr>
+            <a:r>
+              <a:rPr lang="de-DE" dirty="0"/>
+              <a:t>Daher muss man entweder das Projekt verschieben oder umbenennen</a:t>
             </a:r>
           </a:p>
           <a:p>
@@ -22634,7 +22558,7 @@
             </a:pPr>
             <a:r>
               <a:rPr lang="de-DE" dirty="0"/>
-              <a:t>Tags eines bestimmten Container Image ansehen</a:t>
+              <a:t>Wird von GitLab.com gehosteten Instanzen unterstützt</a:t>
             </a:r>
           </a:p>
           <a:p>
@@ -22644,7 +22568,54 @@
             </a:pPr>
             <a:r>
               <a:rPr lang="de-DE" dirty="0"/>
-              <a:t>Container Images von der Container Registry nutzen</a:t>
+              <a:t>Self-</a:t>
+            </a:r>
+            <a:r>
+              <a:rPr lang="de-DE" dirty="0" err="1"/>
+              <a:t>managed</a:t>
+            </a:r>
+            <a:r>
+              <a:rPr lang="de-DE" dirty="0"/>
+              <a:t>:</a:t>
+            </a:r>
+          </a:p>
+          <a:p>
+            <a:pPr lvl="1">
+              <a:buFont typeface="Arial" panose="020B0604020202020204" pitchFamily="34" charset="0"/>
+              <a:buChar char="•"/>
+            </a:pPr>
+            <a:r>
+              <a:rPr lang="de-DE" dirty="0"/>
+              <a:t>Alle Container Images müssen vorher gelöscht werden</a:t>
+            </a:r>
+          </a:p>
+          <a:p>
+            <a:pPr lvl="1">
+              <a:buFont typeface="Arial" panose="020B0604020202020204" pitchFamily="34" charset="0"/>
+              <a:buChar char="•"/>
+            </a:pPr>
+            <a:r>
+              <a:rPr lang="de-DE" dirty="0">
+                <a:hlinkClick r:id="rId3"/>
+              </a:rPr>
+              <a:t>https://gitlab.com/gitlab-org/gitlab/-/issues/18383#possible-workaround</a:t>
+            </a:r>
+            <a:endParaRPr lang="de-DE" dirty="0"/>
+          </a:p>
+          <a:p>
+            <a:pPr lvl="1">
+              <a:buFont typeface="Arial" panose="020B0604020202020204" pitchFamily="34" charset="0"/>
+              <a:buChar char="•"/>
+            </a:pPr>
+            <a:r>
+              <a:rPr lang="de-DE" dirty="0">
+                <a:hlinkClick r:id="rId4"/>
+              </a:rPr>
+              <a:t>https://gitlab.com/groups/gitlab-org/-/epics/9459</a:t>
+            </a:r>
+            <a:r>
+              <a:rPr lang="de-DE" dirty="0"/>
+              <a:t> </a:t>
             </a:r>
           </a:p>
           <a:p>
@@ -22652,47 +22623,20 @@
               <a:buFont typeface="Arial" panose="020B0604020202020204" pitchFamily="34" charset="0"/>
               <a:buChar char="•"/>
             </a:pPr>
-            <a:r>
-              <a:rPr lang="de-DE" dirty="0"/>
-              <a:t>Naming Convention für Container Images</a:t>
-            </a:r>
-          </a:p>
-          <a:p>
-            <a:pPr>
-              <a:buFont typeface="Arial" panose="020B0604020202020204" pitchFamily="34" charset="0"/>
-              <a:buChar char="•"/>
-            </a:pPr>
-            <a:r>
-              <a:rPr lang="de-DE" dirty="0"/>
-              <a:t>Verschieben oder Umbenennen einer Container Registry</a:t>
-            </a:r>
-          </a:p>
-          <a:p>
-            <a:pPr>
-              <a:buFont typeface="Arial" panose="020B0604020202020204" pitchFamily="34" charset="0"/>
-              <a:buChar char="•"/>
-            </a:pPr>
-            <a:r>
-              <a:rPr lang="de-DE" u="sng" dirty="0"/>
-              <a:t>Container Registry für ein Projekt deaktivieren</a:t>
-            </a:r>
-          </a:p>
-          <a:p>
-            <a:pPr>
-              <a:buFont typeface="Arial" panose="020B0604020202020204" pitchFamily="34" charset="0"/>
-              <a:buChar char="•"/>
-            </a:pPr>
-            <a:r>
-              <a:rPr lang="de-DE" dirty="0"/>
-              <a:t>Sichtbarkeit der Container Registry ändern</a:t>
-            </a:r>
+            <a:endParaRPr lang="de-DE" dirty="0"/>
+          </a:p>
+          <a:p>
+            <a:pPr marL="0" indent="0">
+              <a:buNone/>
+            </a:pPr>
+            <a:endParaRPr lang="de-DE" dirty="0"/>
           </a:p>
         </p:txBody>
       </p:sp>
     </p:spTree>
     <p:extLst>
       <p:ext uri="{BB962C8B-B14F-4D97-AF65-F5344CB8AC3E}">
-        <p14:creationId xmlns:p14="http://schemas.microsoft.com/office/powerpoint/2010/main" val="2844639609"/>
+        <p14:creationId xmlns:p14="http://schemas.microsoft.com/office/powerpoint/2010/main" val="4269851796"/>
       </p:ext>
     </p:extLst>
   </p:cSld>
@@ -22768,11 +22712,62 @@
           <a:bodyPr/>
           <a:lstStyle/>
           <a:p>
-            <a:pPr marL="0" indent="0">
-              <a:buNone/>
-            </a:pPr>
-            <a:r>
-              <a:rPr lang="de-DE" b="1" dirty="0"/>
+            <a:pPr>
+              <a:buFont typeface="Arial" panose="020B0604020202020204" pitchFamily="34" charset="0"/>
+              <a:buChar char="•"/>
+            </a:pPr>
+            <a:r>
+              <a:rPr lang="de-DE" dirty="0"/>
+              <a:t>Container Registry ansehen</a:t>
+            </a:r>
+          </a:p>
+          <a:p>
+            <a:pPr>
+              <a:buFont typeface="Arial" panose="020B0604020202020204" pitchFamily="34" charset="0"/>
+              <a:buChar char="•"/>
+            </a:pPr>
+            <a:r>
+              <a:rPr lang="de-DE" dirty="0"/>
+              <a:t>Tags eines bestimmten Container Image ansehen</a:t>
+            </a:r>
+          </a:p>
+          <a:p>
+            <a:pPr>
+              <a:buFont typeface="Arial" panose="020B0604020202020204" pitchFamily="34" charset="0"/>
+              <a:buChar char="•"/>
+            </a:pPr>
+            <a:r>
+              <a:rPr lang="de-DE" dirty="0"/>
+              <a:t>Container Images von der Container Registry nutzen</a:t>
+            </a:r>
+          </a:p>
+          <a:p>
+            <a:pPr>
+              <a:buFont typeface="Arial" panose="020B0604020202020204" pitchFamily="34" charset="0"/>
+              <a:buChar char="•"/>
+            </a:pPr>
+            <a:r>
+              <a:rPr lang="de-DE" dirty="0"/>
+              <a:t>Naming Convention für Container Images</a:t>
+            </a:r>
+          </a:p>
+          <a:p>
+            <a:pPr>
+              <a:buFont typeface="Arial" panose="020B0604020202020204" pitchFamily="34" charset="0"/>
+              <a:buChar char="•"/>
+            </a:pPr>
+            <a:r>
+              <a:rPr lang="de-DE" dirty="0"/>
+              <a:t>Verschieben oder Umbenennen einer Container Registry</a:t>
+            </a:r>
+          </a:p>
+          <a:p>
+            <a:pPr>
+              <a:buFont typeface="Arial" panose="020B0604020202020204" pitchFamily="34" charset="0"/>
+              <a:buChar char="•"/>
+            </a:pPr>
+            <a:r>
+              <a:rPr lang="de-DE" u="sng" dirty="0"/>
               <a:t>Container Registry für ein Projekt deaktivieren</a:t>
             </a:r>
           </a:p>
@@ -22783,170 +22778,15 @@
             </a:pPr>
             <a:r>
               <a:rPr lang="de-DE" dirty="0"/>
-              <a:t>Default: </a:t>
-            </a:r>
-            <a:r>
-              <a:rPr lang="de-DE" dirty="0" err="1"/>
-              <a:t>enabled</a:t>
-            </a:r>
-            <a:endParaRPr lang="de-DE" dirty="0"/>
-          </a:p>
-          <a:p>
-            <a:pPr>
-              <a:buFont typeface="Arial" panose="020B0604020202020204" pitchFamily="34" charset="0"/>
-              <a:buChar char="•"/>
-            </a:pPr>
-            <a:endParaRPr lang="de-DE" dirty="0"/>
-          </a:p>
-          <a:p>
-            <a:pPr marL="457200" indent="-457200">
-              <a:buFont typeface="+mj-lt"/>
-              <a:buAutoNum type="arabicPeriod"/>
-            </a:pPr>
-            <a:r>
-              <a:rPr lang="de-DE" dirty="0"/>
-              <a:t>Gewünschtes Projekt in </a:t>
-            </a:r>
-            <a:r>
-              <a:rPr lang="de-DE" dirty="0" err="1"/>
-              <a:t>GitLab</a:t>
-            </a:r>
-            <a:r>
-              <a:rPr lang="de-DE" dirty="0"/>
-              <a:t> auswählen</a:t>
-            </a:r>
-          </a:p>
-          <a:p>
-            <a:pPr marL="457200" indent="-457200">
-              <a:buFont typeface="+mj-lt"/>
-              <a:buAutoNum type="arabicPeriod"/>
-            </a:pPr>
-            <a:r>
-              <a:rPr lang="de-DE" dirty="0"/>
-              <a:t>„Settings“ </a:t>
-            </a:r>
-            <a:r>
-              <a:rPr lang="de-DE" dirty="0">
-                <a:sym typeface="Wingdings" panose="05000000000000000000" pitchFamily="2" charset="2"/>
-              </a:rPr>
-              <a:t> „General“</a:t>
-            </a:r>
-          </a:p>
-          <a:p>
-            <a:pPr marL="457200" indent="-457200">
-              <a:buFont typeface="+mj-lt"/>
-              <a:buAutoNum type="arabicPeriod"/>
-            </a:pPr>
-            <a:r>
-              <a:rPr lang="de-DE" dirty="0"/>
-              <a:t>„</a:t>
-            </a:r>
-            <a:r>
-              <a:rPr lang="de-DE" dirty="0" err="1"/>
-              <a:t>Visibility</a:t>
-            </a:r>
-            <a:r>
-              <a:rPr lang="de-DE" dirty="0"/>
-              <a:t>, </a:t>
-            </a:r>
-            <a:r>
-              <a:rPr lang="de-DE" dirty="0" err="1"/>
-              <a:t>project</a:t>
-            </a:r>
-            <a:r>
-              <a:rPr lang="de-DE" dirty="0"/>
-              <a:t> </a:t>
-            </a:r>
-            <a:r>
-              <a:rPr lang="de-DE" dirty="0" err="1"/>
-              <a:t>features</a:t>
-            </a:r>
-            <a:r>
-              <a:rPr lang="de-DE" dirty="0"/>
-              <a:t>, </a:t>
-            </a:r>
-            <a:r>
-              <a:rPr lang="de-DE" dirty="0" err="1"/>
-              <a:t>permissions</a:t>
-            </a:r>
-            <a:r>
-              <a:rPr lang="de-DE" dirty="0"/>
-              <a:t>“ aufklappen</a:t>
-            </a:r>
-          </a:p>
-          <a:p>
-            <a:pPr marL="457200" indent="-457200">
-              <a:buFont typeface="+mj-lt"/>
-              <a:buAutoNum type="arabicPeriod"/>
-            </a:pPr>
-            <a:r>
-              <a:rPr lang="de-DE" dirty="0">
-                <a:sym typeface="Wingdings" panose="05000000000000000000" pitchFamily="2" charset="2"/>
-              </a:rPr>
-              <a:t>„Container </a:t>
-            </a:r>
-            <a:r>
-              <a:rPr lang="de-DE" dirty="0" err="1">
-                <a:sym typeface="Wingdings" panose="05000000000000000000" pitchFamily="2" charset="2"/>
-              </a:rPr>
-              <a:t>registry</a:t>
-            </a:r>
-            <a:r>
-              <a:rPr lang="de-DE" dirty="0">
-                <a:sym typeface="Wingdings" panose="05000000000000000000" pitchFamily="2" charset="2"/>
-              </a:rPr>
-              <a:t>“ deaktivieren</a:t>
-            </a:r>
-          </a:p>
-          <a:p>
-            <a:pPr marL="457200" indent="-457200">
-              <a:buFont typeface="+mj-lt"/>
-              <a:buAutoNum type="arabicPeriod"/>
-            </a:pPr>
-            <a:r>
-              <a:rPr lang="de-DE" dirty="0">
-                <a:sym typeface="Wingdings" panose="05000000000000000000" pitchFamily="2" charset="2"/>
-              </a:rPr>
-              <a:t>„Save </a:t>
-            </a:r>
-            <a:r>
-              <a:rPr lang="de-DE" dirty="0" err="1">
-                <a:sym typeface="Wingdings" panose="05000000000000000000" pitchFamily="2" charset="2"/>
-              </a:rPr>
-              <a:t>changes</a:t>
-            </a:r>
-            <a:r>
-              <a:rPr lang="de-DE" dirty="0">
-                <a:sym typeface="Wingdings" panose="05000000000000000000" pitchFamily="2" charset="2"/>
-              </a:rPr>
-              <a:t>“ auswählen</a:t>
-            </a:r>
-          </a:p>
-          <a:p>
-            <a:pPr marL="457200" indent="-457200">
-              <a:buFont typeface="+mj-lt"/>
-              <a:buAutoNum type="arabicPeriod"/>
-            </a:pPr>
-            <a:r>
-              <a:rPr lang="de-DE" dirty="0">
-                <a:sym typeface="Wingdings" panose="05000000000000000000" pitchFamily="2" charset="2"/>
-              </a:rPr>
-              <a:t>Daraufhin wird „Deploy“  „Container Registry“ aus der linken Sidebar entfernt</a:t>
-            </a:r>
-          </a:p>
-          <a:p>
-            <a:pPr marL="457200" indent="-457200">
-              <a:buFont typeface="+mj-lt"/>
-              <a:buAutoNum type="arabicPeriod"/>
-            </a:pPr>
-            <a:endParaRPr lang="de-DE" dirty="0"/>
+              <a:t>Sichtbarkeit der Container Registry ändern</a:t>
+            </a:r>
           </a:p>
         </p:txBody>
       </p:sp>
     </p:spTree>
     <p:extLst>
       <p:ext uri="{BB962C8B-B14F-4D97-AF65-F5344CB8AC3E}">
-        <p14:creationId xmlns:p14="http://schemas.microsoft.com/office/powerpoint/2010/main" val="3312416891"/>
+        <p14:creationId xmlns:p14="http://schemas.microsoft.com/office/powerpoint/2010/main" val="2844639609"/>
       </p:ext>
     </p:extLst>
   </p:cSld>
@@ -23022,81 +22862,185 @@
           <a:bodyPr/>
           <a:lstStyle/>
           <a:p>
+            <a:pPr marL="0" indent="0">
+              <a:buNone/>
+            </a:pPr>
+            <a:r>
+              <a:rPr lang="de-DE" b="1" dirty="0"/>
+              <a:t>Container Registry für ein Projekt deaktivieren</a:t>
+            </a:r>
+          </a:p>
+          <a:p>
             <a:pPr>
               <a:buFont typeface="Arial" panose="020B0604020202020204" pitchFamily="34" charset="0"/>
               <a:buChar char="•"/>
             </a:pPr>
             <a:r>
               <a:rPr lang="de-DE" dirty="0"/>
-              <a:t>Container Registry ansehen</a:t>
-            </a:r>
+              <a:t>Default: </a:t>
+            </a:r>
+            <a:r>
+              <a:rPr lang="de-DE" dirty="0" err="1"/>
+              <a:t>enabled</a:t>
+            </a:r>
+            <a:endParaRPr lang="de-DE" dirty="0"/>
           </a:p>
           <a:p>
             <a:pPr>
               <a:buFont typeface="Arial" panose="020B0604020202020204" pitchFamily="34" charset="0"/>
               <a:buChar char="•"/>
             </a:pPr>
-            <a:r>
-              <a:rPr lang="de-DE" dirty="0"/>
-              <a:t>Tags eines bestimmten Container Image ansehen</a:t>
-            </a:r>
-          </a:p>
-          <a:p>
-            <a:pPr>
-              <a:buFont typeface="Arial" panose="020B0604020202020204" pitchFamily="34" charset="0"/>
-              <a:buChar char="•"/>
-            </a:pPr>
-            <a:r>
-              <a:rPr lang="de-DE" dirty="0"/>
-              <a:t>Container Images von der Container Registry nutzen</a:t>
-            </a:r>
-          </a:p>
-          <a:p>
-            <a:pPr>
-              <a:buFont typeface="Arial" panose="020B0604020202020204" pitchFamily="34" charset="0"/>
-              <a:buChar char="•"/>
-            </a:pPr>
-            <a:r>
-              <a:rPr lang="de-DE" dirty="0"/>
-              <a:t>Naming Convention für Container Images</a:t>
-            </a:r>
-          </a:p>
-          <a:p>
-            <a:pPr>
-              <a:buFont typeface="Arial" panose="020B0604020202020204" pitchFamily="34" charset="0"/>
-              <a:buChar char="•"/>
-            </a:pPr>
-            <a:r>
-              <a:rPr lang="de-DE" dirty="0"/>
-              <a:t>Verschieben oder Umbenennen einer Container Registry</a:t>
-            </a:r>
-          </a:p>
-          <a:p>
-            <a:pPr>
-              <a:buFont typeface="Arial" panose="020B0604020202020204" pitchFamily="34" charset="0"/>
-              <a:buChar char="•"/>
-            </a:pPr>
-            <a:r>
-              <a:rPr lang="de-DE" dirty="0"/>
-              <a:t>Container Registry für ein Projekt deaktivieren</a:t>
-            </a:r>
-          </a:p>
-          <a:p>
-            <a:pPr>
-              <a:buFont typeface="Arial" panose="020B0604020202020204" pitchFamily="34" charset="0"/>
-              <a:buChar char="•"/>
-            </a:pPr>
-            <a:r>
-              <a:rPr lang="de-DE" u="sng" dirty="0"/>
-              <a:t>Sichtbarkeit der Container Registry ändern</a:t>
-            </a:r>
+            <a:endParaRPr lang="de-DE" dirty="0"/>
+          </a:p>
+          <a:p>
+            <a:pPr marL="457200" indent="-457200">
+              <a:buFont typeface="+mj-lt"/>
+              <a:buAutoNum type="arabicPeriod"/>
+            </a:pPr>
+            <a:r>
+              <a:rPr lang="de-DE" dirty="0"/>
+              <a:t>Gewünschtes Projekt in </a:t>
+            </a:r>
+            <a:r>
+              <a:rPr lang="de-DE" dirty="0" err="1"/>
+              <a:t>GitLab</a:t>
+            </a:r>
+            <a:r>
+              <a:rPr lang="de-DE" dirty="0"/>
+              <a:t> auswählen</a:t>
+            </a:r>
+          </a:p>
+          <a:p>
+            <a:pPr marL="457200" indent="-457200">
+              <a:buFont typeface="+mj-lt"/>
+              <a:buAutoNum type="arabicPeriod"/>
+            </a:pPr>
+            <a:r>
+              <a:rPr lang="de-DE" dirty="0"/>
+              <a:t>„Settings“ </a:t>
+            </a:r>
+            <a:r>
+              <a:rPr lang="de-DE" dirty="0">
+                <a:sym typeface="Wingdings" panose="05000000000000000000" pitchFamily="2" charset="2"/>
+              </a:rPr>
+              <a:t> „General“</a:t>
+            </a:r>
+          </a:p>
+          <a:p>
+            <a:pPr marL="457200" indent="-457200">
+              <a:buFont typeface="+mj-lt"/>
+              <a:buAutoNum type="arabicPeriod"/>
+            </a:pPr>
+            <a:r>
+              <a:rPr lang="de-DE" dirty="0"/>
+              <a:t>„</a:t>
+            </a:r>
+            <a:r>
+              <a:rPr lang="de-DE" dirty="0" err="1"/>
+              <a:t>Visibility</a:t>
+            </a:r>
+            <a:r>
+              <a:rPr lang="de-DE" dirty="0"/>
+              <a:t>, </a:t>
+            </a:r>
+            <a:r>
+              <a:rPr lang="de-DE" dirty="0" err="1"/>
+              <a:t>project</a:t>
+            </a:r>
+            <a:r>
+              <a:rPr lang="de-DE" dirty="0"/>
+              <a:t> </a:t>
+            </a:r>
+            <a:r>
+              <a:rPr lang="de-DE" dirty="0" err="1"/>
+              <a:t>features</a:t>
+            </a:r>
+            <a:r>
+              <a:rPr lang="de-DE" dirty="0"/>
+              <a:t>, </a:t>
+            </a:r>
+            <a:r>
+              <a:rPr lang="de-DE" dirty="0" err="1"/>
+              <a:t>permissions</a:t>
+            </a:r>
+            <a:r>
+              <a:rPr lang="de-DE" dirty="0"/>
+              <a:t>“ aufklappen</a:t>
+            </a:r>
+          </a:p>
+          <a:p>
+            <a:pPr marL="457200" indent="-457200">
+              <a:buFont typeface="+mj-lt"/>
+              <a:buAutoNum type="arabicPeriod"/>
+            </a:pPr>
+            <a:r>
+              <a:rPr lang="de-DE" dirty="0">
+                <a:sym typeface="Wingdings" panose="05000000000000000000" pitchFamily="2" charset="2"/>
+              </a:rPr>
+              <a:t>„Container </a:t>
+            </a:r>
+            <a:r>
+              <a:rPr lang="de-DE" dirty="0" err="1">
+                <a:sym typeface="Wingdings" panose="05000000000000000000" pitchFamily="2" charset="2"/>
+              </a:rPr>
+              <a:t>registry</a:t>
+            </a:r>
+            <a:r>
+              <a:rPr lang="de-DE" dirty="0">
+                <a:sym typeface="Wingdings" panose="05000000000000000000" pitchFamily="2" charset="2"/>
+              </a:rPr>
+              <a:t>“ deaktivieren</a:t>
+            </a:r>
+          </a:p>
+          <a:p>
+            <a:pPr marL="457200" indent="-457200">
+              <a:buFont typeface="+mj-lt"/>
+              <a:buAutoNum type="arabicPeriod"/>
+            </a:pPr>
+            <a:r>
+              <a:rPr lang="de-DE" dirty="0">
+                <a:sym typeface="Wingdings" panose="05000000000000000000" pitchFamily="2" charset="2"/>
+              </a:rPr>
+              <a:t>„Save </a:t>
+            </a:r>
+            <a:r>
+              <a:rPr lang="de-DE" dirty="0" err="1">
+                <a:sym typeface="Wingdings" panose="05000000000000000000" pitchFamily="2" charset="2"/>
+              </a:rPr>
+              <a:t>changes</a:t>
+            </a:r>
+            <a:r>
+              <a:rPr lang="de-DE" dirty="0">
+                <a:sym typeface="Wingdings" panose="05000000000000000000" pitchFamily="2" charset="2"/>
+              </a:rPr>
+              <a:t>“ auswählen</a:t>
+            </a:r>
+          </a:p>
+          <a:p>
+            <a:pPr marL="457200" indent="-457200">
+              <a:buFont typeface="+mj-lt"/>
+              <a:buAutoNum type="arabicPeriod"/>
+            </a:pPr>
+            <a:r>
+              <a:rPr lang="de-DE" dirty="0">
+                <a:sym typeface="Wingdings" panose="05000000000000000000" pitchFamily="2" charset="2"/>
+              </a:rPr>
+              <a:t>Daraufhin wird „Deploy“  „Container Registry“ aus der linken Sidebar entfernt</a:t>
+            </a:r>
+          </a:p>
+          <a:p>
+            <a:pPr marL="457200" indent="-457200">
+              <a:buFont typeface="+mj-lt"/>
+              <a:buAutoNum type="arabicPeriod"/>
+            </a:pPr>
+            <a:endParaRPr lang="de-DE" dirty="0"/>
           </a:p>
         </p:txBody>
       </p:sp>
     </p:spTree>
     <p:extLst>
       <p:ext uri="{BB962C8B-B14F-4D97-AF65-F5344CB8AC3E}">
-        <p14:creationId xmlns:p14="http://schemas.microsoft.com/office/powerpoint/2010/main" val="1284672836"/>
+        <p14:creationId xmlns:p14="http://schemas.microsoft.com/office/powerpoint/2010/main" val="3312416891"/>
       </p:ext>
     </p:extLst>
   </p:cSld>
@@ -23435,6 +23379,156 @@
           <a:bodyPr/>
           <a:lstStyle/>
           <a:p>
+            <a:pPr>
+              <a:buFont typeface="Arial" panose="020B0604020202020204" pitchFamily="34" charset="0"/>
+              <a:buChar char="•"/>
+            </a:pPr>
+            <a:r>
+              <a:rPr lang="de-DE" dirty="0"/>
+              <a:t>Container Registry ansehen</a:t>
+            </a:r>
+          </a:p>
+          <a:p>
+            <a:pPr>
+              <a:buFont typeface="Arial" panose="020B0604020202020204" pitchFamily="34" charset="0"/>
+              <a:buChar char="•"/>
+            </a:pPr>
+            <a:r>
+              <a:rPr lang="de-DE" dirty="0"/>
+              <a:t>Tags eines bestimmten Container Image ansehen</a:t>
+            </a:r>
+          </a:p>
+          <a:p>
+            <a:pPr>
+              <a:buFont typeface="Arial" panose="020B0604020202020204" pitchFamily="34" charset="0"/>
+              <a:buChar char="•"/>
+            </a:pPr>
+            <a:r>
+              <a:rPr lang="de-DE" dirty="0"/>
+              <a:t>Container Images von der Container Registry nutzen</a:t>
+            </a:r>
+          </a:p>
+          <a:p>
+            <a:pPr>
+              <a:buFont typeface="Arial" panose="020B0604020202020204" pitchFamily="34" charset="0"/>
+              <a:buChar char="•"/>
+            </a:pPr>
+            <a:r>
+              <a:rPr lang="de-DE" dirty="0"/>
+              <a:t>Naming Convention für Container Images</a:t>
+            </a:r>
+          </a:p>
+          <a:p>
+            <a:pPr>
+              <a:buFont typeface="Arial" panose="020B0604020202020204" pitchFamily="34" charset="0"/>
+              <a:buChar char="•"/>
+            </a:pPr>
+            <a:r>
+              <a:rPr lang="de-DE" dirty="0"/>
+              <a:t>Verschieben oder Umbenennen einer Container Registry</a:t>
+            </a:r>
+          </a:p>
+          <a:p>
+            <a:pPr>
+              <a:buFont typeface="Arial" panose="020B0604020202020204" pitchFamily="34" charset="0"/>
+              <a:buChar char="•"/>
+            </a:pPr>
+            <a:r>
+              <a:rPr lang="de-DE" dirty="0"/>
+              <a:t>Container Registry für ein Projekt deaktivieren</a:t>
+            </a:r>
+          </a:p>
+          <a:p>
+            <a:pPr>
+              <a:buFont typeface="Arial" panose="020B0604020202020204" pitchFamily="34" charset="0"/>
+              <a:buChar char="•"/>
+            </a:pPr>
+            <a:r>
+              <a:rPr lang="de-DE" u="sng" dirty="0"/>
+              <a:t>Sichtbarkeit der Container Registry ändern</a:t>
+            </a:r>
+          </a:p>
+        </p:txBody>
+      </p:sp>
+    </p:spTree>
+    <p:extLst>
+      <p:ext uri="{BB962C8B-B14F-4D97-AF65-F5344CB8AC3E}">
+        <p14:creationId xmlns:p14="http://schemas.microsoft.com/office/powerpoint/2010/main" val="1284672836"/>
+      </p:ext>
+    </p:extLst>
+  </p:cSld>
+  <p:clrMapOvr>
+    <a:masterClrMapping/>
+  </p:clrMapOvr>
+</p:sld>
+</file>
+
+<file path=ppt/slides/slide131.xml><?xml version="1.0" encoding="utf-8"?>
+<p:sld xmlns:a="http://schemas.openxmlformats.org/drawingml/2006/main" xmlns:r="http://schemas.openxmlformats.org/officeDocument/2006/relationships" xmlns:p="http://schemas.openxmlformats.org/presentationml/2006/main">
+  <p:cSld>
+    <p:spTree>
+      <p:nvGrpSpPr>
+        <p:cNvPr id="1" name=""/>
+        <p:cNvGrpSpPr/>
+        <p:nvPr/>
+      </p:nvGrpSpPr>
+      <p:grpSpPr>
+        <a:xfrm>
+          <a:off x="0" y="0"/>
+          <a:ext cx="0" cy="0"/>
+          <a:chOff x="0" y="0"/>
+          <a:chExt cx="0" cy="0"/>
+        </a:xfrm>
+      </p:grpSpPr>
+      <p:sp>
+        <p:nvSpPr>
+          <p:cNvPr id="2" name="Titel 1">
+            <a:extLst>
+              <a:ext uri="{FF2B5EF4-FFF2-40B4-BE49-F238E27FC236}">
+                <a16:creationId xmlns:a16="http://schemas.microsoft.com/office/drawing/2014/main" id="{6AA67486-2598-533D-4DB5-FC490AB10E2A}"/>
+              </a:ext>
+            </a:extLst>
+          </p:cNvPr>
+          <p:cNvSpPr>
+            <a:spLocks noGrp="1"/>
+          </p:cNvSpPr>
+          <p:nvPr>
+            <p:ph type="title"/>
+          </p:nvPr>
+        </p:nvSpPr>
+        <p:spPr/>
+        <p:txBody>
+          <a:bodyPr/>
+          <a:lstStyle/>
+          <a:p>
+            <a:r>
+              <a:rPr lang="de-DE" dirty="0"/>
+              <a:t>Container Registry</a:t>
+            </a:r>
+          </a:p>
+        </p:txBody>
+      </p:sp>
+      <p:sp>
+        <p:nvSpPr>
+          <p:cNvPr id="3" name="Inhaltsplatzhalter 2">
+            <a:extLst>
+              <a:ext uri="{FF2B5EF4-FFF2-40B4-BE49-F238E27FC236}">
+                <a16:creationId xmlns:a16="http://schemas.microsoft.com/office/drawing/2014/main" id="{CA708DD8-2C30-488D-3B3A-0BE38FE0786D}"/>
+              </a:ext>
+            </a:extLst>
+          </p:cNvPr>
+          <p:cNvSpPr>
+            <a:spLocks noGrp="1"/>
+          </p:cNvSpPr>
+          <p:nvPr>
+            <p:ph idx="1"/>
+          </p:nvPr>
+        </p:nvSpPr>
+        <p:spPr/>
+        <p:txBody>
+          <a:bodyPr/>
+          <a:lstStyle/>
+          <a:p>
             <a:pPr marL="0" indent="0">
               <a:buNone/>
             </a:pPr>
@@ -23690,7 +23784,7 @@
 </p:sld>
 </file>
 
-<file path=ppt/slides/slide131.xml><?xml version="1.0" encoding="utf-8"?>
+<file path=ppt/slides/slide132.xml><?xml version="1.0" encoding="utf-8"?>
 <p:sld xmlns:a="http://schemas.openxmlformats.org/drawingml/2006/main" xmlns:r="http://schemas.openxmlformats.org/officeDocument/2006/relationships" xmlns:p="http://schemas.openxmlformats.org/presentationml/2006/main">
   <p:cSld>
     <p:spTree>

</xml_diff>